<commit_message>
feat: update smartdata-2025 presentation
</commit_message>
<xml_diff>
--- a/smartdata/cdc-via-debezium/debezium-smartdata2025.pptx
+++ b/smartdata/cdc-via-debezium/debezium-smartdata2025.pptx
@@ -6,6 +6,30 @@
   </p:sldMasterIdLst>
   <p:sldIdLst>
     <p:sldId id="256" r:id="rId2"/>
+    <p:sldId id="257" r:id="rId3"/>
+    <p:sldId id="258" r:id="rId4"/>
+    <p:sldId id="262" r:id="rId5"/>
+    <p:sldId id="259" r:id="rId6"/>
+    <p:sldId id="260" r:id="rId7"/>
+    <p:sldId id="264" r:id="rId8"/>
+    <p:sldId id="263" r:id="rId9"/>
+    <p:sldId id="261" r:id="rId10"/>
+    <p:sldId id="265" r:id="rId11"/>
+    <p:sldId id="266" r:id="rId12"/>
+    <p:sldId id="267" r:id="rId13"/>
+    <p:sldId id="268" r:id="rId14"/>
+    <p:sldId id="271" r:id="rId15"/>
+    <p:sldId id="272" r:id="rId16"/>
+    <p:sldId id="269" r:id="rId17"/>
+    <p:sldId id="270" r:id="rId18"/>
+    <p:sldId id="273" r:id="rId19"/>
+    <p:sldId id="278" r:id="rId20"/>
+    <p:sldId id="274" r:id="rId21"/>
+    <p:sldId id="275" r:id="rId22"/>
+    <p:sldId id="276" r:id="rId23"/>
+    <p:sldId id="277" r:id="rId24"/>
+    <p:sldId id="279" r:id="rId25"/>
+    <p:sldId id="280" r:id="rId26"/>
   </p:sldIdLst>
   <p:sldSz cx="12192000" cy="6858000"/>
   <p:notesSz cx="6858000" cy="9144000"/>
@@ -104,6 +128,11 @@
       </a:defRPr>
     </a:lvl9pPr>
   </p:defaultTextStyle>
+  <p:extLst>
+    <p:ext uri="{EFAFB233-063F-42B5-8137-9DF3F51BA10A}">
+      <p15:sldGuideLst xmlns:p15="http://schemas.microsoft.com/office/powerpoint/2012/main"/>
+    </p:ext>
+  </p:extLst>
 </p:presentation>
 </file>
 
@@ -254,7 +283,7 @@
           <a:p>
             <a:fld id="{0A80387B-3432-BD42-8238-00F612919BB5}" type="datetimeFigureOut">
               <a:rPr lang="en-US" smtClean="0"/>
-              <a:t>7/21/25</a:t>
+              <a:t>8/18/25</a:t>
             </a:fld>
             <a:endParaRPr lang="en-US"/>
           </a:p>
@@ -452,7 +481,7 @@
           <a:p>
             <a:fld id="{0A80387B-3432-BD42-8238-00F612919BB5}" type="datetimeFigureOut">
               <a:rPr lang="en-US" smtClean="0"/>
-              <a:t>7/21/25</a:t>
+              <a:t>8/18/25</a:t>
             </a:fld>
             <a:endParaRPr lang="en-US"/>
           </a:p>
@@ -660,7 +689,7 @@
           <a:p>
             <a:fld id="{0A80387B-3432-BD42-8238-00F612919BB5}" type="datetimeFigureOut">
               <a:rPr lang="en-US" smtClean="0"/>
-              <a:t>7/21/25</a:t>
+              <a:t>8/18/25</a:t>
             </a:fld>
             <a:endParaRPr lang="en-US"/>
           </a:p>
@@ -858,7 +887,7 @@
           <a:p>
             <a:fld id="{0A80387B-3432-BD42-8238-00F612919BB5}" type="datetimeFigureOut">
               <a:rPr lang="en-US" smtClean="0"/>
-              <a:t>7/21/25</a:t>
+              <a:t>8/18/25</a:t>
             </a:fld>
             <a:endParaRPr lang="en-US"/>
           </a:p>
@@ -1133,7 +1162,7 @@
           <a:p>
             <a:fld id="{0A80387B-3432-BD42-8238-00F612919BB5}" type="datetimeFigureOut">
               <a:rPr lang="en-US" smtClean="0"/>
-              <a:t>7/21/25</a:t>
+              <a:t>8/18/25</a:t>
             </a:fld>
             <a:endParaRPr lang="en-US"/>
           </a:p>
@@ -1398,7 +1427,7 @@
           <a:p>
             <a:fld id="{0A80387B-3432-BD42-8238-00F612919BB5}" type="datetimeFigureOut">
               <a:rPr lang="en-US" smtClean="0"/>
-              <a:t>7/21/25</a:t>
+              <a:t>8/18/25</a:t>
             </a:fld>
             <a:endParaRPr lang="en-US"/>
           </a:p>
@@ -1810,7 +1839,7 @@
           <a:p>
             <a:fld id="{0A80387B-3432-BD42-8238-00F612919BB5}" type="datetimeFigureOut">
               <a:rPr lang="en-US" smtClean="0"/>
-              <a:t>7/21/25</a:t>
+              <a:t>8/18/25</a:t>
             </a:fld>
             <a:endParaRPr lang="en-US"/>
           </a:p>
@@ -1951,7 +1980,7 @@
           <a:p>
             <a:fld id="{0A80387B-3432-BD42-8238-00F612919BB5}" type="datetimeFigureOut">
               <a:rPr lang="en-US" smtClean="0"/>
-              <a:t>7/21/25</a:t>
+              <a:t>8/18/25</a:t>
             </a:fld>
             <a:endParaRPr lang="en-US"/>
           </a:p>
@@ -2064,7 +2093,7 @@
           <a:p>
             <a:fld id="{0A80387B-3432-BD42-8238-00F612919BB5}" type="datetimeFigureOut">
               <a:rPr lang="en-US" smtClean="0"/>
-              <a:t>7/21/25</a:t>
+              <a:t>8/18/25</a:t>
             </a:fld>
             <a:endParaRPr lang="en-US"/>
           </a:p>
@@ -2375,7 +2404,7 @@
           <a:p>
             <a:fld id="{0A80387B-3432-BD42-8238-00F612919BB5}" type="datetimeFigureOut">
               <a:rPr lang="en-US" smtClean="0"/>
-              <a:t>7/21/25</a:t>
+              <a:t>8/18/25</a:t>
             </a:fld>
             <a:endParaRPr lang="en-US"/>
           </a:p>
@@ -2663,7 +2692,7 @@
           <a:p>
             <a:fld id="{0A80387B-3432-BD42-8238-00F612919BB5}" type="datetimeFigureOut">
               <a:rPr lang="en-US" smtClean="0"/>
-              <a:t>7/21/25</a:t>
+              <a:t>8/18/25</a:t>
             </a:fld>
             <a:endParaRPr lang="en-US"/>
           </a:p>
@@ -2904,7 +2933,7 @@
           <a:p>
             <a:fld id="{0A80387B-3432-BD42-8238-00F612919BB5}" type="datetimeFigureOut">
               <a:rPr lang="en-US" smtClean="0"/>
-              <a:t>7/21/25</a:t>
+              <a:t>8/18/25</a:t>
             </a:fld>
             <a:endParaRPr lang="en-US"/>
           </a:p>
@@ -3337,37 +3366,108 @@
             <p:ph type="ctrTitle"/>
           </p:nvPr>
         </p:nvSpPr>
-        <p:spPr/>
-        <p:txBody>
-          <a:bodyPr/>
-          <a:lstStyle/>
-          <a:p>
-            <a:endParaRPr lang="en-US"/>
-          </a:p>
-        </p:txBody>
-      </p:sp>
-      <p:sp>
-        <p:nvSpPr>
-          <p:cNvPr id="3" name="Subtitle 2">
-            <a:extLst>
-              <a:ext uri="{FF2B5EF4-FFF2-40B4-BE49-F238E27FC236}">
-                <a16:creationId xmlns:a16="http://schemas.microsoft.com/office/drawing/2014/main" id="{95B19651-5943-A542-BC8C-444F360E43CA}"/>
-              </a:ext>
-            </a:extLst>
-          </p:cNvPr>
-          <p:cNvSpPr>
-            <a:spLocks noGrp="1"/>
-          </p:cNvSpPr>
-          <p:nvPr>
-            <p:ph type="subTitle" idx="1"/>
-          </p:nvPr>
-        </p:nvSpPr>
-        <p:spPr/>
-        <p:txBody>
-          <a:bodyPr/>
-          <a:lstStyle/>
-          <a:p>
-            <a:endParaRPr lang="en-US"/>
+        <p:spPr>
+          <a:xfrm>
+            <a:off x="59821" y="427291"/>
+            <a:ext cx="12132179" cy="4640366"/>
+          </a:xfrm>
+        </p:spPr>
+        <p:txBody>
+          <a:bodyPr>
+            <a:normAutofit/>
+          </a:bodyPr>
+          <a:lstStyle/>
+          <a:p>
+            <a:r>
+              <a:rPr lang="ru-RU" b="1" dirty="0">
+                <a:solidFill>
+                  <a:srgbClr val="000000"/>
+                </a:solidFill>
+                <a:effectLst/>
+                <a:latin typeface="Helvetica Neue" panose="02000503000000020004" pitchFamily="2" charset="0"/>
+              </a:rPr>
+              <a:t>Способы организации </a:t>
+            </a:r>
+            <a:r>
+              <a:rPr lang="en-US" b="1" dirty="0">
+                <a:solidFill>
+                  <a:srgbClr val="000000"/>
+                </a:solidFill>
+                <a:effectLst/>
+                <a:latin typeface="Helvetica Neue" panose="02000503000000020004" pitchFamily="2" charset="0"/>
+              </a:rPr>
+              <a:t>CDC </a:t>
+            </a:r>
+            <a:r>
+              <a:rPr lang="ru-RU" b="1" dirty="0">
+                <a:solidFill>
+                  <a:srgbClr val="000000"/>
+                </a:solidFill>
+                <a:effectLst/>
+                <a:latin typeface="Helvetica Neue" panose="02000503000000020004" pitchFamily="2" charset="0"/>
+              </a:rPr>
+              <a:t>в </a:t>
+            </a:r>
+            <a:r>
+              <a:rPr lang="en-US" b="1" dirty="0">
+                <a:solidFill>
+                  <a:srgbClr val="000000"/>
+                </a:solidFill>
+                <a:effectLst/>
+                <a:latin typeface="Helvetica Neue" panose="02000503000000020004" pitchFamily="2" charset="0"/>
+              </a:rPr>
+              <a:t>PostgreSQL </a:t>
+            </a:r>
+            <a:r>
+              <a:rPr lang="ru-RU" b="1" dirty="0">
+                <a:solidFill>
+                  <a:srgbClr val="000000"/>
+                </a:solidFill>
+                <a:effectLst/>
+                <a:latin typeface="Helvetica Neue" panose="02000503000000020004" pitchFamily="2" charset="0"/>
+              </a:rPr>
+              <a:t>и почему </a:t>
+            </a:r>
+            <a:r>
+              <a:rPr lang="en-US" b="1" dirty="0" err="1">
+                <a:solidFill>
+                  <a:srgbClr val="000000"/>
+                </a:solidFill>
+                <a:effectLst/>
+                <a:latin typeface="Helvetica Neue" panose="02000503000000020004" pitchFamily="2" charset="0"/>
+              </a:rPr>
+              <a:t>Debezium</a:t>
+            </a:r>
+            <a:r>
+              <a:rPr lang="en-US" b="1" dirty="0">
+                <a:solidFill>
+                  <a:srgbClr val="000000"/>
+                </a:solidFill>
+                <a:effectLst/>
+                <a:latin typeface="Helvetica Neue" panose="02000503000000020004" pitchFamily="2" charset="0"/>
+              </a:rPr>
+              <a:t> </a:t>
+            </a:r>
+            <a:r>
+              <a:rPr lang="ru-RU" b="1" dirty="0">
+                <a:solidFill>
+                  <a:srgbClr val="000000"/>
+                </a:solidFill>
+                <a:effectLst/>
+                <a:latin typeface="Helvetica Neue" panose="02000503000000020004" pitchFamily="2" charset="0"/>
+              </a:rPr>
+              <a:t>из коробки может не решить всех проблем</a:t>
+            </a:r>
+            <a:br>
+              <a:rPr lang="ru-RU" dirty="0">
+                <a:solidFill>
+                  <a:srgbClr val="000000"/>
+                </a:solidFill>
+                <a:effectLst/>
+                <a:latin typeface="Helvetica Neue" panose="02000503000000020004" pitchFamily="2" charset="0"/>
+              </a:rPr>
+            </a:br>
+            <a:endParaRPr lang="en-US" dirty="0"/>
           </a:p>
         </p:txBody>
       </p:sp>
@@ -3375,6 +3475,3931 @@
     <p:extLst>
       <p:ext uri="{BB962C8B-B14F-4D97-AF65-F5344CB8AC3E}">
         <p14:creationId xmlns:p14="http://schemas.microsoft.com/office/powerpoint/2010/main" val="2470531960"/>
+      </p:ext>
+    </p:extLst>
+  </p:cSld>
+  <p:clrMapOvr>
+    <a:masterClrMapping/>
+  </p:clrMapOvr>
+</p:sld>
+</file>
+
+<file path=ppt/slides/slide10.xml><?xml version="1.0" encoding="utf-8"?>
+<p:sld xmlns:a="http://schemas.openxmlformats.org/drawingml/2006/main" xmlns:r="http://schemas.openxmlformats.org/officeDocument/2006/relationships" xmlns:p="http://schemas.openxmlformats.org/presentationml/2006/main">
+  <p:cSld>
+    <p:spTree>
+      <p:nvGrpSpPr>
+        <p:cNvPr id="1" name=""/>
+        <p:cNvGrpSpPr/>
+        <p:nvPr/>
+      </p:nvGrpSpPr>
+      <p:grpSpPr>
+        <a:xfrm>
+          <a:off x="0" y="0"/>
+          <a:ext cx="0" cy="0"/>
+          <a:chOff x="0" y="0"/>
+          <a:chExt cx="0" cy="0"/>
+        </a:xfrm>
+      </p:grpSpPr>
+      <p:sp>
+        <p:nvSpPr>
+          <p:cNvPr id="2" name="Title 1">
+            <a:extLst>
+              <a:ext uri="{FF2B5EF4-FFF2-40B4-BE49-F238E27FC236}">
+                <a16:creationId xmlns:a16="http://schemas.microsoft.com/office/drawing/2014/main" id="{00888323-12E8-8C4F-8E27-23BD5B7DEE03}"/>
+              </a:ext>
+            </a:extLst>
+          </p:cNvPr>
+          <p:cNvSpPr>
+            <a:spLocks noGrp="1"/>
+          </p:cNvSpPr>
+          <p:nvPr>
+            <p:ph type="title"/>
+          </p:nvPr>
+        </p:nvSpPr>
+        <p:spPr>
+          <a:xfrm>
+            <a:off x="0" y="18255"/>
+            <a:ext cx="10515600" cy="1325563"/>
+          </a:xfrm>
+        </p:spPr>
+        <p:txBody>
+          <a:bodyPr/>
+          <a:lstStyle/>
+          <a:p>
+            <a:r>
+              <a:rPr lang="en-US" dirty="0" err="1"/>
+              <a:t>Debezium</a:t>
+            </a:r>
+            <a:r>
+              <a:rPr lang="en-US" dirty="0"/>
+              <a:t>: </a:t>
+            </a:r>
+            <a:r>
+              <a:rPr lang="ru-RU" dirty="0"/>
+              <a:t>«базовый </a:t>
+            </a:r>
+            <a:r>
+              <a:rPr lang="ru-RU" dirty="0" err="1"/>
+              <a:t>сетап</a:t>
+            </a:r>
+            <a:r>
+              <a:rPr lang="ru-RU" dirty="0"/>
+              <a:t>»</a:t>
+            </a:r>
+            <a:endParaRPr lang="en-US" dirty="0"/>
+          </a:p>
+        </p:txBody>
+      </p:sp>
+      <p:sp>
+        <p:nvSpPr>
+          <p:cNvPr id="3" name="Content Placeholder 2">
+            <a:extLst>
+              <a:ext uri="{FF2B5EF4-FFF2-40B4-BE49-F238E27FC236}">
+                <a16:creationId xmlns:a16="http://schemas.microsoft.com/office/drawing/2014/main" id="{DA11F9D3-C291-2245-AEA5-8D09537FB4E5}"/>
+              </a:ext>
+            </a:extLst>
+          </p:cNvPr>
+          <p:cNvSpPr>
+            <a:spLocks noGrp="1"/>
+          </p:cNvSpPr>
+          <p:nvPr>
+            <p:ph idx="1"/>
+          </p:nvPr>
+        </p:nvSpPr>
+        <p:spPr>
+          <a:xfrm>
+            <a:off x="0" y="1343818"/>
+            <a:ext cx="10515600" cy="4351338"/>
+          </a:xfrm>
+        </p:spPr>
+        <p:txBody>
+          <a:bodyPr/>
+          <a:lstStyle/>
+          <a:p>
+            <a:r>
+              <a:rPr lang="ru-RU" dirty="0"/>
+              <a:t>Все примеры на основе </a:t>
+            </a:r>
+            <a:r>
+              <a:rPr lang="en-US" dirty="0" err="1"/>
+              <a:t>Debezium</a:t>
+            </a:r>
+            <a:r>
+              <a:rPr lang="en-US" dirty="0"/>
+              <a:t> Engine, </a:t>
+            </a:r>
+            <a:r>
+              <a:rPr lang="ru-RU" dirty="0"/>
+              <a:t>но они также справедливы и для </a:t>
+            </a:r>
+            <a:r>
+              <a:rPr lang="en-US" dirty="0" err="1"/>
+              <a:t>kafka</a:t>
+            </a:r>
+            <a:r>
+              <a:rPr lang="en-US" dirty="0"/>
+              <a:t>-connect </a:t>
+            </a:r>
+            <a:r>
+              <a:rPr lang="ru-RU" dirty="0"/>
+              <a:t>коннектора, </a:t>
+            </a:r>
+            <a:r>
+              <a:rPr lang="en-US" dirty="0" err="1"/>
+              <a:t>Debezium</a:t>
+            </a:r>
+            <a:r>
+              <a:rPr lang="en-US" dirty="0"/>
+              <a:t> Server </a:t>
+            </a:r>
+            <a:r>
+              <a:rPr lang="ru-RU" dirty="0"/>
+              <a:t>и др.</a:t>
+            </a:r>
+          </a:p>
+          <a:p>
+            <a:r>
+              <a:rPr lang="ru-RU" dirty="0"/>
+              <a:t>Начальная конфигурация: 1 таблица</a:t>
+            </a:r>
+            <a:endParaRPr lang="en-US" dirty="0"/>
+          </a:p>
+        </p:txBody>
+      </p:sp>
+    </p:spTree>
+    <p:extLst>
+      <p:ext uri="{BB962C8B-B14F-4D97-AF65-F5344CB8AC3E}">
+        <p14:creationId xmlns:p14="http://schemas.microsoft.com/office/powerpoint/2010/main" val="1244290482"/>
+      </p:ext>
+    </p:extLst>
+  </p:cSld>
+  <p:clrMapOvr>
+    <a:masterClrMapping/>
+  </p:clrMapOvr>
+</p:sld>
+</file>
+
+<file path=ppt/slides/slide11.xml><?xml version="1.0" encoding="utf-8"?>
+<p:sld xmlns:a="http://schemas.openxmlformats.org/drawingml/2006/main" xmlns:r="http://schemas.openxmlformats.org/officeDocument/2006/relationships" xmlns:p="http://schemas.openxmlformats.org/presentationml/2006/main">
+  <p:cSld>
+    <p:spTree>
+      <p:nvGrpSpPr>
+        <p:cNvPr id="1" name=""/>
+        <p:cNvGrpSpPr/>
+        <p:nvPr/>
+      </p:nvGrpSpPr>
+      <p:grpSpPr>
+        <a:xfrm>
+          <a:off x="0" y="0"/>
+          <a:ext cx="0" cy="0"/>
+          <a:chOff x="0" y="0"/>
+          <a:chExt cx="0" cy="0"/>
+        </a:xfrm>
+      </p:grpSpPr>
+      <p:sp>
+        <p:nvSpPr>
+          <p:cNvPr id="2" name="Title 1">
+            <a:extLst>
+              <a:ext uri="{FF2B5EF4-FFF2-40B4-BE49-F238E27FC236}">
+                <a16:creationId xmlns:a16="http://schemas.microsoft.com/office/drawing/2014/main" id="{00888323-12E8-8C4F-8E27-23BD5B7DEE03}"/>
+              </a:ext>
+            </a:extLst>
+          </p:cNvPr>
+          <p:cNvSpPr>
+            <a:spLocks noGrp="1"/>
+          </p:cNvSpPr>
+          <p:nvPr>
+            <p:ph type="title"/>
+          </p:nvPr>
+        </p:nvSpPr>
+        <p:spPr>
+          <a:xfrm>
+            <a:off x="0" y="18255"/>
+            <a:ext cx="10515600" cy="1325563"/>
+          </a:xfrm>
+        </p:spPr>
+        <p:txBody>
+          <a:bodyPr/>
+          <a:lstStyle/>
+          <a:p>
+            <a:r>
+              <a:rPr lang="en-US" dirty="0" err="1"/>
+              <a:t>Debezium</a:t>
+            </a:r>
+            <a:r>
+              <a:rPr lang="en-US" dirty="0"/>
+              <a:t>: </a:t>
+            </a:r>
+            <a:r>
+              <a:rPr lang="ru-RU" dirty="0"/>
+              <a:t>«базовый </a:t>
+            </a:r>
+            <a:r>
+              <a:rPr lang="ru-RU" dirty="0" err="1"/>
+              <a:t>сетап</a:t>
+            </a:r>
+            <a:r>
+              <a:rPr lang="ru-RU" dirty="0"/>
+              <a:t>»</a:t>
+            </a:r>
+            <a:endParaRPr lang="en-US" dirty="0"/>
+          </a:p>
+        </p:txBody>
+      </p:sp>
+      <p:sp>
+        <p:nvSpPr>
+          <p:cNvPr id="3" name="Content Placeholder 2">
+            <a:extLst>
+              <a:ext uri="{FF2B5EF4-FFF2-40B4-BE49-F238E27FC236}">
+                <a16:creationId xmlns:a16="http://schemas.microsoft.com/office/drawing/2014/main" id="{DA11F9D3-C291-2245-AEA5-8D09537FB4E5}"/>
+              </a:ext>
+            </a:extLst>
+          </p:cNvPr>
+          <p:cNvSpPr>
+            <a:spLocks noGrp="1"/>
+          </p:cNvSpPr>
+          <p:nvPr>
+            <p:ph idx="1"/>
+          </p:nvPr>
+        </p:nvSpPr>
+        <p:spPr>
+          <a:xfrm>
+            <a:off x="0" y="1343818"/>
+            <a:ext cx="10515600" cy="4351338"/>
+          </a:xfrm>
+        </p:spPr>
+        <p:txBody>
+          <a:bodyPr/>
+          <a:lstStyle/>
+          <a:p>
+            <a:r>
+              <a:rPr lang="ru-RU" dirty="0"/>
+              <a:t>Картинка: БД, приложение с </a:t>
+            </a:r>
+            <a:r>
+              <a:rPr lang="en-US" dirty="0" err="1"/>
+              <a:t>debezium</a:t>
+            </a:r>
+            <a:r>
+              <a:rPr lang="en-US" dirty="0"/>
+              <a:t>, </a:t>
+            </a:r>
+            <a:r>
+              <a:rPr lang="ru-RU" dirty="0" err="1"/>
+              <a:t>таргет</a:t>
+            </a:r>
+            <a:endParaRPr lang="en-US" dirty="0"/>
+          </a:p>
+        </p:txBody>
+      </p:sp>
+    </p:spTree>
+    <p:extLst>
+      <p:ext uri="{BB962C8B-B14F-4D97-AF65-F5344CB8AC3E}">
+        <p14:creationId xmlns:p14="http://schemas.microsoft.com/office/powerpoint/2010/main" val="3546497611"/>
+      </p:ext>
+    </p:extLst>
+  </p:cSld>
+  <p:clrMapOvr>
+    <a:masterClrMapping/>
+  </p:clrMapOvr>
+</p:sld>
+</file>
+
+<file path=ppt/slides/slide12.xml><?xml version="1.0" encoding="utf-8"?>
+<p:sld xmlns:a="http://schemas.openxmlformats.org/drawingml/2006/main" xmlns:r="http://schemas.openxmlformats.org/officeDocument/2006/relationships" xmlns:p="http://schemas.openxmlformats.org/presentationml/2006/main">
+  <p:cSld>
+    <p:spTree>
+      <p:nvGrpSpPr>
+        <p:cNvPr id="1" name=""/>
+        <p:cNvGrpSpPr/>
+        <p:nvPr/>
+      </p:nvGrpSpPr>
+      <p:grpSpPr>
+        <a:xfrm>
+          <a:off x="0" y="0"/>
+          <a:ext cx="0" cy="0"/>
+          <a:chOff x="0" y="0"/>
+          <a:chExt cx="0" cy="0"/>
+        </a:xfrm>
+      </p:grpSpPr>
+      <p:sp>
+        <p:nvSpPr>
+          <p:cNvPr id="2" name="Title 1">
+            <a:extLst>
+              <a:ext uri="{FF2B5EF4-FFF2-40B4-BE49-F238E27FC236}">
+                <a16:creationId xmlns:a16="http://schemas.microsoft.com/office/drawing/2014/main" id="{00888323-12E8-8C4F-8E27-23BD5B7DEE03}"/>
+              </a:ext>
+            </a:extLst>
+          </p:cNvPr>
+          <p:cNvSpPr>
+            <a:spLocks noGrp="1"/>
+          </p:cNvSpPr>
+          <p:nvPr>
+            <p:ph type="title"/>
+          </p:nvPr>
+        </p:nvSpPr>
+        <p:spPr>
+          <a:xfrm>
+            <a:off x="0" y="18255"/>
+            <a:ext cx="10515600" cy="1325563"/>
+          </a:xfrm>
+        </p:spPr>
+        <p:txBody>
+          <a:bodyPr/>
+          <a:lstStyle/>
+          <a:p>
+            <a:r>
+              <a:rPr lang="en-US" dirty="0" err="1"/>
+              <a:t>Debezium</a:t>
+            </a:r>
+            <a:r>
+              <a:rPr lang="en-US" dirty="0"/>
+              <a:t>: </a:t>
+            </a:r>
+            <a:r>
+              <a:rPr lang="ru-RU" dirty="0" err="1"/>
+              <a:t>снепшоты</a:t>
+            </a:r>
+            <a:endParaRPr lang="en-US" dirty="0"/>
+          </a:p>
+        </p:txBody>
+      </p:sp>
+      <p:sp>
+        <p:nvSpPr>
+          <p:cNvPr id="3" name="Content Placeholder 2">
+            <a:extLst>
+              <a:ext uri="{FF2B5EF4-FFF2-40B4-BE49-F238E27FC236}">
+                <a16:creationId xmlns:a16="http://schemas.microsoft.com/office/drawing/2014/main" id="{DA11F9D3-C291-2245-AEA5-8D09537FB4E5}"/>
+              </a:ext>
+            </a:extLst>
+          </p:cNvPr>
+          <p:cNvSpPr>
+            <a:spLocks noGrp="1"/>
+          </p:cNvSpPr>
+          <p:nvPr>
+            <p:ph idx="1"/>
+          </p:nvPr>
+        </p:nvSpPr>
+        <p:spPr>
+          <a:xfrm>
+            <a:off x="-1" y="1343818"/>
+            <a:ext cx="11835925" cy="5381722"/>
+          </a:xfrm>
+        </p:spPr>
+        <p:txBody>
+          <a:bodyPr>
+            <a:normAutofit fontScale="77500" lnSpcReduction="20000"/>
+          </a:bodyPr>
+          <a:lstStyle/>
+          <a:p>
+            <a:r>
+              <a:rPr lang="ru-RU" dirty="0"/>
+              <a:t>Задача: перед стартом нужно получить текущее состояние таблицы</a:t>
+            </a:r>
+          </a:p>
+          <a:p>
+            <a:r>
+              <a:rPr lang="ru-RU" dirty="0"/>
+              <a:t>Решение: </a:t>
+            </a:r>
+            <a:r>
+              <a:rPr lang="ru-RU" dirty="0" err="1"/>
+              <a:t>снепшот</a:t>
+            </a:r>
+            <a:endParaRPr lang="ru-RU" dirty="0"/>
+          </a:p>
+          <a:p>
+            <a:r>
+              <a:rPr lang="ru-RU" dirty="0"/>
+              <a:t>Проблема </a:t>
+            </a:r>
+            <a:r>
+              <a:rPr lang="en-US" dirty="0"/>
+              <a:t>#1</a:t>
+            </a:r>
+            <a:r>
+              <a:rPr lang="ru-RU" dirty="0"/>
+              <a:t>: </a:t>
+            </a:r>
+            <a:r>
+              <a:rPr lang="en-US" dirty="0"/>
+              <a:t>Blocking snapshot =&gt; </a:t>
+            </a:r>
+            <a:r>
+              <a:rPr lang="ru-RU" dirty="0"/>
+              <a:t>долгие транзакции в случае больших таблиц</a:t>
+            </a:r>
+          </a:p>
+          <a:p>
+            <a:pPr lvl="1"/>
+            <a:r>
+              <a:rPr lang="ru-RU" dirty="0"/>
+              <a:t>Решение: </a:t>
+            </a:r>
+            <a:r>
+              <a:rPr lang="en-US" dirty="0"/>
+              <a:t>Incremental snapshot</a:t>
+            </a:r>
+            <a:r>
+              <a:rPr lang="ru-RU" dirty="0"/>
+              <a:t> (но работает только для </a:t>
+            </a:r>
+            <a:r>
+              <a:rPr lang="en-US" dirty="0"/>
+              <a:t>signal=source</a:t>
+            </a:r>
+            <a:r>
+              <a:rPr lang="ru-RU" dirty="0"/>
+              <a:t>)</a:t>
+            </a:r>
+          </a:p>
+          <a:p>
+            <a:r>
+              <a:rPr lang="ru-RU" dirty="0"/>
+              <a:t>Проблема </a:t>
+            </a:r>
+            <a:r>
+              <a:rPr lang="en-US" dirty="0"/>
+              <a:t>#2: Incremental snapshot </a:t>
+            </a:r>
+            <a:r>
+              <a:rPr lang="ru-RU" dirty="0" err="1"/>
+              <a:t>рабоатет</a:t>
+            </a:r>
+            <a:r>
+              <a:rPr lang="ru-RU" dirty="0"/>
+              <a:t> только для таблиц с ПК</a:t>
+            </a:r>
+          </a:p>
+          <a:p>
+            <a:pPr lvl="1"/>
+            <a:r>
+              <a:rPr lang="ru-RU" dirty="0"/>
+              <a:t>Решение: </a:t>
+            </a:r>
+            <a:r>
+              <a:rPr lang="en-US" dirty="0"/>
+              <a:t>surrogate key</a:t>
+            </a:r>
+          </a:p>
+          <a:p>
+            <a:r>
+              <a:rPr lang="ru-RU" dirty="0"/>
+              <a:t>Проблема </a:t>
+            </a:r>
+            <a:r>
+              <a:rPr lang="en-US" dirty="0"/>
+              <a:t>#</a:t>
+            </a:r>
+            <a:r>
+              <a:rPr lang="ru-RU" dirty="0"/>
+              <a:t>3: долгий </a:t>
+            </a:r>
+            <a:r>
+              <a:rPr lang="ru-RU" dirty="0" err="1"/>
+              <a:t>снепшот</a:t>
+            </a:r>
+            <a:endParaRPr lang="ru-RU" dirty="0"/>
+          </a:p>
+          <a:p>
+            <a:pPr lvl="1"/>
+            <a:r>
+              <a:rPr lang="ru-RU" dirty="0"/>
+              <a:t>Решение: своя логика снятия </a:t>
+            </a:r>
+            <a:r>
+              <a:rPr lang="ru-RU" dirty="0" err="1"/>
+              <a:t>снепшота</a:t>
+            </a:r>
+            <a:r>
+              <a:rPr lang="ru-RU" dirty="0"/>
+              <a:t> или готовое решение (</a:t>
+            </a:r>
+            <a:r>
+              <a:rPr lang="en-US" dirty="0"/>
+              <a:t>ex. apache </a:t>
+            </a:r>
+            <a:r>
+              <a:rPr lang="en-US" dirty="0" err="1"/>
+              <a:t>flink</a:t>
+            </a:r>
+            <a:r>
+              <a:rPr lang="en-US" dirty="0"/>
+              <a:t> </a:t>
+            </a:r>
+            <a:r>
+              <a:rPr lang="en-US" dirty="0" err="1"/>
+              <a:t>cdc</a:t>
+            </a:r>
+            <a:r>
+              <a:rPr lang="ru-RU" dirty="0"/>
+              <a:t>)</a:t>
+            </a:r>
+          </a:p>
+          <a:p>
+            <a:r>
+              <a:rPr lang="ru-RU" dirty="0"/>
+              <a:t>Проблема </a:t>
+            </a:r>
+            <a:r>
+              <a:rPr lang="en-US" dirty="0"/>
+              <a:t>#</a:t>
+            </a:r>
+            <a:r>
+              <a:rPr lang="ru-RU" dirty="0"/>
+              <a:t>4</a:t>
+            </a:r>
+            <a:r>
+              <a:rPr lang="en-US" dirty="0"/>
+              <a:t>: </a:t>
+            </a:r>
+            <a:r>
+              <a:rPr lang="ru-RU" dirty="0" err="1"/>
+              <a:t>снепшоты</a:t>
+            </a:r>
+            <a:r>
+              <a:rPr lang="ru-RU" dirty="0"/>
+              <a:t> запускается повторно после рестарта приложения</a:t>
+            </a:r>
+          </a:p>
+          <a:p>
+            <a:pPr lvl="1"/>
+            <a:r>
+              <a:rPr lang="ru-RU" dirty="0"/>
+              <a:t>Решение: изменить настройку </a:t>
+            </a:r>
+            <a:r>
+              <a:rPr lang="en-US" dirty="0" err="1"/>
+              <a:t>snapshot.mode</a:t>
+            </a:r>
+            <a:r>
+              <a:rPr lang="en-US" dirty="0"/>
+              <a:t> </a:t>
+            </a:r>
+            <a:r>
+              <a:rPr lang="ru-RU" dirty="0"/>
+              <a:t>на </a:t>
+            </a:r>
+            <a:r>
+              <a:rPr lang="en-US" dirty="0"/>
+              <a:t>NO_DATA </a:t>
+            </a:r>
+            <a:r>
+              <a:rPr lang="ru-RU" dirty="0"/>
+              <a:t>и управлять </a:t>
+            </a:r>
+            <a:r>
+              <a:rPr lang="ru-RU" dirty="0" err="1"/>
+              <a:t>снепшотом</a:t>
+            </a:r>
+            <a:r>
+              <a:rPr lang="ru-RU" dirty="0"/>
+              <a:t> </a:t>
+            </a:r>
+            <a:r>
+              <a:rPr lang="ru-RU" dirty="0" err="1"/>
+              <a:t>самостоятльно</a:t>
+            </a:r>
+            <a:r>
+              <a:rPr lang="ru-RU" dirty="0"/>
+              <a:t> через сигналы</a:t>
+            </a:r>
+          </a:p>
+          <a:p>
+            <a:r>
+              <a:rPr lang="ru-RU" dirty="0"/>
+              <a:t>Проблема </a:t>
+            </a:r>
+            <a:r>
+              <a:rPr lang="en-US" dirty="0"/>
+              <a:t>#5</a:t>
+            </a:r>
+            <a:r>
+              <a:rPr lang="ru-RU" dirty="0"/>
+              <a:t>: </a:t>
+            </a:r>
+            <a:r>
+              <a:rPr lang="ru-RU" dirty="0" err="1"/>
+              <a:t>снепшоты</a:t>
+            </a:r>
+            <a:r>
+              <a:rPr lang="ru-RU" dirty="0"/>
+              <a:t> через сигналы не запускаются</a:t>
+            </a:r>
+          </a:p>
+          <a:p>
+            <a:pPr lvl="1"/>
+            <a:r>
+              <a:rPr lang="ru-RU" dirty="0"/>
+              <a:t>Решение </a:t>
+            </a:r>
+            <a:r>
+              <a:rPr lang="en-US" dirty="0"/>
+              <a:t>#1</a:t>
+            </a:r>
+            <a:r>
+              <a:rPr lang="ru-RU" dirty="0"/>
+              <a:t>: нужно </a:t>
+            </a:r>
+            <a:r>
+              <a:rPr lang="ru-RU" dirty="0" err="1"/>
+              <a:t>стригеррить</a:t>
+            </a:r>
+            <a:r>
+              <a:rPr lang="ru-RU" dirty="0"/>
+              <a:t> любое изменение в </a:t>
+            </a:r>
+            <a:r>
+              <a:rPr lang="en-US" dirty="0"/>
+              <a:t>WAL</a:t>
+            </a:r>
+            <a:r>
+              <a:rPr lang="ru-RU" dirty="0"/>
+              <a:t> по реплицируемых таблицам</a:t>
+            </a:r>
+          </a:p>
+          <a:p>
+            <a:pPr lvl="1"/>
+            <a:r>
+              <a:rPr lang="ru-RU" dirty="0"/>
+              <a:t>Решение </a:t>
+            </a:r>
+            <a:r>
+              <a:rPr lang="en-US" dirty="0"/>
+              <a:t>#2: heartbeat </a:t>
+            </a:r>
+            <a:r>
+              <a:rPr lang="ru-RU" dirty="0"/>
+              <a:t>таблица</a:t>
+            </a:r>
+          </a:p>
+          <a:p>
+            <a:r>
+              <a:rPr lang="ru-RU" dirty="0"/>
+              <a:t>Проблема </a:t>
+            </a:r>
+            <a:r>
+              <a:rPr lang="en-US" dirty="0"/>
+              <a:t>#6: </a:t>
+            </a:r>
+            <a:r>
+              <a:rPr lang="ru-RU" dirty="0"/>
+              <a:t>владельцы БД категорически против генерации любой дополнительной нагрузки на мастере</a:t>
+            </a:r>
+          </a:p>
+          <a:p>
+            <a:pPr lvl="1"/>
+            <a:r>
+              <a:rPr lang="ru-RU" dirty="0"/>
+              <a:t>Решение: с версии </a:t>
+            </a:r>
+            <a:r>
+              <a:rPr lang="en-US" dirty="0"/>
+              <a:t>pg16 </a:t>
+            </a:r>
+            <a:r>
+              <a:rPr lang="ru-RU" dirty="0"/>
+              <a:t>есть возможность использовать логический слот для репликации и на репликах</a:t>
+            </a:r>
+          </a:p>
+        </p:txBody>
+      </p:sp>
+    </p:spTree>
+    <p:extLst>
+      <p:ext uri="{BB962C8B-B14F-4D97-AF65-F5344CB8AC3E}">
+        <p14:creationId xmlns:p14="http://schemas.microsoft.com/office/powerpoint/2010/main" val="1436139559"/>
+      </p:ext>
+    </p:extLst>
+  </p:cSld>
+  <p:clrMapOvr>
+    <a:masterClrMapping/>
+  </p:clrMapOvr>
+</p:sld>
+</file>
+
+<file path=ppt/slides/slide13.xml><?xml version="1.0" encoding="utf-8"?>
+<p:sld xmlns:a="http://schemas.openxmlformats.org/drawingml/2006/main" xmlns:r="http://schemas.openxmlformats.org/officeDocument/2006/relationships" xmlns:p="http://schemas.openxmlformats.org/presentationml/2006/main">
+  <p:cSld>
+    <p:spTree>
+      <p:nvGrpSpPr>
+        <p:cNvPr id="1" name=""/>
+        <p:cNvGrpSpPr/>
+        <p:nvPr/>
+      </p:nvGrpSpPr>
+      <p:grpSpPr>
+        <a:xfrm>
+          <a:off x="0" y="0"/>
+          <a:ext cx="0" cy="0"/>
+          <a:chOff x="0" y="0"/>
+          <a:chExt cx="0" cy="0"/>
+        </a:xfrm>
+      </p:grpSpPr>
+      <p:sp>
+        <p:nvSpPr>
+          <p:cNvPr id="2" name="Title 1">
+            <a:extLst>
+              <a:ext uri="{FF2B5EF4-FFF2-40B4-BE49-F238E27FC236}">
+                <a16:creationId xmlns:a16="http://schemas.microsoft.com/office/drawing/2014/main" id="{00888323-12E8-8C4F-8E27-23BD5B7DEE03}"/>
+              </a:ext>
+            </a:extLst>
+          </p:cNvPr>
+          <p:cNvSpPr>
+            <a:spLocks noGrp="1"/>
+          </p:cNvSpPr>
+          <p:nvPr>
+            <p:ph type="title"/>
+          </p:nvPr>
+        </p:nvSpPr>
+        <p:spPr>
+          <a:xfrm>
+            <a:off x="0" y="18255"/>
+            <a:ext cx="10515600" cy="1325563"/>
+          </a:xfrm>
+        </p:spPr>
+        <p:txBody>
+          <a:bodyPr/>
+          <a:lstStyle/>
+          <a:p>
+            <a:r>
+              <a:rPr lang="en-US" dirty="0" err="1"/>
+              <a:t>Debezium</a:t>
+            </a:r>
+            <a:r>
+              <a:rPr lang="en-US" dirty="0"/>
+              <a:t>: </a:t>
+            </a:r>
+            <a:r>
+              <a:rPr lang="ru-RU" dirty="0" err="1"/>
+              <a:t>снепшоты</a:t>
+            </a:r>
+            <a:endParaRPr lang="en-US" dirty="0"/>
+          </a:p>
+        </p:txBody>
+      </p:sp>
+      <p:sp>
+        <p:nvSpPr>
+          <p:cNvPr id="3" name="Content Placeholder 2">
+            <a:extLst>
+              <a:ext uri="{FF2B5EF4-FFF2-40B4-BE49-F238E27FC236}">
+                <a16:creationId xmlns:a16="http://schemas.microsoft.com/office/drawing/2014/main" id="{DA11F9D3-C291-2245-AEA5-8D09537FB4E5}"/>
+              </a:ext>
+            </a:extLst>
+          </p:cNvPr>
+          <p:cNvSpPr>
+            <a:spLocks noGrp="1"/>
+          </p:cNvSpPr>
+          <p:nvPr>
+            <p:ph idx="1"/>
+          </p:nvPr>
+        </p:nvSpPr>
+        <p:spPr>
+          <a:xfrm>
+            <a:off x="0" y="1343818"/>
+            <a:ext cx="10515600" cy="4351338"/>
+          </a:xfrm>
+        </p:spPr>
+        <p:txBody>
+          <a:bodyPr>
+            <a:normAutofit/>
+          </a:bodyPr>
+          <a:lstStyle/>
+          <a:p>
+            <a:r>
+              <a:rPr lang="ru-RU" dirty="0"/>
+              <a:t>Задача: восстановить </a:t>
+            </a:r>
+            <a:r>
+              <a:rPr lang="ru-RU" dirty="0" err="1"/>
+              <a:t>потерянныйсрез</a:t>
+            </a:r>
+            <a:r>
+              <a:rPr lang="ru-RU" dirty="0"/>
+              <a:t> данных за заданные период</a:t>
+            </a:r>
+          </a:p>
+          <a:p>
+            <a:r>
+              <a:rPr lang="ru-RU" dirty="0"/>
+              <a:t>Решение: </a:t>
+            </a:r>
+            <a:r>
+              <a:rPr lang="ru-RU" dirty="0" err="1"/>
+              <a:t>снепшот</a:t>
+            </a:r>
+            <a:r>
+              <a:rPr lang="ru-RU" dirty="0"/>
+              <a:t> с фильтром</a:t>
+            </a:r>
+          </a:p>
+        </p:txBody>
+      </p:sp>
+    </p:spTree>
+    <p:extLst>
+      <p:ext uri="{BB962C8B-B14F-4D97-AF65-F5344CB8AC3E}">
+        <p14:creationId xmlns:p14="http://schemas.microsoft.com/office/powerpoint/2010/main" val="2994142072"/>
+      </p:ext>
+    </p:extLst>
+  </p:cSld>
+  <p:clrMapOvr>
+    <a:masterClrMapping/>
+  </p:clrMapOvr>
+</p:sld>
+</file>
+
+<file path=ppt/slides/slide14.xml><?xml version="1.0" encoding="utf-8"?>
+<p:sld xmlns:a="http://schemas.openxmlformats.org/drawingml/2006/main" xmlns:r="http://schemas.openxmlformats.org/officeDocument/2006/relationships" xmlns:p="http://schemas.openxmlformats.org/presentationml/2006/main">
+  <p:cSld>
+    <p:spTree>
+      <p:nvGrpSpPr>
+        <p:cNvPr id="1" name=""/>
+        <p:cNvGrpSpPr/>
+        <p:nvPr/>
+      </p:nvGrpSpPr>
+      <p:grpSpPr>
+        <a:xfrm>
+          <a:off x="0" y="0"/>
+          <a:ext cx="0" cy="0"/>
+          <a:chOff x="0" y="0"/>
+          <a:chExt cx="0" cy="0"/>
+        </a:xfrm>
+      </p:grpSpPr>
+      <p:sp>
+        <p:nvSpPr>
+          <p:cNvPr id="2" name="Title 1">
+            <a:extLst>
+              <a:ext uri="{FF2B5EF4-FFF2-40B4-BE49-F238E27FC236}">
+                <a16:creationId xmlns:a16="http://schemas.microsoft.com/office/drawing/2014/main" id="{00888323-12E8-8C4F-8E27-23BD5B7DEE03}"/>
+              </a:ext>
+            </a:extLst>
+          </p:cNvPr>
+          <p:cNvSpPr>
+            <a:spLocks noGrp="1"/>
+          </p:cNvSpPr>
+          <p:nvPr>
+            <p:ph type="title"/>
+          </p:nvPr>
+        </p:nvSpPr>
+        <p:spPr>
+          <a:xfrm>
+            <a:off x="0" y="18255"/>
+            <a:ext cx="10515600" cy="1325563"/>
+          </a:xfrm>
+        </p:spPr>
+        <p:txBody>
+          <a:bodyPr/>
+          <a:lstStyle/>
+          <a:p>
+            <a:r>
+              <a:rPr lang="en-US" dirty="0" err="1"/>
+              <a:t>Debezium</a:t>
+            </a:r>
+            <a:r>
+              <a:rPr lang="en-US" dirty="0"/>
+              <a:t>: </a:t>
+            </a:r>
+            <a:r>
+              <a:rPr lang="ru-RU" dirty="0" err="1"/>
+              <a:t>снепшоты</a:t>
+            </a:r>
+            <a:endParaRPr lang="en-US" dirty="0"/>
+          </a:p>
+        </p:txBody>
+      </p:sp>
+      <p:sp>
+        <p:nvSpPr>
+          <p:cNvPr id="3" name="Content Placeholder 2">
+            <a:extLst>
+              <a:ext uri="{FF2B5EF4-FFF2-40B4-BE49-F238E27FC236}">
+                <a16:creationId xmlns:a16="http://schemas.microsoft.com/office/drawing/2014/main" id="{DA11F9D3-C291-2245-AEA5-8D09537FB4E5}"/>
+              </a:ext>
+            </a:extLst>
+          </p:cNvPr>
+          <p:cNvSpPr>
+            <a:spLocks noGrp="1"/>
+          </p:cNvSpPr>
+          <p:nvPr>
+            <p:ph idx="1"/>
+          </p:nvPr>
+        </p:nvSpPr>
+        <p:spPr>
+          <a:xfrm>
+            <a:off x="0" y="1343818"/>
+            <a:ext cx="10515600" cy="4351338"/>
+          </a:xfrm>
+        </p:spPr>
+        <p:txBody>
+          <a:bodyPr>
+            <a:normAutofit/>
+          </a:bodyPr>
+          <a:lstStyle/>
+          <a:p>
+            <a:r>
+              <a:rPr lang="ru-RU" dirty="0"/>
+              <a:t>Контекст: запустили ручной </a:t>
+            </a:r>
+            <a:r>
+              <a:rPr lang="ru-RU" dirty="0" err="1"/>
+              <a:t>снепшот</a:t>
+            </a:r>
+            <a:r>
+              <a:rPr lang="ru-RU" dirty="0"/>
+              <a:t> таблицы, но забыли выдать права на чтение пользователю</a:t>
+            </a:r>
+          </a:p>
+          <a:p>
+            <a:r>
+              <a:rPr lang="ru-RU" dirty="0"/>
+              <a:t>Проблема: </a:t>
+            </a:r>
+            <a:r>
+              <a:rPr lang="en-US" dirty="0" err="1"/>
+              <a:t>cdc</a:t>
+            </a:r>
+            <a:r>
+              <a:rPr lang="en-US" dirty="0"/>
+              <a:t>-</a:t>
+            </a:r>
+            <a:r>
+              <a:rPr lang="ru-RU" dirty="0"/>
+              <a:t>приложение не упало, но и ничего не делает</a:t>
+            </a:r>
+          </a:p>
+          <a:p>
+            <a:pPr lvl="1"/>
+            <a:r>
+              <a:rPr lang="ru-RU" dirty="0"/>
+              <a:t>Замечено на версии </a:t>
+            </a:r>
+            <a:r>
+              <a:rPr lang="en-US" dirty="0" err="1"/>
+              <a:t>debezium</a:t>
+            </a:r>
+            <a:r>
+              <a:rPr lang="en-US" dirty="0"/>
+              <a:t> </a:t>
+            </a:r>
+            <a:r>
+              <a:rPr lang="ru-RU" dirty="0"/>
+              <a:t>2.7 (проверить на более новых версиях)</a:t>
+            </a:r>
+          </a:p>
+          <a:p>
+            <a:pPr lvl="1"/>
+            <a:r>
+              <a:rPr lang="ru-RU" dirty="0"/>
+              <a:t>В метриках (</a:t>
+            </a:r>
+            <a:r>
+              <a:rPr lang="en-US" dirty="0" err="1"/>
+              <a:t>kafka</a:t>
+            </a:r>
+            <a:r>
+              <a:rPr lang="en-US" dirty="0"/>
+              <a:t>-connect</a:t>
+            </a:r>
+            <a:r>
+              <a:rPr lang="ru-RU" dirty="0"/>
+              <a:t>)</a:t>
+            </a:r>
+            <a:r>
+              <a:rPr lang="en-US" dirty="0"/>
+              <a:t> </a:t>
+            </a:r>
+            <a:r>
+              <a:rPr lang="ru-RU" dirty="0"/>
+              <a:t>приложение живо и работает</a:t>
+            </a:r>
+          </a:p>
+          <a:p>
+            <a:r>
+              <a:rPr lang="ru-RU" dirty="0"/>
+              <a:t>Решение:</a:t>
+            </a:r>
+          </a:p>
+          <a:p>
+            <a:pPr lvl="1"/>
+            <a:r>
+              <a:rPr lang="ru-RU" dirty="0"/>
+              <a:t>Только перезапуск приложения</a:t>
+            </a:r>
+          </a:p>
+        </p:txBody>
+      </p:sp>
+    </p:spTree>
+    <p:extLst>
+      <p:ext uri="{BB962C8B-B14F-4D97-AF65-F5344CB8AC3E}">
+        <p14:creationId xmlns:p14="http://schemas.microsoft.com/office/powerpoint/2010/main" val="2518105868"/>
+      </p:ext>
+    </p:extLst>
+  </p:cSld>
+  <p:clrMapOvr>
+    <a:masterClrMapping/>
+  </p:clrMapOvr>
+</p:sld>
+</file>
+
+<file path=ppt/slides/slide15.xml><?xml version="1.0" encoding="utf-8"?>
+<p:sld xmlns:a="http://schemas.openxmlformats.org/drawingml/2006/main" xmlns:r="http://schemas.openxmlformats.org/officeDocument/2006/relationships" xmlns:p="http://schemas.openxmlformats.org/presentationml/2006/main">
+  <p:cSld>
+    <p:spTree>
+      <p:nvGrpSpPr>
+        <p:cNvPr id="1" name=""/>
+        <p:cNvGrpSpPr/>
+        <p:nvPr/>
+      </p:nvGrpSpPr>
+      <p:grpSpPr>
+        <a:xfrm>
+          <a:off x="0" y="0"/>
+          <a:ext cx="0" cy="0"/>
+          <a:chOff x="0" y="0"/>
+          <a:chExt cx="0" cy="0"/>
+        </a:xfrm>
+      </p:grpSpPr>
+      <p:sp>
+        <p:nvSpPr>
+          <p:cNvPr id="2" name="Title 1">
+            <a:extLst>
+              <a:ext uri="{FF2B5EF4-FFF2-40B4-BE49-F238E27FC236}">
+                <a16:creationId xmlns:a16="http://schemas.microsoft.com/office/drawing/2014/main" id="{00888323-12E8-8C4F-8E27-23BD5B7DEE03}"/>
+              </a:ext>
+            </a:extLst>
+          </p:cNvPr>
+          <p:cNvSpPr>
+            <a:spLocks noGrp="1"/>
+          </p:cNvSpPr>
+          <p:nvPr>
+            <p:ph type="title"/>
+          </p:nvPr>
+        </p:nvSpPr>
+        <p:spPr>
+          <a:xfrm>
+            <a:off x="0" y="18255"/>
+            <a:ext cx="10515600" cy="1325563"/>
+          </a:xfrm>
+        </p:spPr>
+        <p:txBody>
+          <a:bodyPr/>
+          <a:lstStyle/>
+          <a:p>
+            <a:r>
+              <a:rPr lang="en-US" dirty="0" err="1"/>
+              <a:t>Debezium</a:t>
+            </a:r>
+            <a:r>
+              <a:rPr lang="en-US" dirty="0"/>
+              <a:t>: </a:t>
+            </a:r>
+            <a:r>
+              <a:rPr lang="ru-RU" dirty="0" err="1"/>
+              <a:t>снепшоты</a:t>
+            </a:r>
+            <a:endParaRPr lang="en-US" dirty="0"/>
+          </a:p>
+        </p:txBody>
+      </p:sp>
+      <p:sp>
+        <p:nvSpPr>
+          <p:cNvPr id="3" name="Content Placeholder 2">
+            <a:extLst>
+              <a:ext uri="{FF2B5EF4-FFF2-40B4-BE49-F238E27FC236}">
+                <a16:creationId xmlns:a16="http://schemas.microsoft.com/office/drawing/2014/main" id="{DA11F9D3-C291-2245-AEA5-8D09537FB4E5}"/>
+              </a:ext>
+            </a:extLst>
+          </p:cNvPr>
+          <p:cNvSpPr>
+            <a:spLocks noGrp="1"/>
+          </p:cNvSpPr>
+          <p:nvPr>
+            <p:ph idx="1"/>
+          </p:nvPr>
+        </p:nvSpPr>
+        <p:spPr>
+          <a:xfrm>
+            <a:off x="0" y="1343818"/>
+            <a:ext cx="10515600" cy="4351338"/>
+          </a:xfrm>
+        </p:spPr>
+        <p:txBody>
+          <a:bodyPr>
+            <a:normAutofit/>
+          </a:bodyPr>
+          <a:lstStyle/>
+          <a:p>
+            <a:r>
+              <a:rPr lang="ru-RU" dirty="0"/>
+              <a:t>Контекст: отправили сигнал на запуск инкрементального </a:t>
+            </a:r>
+            <a:r>
+              <a:rPr lang="ru-RU" dirty="0" err="1"/>
+              <a:t>снепшота</a:t>
+            </a:r>
+            <a:r>
+              <a:rPr lang="ru-RU" dirty="0"/>
+              <a:t> таблицы, по которой еще не было ни одного </a:t>
+            </a:r>
+            <a:r>
+              <a:rPr lang="ru-RU" dirty="0" err="1"/>
+              <a:t>эвента</a:t>
+            </a:r>
+            <a:endParaRPr lang="ru-RU" dirty="0"/>
+          </a:p>
+          <a:p>
+            <a:r>
+              <a:rPr lang="ru-RU" dirty="0"/>
+              <a:t>Проблема: </a:t>
+            </a:r>
+            <a:r>
+              <a:rPr lang="ru-RU" dirty="0" err="1"/>
+              <a:t>снепшот</a:t>
+            </a:r>
+            <a:r>
+              <a:rPr lang="ru-RU" dirty="0"/>
+              <a:t> падает с ошибкой «ошибка про получение схемы»</a:t>
+            </a:r>
+          </a:p>
+          <a:p>
+            <a:r>
+              <a:rPr lang="ru-RU" dirty="0"/>
+              <a:t>Решения:</a:t>
+            </a:r>
+          </a:p>
+          <a:p>
+            <a:pPr lvl="1"/>
+            <a:r>
+              <a:rPr lang="ru-RU" dirty="0" err="1"/>
+              <a:t>Стригеррить</a:t>
+            </a:r>
+            <a:r>
+              <a:rPr lang="ru-RU" dirty="0"/>
+              <a:t> изменения по целевой таблице</a:t>
+            </a:r>
+          </a:p>
+          <a:p>
+            <a:pPr lvl="1"/>
+            <a:r>
+              <a:rPr lang="ru-RU" dirty="0"/>
+              <a:t>Обновить </a:t>
+            </a:r>
+            <a:r>
+              <a:rPr lang="en-US" dirty="0" err="1"/>
+              <a:t>debezium</a:t>
+            </a:r>
+            <a:r>
+              <a:rPr lang="en-US" dirty="0"/>
+              <a:t> </a:t>
+            </a:r>
+            <a:r>
+              <a:rPr lang="ru-RU" dirty="0"/>
+              <a:t>до версии выше </a:t>
+            </a:r>
+            <a:r>
+              <a:rPr lang="en-US" dirty="0"/>
+              <a:t>3.1.2+</a:t>
+            </a:r>
+            <a:endParaRPr lang="ru-RU" dirty="0"/>
+          </a:p>
+        </p:txBody>
+      </p:sp>
+    </p:spTree>
+    <p:extLst>
+      <p:ext uri="{BB962C8B-B14F-4D97-AF65-F5344CB8AC3E}">
+        <p14:creationId xmlns:p14="http://schemas.microsoft.com/office/powerpoint/2010/main" val="3287761478"/>
+      </p:ext>
+    </p:extLst>
+  </p:cSld>
+  <p:clrMapOvr>
+    <a:masterClrMapping/>
+  </p:clrMapOvr>
+</p:sld>
+</file>
+
+<file path=ppt/slides/slide16.xml><?xml version="1.0" encoding="utf-8"?>
+<p:sld xmlns:a="http://schemas.openxmlformats.org/drawingml/2006/main" xmlns:r="http://schemas.openxmlformats.org/officeDocument/2006/relationships" xmlns:p="http://schemas.openxmlformats.org/presentationml/2006/main">
+  <p:cSld>
+    <p:spTree>
+      <p:nvGrpSpPr>
+        <p:cNvPr id="1" name=""/>
+        <p:cNvGrpSpPr/>
+        <p:nvPr/>
+      </p:nvGrpSpPr>
+      <p:grpSpPr>
+        <a:xfrm>
+          <a:off x="0" y="0"/>
+          <a:ext cx="0" cy="0"/>
+          <a:chOff x="0" y="0"/>
+          <a:chExt cx="0" cy="0"/>
+        </a:xfrm>
+      </p:grpSpPr>
+      <p:sp>
+        <p:nvSpPr>
+          <p:cNvPr id="2" name="Title 1">
+            <a:extLst>
+              <a:ext uri="{FF2B5EF4-FFF2-40B4-BE49-F238E27FC236}">
+                <a16:creationId xmlns:a16="http://schemas.microsoft.com/office/drawing/2014/main" id="{00888323-12E8-8C4F-8E27-23BD5B7DEE03}"/>
+              </a:ext>
+            </a:extLst>
+          </p:cNvPr>
+          <p:cNvSpPr>
+            <a:spLocks noGrp="1"/>
+          </p:cNvSpPr>
+          <p:nvPr>
+            <p:ph type="title"/>
+          </p:nvPr>
+        </p:nvSpPr>
+        <p:spPr>
+          <a:xfrm>
+            <a:off x="0" y="18255"/>
+            <a:ext cx="10515600" cy="1325563"/>
+          </a:xfrm>
+        </p:spPr>
+        <p:txBody>
+          <a:bodyPr/>
+          <a:lstStyle/>
+          <a:p>
+            <a:r>
+              <a:rPr lang="en-US" dirty="0" err="1"/>
+              <a:t>Debezium</a:t>
+            </a:r>
+            <a:r>
+              <a:rPr lang="en-US" dirty="0"/>
+              <a:t>: </a:t>
+            </a:r>
+            <a:r>
+              <a:rPr lang="ru-RU" dirty="0"/>
+              <a:t>редко обновляемые таблицы</a:t>
+            </a:r>
+            <a:endParaRPr lang="en-US" dirty="0"/>
+          </a:p>
+        </p:txBody>
+      </p:sp>
+      <p:sp>
+        <p:nvSpPr>
+          <p:cNvPr id="3" name="Content Placeholder 2">
+            <a:extLst>
+              <a:ext uri="{FF2B5EF4-FFF2-40B4-BE49-F238E27FC236}">
+                <a16:creationId xmlns:a16="http://schemas.microsoft.com/office/drawing/2014/main" id="{DA11F9D3-C291-2245-AEA5-8D09537FB4E5}"/>
+              </a:ext>
+            </a:extLst>
+          </p:cNvPr>
+          <p:cNvSpPr>
+            <a:spLocks noGrp="1"/>
+          </p:cNvSpPr>
+          <p:nvPr>
+            <p:ph idx="1"/>
+          </p:nvPr>
+        </p:nvSpPr>
+        <p:spPr>
+          <a:xfrm>
+            <a:off x="0" y="1343818"/>
+            <a:ext cx="10515600" cy="4351338"/>
+          </a:xfrm>
+        </p:spPr>
+        <p:txBody>
+          <a:bodyPr>
+            <a:normAutofit/>
+          </a:bodyPr>
+          <a:lstStyle/>
+          <a:p>
+            <a:r>
+              <a:rPr lang="ru-RU" dirty="0"/>
+              <a:t>Контекст: в БД много таблиц, но реплицируем одну таблицу справочник, которая обновляется крайне редко</a:t>
+            </a:r>
+          </a:p>
+          <a:p>
+            <a:r>
+              <a:rPr lang="ru-RU" dirty="0"/>
+              <a:t>Проблема: Слот всегда отстает, </a:t>
+            </a:r>
+            <a:r>
+              <a:rPr lang="en-US" dirty="0"/>
+              <a:t>WAL </a:t>
+            </a:r>
+            <a:r>
+              <a:rPr lang="ru-RU" dirty="0"/>
+              <a:t>копится до «предела». Есть риск потери данных и переход </a:t>
+            </a:r>
+            <a:r>
+              <a:rPr lang="ru-RU" dirty="0" err="1"/>
+              <a:t>инстанса</a:t>
+            </a:r>
+            <a:r>
+              <a:rPr lang="ru-RU" dirty="0"/>
+              <a:t> в </a:t>
+            </a:r>
+            <a:r>
+              <a:rPr lang="en-US" dirty="0"/>
+              <a:t>RO</a:t>
+            </a:r>
+            <a:endParaRPr lang="ru-RU" dirty="0"/>
+          </a:p>
+          <a:p>
+            <a:r>
+              <a:rPr lang="ru-RU" dirty="0"/>
+              <a:t>Решение:</a:t>
+            </a:r>
+          </a:p>
+          <a:p>
+            <a:pPr lvl="1"/>
+            <a:r>
+              <a:rPr lang="en-US" dirty="0"/>
+              <a:t>Heartbeat </a:t>
+            </a:r>
+            <a:r>
+              <a:rPr lang="ru-RU" dirty="0"/>
+              <a:t>таблица</a:t>
+            </a:r>
+          </a:p>
+          <a:p>
+            <a:pPr lvl="1"/>
+            <a:r>
+              <a:rPr lang="ru-RU" dirty="0"/>
+              <a:t>Установить настройку, ограничивающую размер </a:t>
+            </a:r>
+            <a:r>
+              <a:rPr lang="en-US" dirty="0"/>
+              <a:t>WAL’</a:t>
+            </a:r>
+            <a:r>
+              <a:rPr lang="ru-RU" dirty="0"/>
+              <a:t>а</a:t>
+            </a:r>
+          </a:p>
+        </p:txBody>
+      </p:sp>
+    </p:spTree>
+    <p:extLst>
+      <p:ext uri="{BB962C8B-B14F-4D97-AF65-F5344CB8AC3E}">
+        <p14:creationId xmlns:p14="http://schemas.microsoft.com/office/powerpoint/2010/main" val="1965460881"/>
+      </p:ext>
+    </p:extLst>
+  </p:cSld>
+  <p:clrMapOvr>
+    <a:masterClrMapping/>
+  </p:clrMapOvr>
+</p:sld>
+</file>
+
+<file path=ppt/slides/slide17.xml><?xml version="1.0" encoding="utf-8"?>
+<p:sld xmlns:a="http://schemas.openxmlformats.org/drawingml/2006/main" xmlns:r="http://schemas.openxmlformats.org/officeDocument/2006/relationships" xmlns:p="http://schemas.openxmlformats.org/presentationml/2006/main">
+  <p:cSld>
+    <p:spTree>
+      <p:nvGrpSpPr>
+        <p:cNvPr id="1" name=""/>
+        <p:cNvGrpSpPr/>
+        <p:nvPr/>
+      </p:nvGrpSpPr>
+      <p:grpSpPr>
+        <a:xfrm>
+          <a:off x="0" y="0"/>
+          <a:ext cx="0" cy="0"/>
+          <a:chOff x="0" y="0"/>
+          <a:chExt cx="0" cy="0"/>
+        </a:xfrm>
+      </p:grpSpPr>
+      <p:sp>
+        <p:nvSpPr>
+          <p:cNvPr id="2" name="Title 1">
+            <a:extLst>
+              <a:ext uri="{FF2B5EF4-FFF2-40B4-BE49-F238E27FC236}">
+                <a16:creationId xmlns:a16="http://schemas.microsoft.com/office/drawing/2014/main" id="{00888323-12E8-8C4F-8E27-23BD5B7DEE03}"/>
+              </a:ext>
+            </a:extLst>
+          </p:cNvPr>
+          <p:cNvSpPr>
+            <a:spLocks noGrp="1"/>
+          </p:cNvSpPr>
+          <p:nvPr>
+            <p:ph type="title"/>
+          </p:nvPr>
+        </p:nvSpPr>
+        <p:spPr>
+          <a:xfrm>
+            <a:off x="0" y="18255"/>
+            <a:ext cx="10515600" cy="1325563"/>
+          </a:xfrm>
+        </p:spPr>
+        <p:txBody>
+          <a:bodyPr/>
+          <a:lstStyle/>
+          <a:p>
+            <a:r>
+              <a:rPr lang="en-US" dirty="0" err="1"/>
+              <a:t>Debezium</a:t>
+            </a:r>
+            <a:r>
+              <a:rPr lang="en-US" dirty="0"/>
+              <a:t>: </a:t>
+            </a:r>
+            <a:r>
+              <a:rPr lang="ru-RU" dirty="0" err="1"/>
+              <a:t>эвенты</a:t>
+            </a:r>
+            <a:r>
+              <a:rPr lang="ru-RU" dirty="0"/>
+              <a:t> с неполным состоянием</a:t>
+            </a:r>
+            <a:endParaRPr lang="en-US" dirty="0"/>
+          </a:p>
+        </p:txBody>
+      </p:sp>
+      <p:sp>
+        <p:nvSpPr>
+          <p:cNvPr id="3" name="Content Placeholder 2">
+            <a:extLst>
+              <a:ext uri="{FF2B5EF4-FFF2-40B4-BE49-F238E27FC236}">
+                <a16:creationId xmlns:a16="http://schemas.microsoft.com/office/drawing/2014/main" id="{DA11F9D3-C291-2245-AEA5-8D09537FB4E5}"/>
+              </a:ext>
+            </a:extLst>
+          </p:cNvPr>
+          <p:cNvSpPr>
+            <a:spLocks noGrp="1"/>
+          </p:cNvSpPr>
+          <p:nvPr>
+            <p:ph idx="1"/>
+          </p:nvPr>
+        </p:nvSpPr>
+        <p:spPr>
+          <a:xfrm>
+            <a:off x="0" y="1343818"/>
+            <a:ext cx="10515600" cy="4351338"/>
+          </a:xfrm>
+        </p:spPr>
+        <p:txBody>
+          <a:bodyPr>
+            <a:normAutofit/>
+          </a:bodyPr>
+          <a:lstStyle/>
+          <a:p>
+            <a:r>
+              <a:rPr lang="ru-RU" dirty="0"/>
+              <a:t>Контекст: реплицируется таблица с </a:t>
+            </a:r>
+            <a:r>
+              <a:rPr lang="en-US" dirty="0"/>
+              <a:t>TOAST </a:t>
+            </a:r>
+            <a:r>
+              <a:rPr lang="ru-RU" dirty="0"/>
+              <a:t>полями</a:t>
+            </a:r>
+          </a:p>
+          <a:p>
+            <a:r>
+              <a:rPr lang="ru-RU" dirty="0"/>
+              <a:t>Проблема: некоторые </a:t>
+            </a:r>
+            <a:r>
+              <a:rPr lang="ru-RU" dirty="0" err="1"/>
+              <a:t>эвенты</a:t>
+            </a:r>
+            <a:r>
+              <a:rPr lang="ru-RU" dirty="0"/>
+              <a:t> приходят только с частью заполненных колонок</a:t>
+            </a:r>
+          </a:p>
+          <a:p>
+            <a:r>
+              <a:rPr lang="ru-RU" dirty="0"/>
+              <a:t>Решения:</a:t>
+            </a:r>
+          </a:p>
+          <a:p>
+            <a:pPr lvl="1"/>
+            <a:r>
+              <a:rPr lang="en-US" dirty="0"/>
+              <a:t>REPLICA IDENTITY FULL</a:t>
+            </a:r>
+          </a:p>
+          <a:p>
+            <a:pPr lvl="1"/>
+            <a:r>
+              <a:rPr lang="ru-RU" dirty="0"/>
+              <a:t>Сделать поля частью </a:t>
+            </a:r>
+            <a:r>
+              <a:rPr lang="en-US" dirty="0"/>
+              <a:t>PK / Unique index</a:t>
+            </a:r>
+            <a:endParaRPr lang="ru-RU" dirty="0"/>
+          </a:p>
+        </p:txBody>
+      </p:sp>
+    </p:spTree>
+    <p:extLst>
+      <p:ext uri="{BB962C8B-B14F-4D97-AF65-F5344CB8AC3E}">
+        <p14:creationId xmlns:p14="http://schemas.microsoft.com/office/powerpoint/2010/main" val="3406737331"/>
+      </p:ext>
+    </p:extLst>
+  </p:cSld>
+  <p:clrMapOvr>
+    <a:masterClrMapping/>
+  </p:clrMapOvr>
+</p:sld>
+</file>
+
+<file path=ppt/slides/slide18.xml><?xml version="1.0" encoding="utf-8"?>
+<p:sld xmlns:a="http://schemas.openxmlformats.org/drawingml/2006/main" xmlns:r="http://schemas.openxmlformats.org/officeDocument/2006/relationships" xmlns:p="http://schemas.openxmlformats.org/presentationml/2006/main">
+  <p:cSld>
+    <p:spTree>
+      <p:nvGrpSpPr>
+        <p:cNvPr id="1" name=""/>
+        <p:cNvGrpSpPr/>
+        <p:nvPr/>
+      </p:nvGrpSpPr>
+      <p:grpSpPr>
+        <a:xfrm>
+          <a:off x="0" y="0"/>
+          <a:ext cx="0" cy="0"/>
+          <a:chOff x="0" y="0"/>
+          <a:chExt cx="0" cy="0"/>
+        </a:xfrm>
+      </p:grpSpPr>
+      <p:sp>
+        <p:nvSpPr>
+          <p:cNvPr id="2" name="Title 1">
+            <a:extLst>
+              <a:ext uri="{FF2B5EF4-FFF2-40B4-BE49-F238E27FC236}">
+                <a16:creationId xmlns:a16="http://schemas.microsoft.com/office/drawing/2014/main" id="{00888323-12E8-8C4F-8E27-23BD5B7DEE03}"/>
+              </a:ext>
+            </a:extLst>
+          </p:cNvPr>
+          <p:cNvSpPr>
+            <a:spLocks noGrp="1"/>
+          </p:cNvSpPr>
+          <p:nvPr>
+            <p:ph type="title"/>
+          </p:nvPr>
+        </p:nvSpPr>
+        <p:spPr>
+          <a:xfrm>
+            <a:off x="0" y="18255"/>
+            <a:ext cx="10515600" cy="1325563"/>
+          </a:xfrm>
+        </p:spPr>
+        <p:txBody>
+          <a:bodyPr/>
+          <a:lstStyle/>
+          <a:p>
+            <a:r>
+              <a:rPr lang="en-US" dirty="0" err="1"/>
+              <a:t>Debezium</a:t>
+            </a:r>
+            <a:r>
+              <a:rPr lang="en-US" dirty="0"/>
+              <a:t>: </a:t>
+            </a:r>
+            <a:r>
+              <a:rPr lang="ru-RU" dirty="0" err="1"/>
+              <a:t>партиционированные</a:t>
+            </a:r>
+            <a:r>
+              <a:rPr lang="ru-RU" dirty="0"/>
+              <a:t> таблицы</a:t>
+            </a:r>
+            <a:endParaRPr lang="en-US" dirty="0"/>
+          </a:p>
+        </p:txBody>
+      </p:sp>
+      <p:sp>
+        <p:nvSpPr>
+          <p:cNvPr id="3" name="Content Placeholder 2">
+            <a:extLst>
+              <a:ext uri="{FF2B5EF4-FFF2-40B4-BE49-F238E27FC236}">
+                <a16:creationId xmlns:a16="http://schemas.microsoft.com/office/drawing/2014/main" id="{DA11F9D3-C291-2245-AEA5-8D09537FB4E5}"/>
+              </a:ext>
+            </a:extLst>
+          </p:cNvPr>
+          <p:cNvSpPr>
+            <a:spLocks noGrp="1"/>
+          </p:cNvSpPr>
+          <p:nvPr>
+            <p:ph idx="1"/>
+          </p:nvPr>
+        </p:nvSpPr>
+        <p:spPr>
+          <a:xfrm>
+            <a:off x="0" y="1343818"/>
+            <a:ext cx="10515600" cy="4351338"/>
+          </a:xfrm>
+        </p:spPr>
+        <p:txBody>
+          <a:bodyPr>
+            <a:normAutofit/>
+          </a:bodyPr>
+          <a:lstStyle/>
+          <a:p>
+            <a:r>
+              <a:rPr lang="ru-RU" dirty="0"/>
+              <a:t>Задача: нужно реплицировать </a:t>
+            </a:r>
+            <a:r>
+              <a:rPr lang="ru-RU" dirty="0" err="1"/>
+              <a:t>партиционированную</a:t>
+            </a:r>
+            <a:r>
+              <a:rPr lang="ru-RU" dirty="0"/>
+              <a:t> таблицу</a:t>
+            </a:r>
+          </a:p>
+          <a:p>
+            <a:r>
+              <a:rPr lang="ru-RU" dirty="0"/>
+              <a:t>Проблема: </a:t>
+            </a:r>
+            <a:r>
+              <a:rPr lang="ru-RU" dirty="0" err="1"/>
+              <a:t>эвенты</a:t>
+            </a:r>
+            <a:r>
+              <a:rPr lang="ru-RU" dirty="0"/>
+              <a:t> приходят не от корневой таблицы, а от </a:t>
+            </a:r>
+            <a:r>
+              <a:rPr lang="ru-RU" dirty="0" err="1"/>
+              <a:t>партиций</a:t>
+            </a:r>
+            <a:endParaRPr lang="ru-RU" dirty="0"/>
+          </a:p>
+          <a:p>
+            <a:r>
+              <a:rPr lang="ru-RU" dirty="0"/>
+              <a:t>Решение:</a:t>
+            </a:r>
+          </a:p>
+          <a:p>
+            <a:pPr lvl="1"/>
+            <a:r>
+              <a:rPr lang="ru-RU" dirty="0"/>
+              <a:t>При создании публикации выставить флаг «</a:t>
+            </a:r>
+            <a:r>
+              <a:rPr lang="en-US" dirty="0" err="1"/>
+              <a:t>publish_via_partition_root</a:t>
+            </a:r>
+            <a:r>
+              <a:rPr lang="ru-RU" dirty="0"/>
+              <a:t>»</a:t>
+            </a:r>
+            <a:endParaRPr lang="en-US" dirty="0"/>
+          </a:p>
+        </p:txBody>
+      </p:sp>
+    </p:spTree>
+    <p:extLst>
+      <p:ext uri="{BB962C8B-B14F-4D97-AF65-F5344CB8AC3E}">
+        <p14:creationId xmlns:p14="http://schemas.microsoft.com/office/powerpoint/2010/main" val="1856578306"/>
+      </p:ext>
+    </p:extLst>
+  </p:cSld>
+  <p:clrMapOvr>
+    <a:masterClrMapping/>
+  </p:clrMapOvr>
+</p:sld>
+</file>
+
+<file path=ppt/slides/slide19.xml><?xml version="1.0" encoding="utf-8"?>
+<p:sld xmlns:a="http://schemas.openxmlformats.org/drawingml/2006/main" xmlns:r="http://schemas.openxmlformats.org/officeDocument/2006/relationships" xmlns:p="http://schemas.openxmlformats.org/presentationml/2006/main">
+  <p:cSld>
+    <p:spTree>
+      <p:nvGrpSpPr>
+        <p:cNvPr id="1" name=""/>
+        <p:cNvGrpSpPr/>
+        <p:nvPr/>
+      </p:nvGrpSpPr>
+      <p:grpSpPr>
+        <a:xfrm>
+          <a:off x="0" y="0"/>
+          <a:ext cx="0" cy="0"/>
+          <a:chOff x="0" y="0"/>
+          <a:chExt cx="0" cy="0"/>
+        </a:xfrm>
+      </p:grpSpPr>
+      <p:sp>
+        <p:nvSpPr>
+          <p:cNvPr id="2" name="Title 1">
+            <a:extLst>
+              <a:ext uri="{FF2B5EF4-FFF2-40B4-BE49-F238E27FC236}">
+                <a16:creationId xmlns:a16="http://schemas.microsoft.com/office/drawing/2014/main" id="{00888323-12E8-8C4F-8E27-23BD5B7DEE03}"/>
+              </a:ext>
+            </a:extLst>
+          </p:cNvPr>
+          <p:cNvSpPr>
+            <a:spLocks noGrp="1"/>
+          </p:cNvSpPr>
+          <p:nvPr>
+            <p:ph type="title"/>
+          </p:nvPr>
+        </p:nvSpPr>
+        <p:spPr>
+          <a:xfrm>
+            <a:off x="0" y="18255"/>
+            <a:ext cx="10515600" cy="1325563"/>
+          </a:xfrm>
+        </p:spPr>
+        <p:txBody>
+          <a:bodyPr/>
+          <a:lstStyle/>
+          <a:p>
+            <a:r>
+              <a:rPr lang="en-US" dirty="0" err="1"/>
+              <a:t>Debezium</a:t>
+            </a:r>
+            <a:r>
+              <a:rPr lang="en-US" dirty="0"/>
+              <a:t>: </a:t>
+            </a:r>
+            <a:r>
+              <a:rPr lang="en-US" dirty="0" err="1"/>
+              <a:t>hypertable</a:t>
+            </a:r>
+            <a:endParaRPr lang="en-US" dirty="0"/>
+          </a:p>
+        </p:txBody>
+      </p:sp>
+      <p:sp>
+        <p:nvSpPr>
+          <p:cNvPr id="3" name="Content Placeholder 2">
+            <a:extLst>
+              <a:ext uri="{FF2B5EF4-FFF2-40B4-BE49-F238E27FC236}">
+                <a16:creationId xmlns:a16="http://schemas.microsoft.com/office/drawing/2014/main" id="{DA11F9D3-C291-2245-AEA5-8D09537FB4E5}"/>
+              </a:ext>
+            </a:extLst>
+          </p:cNvPr>
+          <p:cNvSpPr>
+            <a:spLocks noGrp="1"/>
+          </p:cNvSpPr>
+          <p:nvPr>
+            <p:ph idx="1"/>
+          </p:nvPr>
+        </p:nvSpPr>
+        <p:spPr>
+          <a:xfrm>
+            <a:off x="0" y="1343818"/>
+            <a:ext cx="10515600" cy="4351338"/>
+          </a:xfrm>
+        </p:spPr>
+        <p:txBody>
+          <a:bodyPr>
+            <a:normAutofit/>
+          </a:bodyPr>
+          <a:lstStyle/>
+          <a:p>
+            <a:r>
+              <a:rPr lang="ru-RU" dirty="0"/>
+              <a:t>Задача: нужно реплицировать </a:t>
+            </a:r>
+            <a:r>
+              <a:rPr lang="en-US" dirty="0" err="1"/>
+              <a:t>hypertable</a:t>
+            </a:r>
+            <a:r>
+              <a:rPr lang="en-US" dirty="0"/>
+              <a:t> (</a:t>
+            </a:r>
+            <a:r>
+              <a:rPr lang="en-US" dirty="0" err="1"/>
+              <a:t>timescaldb</a:t>
+            </a:r>
+            <a:r>
+              <a:rPr lang="en-US" dirty="0"/>
+              <a:t>)</a:t>
+            </a:r>
+            <a:endParaRPr lang="ru-RU" dirty="0"/>
+          </a:p>
+          <a:p>
+            <a:r>
+              <a:rPr lang="ru-RU" dirty="0"/>
+              <a:t>Проблема </a:t>
+            </a:r>
+            <a:r>
+              <a:rPr lang="en-US" dirty="0"/>
+              <a:t>#1</a:t>
+            </a:r>
+            <a:r>
+              <a:rPr lang="ru-RU" dirty="0"/>
+              <a:t>: </a:t>
+            </a:r>
+            <a:r>
+              <a:rPr lang="ru-RU" dirty="0" err="1"/>
+              <a:t>эвенты</a:t>
+            </a:r>
+            <a:r>
+              <a:rPr lang="ru-RU" dirty="0"/>
+              <a:t> не приходят</a:t>
+            </a:r>
+          </a:p>
+          <a:p>
+            <a:r>
+              <a:rPr lang="ru-RU" dirty="0"/>
+              <a:t>Решение:</a:t>
+            </a:r>
+          </a:p>
+          <a:p>
+            <a:pPr lvl="1"/>
+            <a:r>
+              <a:rPr lang="ru-RU" dirty="0"/>
+              <a:t>«Правильная настройка» (пример)</a:t>
+            </a:r>
+          </a:p>
+          <a:p>
+            <a:r>
+              <a:rPr lang="en-US" dirty="0"/>
+              <a:t> </a:t>
+            </a:r>
+            <a:r>
+              <a:rPr lang="ru-RU" dirty="0"/>
+              <a:t>Проблема </a:t>
+            </a:r>
+            <a:r>
+              <a:rPr lang="en-US" dirty="0"/>
+              <a:t>#2: </a:t>
+            </a:r>
+            <a:r>
+              <a:rPr lang="ru-RU" dirty="0"/>
+              <a:t>процесс падает из-за системной таблицы</a:t>
+            </a:r>
+          </a:p>
+          <a:p>
+            <a:pPr lvl="1"/>
+            <a:r>
+              <a:rPr lang="ru-RU" dirty="0"/>
+              <a:t>Решение: явное исключение таблиц из репликации</a:t>
+            </a:r>
+            <a:endParaRPr lang="en-US" dirty="0"/>
+          </a:p>
+        </p:txBody>
+      </p:sp>
+    </p:spTree>
+    <p:extLst>
+      <p:ext uri="{BB962C8B-B14F-4D97-AF65-F5344CB8AC3E}">
+        <p14:creationId xmlns:p14="http://schemas.microsoft.com/office/powerpoint/2010/main" val="1513835637"/>
+      </p:ext>
+    </p:extLst>
+  </p:cSld>
+  <p:clrMapOvr>
+    <a:masterClrMapping/>
+  </p:clrMapOvr>
+</p:sld>
+</file>
+
+<file path=ppt/slides/slide2.xml><?xml version="1.0" encoding="utf-8"?>
+<p:sld xmlns:a="http://schemas.openxmlformats.org/drawingml/2006/main" xmlns:r="http://schemas.openxmlformats.org/officeDocument/2006/relationships" xmlns:p="http://schemas.openxmlformats.org/presentationml/2006/main">
+  <p:cSld>
+    <p:spTree>
+      <p:nvGrpSpPr>
+        <p:cNvPr id="1" name=""/>
+        <p:cNvGrpSpPr/>
+        <p:nvPr/>
+      </p:nvGrpSpPr>
+      <p:grpSpPr>
+        <a:xfrm>
+          <a:off x="0" y="0"/>
+          <a:ext cx="0" cy="0"/>
+          <a:chOff x="0" y="0"/>
+          <a:chExt cx="0" cy="0"/>
+        </a:xfrm>
+      </p:grpSpPr>
+      <p:sp>
+        <p:nvSpPr>
+          <p:cNvPr id="2" name="Title 1">
+            <a:extLst>
+              <a:ext uri="{FF2B5EF4-FFF2-40B4-BE49-F238E27FC236}">
+                <a16:creationId xmlns:a16="http://schemas.microsoft.com/office/drawing/2014/main" id="{00888323-12E8-8C4F-8E27-23BD5B7DEE03}"/>
+              </a:ext>
+            </a:extLst>
+          </p:cNvPr>
+          <p:cNvSpPr>
+            <a:spLocks noGrp="1"/>
+          </p:cNvSpPr>
+          <p:nvPr>
+            <p:ph type="title"/>
+          </p:nvPr>
+        </p:nvSpPr>
+        <p:spPr>
+          <a:xfrm>
+            <a:off x="0" y="18255"/>
+            <a:ext cx="10515600" cy="1325563"/>
+          </a:xfrm>
+        </p:spPr>
+        <p:txBody>
+          <a:bodyPr/>
+          <a:lstStyle/>
+          <a:p>
+            <a:r>
+              <a:rPr lang="ru-RU" dirty="0"/>
+              <a:t>О чем пойдет речь</a:t>
+            </a:r>
+            <a:endParaRPr lang="en-US" dirty="0"/>
+          </a:p>
+        </p:txBody>
+      </p:sp>
+      <p:sp>
+        <p:nvSpPr>
+          <p:cNvPr id="3" name="Content Placeholder 2">
+            <a:extLst>
+              <a:ext uri="{FF2B5EF4-FFF2-40B4-BE49-F238E27FC236}">
+                <a16:creationId xmlns:a16="http://schemas.microsoft.com/office/drawing/2014/main" id="{DA11F9D3-C291-2245-AEA5-8D09537FB4E5}"/>
+              </a:ext>
+            </a:extLst>
+          </p:cNvPr>
+          <p:cNvSpPr>
+            <a:spLocks noGrp="1"/>
+          </p:cNvSpPr>
+          <p:nvPr>
+            <p:ph idx="1"/>
+          </p:nvPr>
+        </p:nvSpPr>
+        <p:spPr>
+          <a:xfrm>
+            <a:off x="0" y="1343818"/>
+            <a:ext cx="10515600" cy="4351338"/>
+          </a:xfrm>
+        </p:spPr>
+        <p:txBody>
+          <a:bodyPr/>
+          <a:lstStyle/>
+          <a:p>
+            <a:r>
+              <a:rPr lang="ru-RU" dirty="0"/>
+              <a:t>Кратко «что такое и зачем </a:t>
+            </a:r>
+            <a:r>
+              <a:rPr lang="en-US" dirty="0"/>
+              <a:t>CDC</a:t>
+            </a:r>
+            <a:r>
+              <a:rPr lang="ru-RU" dirty="0"/>
+              <a:t>»</a:t>
+            </a:r>
+          </a:p>
+          <a:p>
+            <a:r>
+              <a:rPr lang="ru-RU" dirty="0"/>
+              <a:t>Описание задачи для примера</a:t>
+            </a:r>
+          </a:p>
+          <a:p>
+            <a:r>
+              <a:rPr lang="ru-RU" dirty="0"/>
+              <a:t>Известные и не очень способы организации </a:t>
+            </a:r>
+            <a:r>
+              <a:rPr lang="en-US" dirty="0"/>
+              <a:t>CDC</a:t>
+            </a:r>
+            <a:endParaRPr lang="ru-RU" dirty="0"/>
+          </a:p>
+          <a:p>
+            <a:r>
+              <a:rPr lang="en-US" dirty="0" err="1"/>
+              <a:t>Debezium</a:t>
+            </a:r>
+            <a:r>
+              <a:rPr lang="en-US" dirty="0"/>
+              <a:t>: </a:t>
+            </a:r>
+            <a:r>
+              <a:rPr lang="ru-RU" dirty="0"/>
+              <a:t>где можно споткнуться</a:t>
+            </a:r>
+          </a:p>
+          <a:p>
+            <a:r>
+              <a:rPr lang="ru-RU" dirty="0"/>
+              <a:t>Выводы</a:t>
+            </a:r>
+          </a:p>
+        </p:txBody>
+      </p:sp>
+    </p:spTree>
+    <p:extLst>
+      <p:ext uri="{BB962C8B-B14F-4D97-AF65-F5344CB8AC3E}">
+        <p14:creationId xmlns:p14="http://schemas.microsoft.com/office/powerpoint/2010/main" val="2390120208"/>
+      </p:ext>
+    </p:extLst>
+  </p:cSld>
+  <p:clrMapOvr>
+    <a:masterClrMapping/>
+  </p:clrMapOvr>
+</p:sld>
+</file>
+
+<file path=ppt/slides/slide20.xml><?xml version="1.0" encoding="utf-8"?>
+<p:sld xmlns:a="http://schemas.openxmlformats.org/drawingml/2006/main" xmlns:r="http://schemas.openxmlformats.org/officeDocument/2006/relationships" xmlns:p="http://schemas.openxmlformats.org/presentationml/2006/main">
+  <p:cSld>
+    <p:spTree>
+      <p:nvGrpSpPr>
+        <p:cNvPr id="1" name=""/>
+        <p:cNvGrpSpPr/>
+        <p:nvPr/>
+      </p:nvGrpSpPr>
+      <p:grpSpPr>
+        <a:xfrm>
+          <a:off x="0" y="0"/>
+          <a:ext cx="0" cy="0"/>
+          <a:chOff x="0" y="0"/>
+          <a:chExt cx="0" cy="0"/>
+        </a:xfrm>
+      </p:grpSpPr>
+      <p:sp>
+        <p:nvSpPr>
+          <p:cNvPr id="2" name="Title 1">
+            <a:extLst>
+              <a:ext uri="{FF2B5EF4-FFF2-40B4-BE49-F238E27FC236}">
+                <a16:creationId xmlns:a16="http://schemas.microsoft.com/office/drawing/2014/main" id="{00888323-12E8-8C4F-8E27-23BD5B7DEE03}"/>
+              </a:ext>
+            </a:extLst>
+          </p:cNvPr>
+          <p:cNvSpPr>
+            <a:spLocks noGrp="1"/>
+          </p:cNvSpPr>
+          <p:nvPr>
+            <p:ph type="title"/>
+          </p:nvPr>
+        </p:nvSpPr>
+        <p:spPr>
+          <a:xfrm>
+            <a:off x="0" y="18255"/>
+            <a:ext cx="10515600" cy="1325563"/>
+          </a:xfrm>
+        </p:spPr>
+        <p:txBody>
+          <a:bodyPr/>
+          <a:lstStyle/>
+          <a:p>
+            <a:r>
+              <a:rPr lang="en-US" dirty="0" err="1"/>
+              <a:t>Debezium</a:t>
+            </a:r>
+            <a:r>
+              <a:rPr lang="en-US" dirty="0"/>
+              <a:t>: </a:t>
+            </a:r>
+            <a:r>
+              <a:rPr lang="ru-RU" dirty="0"/>
+              <a:t>эволюция схем</a:t>
+            </a:r>
+            <a:endParaRPr lang="en-US" dirty="0"/>
+          </a:p>
+        </p:txBody>
+      </p:sp>
+      <p:sp>
+        <p:nvSpPr>
+          <p:cNvPr id="3" name="Content Placeholder 2">
+            <a:extLst>
+              <a:ext uri="{FF2B5EF4-FFF2-40B4-BE49-F238E27FC236}">
+                <a16:creationId xmlns:a16="http://schemas.microsoft.com/office/drawing/2014/main" id="{DA11F9D3-C291-2245-AEA5-8D09537FB4E5}"/>
+              </a:ext>
+            </a:extLst>
+          </p:cNvPr>
+          <p:cNvSpPr>
+            <a:spLocks noGrp="1"/>
+          </p:cNvSpPr>
+          <p:nvPr>
+            <p:ph idx="1"/>
+          </p:nvPr>
+        </p:nvSpPr>
+        <p:spPr>
+          <a:xfrm>
+            <a:off x="0" y="1343818"/>
+            <a:ext cx="10515600" cy="4351338"/>
+          </a:xfrm>
+        </p:spPr>
+        <p:txBody>
+          <a:bodyPr>
+            <a:normAutofit/>
+          </a:bodyPr>
+          <a:lstStyle/>
+          <a:p>
+            <a:r>
+              <a:rPr lang="ru-RU" dirty="0"/>
+              <a:t>Контекст: </a:t>
+            </a:r>
+            <a:r>
+              <a:rPr lang="en-US" dirty="0" err="1"/>
+              <a:t>debezium</a:t>
+            </a:r>
+            <a:r>
+              <a:rPr lang="en-US" dirty="0"/>
+              <a:t> </a:t>
+            </a:r>
+            <a:r>
+              <a:rPr lang="ru-RU" dirty="0"/>
+              <a:t>использует </a:t>
+            </a:r>
+            <a:r>
+              <a:rPr lang="en-US" dirty="0" err="1"/>
+              <a:t>avro</a:t>
+            </a:r>
+            <a:r>
+              <a:rPr lang="en-US" dirty="0"/>
+              <a:t>-</a:t>
+            </a:r>
+            <a:r>
+              <a:rPr lang="ru-RU" dirty="0"/>
+              <a:t>формат. Владелец БД изменил схему реплицируемой таблицы</a:t>
+            </a:r>
+          </a:p>
+          <a:p>
+            <a:r>
+              <a:rPr lang="ru-RU" dirty="0"/>
+              <a:t>Проблема: после изменения схемы </a:t>
+            </a:r>
+            <a:r>
+              <a:rPr lang="en-US" dirty="0" err="1"/>
+              <a:t>debezium</a:t>
+            </a:r>
+            <a:r>
+              <a:rPr lang="en-US" dirty="0"/>
+              <a:t> </a:t>
+            </a:r>
+            <a:r>
+              <a:rPr lang="ru-RU" dirty="0"/>
+              <a:t>падает</a:t>
+            </a:r>
+          </a:p>
+          <a:p>
+            <a:r>
+              <a:rPr lang="ru-RU" dirty="0"/>
+              <a:t>Причина: несовместимое изменение схемы</a:t>
+            </a:r>
+          </a:p>
+          <a:p>
+            <a:r>
+              <a:rPr lang="ru-RU" dirty="0"/>
+              <a:t>Решения:</a:t>
+            </a:r>
+          </a:p>
+          <a:p>
+            <a:pPr lvl="1"/>
+            <a:r>
+              <a:rPr lang="ru-RU" dirty="0"/>
+              <a:t>Указать </a:t>
+            </a:r>
+            <a:r>
+              <a:rPr lang="en-US" dirty="0" err="1"/>
+              <a:t>compatibility.mode</a:t>
+            </a:r>
+            <a:r>
+              <a:rPr lang="en-US" dirty="0"/>
+              <a:t>=NONE</a:t>
+            </a:r>
+          </a:p>
+          <a:p>
+            <a:pPr lvl="1"/>
+            <a:r>
+              <a:rPr lang="ru-RU" dirty="0"/>
+              <a:t>Глобально запретить выполнять несовместимые изменения </a:t>
+            </a:r>
+          </a:p>
+          <a:p>
+            <a:pPr lvl="1"/>
+            <a:r>
+              <a:rPr lang="ru-RU" dirty="0"/>
+              <a:t>Контролировать </a:t>
+            </a:r>
+            <a:r>
+              <a:rPr lang="ru-RU" dirty="0" err="1"/>
+              <a:t>валидацию</a:t>
+            </a:r>
+            <a:r>
+              <a:rPr lang="ru-RU" dirty="0"/>
+              <a:t> эволюции схемы самостоятельно</a:t>
+            </a:r>
+          </a:p>
+        </p:txBody>
+      </p:sp>
+    </p:spTree>
+    <p:extLst>
+      <p:ext uri="{BB962C8B-B14F-4D97-AF65-F5344CB8AC3E}">
+        <p14:creationId xmlns:p14="http://schemas.microsoft.com/office/powerpoint/2010/main" val="3793313203"/>
+      </p:ext>
+    </p:extLst>
+  </p:cSld>
+  <p:clrMapOvr>
+    <a:masterClrMapping/>
+  </p:clrMapOvr>
+</p:sld>
+</file>
+
+<file path=ppt/slides/slide21.xml><?xml version="1.0" encoding="utf-8"?>
+<p:sld xmlns:a="http://schemas.openxmlformats.org/drawingml/2006/main" xmlns:r="http://schemas.openxmlformats.org/officeDocument/2006/relationships" xmlns:p="http://schemas.openxmlformats.org/presentationml/2006/main">
+  <p:cSld>
+    <p:spTree>
+      <p:nvGrpSpPr>
+        <p:cNvPr id="1" name=""/>
+        <p:cNvGrpSpPr/>
+        <p:nvPr/>
+      </p:nvGrpSpPr>
+      <p:grpSpPr>
+        <a:xfrm>
+          <a:off x="0" y="0"/>
+          <a:ext cx="0" cy="0"/>
+          <a:chOff x="0" y="0"/>
+          <a:chExt cx="0" cy="0"/>
+        </a:xfrm>
+      </p:grpSpPr>
+      <p:sp>
+        <p:nvSpPr>
+          <p:cNvPr id="2" name="Title 1">
+            <a:extLst>
+              <a:ext uri="{FF2B5EF4-FFF2-40B4-BE49-F238E27FC236}">
+                <a16:creationId xmlns:a16="http://schemas.microsoft.com/office/drawing/2014/main" id="{00888323-12E8-8C4F-8E27-23BD5B7DEE03}"/>
+              </a:ext>
+            </a:extLst>
+          </p:cNvPr>
+          <p:cNvSpPr>
+            <a:spLocks noGrp="1"/>
+          </p:cNvSpPr>
+          <p:nvPr>
+            <p:ph type="title"/>
+          </p:nvPr>
+        </p:nvSpPr>
+        <p:spPr>
+          <a:xfrm>
+            <a:off x="0" y="18255"/>
+            <a:ext cx="10515600" cy="1325563"/>
+          </a:xfrm>
+        </p:spPr>
+        <p:txBody>
+          <a:bodyPr/>
+          <a:lstStyle/>
+          <a:p>
+            <a:r>
+              <a:rPr lang="en-US" dirty="0" err="1"/>
+              <a:t>Debezium</a:t>
+            </a:r>
+            <a:r>
+              <a:rPr lang="en-US" dirty="0"/>
+              <a:t>: </a:t>
+            </a:r>
+            <a:r>
+              <a:rPr lang="ru-RU" dirty="0"/>
+              <a:t>упавший мастер</a:t>
+            </a:r>
+            <a:endParaRPr lang="en-US" dirty="0"/>
+          </a:p>
+        </p:txBody>
+      </p:sp>
+      <p:sp>
+        <p:nvSpPr>
+          <p:cNvPr id="3" name="Content Placeholder 2">
+            <a:extLst>
+              <a:ext uri="{FF2B5EF4-FFF2-40B4-BE49-F238E27FC236}">
+                <a16:creationId xmlns:a16="http://schemas.microsoft.com/office/drawing/2014/main" id="{DA11F9D3-C291-2245-AEA5-8D09537FB4E5}"/>
+              </a:ext>
+            </a:extLst>
+          </p:cNvPr>
+          <p:cNvSpPr>
+            <a:spLocks noGrp="1"/>
+          </p:cNvSpPr>
+          <p:nvPr>
+            <p:ph idx="1"/>
+          </p:nvPr>
+        </p:nvSpPr>
+        <p:spPr>
+          <a:xfrm>
+            <a:off x="0" y="1343818"/>
+            <a:ext cx="10515600" cy="4351338"/>
+          </a:xfrm>
+        </p:spPr>
+        <p:txBody>
+          <a:bodyPr>
+            <a:normAutofit/>
+          </a:bodyPr>
+          <a:lstStyle/>
+          <a:p>
+            <a:r>
+              <a:rPr lang="ru-RU" dirty="0"/>
+              <a:t>Проблема: мастер в кластере</a:t>
+            </a:r>
+            <a:r>
+              <a:rPr lang="en-US" dirty="0"/>
+              <a:t> PG </a:t>
+            </a:r>
+            <a:r>
+              <a:rPr lang="ru-RU" dirty="0"/>
+              <a:t>переехал, </a:t>
+            </a:r>
+            <a:r>
+              <a:rPr lang="en-US" dirty="0" err="1"/>
+              <a:t>debezium</a:t>
+            </a:r>
+            <a:r>
+              <a:rPr lang="en-US" dirty="0"/>
+              <a:t> </a:t>
+            </a:r>
+            <a:r>
+              <a:rPr lang="ru-RU" dirty="0"/>
+              <a:t>упал</a:t>
+            </a:r>
+          </a:p>
+          <a:p>
+            <a:r>
+              <a:rPr lang="ru-RU" dirty="0"/>
+              <a:t>Решения:</a:t>
+            </a:r>
+          </a:p>
+          <a:p>
+            <a:pPr lvl="1"/>
+            <a:r>
+              <a:rPr lang="ru-RU" dirty="0"/>
+              <a:t>Обновить настройки подключения, указав ссылку на новый мастер</a:t>
+            </a:r>
+          </a:p>
+          <a:p>
+            <a:pPr lvl="1"/>
+            <a:r>
+              <a:rPr lang="ru-RU" dirty="0"/>
+              <a:t>Если </a:t>
+            </a:r>
+            <a:r>
+              <a:rPr lang="en-US" dirty="0"/>
+              <a:t>DNS </a:t>
+            </a:r>
+            <a:r>
+              <a:rPr lang="ru-RU" dirty="0"/>
+              <a:t>имя мастера не изменилось, то достаточно </a:t>
+            </a:r>
+            <a:r>
+              <a:rPr lang="ru-RU" dirty="0" err="1"/>
+              <a:t>ретраев</a:t>
+            </a:r>
+            <a:r>
+              <a:rPr lang="ru-RU" dirty="0"/>
+              <a:t> на стороне </a:t>
+            </a:r>
+            <a:r>
+              <a:rPr lang="en-US" dirty="0" err="1"/>
+              <a:t>debezium</a:t>
+            </a:r>
+            <a:endParaRPr lang="ru-RU" dirty="0"/>
+          </a:p>
+        </p:txBody>
+      </p:sp>
+    </p:spTree>
+    <p:extLst>
+      <p:ext uri="{BB962C8B-B14F-4D97-AF65-F5344CB8AC3E}">
+        <p14:creationId xmlns:p14="http://schemas.microsoft.com/office/powerpoint/2010/main" val="2646893299"/>
+      </p:ext>
+    </p:extLst>
+  </p:cSld>
+  <p:clrMapOvr>
+    <a:masterClrMapping/>
+  </p:clrMapOvr>
+</p:sld>
+</file>
+
+<file path=ppt/slides/slide22.xml><?xml version="1.0" encoding="utf-8"?>
+<p:sld xmlns:a="http://schemas.openxmlformats.org/drawingml/2006/main" xmlns:r="http://schemas.openxmlformats.org/officeDocument/2006/relationships" xmlns:p="http://schemas.openxmlformats.org/presentationml/2006/main">
+  <p:cSld>
+    <p:spTree>
+      <p:nvGrpSpPr>
+        <p:cNvPr id="1" name=""/>
+        <p:cNvGrpSpPr/>
+        <p:nvPr/>
+      </p:nvGrpSpPr>
+      <p:grpSpPr>
+        <a:xfrm>
+          <a:off x="0" y="0"/>
+          <a:ext cx="0" cy="0"/>
+          <a:chOff x="0" y="0"/>
+          <a:chExt cx="0" cy="0"/>
+        </a:xfrm>
+      </p:grpSpPr>
+      <p:sp>
+        <p:nvSpPr>
+          <p:cNvPr id="2" name="Title 1">
+            <a:extLst>
+              <a:ext uri="{FF2B5EF4-FFF2-40B4-BE49-F238E27FC236}">
+                <a16:creationId xmlns:a16="http://schemas.microsoft.com/office/drawing/2014/main" id="{00888323-12E8-8C4F-8E27-23BD5B7DEE03}"/>
+              </a:ext>
+            </a:extLst>
+          </p:cNvPr>
+          <p:cNvSpPr>
+            <a:spLocks noGrp="1"/>
+          </p:cNvSpPr>
+          <p:nvPr>
+            <p:ph type="title"/>
+          </p:nvPr>
+        </p:nvSpPr>
+        <p:spPr>
+          <a:xfrm>
+            <a:off x="0" y="18255"/>
+            <a:ext cx="10515600" cy="1325563"/>
+          </a:xfrm>
+        </p:spPr>
+        <p:txBody>
+          <a:bodyPr/>
+          <a:lstStyle/>
+          <a:p>
+            <a:r>
+              <a:rPr lang="en-US" dirty="0" err="1"/>
+              <a:t>Debezium</a:t>
+            </a:r>
+            <a:r>
+              <a:rPr lang="en-US" dirty="0"/>
+              <a:t>: </a:t>
+            </a:r>
+            <a:r>
+              <a:rPr lang="en-US" dirty="0" err="1"/>
+              <a:t>cdc</a:t>
+            </a:r>
+            <a:r>
+              <a:rPr lang="en-US" dirty="0"/>
+              <a:t> </a:t>
+            </a:r>
+            <a:r>
+              <a:rPr lang="ru-RU" dirty="0"/>
+              <a:t>для </a:t>
+            </a:r>
+            <a:r>
+              <a:rPr lang="ru-RU" dirty="0" err="1"/>
+              <a:t>шардов</a:t>
+            </a:r>
+            <a:endParaRPr lang="en-US" dirty="0"/>
+          </a:p>
+        </p:txBody>
+      </p:sp>
+      <p:sp>
+        <p:nvSpPr>
+          <p:cNvPr id="3" name="Content Placeholder 2">
+            <a:extLst>
+              <a:ext uri="{FF2B5EF4-FFF2-40B4-BE49-F238E27FC236}">
+                <a16:creationId xmlns:a16="http://schemas.microsoft.com/office/drawing/2014/main" id="{DA11F9D3-C291-2245-AEA5-8D09537FB4E5}"/>
+              </a:ext>
+            </a:extLst>
+          </p:cNvPr>
+          <p:cNvSpPr>
+            <a:spLocks noGrp="1"/>
+          </p:cNvSpPr>
+          <p:nvPr>
+            <p:ph idx="1"/>
+          </p:nvPr>
+        </p:nvSpPr>
+        <p:spPr>
+          <a:xfrm>
+            <a:off x="0" y="1343818"/>
+            <a:ext cx="10515600" cy="4351338"/>
+          </a:xfrm>
+        </p:spPr>
+        <p:txBody>
+          <a:bodyPr>
+            <a:normAutofit/>
+          </a:bodyPr>
+          <a:lstStyle/>
+          <a:p>
+            <a:r>
+              <a:rPr lang="ru-RU" dirty="0"/>
+              <a:t>Контекст: нужно перехватывать изменения по заданному набору таблиц в разных </a:t>
+            </a:r>
+            <a:r>
+              <a:rPr lang="ru-RU" dirty="0" err="1"/>
+              <a:t>шардах</a:t>
+            </a:r>
+            <a:endParaRPr lang="ru-RU" dirty="0"/>
+          </a:p>
+          <a:p>
+            <a:r>
+              <a:rPr lang="ru-RU" dirty="0"/>
+              <a:t>Проблема: </a:t>
+            </a:r>
+            <a:r>
+              <a:rPr lang="ru-RU" dirty="0" err="1"/>
+              <a:t>эвенты</a:t>
+            </a:r>
+            <a:r>
+              <a:rPr lang="ru-RU" dirty="0"/>
+              <a:t> по одинаковым таблицам сохраняются в разные топики</a:t>
+            </a:r>
+          </a:p>
+          <a:p>
+            <a:r>
+              <a:rPr lang="ru-RU" dirty="0"/>
+              <a:t>Решение:</a:t>
+            </a:r>
+          </a:p>
+          <a:p>
+            <a:pPr lvl="1"/>
+            <a:r>
+              <a:rPr lang="ru-RU" dirty="0"/>
+              <a:t>Настройка </a:t>
+            </a:r>
+            <a:r>
+              <a:rPr lang="ru-RU" dirty="0" err="1"/>
+              <a:t>роутинга</a:t>
+            </a:r>
+            <a:r>
+              <a:rPr lang="ru-RU" dirty="0"/>
+              <a:t> таблиц</a:t>
+            </a:r>
+          </a:p>
+        </p:txBody>
+      </p:sp>
+    </p:spTree>
+    <p:extLst>
+      <p:ext uri="{BB962C8B-B14F-4D97-AF65-F5344CB8AC3E}">
+        <p14:creationId xmlns:p14="http://schemas.microsoft.com/office/powerpoint/2010/main" val="2860038133"/>
+      </p:ext>
+    </p:extLst>
+  </p:cSld>
+  <p:clrMapOvr>
+    <a:masterClrMapping/>
+  </p:clrMapOvr>
+</p:sld>
+</file>
+
+<file path=ppt/slides/slide23.xml><?xml version="1.0" encoding="utf-8"?>
+<p:sld xmlns:a="http://schemas.openxmlformats.org/drawingml/2006/main" xmlns:r="http://schemas.openxmlformats.org/officeDocument/2006/relationships" xmlns:p="http://schemas.openxmlformats.org/presentationml/2006/main">
+  <p:cSld>
+    <p:spTree>
+      <p:nvGrpSpPr>
+        <p:cNvPr id="1" name=""/>
+        <p:cNvGrpSpPr/>
+        <p:nvPr/>
+      </p:nvGrpSpPr>
+      <p:grpSpPr>
+        <a:xfrm>
+          <a:off x="0" y="0"/>
+          <a:ext cx="0" cy="0"/>
+          <a:chOff x="0" y="0"/>
+          <a:chExt cx="0" cy="0"/>
+        </a:xfrm>
+      </p:grpSpPr>
+      <p:sp>
+        <p:nvSpPr>
+          <p:cNvPr id="2" name="Title 1">
+            <a:extLst>
+              <a:ext uri="{FF2B5EF4-FFF2-40B4-BE49-F238E27FC236}">
+                <a16:creationId xmlns:a16="http://schemas.microsoft.com/office/drawing/2014/main" id="{00888323-12E8-8C4F-8E27-23BD5B7DEE03}"/>
+              </a:ext>
+            </a:extLst>
+          </p:cNvPr>
+          <p:cNvSpPr>
+            <a:spLocks noGrp="1"/>
+          </p:cNvSpPr>
+          <p:nvPr>
+            <p:ph type="title"/>
+          </p:nvPr>
+        </p:nvSpPr>
+        <p:spPr>
+          <a:xfrm>
+            <a:off x="0" y="18255"/>
+            <a:ext cx="10515600" cy="1325563"/>
+          </a:xfrm>
+        </p:spPr>
+        <p:txBody>
+          <a:bodyPr/>
+          <a:lstStyle/>
+          <a:p>
+            <a:r>
+              <a:rPr lang="en-US" dirty="0" err="1"/>
+              <a:t>Debezium</a:t>
+            </a:r>
+            <a:r>
+              <a:rPr lang="en-US" dirty="0"/>
+              <a:t>: </a:t>
+            </a:r>
+            <a:r>
+              <a:rPr lang="en-US" dirty="0" err="1"/>
+              <a:t>cdc</a:t>
+            </a:r>
+            <a:r>
+              <a:rPr lang="en-US" dirty="0"/>
+              <a:t> </a:t>
+            </a:r>
+            <a:r>
+              <a:rPr lang="ru-RU" dirty="0"/>
+              <a:t>для </a:t>
+            </a:r>
+            <a:r>
+              <a:rPr lang="ru-RU" dirty="0" err="1"/>
+              <a:t>шардов</a:t>
+            </a:r>
+            <a:endParaRPr lang="en-US" dirty="0"/>
+          </a:p>
+        </p:txBody>
+      </p:sp>
+      <p:sp>
+        <p:nvSpPr>
+          <p:cNvPr id="3" name="Content Placeholder 2">
+            <a:extLst>
+              <a:ext uri="{FF2B5EF4-FFF2-40B4-BE49-F238E27FC236}">
+                <a16:creationId xmlns:a16="http://schemas.microsoft.com/office/drawing/2014/main" id="{DA11F9D3-C291-2245-AEA5-8D09537FB4E5}"/>
+              </a:ext>
+            </a:extLst>
+          </p:cNvPr>
+          <p:cNvSpPr>
+            <a:spLocks noGrp="1"/>
+          </p:cNvSpPr>
+          <p:nvPr>
+            <p:ph idx="1"/>
+          </p:nvPr>
+        </p:nvSpPr>
+        <p:spPr>
+          <a:xfrm>
+            <a:off x="0" y="1343818"/>
+            <a:ext cx="10515600" cy="4351338"/>
+          </a:xfrm>
+        </p:spPr>
+        <p:txBody>
+          <a:bodyPr>
+            <a:normAutofit fontScale="92500" lnSpcReduction="10000"/>
+          </a:bodyPr>
+          <a:lstStyle/>
+          <a:p>
+            <a:r>
+              <a:rPr lang="ru-RU" dirty="0"/>
+              <a:t>Контекст: нужно перехватывать изменения по заданному набору таблиц в разных </a:t>
+            </a:r>
+            <a:r>
+              <a:rPr lang="ru-RU" dirty="0" err="1"/>
+              <a:t>шардах</a:t>
+            </a:r>
+            <a:r>
+              <a:rPr lang="ru-RU" dirty="0"/>
+              <a:t> / </a:t>
+            </a:r>
+            <a:r>
+              <a:rPr lang="en-US" dirty="0" err="1"/>
+              <a:t>debezium</a:t>
+            </a:r>
+            <a:r>
+              <a:rPr lang="ru-RU" dirty="0"/>
+              <a:t> использует </a:t>
+            </a:r>
+            <a:r>
+              <a:rPr lang="en-US" dirty="0" err="1"/>
+              <a:t>avro</a:t>
+            </a:r>
+            <a:endParaRPr lang="ru-RU" dirty="0"/>
+          </a:p>
+          <a:p>
+            <a:r>
+              <a:rPr lang="ru-RU" dirty="0"/>
+              <a:t>Проблема </a:t>
+            </a:r>
+            <a:r>
+              <a:rPr lang="en-US" dirty="0"/>
+              <a:t>#1</a:t>
+            </a:r>
+            <a:r>
+              <a:rPr lang="ru-RU" dirty="0"/>
+              <a:t>: </a:t>
+            </a:r>
+            <a:r>
+              <a:rPr lang="ru-RU" dirty="0" err="1"/>
+              <a:t>эвенты</a:t>
+            </a:r>
+            <a:r>
+              <a:rPr lang="ru-RU" dirty="0"/>
+              <a:t> по одинаковым таблицам имею одинаковую структуру, но </a:t>
+            </a:r>
+            <a:r>
+              <a:rPr lang="en-US" dirty="0" err="1"/>
+              <a:t>debezium</a:t>
+            </a:r>
+            <a:r>
+              <a:rPr lang="en-US" dirty="0"/>
+              <a:t> </a:t>
+            </a:r>
+            <a:r>
+              <a:rPr lang="ru-RU" dirty="0"/>
+              <a:t>генерирует разные несовместимые схемы</a:t>
+            </a:r>
+          </a:p>
+          <a:p>
+            <a:r>
+              <a:rPr lang="ru-RU" dirty="0"/>
+              <a:t>Решение:</a:t>
+            </a:r>
+          </a:p>
+          <a:p>
+            <a:pPr lvl="1"/>
+            <a:r>
+              <a:rPr lang="ru-RU" dirty="0"/>
+              <a:t>Трансформ для переименования рекордов</a:t>
+            </a:r>
+            <a:endParaRPr lang="en-US" dirty="0"/>
+          </a:p>
+          <a:p>
+            <a:r>
+              <a:rPr lang="ru-RU" dirty="0"/>
+              <a:t>Проблема </a:t>
+            </a:r>
+            <a:r>
+              <a:rPr lang="en-US" dirty="0"/>
+              <a:t>#2: </a:t>
+            </a:r>
+            <a:r>
+              <a:rPr lang="ru-RU" dirty="0"/>
+              <a:t>переименование сработало только на верхнем уровне. Вложенные структуры также с разным </a:t>
+            </a:r>
+            <a:r>
+              <a:rPr lang="ru-RU" dirty="0" err="1"/>
+              <a:t>неймингом</a:t>
+            </a:r>
+            <a:endParaRPr lang="ru-RU" dirty="0"/>
+          </a:p>
+          <a:p>
+            <a:r>
+              <a:rPr lang="ru-RU" dirty="0"/>
+              <a:t>Решение:</a:t>
+            </a:r>
+          </a:p>
+          <a:p>
+            <a:pPr lvl="1"/>
+            <a:r>
+              <a:rPr lang="ru-RU" dirty="0" err="1"/>
+              <a:t>Кастомный</a:t>
+            </a:r>
+            <a:r>
+              <a:rPr lang="ru-RU" dirty="0"/>
+              <a:t> трансформ, который переименовывает в том числе и вложенные структуры</a:t>
+            </a:r>
+          </a:p>
+        </p:txBody>
+      </p:sp>
+    </p:spTree>
+    <p:extLst>
+      <p:ext uri="{BB962C8B-B14F-4D97-AF65-F5344CB8AC3E}">
+        <p14:creationId xmlns:p14="http://schemas.microsoft.com/office/powerpoint/2010/main" val="167980905"/>
+      </p:ext>
+    </p:extLst>
+  </p:cSld>
+  <p:clrMapOvr>
+    <a:masterClrMapping/>
+  </p:clrMapOvr>
+</p:sld>
+</file>
+
+<file path=ppt/slides/slide24.xml><?xml version="1.0" encoding="utf-8"?>
+<p:sld xmlns:a="http://schemas.openxmlformats.org/drawingml/2006/main" xmlns:r="http://schemas.openxmlformats.org/officeDocument/2006/relationships" xmlns:p="http://schemas.openxmlformats.org/presentationml/2006/main">
+  <p:cSld>
+    <p:spTree>
+      <p:nvGrpSpPr>
+        <p:cNvPr id="1" name=""/>
+        <p:cNvGrpSpPr/>
+        <p:nvPr/>
+      </p:nvGrpSpPr>
+      <p:grpSpPr>
+        <a:xfrm>
+          <a:off x="0" y="0"/>
+          <a:ext cx="0" cy="0"/>
+          <a:chOff x="0" y="0"/>
+          <a:chExt cx="0" cy="0"/>
+        </a:xfrm>
+      </p:grpSpPr>
+      <p:sp>
+        <p:nvSpPr>
+          <p:cNvPr id="2" name="Title 1">
+            <a:extLst>
+              <a:ext uri="{FF2B5EF4-FFF2-40B4-BE49-F238E27FC236}">
+                <a16:creationId xmlns:a16="http://schemas.microsoft.com/office/drawing/2014/main" id="{00888323-12E8-8C4F-8E27-23BD5B7DEE03}"/>
+              </a:ext>
+            </a:extLst>
+          </p:cNvPr>
+          <p:cNvSpPr>
+            <a:spLocks noGrp="1"/>
+          </p:cNvSpPr>
+          <p:nvPr>
+            <p:ph type="title"/>
+          </p:nvPr>
+        </p:nvSpPr>
+        <p:spPr>
+          <a:xfrm>
+            <a:off x="0" y="18255"/>
+            <a:ext cx="10515600" cy="1325563"/>
+          </a:xfrm>
+        </p:spPr>
+        <p:txBody>
+          <a:bodyPr/>
+          <a:lstStyle/>
+          <a:p>
+            <a:r>
+              <a:rPr lang="en-US" dirty="0" err="1"/>
+              <a:t>Debezium</a:t>
+            </a:r>
+            <a:r>
+              <a:rPr lang="en-US" dirty="0"/>
+              <a:t>: timestamp / </a:t>
+            </a:r>
+            <a:r>
+              <a:rPr lang="en-US" dirty="0" err="1"/>
+              <a:t>timestamptz</a:t>
+            </a:r>
+            <a:endParaRPr lang="en-US" dirty="0"/>
+          </a:p>
+        </p:txBody>
+      </p:sp>
+      <p:sp>
+        <p:nvSpPr>
+          <p:cNvPr id="3" name="Content Placeholder 2">
+            <a:extLst>
+              <a:ext uri="{FF2B5EF4-FFF2-40B4-BE49-F238E27FC236}">
+                <a16:creationId xmlns:a16="http://schemas.microsoft.com/office/drawing/2014/main" id="{DA11F9D3-C291-2245-AEA5-8D09537FB4E5}"/>
+              </a:ext>
+            </a:extLst>
+          </p:cNvPr>
+          <p:cNvSpPr>
+            <a:spLocks noGrp="1"/>
+          </p:cNvSpPr>
+          <p:nvPr>
+            <p:ph idx="1"/>
+          </p:nvPr>
+        </p:nvSpPr>
+        <p:spPr>
+          <a:xfrm>
+            <a:off x="0" y="1343818"/>
+            <a:ext cx="10515600" cy="4351338"/>
+          </a:xfrm>
+        </p:spPr>
+        <p:txBody>
+          <a:bodyPr>
+            <a:normAutofit/>
+          </a:bodyPr>
+          <a:lstStyle/>
+          <a:p>
+            <a:r>
+              <a:rPr lang="ru-RU" dirty="0"/>
+              <a:t>Контекст: нужно реплицировать </a:t>
+            </a:r>
+            <a:r>
+              <a:rPr lang="ru-RU" dirty="0" err="1"/>
+              <a:t>таблцы</a:t>
+            </a:r>
+            <a:r>
+              <a:rPr lang="ru-RU" dirty="0"/>
+              <a:t> с колонками типов </a:t>
+            </a:r>
+            <a:r>
+              <a:rPr lang="en-US" dirty="0"/>
+              <a:t>timestamp / </a:t>
+            </a:r>
+            <a:r>
+              <a:rPr lang="en-US" dirty="0" err="1"/>
+              <a:t>timestamptz</a:t>
+            </a:r>
+            <a:endParaRPr lang="ru-RU" dirty="0"/>
+          </a:p>
+          <a:p>
+            <a:r>
+              <a:rPr lang="ru-RU" dirty="0"/>
+              <a:t>Проблема </a:t>
+            </a:r>
+            <a:r>
+              <a:rPr lang="en-US" dirty="0"/>
+              <a:t>#1</a:t>
+            </a:r>
+            <a:r>
+              <a:rPr lang="ru-RU" dirty="0"/>
+              <a:t>: </a:t>
+            </a:r>
+            <a:r>
+              <a:rPr lang="en-US" dirty="0" err="1"/>
+              <a:t>debezium</a:t>
+            </a:r>
+            <a:r>
+              <a:rPr lang="en-US" dirty="0"/>
+              <a:t> </a:t>
+            </a:r>
+            <a:r>
+              <a:rPr lang="ru-RU" dirty="0"/>
+              <a:t>конвертирует один тип в </a:t>
+            </a:r>
+            <a:r>
+              <a:rPr lang="en-US" dirty="0"/>
+              <a:t>long, </a:t>
+            </a:r>
+            <a:r>
+              <a:rPr lang="ru-RU" dirty="0"/>
+              <a:t>другой в </a:t>
+            </a:r>
+            <a:r>
+              <a:rPr lang="en-US" dirty="0"/>
+              <a:t>string</a:t>
+            </a:r>
+            <a:endParaRPr lang="ru-RU" dirty="0"/>
+          </a:p>
+          <a:p>
+            <a:r>
+              <a:rPr lang="ru-RU" dirty="0"/>
+              <a:t>Решение:</a:t>
+            </a:r>
+          </a:p>
+          <a:p>
+            <a:pPr lvl="1"/>
+            <a:r>
+              <a:rPr lang="ru-RU" dirty="0"/>
+              <a:t>Трансформ для конвертации типов</a:t>
+            </a:r>
+          </a:p>
+          <a:p>
+            <a:pPr lvl="1"/>
+            <a:r>
+              <a:rPr lang="ru-RU" dirty="0"/>
+              <a:t>Указывать явно </a:t>
+            </a:r>
+            <a:r>
+              <a:rPr lang="en-US" dirty="0" err="1"/>
+              <a:t>timezone</a:t>
+            </a:r>
+            <a:r>
+              <a:rPr lang="en-US" dirty="0"/>
+              <a:t>, </a:t>
+            </a:r>
+            <a:r>
+              <a:rPr lang="ru-RU" dirty="0"/>
+              <a:t> которую нужно конвертировать </a:t>
+            </a:r>
+            <a:r>
+              <a:rPr lang="en-US" dirty="0" err="1"/>
+              <a:t>timestamptz</a:t>
+            </a:r>
+            <a:endParaRPr lang="en-US" dirty="0"/>
+          </a:p>
+        </p:txBody>
+      </p:sp>
+    </p:spTree>
+    <p:extLst>
+      <p:ext uri="{BB962C8B-B14F-4D97-AF65-F5344CB8AC3E}">
+        <p14:creationId xmlns:p14="http://schemas.microsoft.com/office/powerpoint/2010/main" val="281530354"/>
+      </p:ext>
+    </p:extLst>
+  </p:cSld>
+  <p:clrMapOvr>
+    <a:masterClrMapping/>
+  </p:clrMapOvr>
+</p:sld>
+</file>
+
+<file path=ppt/slides/slide25.xml><?xml version="1.0" encoding="utf-8"?>
+<p:sld xmlns:a="http://schemas.openxmlformats.org/drawingml/2006/main" xmlns:r="http://schemas.openxmlformats.org/officeDocument/2006/relationships" xmlns:p="http://schemas.openxmlformats.org/presentationml/2006/main">
+  <p:cSld>
+    <p:spTree>
+      <p:nvGrpSpPr>
+        <p:cNvPr id="1" name=""/>
+        <p:cNvGrpSpPr/>
+        <p:nvPr/>
+      </p:nvGrpSpPr>
+      <p:grpSpPr>
+        <a:xfrm>
+          <a:off x="0" y="0"/>
+          <a:ext cx="0" cy="0"/>
+          <a:chOff x="0" y="0"/>
+          <a:chExt cx="0" cy="0"/>
+        </a:xfrm>
+      </p:grpSpPr>
+      <p:sp>
+        <p:nvSpPr>
+          <p:cNvPr id="2" name="Title 1">
+            <a:extLst>
+              <a:ext uri="{FF2B5EF4-FFF2-40B4-BE49-F238E27FC236}">
+                <a16:creationId xmlns:a16="http://schemas.microsoft.com/office/drawing/2014/main" id="{00888323-12E8-8C4F-8E27-23BD5B7DEE03}"/>
+              </a:ext>
+            </a:extLst>
+          </p:cNvPr>
+          <p:cNvSpPr>
+            <a:spLocks noGrp="1"/>
+          </p:cNvSpPr>
+          <p:nvPr>
+            <p:ph type="title"/>
+          </p:nvPr>
+        </p:nvSpPr>
+        <p:spPr>
+          <a:xfrm>
+            <a:off x="0" y="18255"/>
+            <a:ext cx="10515600" cy="1325563"/>
+          </a:xfrm>
+        </p:spPr>
+        <p:txBody>
+          <a:bodyPr/>
+          <a:lstStyle/>
+          <a:p>
+            <a:r>
+              <a:rPr lang="ru-RU" dirty="0"/>
+              <a:t>Выводы</a:t>
+            </a:r>
+            <a:endParaRPr lang="en-US" dirty="0"/>
+          </a:p>
+        </p:txBody>
+      </p:sp>
+      <p:sp>
+        <p:nvSpPr>
+          <p:cNvPr id="3" name="Content Placeholder 2">
+            <a:extLst>
+              <a:ext uri="{FF2B5EF4-FFF2-40B4-BE49-F238E27FC236}">
+                <a16:creationId xmlns:a16="http://schemas.microsoft.com/office/drawing/2014/main" id="{DA11F9D3-C291-2245-AEA5-8D09537FB4E5}"/>
+              </a:ext>
+            </a:extLst>
+          </p:cNvPr>
+          <p:cNvSpPr>
+            <a:spLocks noGrp="1"/>
+          </p:cNvSpPr>
+          <p:nvPr>
+            <p:ph idx="1"/>
+          </p:nvPr>
+        </p:nvSpPr>
+        <p:spPr>
+          <a:xfrm>
+            <a:off x="0" y="1343818"/>
+            <a:ext cx="10515600" cy="4351338"/>
+          </a:xfrm>
+        </p:spPr>
+        <p:txBody>
+          <a:bodyPr>
+            <a:normAutofit lnSpcReduction="10000"/>
+          </a:bodyPr>
+          <a:lstStyle/>
+          <a:p>
+            <a:r>
+              <a:rPr lang="ru-RU" dirty="0"/>
+              <a:t>Одну и ту же задачу можно решать разными способами</a:t>
+            </a:r>
+          </a:p>
+          <a:p>
+            <a:r>
+              <a:rPr lang="ru-RU" dirty="0"/>
+              <a:t>Каждый способ имеет право на жизнь и выбор конкретного решения зависит от таких факторов, как например:</a:t>
+            </a:r>
+          </a:p>
+          <a:p>
+            <a:pPr lvl="1"/>
+            <a:r>
+              <a:rPr lang="ru-RU" dirty="0"/>
+              <a:t>Стоимость разработки</a:t>
+            </a:r>
+          </a:p>
+          <a:p>
+            <a:pPr lvl="1"/>
+            <a:r>
+              <a:rPr lang="ru-RU" dirty="0"/>
+              <a:t>Влияние на процессы владельцев БД</a:t>
+            </a:r>
+          </a:p>
+          <a:p>
+            <a:pPr lvl="1"/>
+            <a:r>
+              <a:rPr lang="ru-RU" dirty="0"/>
+              <a:t>Влияние на БД</a:t>
+            </a:r>
+          </a:p>
+          <a:p>
+            <a:pPr lvl="1"/>
+            <a:r>
+              <a:rPr lang="ru-RU" dirty="0"/>
+              <a:t>Возможность адаптироваться под новые требования</a:t>
+            </a:r>
+          </a:p>
+          <a:p>
+            <a:pPr lvl="1"/>
+            <a:r>
+              <a:rPr lang="ru-RU" dirty="0"/>
+              <a:t>Гарантии доставки</a:t>
+            </a:r>
+          </a:p>
+          <a:p>
+            <a:r>
+              <a:rPr lang="en-US" dirty="0" err="1"/>
+              <a:t>Debezium</a:t>
+            </a:r>
+            <a:r>
+              <a:rPr lang="en-US" dirty="0"/>
+              <a:t> </a:t>
+            </a:r>
+            <a:r>
+              <a:rPr lang="ru-RU" dirty="0"/>
+              <a:t>может показаться «готовым» решением, но для некоторых задач может оказаться проще использовать другой подход</a:t>
+            </a:r>
+          </a:p>
+        </p:txBody>
+      </p:sp>
+    </p:spTree>
+    <p:extLst>
+      <p:ext uri="{BB962C8B-B14F-4D97-AF65-F5344CB8AC3E}">
+        <p14:creationId xmlns:p14="http://schemas.microsoft.com/office/powerpoint/2010/main" val="1224448155"/>
+      </p:ext>
+    </p:extLst>
+  </p:cSld>
+  <p:clrMapOvr>
+    <a:masterClrMapping/>
+  </p:clrMapOvr>
+</p:sld>
+</file>
+
+<file path=ppt/slides/slide3.xml><?xml version="1.0" encoding="utf-8"?>
+<p:sld xmlns:a="http://schemas.openxmlformats.org/drawingml/2006/main" xmlns:r="http://schemas.openxmlformats.org/officeDocument/2006/relationships" xmlns:p="http://schemas.openxmlformats.org/presentationml/2006/main">
+  <p:cSld>
+    <p:spTree>
+      <p:nvGrpSpPr>
+        <p:cNvPr id="1" name=""/>
+        <p:cNvGrpSpPr/>
+        <p:nvPr/>
+      </p:nvGrpSpPr>
+      <p:grpSpPr>
+        <a:xfrm>
+          <a:off x="0" y="0"/>
+          <a:ext cx="0" cy="0"/>
+          <a:chOff x="0" y="0"/>
+          <a:chExt cx="0" cy="0"/>
+        </a:xfrm>
+      </p:grpSpPr>
+      <p:sp>
+        <p:nvSpPr>
+          <p:cNvPr id="2" name="Title 1">
+            <a:extLst>
+              <a:ext uri="{FF2B5EF4-FFF2-40B4-BE49-F238E27FC236}">
+                <a16:creationId xmlns:a16="http://schemas.microsoft.com/office/drawing/2014/main" id="{00888323-12E8-8C4F-8E27-23BD5B7DEE03}"/>
+              </a:ext>
+            </a:extLst>
+          </p:cNvPr>
+          <p:cNvSpPr>
+            <a:spLocks noGrp="1"/>
+          </p:cNvSpPr>
+          <p:nvPr>
+            <p:ph type="title"/>
+          </p:nvPr>
+        </p:nvSpPr>
+        <p:spPr>
+          <a:xfrm>
+            <a:off x="0" y="18255"/>
+            <a:ext cx="10515600" cy="1325563"/>
+          </a:xfrm>
+        </p:spPr>
+        <p:txBody>
+          <a:bodyPr/>
+          <a:lstStyle/>
+          <a:p>
+            <a:r>
+              <a:rPr lang="ru-RU" dirty="0"/>
+              <a:t>Перед тем, как начнем</a:t>
+            </a:r>
+            <a:endParaRPr lang="en-US" dirty="0"/>
+          </a:p>
+        </p:txBody>
+      </p:sp>
+      <p:sp>
+        <p:nvSpPr>
+          <p:cNvPr id="3" name="Content Placeholder 2">
+            <a:extLst>
+              <a:ext uri="{FF2B5EF4-FFF2-40B4-BE49-F238E27FC236}">
+                <a16:creationId xmlns:a16="http://schemas.microsoft.com/office/drawing/2014/main" id="{DA11F9D3-C291-2245-AEA5-8D09537FB4E5}"/>
+              </a:ext>
+            </a:extLst>
+          </p:cNvPr>
+          <p:cNvSpPr>
+            <a:spLocks noGrp="1"/>
+          </p:cNvSpPr>
+          <p:nvPr>
+            <p:ph idx="1"/>
+          </p:nvPr>
+        </p:nvSpPr>
+        <p:spPr>
+          <a:xfrm>
+            <a:off x="0" y="1343818"/>
+            <a:ext cx="10515600" cy="4351338"/>
+          </a:xfrm>
+        </p:spPr>
+        <p:txBody>
+          <a:bodyPr/>
+          <a:lstStyle/>
+          <a:p>
+            <a:r>
+              <a:rPr lang="ru-RU" dirty="0"/>
+              <a:t>Все примеры выполнены с использованием СУБД </a:t>
+            </a:r>
+            <a:r>
+              <a:rPr lang="en-US" dirty="0"/>
+              <a:t>PostgreSQL </a:t>
+            </a:r>
+            <a:r>
+              <a:rPr lang="ru-RU" dirty="0"/>
+              <a:t>на версиях 15, 16 и 17. Если версия не указана, то по умолчанию подразумевается использование 17</a:t>
+            </a:r>
+          </a:p>
+          <a:p>
+            <a:r>
+              <a:rPr lang="ru-RU" dirty="0"/>
+              <a:t>Что-то может быть отражено в документации</a:t>
+            </a:r>
+          </a:p>
+        </p:txBody>
+      </p:sp>
+    </p:spTree>
+    <p:extLst>
+      <p:ext uri="{BB962C8B-B14F-4D97-AF65-F5344CB8AC3E}">
+        <p14:creationId xmlns:p14="http://schemas.microsoft.com/office/powerpoint/2010/main" val="3701959771"/>
+      </p:ext>
+    </p:extLst>
+  </p:cSld>
+  <p:clrMapOvr>
+    <a:masterClrMapping/>
+  </p:clrMapOvr>
+</p:sld>
+</file>
+
+<file path=ppt/slides/slide4.xml><?xml version="1.0" encoding="utf-8"?>
+<p:sld xmlns:a="http://schemas.openxmlformats.org/drawingml/2006/main" xmlns:r="http://schemas.openxmlformats.org/officeDocument/2006/relationships" xmlns:p="http://schemas.openxmlformats.org/presentationml/2006/main">
+  <p:cSld>
+    <p:spTree>
+      <p:nvGrpSpPr>
+        <p:cNvPr id="1" name=""/>
+        <p:cNvGrpSpPr/>
+        <p:nvPr/>
+      </p:nvGrpSpPr>
+      <p:grpSpPr>
+        <a:xfrm>
+          <a:off x="0" y="0"/>
+          <a:ext cx="0" cy="0"/>
+          <a:chOff x="0" y="0"/>
+          <a:chExt cx="0" cy="0"/>
+        </a:xfrm>
+      </p:grpSpPr>
+      <p:sp>
+        <p:nvSpPr>
+          <p:cNvPr id="2" name="Title 1">
+            <a:extLst>
+              <a:ext uri="{FF2B5EF4-FFF2-40B4-BE49-F238E27FC236}">
+                <a16:creationId xmlns:a16="http://schemas.microsoft.com/office/drawing/2014/main" id="{00888323-12E8-8C4F-8E27-23BD5B7DEE03}"/>
+              </a:ext>
+            </a:extLst>
+          </p:cNvPr>
+          <p:cNvSpPr>
+            <a:spLocks noGrp="1"/>
+          </p:cNvSpPr>
+          <p:nvPr>
+            <p:ph type="title"/>
+          </p:nvPr>
+        </p:nvSpPr>
+        <p:spPr>
+          <a:xfrm>
+            <a:off x="0" y="18255"/>
+            <a:ext cx="10515600" cy="1325563"/>
+          </a:xfrm>
+        </p:spPr>
+        <p:txBody>
+          <a:bodyPr/>
+          <a:lstStyle/>
+          <a:p>
+            <a:r>
+              <a:rPr lang="ru-RU" dirty="0"/>
+              <a:t>Кратко «что такое и зачем </a:t>
+            </a:r>
+            <a:r>
+              <a:rPr lang="en-US" dirty="0"/>
+              <a:t>CDC</a:t>
+            </a:r>
+            <a:r>
+              <a:rPr lang="ru-RU" dirty="0"/>
+              <a:t>»</a:t>
+            </a:r>
+            <a:endParaRPr lang="en-US" dirty="0"/>
+          </a:p>
+        </p:txBody>
+      </p:sp>
+      <p:sp>
+        <p:nvSpPr>
+          <p:cNvPr id="3" name="Content Placeholder 2">
+            <a:extLst>
+              <a:ext uri="{FF2B5EF4-FFF2-40B4-BE49-F238E27FC236}">
+                <a16:creationId xmlns:a16="http://schemas.microsoft.com/office/drawing/2014/main" id="{DA11F9D3-C291-2245-AEA5-8D09537FB4E5}"/>
+              </a:ext>
+            </a:extLst>
+          </p:cNvPr>
+          <p:cNvSpPr>
+            <a:spLocks noGrp="1"/>
+          </p:cNvSpPr>
+          <p:nvPr>
+            <p:ph idx="1"/>
+          </p:nvPr>
+        </p:nvSpPr>
+        <p:spPr>
+          <a:xfrm>
+            <a:off x="0" y="1343818"/>
+            <a:ext cx="10515600" cy="4351338"/>
+          </a:xfrm>
+        </p:spPr>
+        <p:txBody>
+          <a:bodyPr>
+            <a:normAutofit/>
+          </a:bodyPr>
+          <a:lstStyle/>
+          <a:p>
+            <a:r>
+              <a:rPr lang="ru-RU" dirty="0"/>
+              <a:t>Процесс захвата изменений</a:t>
+            </a:r>
+          </a:p>
+          <a:p>
+            <a:pPr lvl="1"/>
+            <a:r>
+              <a:rPr lang="ru-RU" dirty="0"/>
+              <a:t>Обычно речь про такие операции, как </a:t>
+            </a:r>
+            <a:r>
+              <a:rPr lang="en-US" dirty="0"/>
+              <a:t>create, update, delete</a:t>
+            </a:r>
+            <a:endParaRPr lang="ru-RU" dirty="0"/>
+          </a:p>
+          <a:p>
+            <a:pPr lvl="1"/>
+            <a:r>
+              <a:rPr lang="ru-RU" dirty="0"/>
+              <a:t>В некоторых случаях отслеживаются также и </a:t>
+            </a:r>
+            <a:r>
+              <a:rPr lang="en-US" dirty="0"/>
+              <a:t>truncate</a:t>
+            </a:r>
+            <a:endParaRPr lang="ru-RU" dirty="0"/>
+          </a:p>
+          <a:p>
+            <a:r>
+              <a:rPr lang="ru-RU" dirty="0"/>
+              <a:t>Процесс непрерывный </a:t>
+            </a:r>
+          </a:p>
+          <a:p>
+            <a:r>
+              <a:rPr lang="ru-RU" dirty="0"/>
+              <a:t>Может подразумевать снятие начального </a:t>
+            </a:r>
+            <a:r>
+              <a:rPr lang="ru-RU" dirty="0" err="1"/>
+              <a:t>снепшота</a:t>
+            </a:r>
+            <a:r>
+              <a:rPr lang="ru-RU" dirty="0"/>
+              <a:t> сущности(ей)</a:t>
+            </a:r>
+          </a:p>
+          <a:p>
+            <a:r>
+              <a:rPr lang="ru-RU" dirty="0"/>
+              <a:t>Цель: получить и обработать изменения на источнике</a:t>
+            </a:r>
+          </a:p>
+          <a:p>
+            <a:pPr lvl="1"/>
+            <a:r>
+              <a:rPr lang="ru-RU" dirty="0"/>
+              <a:t>Обработка может включать в себя как реагирование на событие «на месте» без сохранения куда-либо, так и сохранение в новое хранилище для дальнейшей обработки</a:t>
+            </a:r>
+          </a:p>
+        </p:txBody>
+      </p:sp>
+    </p:spTree>
+    <p:extLst>
+      <p:ext uri="{BB962C8B-B14F-4D97-AF65-F5344CB8AC3E}">
+        <p14:creationId xmlns:p14="http://schemas.microsoft.com/office/powerpoint/2010/main" val="166203416"/>
+      </p:ext>
+    </p:extLst>
+  </p:cSld>
+  <p:clrMapOvr>
+    <a:masterClrMapping/>
+  </p:clrMapOvr>
+</p:sld>
+</file>
+
+<file path=ppt/slides/slide5.xml><?xml version="1.0" encoding="utf-8"?>
+<p:sld xmlns:a="http://schemas.openxmlformats.org/drawingml/2006/main" xmlns:r="http://schemas.openxmlformats.org/officeDocument/2006/relationships" xmlns:p="http://schemas.openxmlformats.org/presentationml/2006/main">
+  <p:cSld>
+    <p:spTree>
+      <p:nvGrpSpPr>
+        <p:cNvPr id="1" name=""/>
+        <p:cNvGrpSpPr/>
+        <p:nvPr/>
+      </p:nvGrpSpPr>
+      <p:grpSpPr>
+        <a:xfrm>
+          <a:off x="0" y="0"/>
+          <a:ext cx="0" cy="0"/>
+          <a:chOff x="0" y="0"/>
+          <a:chExt cx="0" cy="0"/>
+        </a:xfrm>
+      </p:grpSpPr>
+      <p:sp>
+        <p:nvSpPr>
+          <p:cNvPr id="2" name="Title 1">
+            <a:extLst>
+              <a:ext uri="{FF2B5EF4-FFF2-40B4-BE49-F238E27FC236}">
+                <a16:creationId xmlns:a16="http://schemas.microsoft.com/office/drawing/2014/main" id="{00888323-12E8-8C4F-8E27-23BD5B7DEE03}"/>
+              </a:ext>
+            </a:extLst>
+          </p:cNvPr>
+          <p:cNvSpPr>
+            <a:spLocks noGrp="1"/>
+          </p:cNvSpPr>
+          <p:nvPr>
+            <p:ph type="title"/>
+          </p:nvPr>
+        </p:nvSpPr>
+        <p:spPr>
+          <a:xfrm>
+            <a:off x="0" y="18255"/>
+            <a:ext cx="10515600" cy="1325563"/>
+          </a:xfrm>
+        </p:spPr>
+        <p:txBody>
+          <a:bodyPr/>
+          <a:lstStyle/>
+          <a:p>
+            <a:r>
+              <a:rPr lang="ru-RU" dirty="0"/>
+              <a:t>Описание задачи для примера</a:t>
+            </a:r>
+            <a:endParaRPr lang="en-US" dirty="0"/>
+          </a:p>
+        </p:txBody>
+      </p:sp>
+      <p:sp>
+        <p:nvSpPr>
+          <p:cNvPr id="3" name="Content Placeholder 2">
+            <a:extLst>
+              <a:ext uri="{FF2B5EF4-FFF2-40B4-BE49-F238E27FC236}">
+                <a16:creationId xmlns:a16="http://schemas.microsoft.com/office/drawing/2014/main" id="{DA11F9D3-C291-2245-AEA5-8D09537FB4E5}"/>
+              </a:ext>
+            </a:extLst>
+          </p:cNvPr>
+          <p:cNvSpPr>
+            <a:spLocks noGrp="1"/>
+          </p:cNvSpPr>
+          <p:nvPr>
+            <p:ph idx="1"/>
+          </p:nvPr>
+        </p:nvSpPr>
+        <p:spPr>
+          <a:xfrm>
+            <a:off x="0" y="1343818"/>
+            <a:ext cx="10515600" cy="4351338"/>
+          </a:xfrm>
+        </p:spPr>
+        <p:txBody>
+          <a:bodyPr/>
+          <a:lstStyle/>
+          <a:p>
+            <a:pPr marL="0" indent="0">
+              <a:buNone/>
+            </a:pPr>
+            <a:r>
+              <a:rPr lang="ru-RU" dirty="0"/>
+              <a:t>Требования:</a:t>
+            </a:r>
+          </a:p>
+          <a:p>
+            <a:r>
+              <a:rPr lang="ru-RU" dirty="0"/>
+              <a:t>Должны «захватывать» такие операции, как </a:t>
+            </a:r>
+            <a:r>
+              <a:rPr lang="en-US" dirty="0"/>
+              <a:t>create, update, delete</a:t>
+            </a:r>
+          </a:p>
+          <a:p>
+            <a:r>
+              <a:rPr lang="ru-RU" dirty="0"/>
+              <a:t>Перед началом работы должно быть сохранено текущее состояние сущности</a:t>
+            </a:r>
+          </a:p>
+          <a:p>
+            <a:r>
+              <a:rPr lang="ru-RU" dirty="0"/>
+              <a:t>Должны быть обеспечены гарантии доставки (потери недопустимы)</a:t>
+            </a:r>
+          </a:p>
+          <a:p>
+            <a:r>
+              <a:rPr lang="ru-RU" dirty="0"/>
+              <a:t>Должна быть возможность менять список отслеживаемых сущностей</a:t>
+            </a:r>
+          </a:p>
+          <a:p>
+            <a:r>
+              <a:rPr lang="ru-RU" dirty="0"/>
+              <a:t>Полученные </a:t>
+            </a:r>
+            <a:r>
+              <a:rPr lang="ru-RU" dirty="0" err="1"/>
+              <a:t>эвенты</a:t>
+            </a:r>
+            <a:r>
+              <a:rPr lang="ru-RU" dirty="0"/>
+              <a:t> сохраняются </a:t>
+            </a:r>
+            <a:r>
+              <a:rPr lang="en-US" dirty="0"/>
+              <a:t>as-is </a:t>
+            </a:r>
+            <a:r>
+              <a:rPr lang="ru-RU" dirty="0"/>
+              <a:t>в КХД</a:t>
+            </a:r>
+          </a:p>
+          <a:p>
+            <a:endParaRPr lang="en-US" dirty="0"/>
+          </a:p>
+        </p:txBody>
+      </p:sp>
+    </p:spTree>
+    <p:extLst>
+      <p:ext uri="{BB962C8B-B14F-4D97-AF65-F5344CB8AC3E}">
+        <p14:creationId xmlns:p14="http://schemas.microsoft.com/office/powerpoint/2010/main" val="586964954"/>
+      </p:ext>
+    </p:extLst>
+  </p:cSld>
+  <p:clrMapOvr>
+    <a:masterClrMapping/>
+  </p:clrMapOvr>
+</p:sld>
+</file>
+
+<file path=ppt/slides/slide6.xml><?xml version="1.0" encoding="utf-8"?>
+<p:sld xmlns:a="http://schemas.openxmlformats.org/drawingml/2006/main" xmlns:r="http://schemas.openxmlformats.org/officeDocument/2006/relationships" xmlns:p="http://schemas.openxmlformats.org/presentationml/2006/main">
+  <p:cSld>
+    <p:spTree>
+      <p:nvGrpSpPr>
+        <p:cNvPr id="1" name=""/>
+        <p:cNvGrpSpPr/>
+        <p:nvPr/>
+      </p:nvGrpSpPr>
+      <p:grpSpPr>
+        <a:xfrm>
+          <a:off x="0" y="0"/>
+          <a:ext cx="0" cy="0"/>
+          <a:chOff x="0" y="0"/>
+          <a:chExt cx="0" cy="0"/>
+        </a:xfrm>
+      </p:grpSpPr>
+      <p:sp>
+        <p:nvSpPr>
+          <p:cNvPr id="2" name="Title 1">
+            <a:extLst>
+              <a:ext uri="{FF2B5EF4-FFF2-40B4-BE49-F238E27FC236}">
+                <a16:creationId xmlns:a16="http://schemas.microsoft.com/office/drawing/2014/main" id="{00888323-12E8-8C4F-8E27-23BD5B7DEE03}"/>
+              </a:ext>
+            </a:extLst>
+          </p:cNvPr>
+          <p:cNvSpPr>
+            <a:spLocks noGrp="1"/>
+          </p:cNvSpPr>
+          <p:nvPr>
+            <p:ph type="title"/>
+          </p:nvPr>
+        </p:nvSpPr>
+        <p:spPr>
+          <a:xfrm>
+            <a:off x="0" y="18255"/>
+            <a:ext cx="10515600" cy="1325563"/>
+          </a:xfrm>
+        </p:spPr>
+        <p:txBody>
+          <a:bodyPr>
+            <a:normAutofit/>
+          </a:bodyPr>
+          <a:lstStyle/>
+          <a:p>
+            <a:r>
+              <a:rPr lang="ru-RU" dirty="0"/>
+              <a:t>Известные и не очень способы организации </a:t>
+            </a:r>
+            <a:r>
+              <a:rPr lang="en-US" dirty="0"/>
+              <a:t>CDC</a:t>
+            </a:r>
+            <a:r>
+              <a:rPr lang="ru-RU" dirty="0"/>
+              <a:t>: </a:t>
+            </a:r>
+            <a:r>
+              <a:rPr lang="en-US" dirty="0"/>
+              <a:t>LISTEN/NOTIFY</a:t>
+            </a:r>
+          </a:p>
+        </p:txBody>
+      </p:sp>
+      <p:sp>
+        <p:nvSpPr>
+          <p:cNvPr id="3" name="Content Placeholder 2">
+            <a:extLst>
+              <a:ext uri="{FF2B5EF4-FFF2-40B4-BE49-F238E27FC236}">
+                <a16:creationId xmlns:a16="http://schemas.microsoft.com/office/drawing/2014/main" id="{DA11F9D3-C291-2245-AEA5-8D09537FB4E5}"/>
+              </a:ext>
+            </a:extLst>
+          </p:cNvPr>
+          <p:cNvSpPr>
+            <a:spLocks noGrp="1"/>
+          </p:cNvSpPr>
+          <p:nvPr>
+            <p:ph idx="1"/>
+          </p:nvPr>
+        </p:nvSpPr>
+        <p:spPr>
+          <a:xfrm>
+            <a:off x="0" y="1343818"/>
+            <a:ext cx="10515600" cy="4351338"/>
+          </a:xfrm>
+        </p:spPr>
+        <p:txBody>
+          <a:bodyPr/>
+          <a:lstStyle/>
+          <a:p>
+            <a:endParaRPr lang="en-US" dirty="0"/>
+          </a:p>
+        </p:txBody>
+      </p:sp>
+    </p:spTree>
+    <p:extLst>
+      <p:ext uri="{BB962C8B-B14F-4D97-AF65-F5344CB8AC3E}">
+        <p14:creationId xmlns:p14="http://schemas.microsoft.com/office/powerpoint/2010/main" val="82865300"/>
+      </p:ext>
+    </p:extLst>
+  </p:cSld>
+  <p:clrMapOvr>
+    <a:masterClrMapping/>
+  </p:clrMapOvr>
+</p:sld>
+</file>
+
+<file path=ppt/slides/slide7.xml><?xml version="1.0" encoding="utf-8"?>
+<p:sld xmlns:a="http://schemas.openxmlformats.org/drawingml/2006/main" xmlns:r="http://schemas.openxmlformats.org/officeDocument/2006/relationships" xmlns:p="http://schemas.openxmlformats.org/presentationml/2006/main">
+  <p:cSld>
+    <p:spTree>
+      <p:nvGrpSpPr>
+        <p:cNvPr id="1" name=""/>
+        <p:cNvGrpSpPr/>
+        <p:nvPr/>
+      </p:nvGrpSpPr>
+      <p:grpSpPr>
+        <a:xfrm>
+          <a:off x="0" y="0"/>
+          <a:ext cx="0" cy="0"/>
+          <a:chOff x="0" y="0"/>
+          <a:chExt cx="0" cy="0"/>
+        </a:xfrm>
+      </p:grpSpPr>
+      <p:sp>
+        <p:nvSpPr>
+          <p:cNvPr id="2" name="Title 1">
+            <a:extLst>
+              <a:ext uri="{FF2B5EF4-FFF2-40B4-BE49-F238E27FC236}">
+                <a16:creationId xmlns:a16="http://schemas.microsoft.com/office/drawing/2014/main" id="{00888323-12E8-8C4F-8E27-23BD5B7DEE03}"/>
+              </a:ext>
+            </a:extLst>
+          </p:cNvPr>
+          <p:cNvSpPr>
+            <a:spLocks noGrp="1"/>
+          </p:cNvSpPr>
+          <p:nvPr>
+            <p:ph type="title"/>
+          </p:nvPr>
+        </p:nvSpPr>
+        <p:spPr>
+          <a:xfrm>
+            <a:off x="0" y="18255"/>
+            <a:ext cx="10515600" cy="1325563"/>
+          </a:xfrm>
+        </p:spPr>
+        <p:txBody>
+          <a:bodyPr>
+            <a:normAutofit/>
+          </a:bodyPr>
+          <a:lstStyle/>
+          <a:p>
+            <a:r>
+              <a:rPr lang="ru-RU" dirty="0"/>
+              <a:t>Известные и не очень способы организации </a:t>
+            </a:r>
+            <a:r>
+              <a:rPr lang="en-US" dirty="0"/>
+              <a:t>CDC</a:t>
+            </a:r>
+            <a:r>
+              <a:rPr lang="ru-RU" dirty="0"/>
+              <a:t>: </a:t>
+            </a:r>
+            <a:r>
+              <a:rPr lang="en-US" dirty="0"/>
+              <a:t>SELECT</a:t>
+            </a:r>
+          </a:p>
+        </p:txBody>
+      </p:sp>
+      <p:sp>
+        <p:nvSpPr>
+          <p:cNvPr id="3" name="Content Placeholder 2">
+            <a:extLst>
+              <a:ext uri="{FF2B5EF4-FFF2-40B4-BE49-F238E27FC236}">
+                <a16:creationId xmlns:a16="http://schemas.microsoft.com/office/drawing/2014/main" id="{DA11F9D3-C291-2245-AEA5-8D09537FB4E5}"/>
+              </a:ext>
+            </a:extLst>
+          </p:cNvPr>
+          <p:cNvSpPr>
+            <a:spLocks noGrp="1"/>
+          </p:cNvSpPr>
+          <p:nvPr>
+            <p:ph idx="1"/>
+          </p:nvPr>
+        </p:nvSpPr>
+        <p:spPr>
+          <a:xfrm>
+            <a:off x="0" y="1343818"/>
+            <a:ext cx="10515600" cy="4351338"/>
+          </a:xfrm>
+        </p:spPr>
+        <p:txBody>
+          <a:bodyPr/>
+          <a:lstStyle/>
+          <a:p>
+            <a:endParaRPr lang="en-US" dirty="0"/>
+          </a:p>
+        </p:txBody>
+      </p:sp>
+    </p:spTree>
+    <p:extLst>
+      <p:ext uri="{BB962C8B-B14F-4D97-AF65-F5344CB8AC3E}">
+        <p14:creationId xmlns:p14="http://schemas.microsoft.com/office/powerpoint/2010/main" val="137624388"/>
+      </p:ext>
+    </p:extLst>
+  </p:cSld>
+  <p:clrMapOvr>
+    <a:masterClrMapping/>
+  </p:clrMapOvr>
+</p:sld>
+</file>
+
+<file path=ppt/slides/slide8.xml><?xml version="1.0" encoding="utf-8"?>
+<p:sld xmlns:a="http://schemas.openxmlformats.org/drawingml/2006/main" xmlns:r="http://schemas.openxmlformats.org/officeDocument/2006/relationships" xmlns:p="http://schemas.openxmlformats.org/presentationml/2006/main">
+  <p:cSld>
+    <p:spTree>
+      <p:nvGrpSpPr>
+        <p:cNvPr id="1" name=""/>
+        <p:cNvGrpSpPr/>
+        <p:nvPr/>
+      </p:nvGrpSpPr>
+      <p:grpSpPr>
+        <a:xfrm>
+          <a:off x="0" y="0"/>
+          <a:ext cx="0" cy="0"/>
+          <a:chOff x="0" y="0"/>
+          <a:chExt cx="0" cy="0"/>
+        </a:xfrm>
+      </p:grpSpPr>
+      <p:sp>
+        <p:nvSpPr>
+          <p:cNvPr id="2" name="Title 1">
+            <a:extLst>
+              <a:ext uri="{FF2B5EF4-FFF2-40B4-BE49-F238E27FC236}">
+                <a16:creationId xmlns:a16="http://schemas.microsoft.com/office/drawing/2014/main" id="{00888323-12E8-8C4F-8E27-23BD5B7DEE03}"/>
+              </a:ext>
+            </a:extLst>
+          </p:cNvPr>
+          <p:cNvSpPr>
+            <a:spLocks noGrp="1"/>
+          </p:cNvSpPr>
+          <p:nvPr>
+            <p:ph type="title"/>
+          </p:nvPr>
+        </p:nvSpPr>
+        <p:spPr>
+          <a:xfrm>
+            <a:off x="0" y="18255"/>
+            <a:ext cx="10515600" cy="1325563"/>
+          </a:xfrm>
+        </p:spPr>
+        <p:txBody>
+          <a:bodyPr>
+            <a:normAutofit/>
+          </a:bodyPr>
+          <a:lstStyle/>
+          <a:p>
+            <a:r>
+              <a:rPr lang="ru-RU" dirty="0"/>
+              <a:t>Известные и не очень способы организации </a:t>
+            </a:r>
+            <a:r>
+              <a:rPr lang="en-US" dirty="0"/>
+              <a:t>CDC</a:t>
+            </a:r>
+            <a:r>
+              <a:rPr lang="ru-RU" dirty="0"/>
+              <a:t>: </a:t>
+            </a:r>
+            <a:r>
+              <a:rPr lang="en-US" dirty="0"/>
+              <a:t>Triggers / Outbox</a:t>
+            </a:r>
+          </a:p>
+        </p:txBody>
+      </p:sp>
+      <p:sp>
+        <p:nvSpPr>
+          <p:cNvPr id="3" name="Content Placeholder 2">
+            <a:extLst>
+              <a:ext uri="{FF2B5EF4-FFF2-40B4-BE49-F238E27FC236}">
+                <a16:creationId xmlns:a16="http://schemas.microsoft.com/office/drawing/2014/main" id="{DA11F9D3-C291-2245-AEA5-8D09537FB4E5}"/>
+              </a:ext>
+            </a:extLst>
+          </p:cNvPr>
+          <p:cNvSpPr>
+            <a:spLocks noGrp="1"/>
+          </p:cNvSpPr>
+          <p:nvPr>
+            <p:ph idx="1"/>
+          </p:nvPr>
+        </p:nvSpPr>
+        <p:spPr>
+          <a:xfrm>
+            <a:off x="0" y="1343818"/>
+            <a:ext cx="10515600" cy="4351338"/>
+          </a:xfrm>
+        </p:spPr>
+        <p:txBody>
+          <a:bodyPr/>
+          <a:lstStyle/>
+          <a:p>
+            <a:endParaRPr lang="en-US" dirty="0"/>
+          </a:p>
+        </p:txBody>
+      </p:sp>
+    </p:spTree>
+    <p:extLst>
+      <p:ext uri="{BB962C8B-B14F-4D97-AF65-F5344CB8AC3E}">
+        <p14:creationId xmlns:p14="http://schemas.microsoft.com/office/powerpoint/2010/main" val="296076661"/>
+      </p:ext>
+    </p:extLst>
+  </p:cSld>
+  <p:clrMapOvr>
+    <a:masterClrMapping/>
+  </p:clrMapOvr>
+</p:sld>
+</file>
+
+<file path=ppt/slides/slide9.xml><?xml version="1.0" encoding="utf-8"?>
+<p:sld xmlns:a="http://schemas.openxmlformats.org/drawingml/2006/main" xmlns:r="http://schemas.openxmlformats.org/officeDocument/2006/relationships" xmlns:p="http://schemas.openxmlformats.org/presentationml/2006/main">
+  <p:cSld>
+    <p:spTree>
+      <p:nvGrpSpPr>
+        <p:cNvPr id="1" name=""/>
+        <p:cNvGrpSpPr/>
+        <p:nvPr/>
+      </p:nvGrpSpPr>
+      <p:grpSpPr>
+        <a:xfrm>
+          <a:off x="0" y="0"/>
+          <a:ext cx="0" cy="0"/>
+          <a:chOff x="0" y="0"/>
+          <a:chExt cx="0" cy="0"/>
+        </a:xfrm>
+      </p:grpSpPr>
+      <p:sp>
+        <p:nvSpPr>
+          <p:cNvPr id="2" name="Title 1">
+            <a:extLst>
+              <a:ext uri="{FF2B5EF4-FFF2-40B4-BE49-F238E27FC236}">
+                <a16:creationId xmlns:a16="http://schemas.microsoft.com/office/drawing/2014/main" id="{00888323-12E8-8C4F-8E27-23BD5B7DEE03}"/>
+              </a:ext>
+            </a:extLst>
+          </p:cNvPr>
+          <p:cNvSpPr>
+            <a:spLocks noGrp="1"/>
+          </p:cNvSpPr>
+          <p:nvPr>
+            <p:ph type="title"/>
+          </p:nvPr>
+        </p:nvSpPr>
+        <p:spPr>
+          <a:xfrm>
+            <a:off x="0" y="18255"/>
+            <a:ext cx="10515600" cy="1325563"/>
+          </a:xfrm>
+        </p:spPr>
+        <p:txBody>
+          <a:bodyPr/>
+          <a:lstStyle/>
+          <a:p>
+            <a:r>
+              <a:rPr lang="en-US" dirty="0" err="1"/>
+              <a:t>Debezium</a:t>
+            </a:r>
+            <a:r>
+              <a:rPr lang="en-US" dirty="0"/>
+              <a:t>: </a:t>
+            </a:r>
+            <a:r>
+              <a:rPr lang="ru-RU" dirty="0"/>
+              <a:t>где можно споткнуться</a:t>
+            </a:r>
+            <a:endParaRPr lang="en-US" dirty="0"/>
+          </a:p>
+        </p:txBody>
+      </p:sp>
+    </p:spTree>
+    <p:extLst>
+      <p:ext uri="{BB962C8B-B14F-4D97-AF65-F5344CB8AC3E}">
+        <p14:creationId xmlns:p14="http://schemas.microsoft.com/office/powerpoint/2010/main" val="3464816970"/>
       </p:ext>
     </p:extLst>
   </p:cSld>

</xml_diff>

<commit_message>
feat: update debezium presentation
</commit_message>
<xml_diff>
--- a/smartdata/cdc-via-debezium/debezium-smartdata2025.pptx
+++ b/smartdata/cdc-via-debezium/debezium-smartdata2025.pptx
@@ -11,25 +11,32 @@
     <p:sldId id="262" r:id="rId5"/>
     <p:sldId id="259" r:id="rId6"/>
     <p:sldId id="260" r:id="rId7"/>
-    <p:sldId id="264" r:id="rId8"/>
-    <p:sldId id="263" r:id="rId9"/>
-    <p:sldId id="261" r:id="rId10"/>
-    <p:sldId id="265" r:id="rId11"/>
-    <p:sldId id="266" r:id="rId12"/>
-    <p:sldId id="267" r:id="rId13"/>
-    <p:sldId id="268" r:id="rId14"/>
-    <p:sldId id="271" r:id="rId15"/>
-    <p:sldId id="272" r:id="rId16"/>
-    <p:sldId id="269" r:id="rId17"/>
-    <p:sldId id="270" r:id="rId18"/>
-    <p:sldId id="273" r:id="rId19"/>
-    <p:sldId id="278" r:id="rId20"/>
-    <p:sldId id="274" r:id="rId21"/>
-    <p:sldId id="275" r:id="rId22"/>
-    <p:sldId id="276" r:id="rId23"/>
-    <p:sldId id="277" r:id="rId24"/>
-    <p:sldId id="279" r:id="rId25"/>
-    <p:sldId id="280" r:id="rId26"/>
+    <p:sldId id="281" r:id="rId8"/>
+    <p:sldId id="264" r:id="rId9"/>
+    <p:sldId id="282" r:id="rId10"/>
+    <p:sldId id="283" r:id="rId11"/>
+    <p:sldId id="284" r:id="rId12"/>
+    <p:sldId id="263" r:id="rId13"/>
+    <p:sldId id="285" r:id="rId14"/>
+    <p:sldId id="286" r:id="rId15"/>
+    <p:sldId id="261" r:id="rId16"/>
+    <p:sldId id="265" r:id="rId17"/>
+    <p:sldId id="266" r:id="rId18"/>
+    <p:sldId id="287" r:id="rId19"/>
+    <p:sldId id="267" r:id="rId20"/>
+    <p:sldId id="268" r:id="rId21"/>
+    <p:sldId id="271" r:id="rId22"/>
+    <p:sldId id="272" r:id="rId23"/>
+    <p:sldId id="269" r:id="rId24"/>
+    <p:sldId id="270" r:id="rId25"/>
+    <p:sldId id="273" r:id="rId26"/>
+    <p:sldId id="278" r:id="rId27"/>
+    <p:sldId id="274" r:id="rId28"/>
+    <p:sldId id="275" r:id="rId29"/>
+    <p:sldId id="276" r:id="rId30"/>
+    <p:sldId id="277" r:id="rId31"/>
+    <p:sldId id="279" r:id="rId32"/>
+    <p:sldId id="280" r:id="rId33"/>
   </p:sldIdLst>
   <p:sldSz cx="12192000" cy="6858000"/>
   <p:notesSz cx="6858000" cy="9144000"/>
@@ -283,7 +290,7 @@
           <a:p>
             <a:fld id="{0A80387B-3432-BD42-8238-00F612919BB5}" type="datetimeFigureOut">
               <a:rPr lang="en-US" smtClean="0"/>
-              <a:t>8/18/25</a:t>
+              <a:t>8/19/25</a:t>
             </a:fld>
             <a:endParaRPr lang="en-US"/>
           </a:p>
@@ -481,7 +488,7 @@
           <a:p>
             <a:fld id="{0A80387B-3432-BD42-8238-00F612919BB5}" type="datetimeFigureOut">
               <a:rPr lang="en-US" smtClean="0"/>
-              <a:t>8/18/25</a:t>
+              <a:t>8/19/25</a:t>
             </a:fld>
             <a:endParaRPr lang="en-US"/>
           </a:p>
@@ -689,7 +696,7 @@
           <a:p>
             <a:fld id="{0A80387B-3432-BD42-8238-00F612919BB5}" type="datetimeFigureOut">
               <a:rPr lang="en-US" smtClean="0"/>
-              <a:t>8/18/25</a:t>
+              <a:t>8/19/25</a:t>
             </a:fld>
             <a:endParaRPr lang="en-US"/>
           </a:p>
@@ -887,7 +894,7 @@
           <a:p>
             <a:fld id="{0A80387B-3432-BD42-8238-00F612919BB5}" type="datetimeFigureOut">
               <a:rPr lang="en-US" smtClean="0"/>
-              <a:t>8/18/25</a:t>
+              <a:t>8/19/25</a:t>
             </a:fld>
             <a:endParaRPr lang="en-US"/>
           </a:p>
@@ -1162,7 +1169,7 @@
           <a:p>
             <a:fld id="{0A80387B-3432-BD42-8238-00F612919BB5}" type="datetimeFigureOut">
               <a:rPr lang="en-US" smtClean="0"/>
-              <a:t>8/18/25</a:t>
+              <a:t>8/19/25</a:t>
             </a:fld>
             <a:endParaRPr lang="en-US"/>
           </a:p>
@@ -1427,7 +1434,7 @@
           <a:p>
             <a:fld id="{0A80387B-3432-BD42-8238-00F612919BB5}" type="datetimeFigureOut">
               <a:rPr lang="en-US" smtClean="0"/>
-              <a:t>8/18/25</a:t>
+              <a:t>8/19/25</a:t>
             </a:fld>
             <a:endParaRPr lang="en-US"/>
           </a:p>
@@ -1839,7 +1846,7 @@
           <a:p>
             <a:fld id="{0A80387B-3432-BD42-8238-00F612919BB5}" type="datetimeFigureOut">
               <a:rPr lang="en-US" smtClean="0"/>
-              <a:t>8/18/25</a:t>
+              <a:t>8/19/25</a:t>
             </a:fld>
             <a:endParaRPr lang="en-US"/>
           </a:p>
@@ -1980,7 +1987,7 @@
           <a:p>
             <a:fld id="{0A80387B-3432-BD42-8238-00F612919BB5}" type="datetimeFigureOut">
               <a:rPr lang="en-US" smtClean="0"/>
-              <a:t>8/18/25</a:t>
+              <a:t>8/19/25</a:t>
             </a:fld>
             <a:endParaRPr lang="en-US"/>
           </a:p>
@@ -2093,7 +2100,7 @@
           <a:p>
             <a:fld id="{0A80387B-3432-BD42-8238-00F612919BB5}" type="datetimeFigureOut">
               <a:rPr lang="en-US" smtClean="0"/>
-              <a:t>8/18/25</a:t>
+              <a:t>8/19/25</a:t>
             </a:fld>
             <a:endParaRPr lang="en-US"/>
           </a:p>
@@ -2404,7 +2411,7 @@
           <a:p>
             <a:fld id="{0A80387B-3432-BD42-8238-00F612919BB5}" type="datetimeFigureOut">
               <a:rPr lang="en-US" smtClean="0"/>
-              <a:t>8/18/25</a:t>
+              <a:t>8/19/25</a:t>
             </a:fld>
             <a:endParaRPr lang="en-US"/>
           </a:p>
@@ -2692,7 +2699,7 @@
           <a:p>
             <a:fld id="{0A80387B-3432-BD42-8238-00F612919BB5}" type="datetimeFigureOut">
               <a:rPr lang="en-US" smtClean="0"/>
-              <a:t>8/18/25</a:t>
+              <a:t>8/19/25</a:t>
             </a:fld>
             <a:endParaRPr lang="en-US"/>
           </a:p>
@@ -2933,7 +2940,7 @@
           <a:p>
             <a:fld id="{0A80387B-3432-BD42-8238-00F612919BB5}" type="datetimeFigureOut">
               <a:rPr lang="en-US" smtClean="0"/>
-              <a:t>8/18/25</a:t>
+              <a:t>8/19/25</a:t>
             </a:fld>
             <a:endParaRPr lang="en-US"/>
           </a:p>
@@ -3524,30 +3531,27 @@
           </a:xfrm>
         </p:spPr>
         <p:txBody>
-          <a:bodyPr/>
-          <a:lstStyle/>
-          <a:p>
-            <a:r>
-              <a:rPr lang="en-US" dirty="0" err="1"/>
-              <a:t>Debezium</a:t>
-            </a:r>
-            <a:r>
-              <a:rPr lang="en-US" dirty="0"/>
+          <a:bodyPr>
+            <a:normAutofit/>
+          </a:bodyPr>
+          <a:lstStyle/>
+          <a:p>
+            <a:r>
+              <a:rPr lang="ru-RU" dirty="0"/>
+              <a:t>Известные и не очень способы организации </a:t>
+            </a:r>
+            <a:r>
+              <a:rPr lang="en-US" dirty="0"/>
+              <a:t>CDC</a:t>
+            </a:r>
+            <a:r>
+              <a:rPr lang="ru-RU" dirty="0"/>
               <a:t>: </a:t>
             </a:r>
             <a:r>
-              <a:rPr lang="ru-RU" dirty="0"/>
-              <a:t>«базовый </a:t>
-            </a:r>
-            <a:r>
-              <a:rPr lang="ru-RU" dirty="0" err="1"/>
-              <a:t>сетап</a:t>
-            </a:r>
-            <a:r>
-              <a:rPr lang="ru-RU" dirty="0"/>
-              <a:t>»</a:t>
-            </a:r>
-            <a:endParaRPr lang="en-US" dirty="0"/>
+              <a:rPr lang="en-US" dirty="0"/>
+              <a:t>SELECT</a:t>
+            </a:r>
           </a:p>
         </p:txBody>
       </p:sp>
@@ -3579,58 +3583,29 @@
           <a:p>
             <a:r>
               <a:rPr lang="ru-RU" dirty="0"/>
-              <a:t>Все примеры на основе </a:t>
+              <a:t>Пример реализации</a:t>
+            </a:r>
+          </a:p>
+          <a:p>
+            <a:r>
+              <a:rPr lang="en-US" dirty="0"/>
+              <a:t>Kafka-connect: </a:t>
             </a:r>
             <a:r>
               <a:rPr lang="en-US" dirty="0" err="1"/>
-              <a:t>Debezium</a:t>
-            </a:r>
-            <a:r>
-              <a:rPr lang="en-US" dirty="0"/>
-              <a:t> Engine, </a:t>
-            </a:r>
-            <a:r>
-              <a:rPr lang="ru-RU" dirty="0"/>
-              <a:t>но они также справедливы и для </a:t>
-            </a:r>
-            <a:r>
-              <a:rPr lang="en-US" dirty="0" err="1"/>
-              <a:t>kafka</a:t>
-            </a:r>
-            <a:r>
-              <a:rPr lang="en-US" dirty="0"/>
-              <a:t>-connect </a:t>
-            </a:r>
-            <a:r>
-              <a:rPr lang="ru-RU" dirty="0"/>
-              <a:t>коннектора, </a:t>
-            </a:r>
-            <a:r>
-              <a:rPr lang="en-US" dirty="0" err="1"/>
-              <a:t>Debezium</a:t>
-            </a:r>
-            <a:r>
-              <a:rPr lang="en-US" dirty="0"/>
-              <a:t> Server </a:t>
-            </a:r>
-            <a:r>
-              <a:rPr lang="ru-RU" dirty="0"/>
-              <a:t>и др.</a:t>
-            </a:r>
-          </a:p>
-          <a:p>
-            <a:r>
-              <a:rPr lang="ru-RU" dirty="0"/>
-              <a:t>Начальная конфигурация: 1 таблица</a:t>
-            </a:r>
-            <a:endParaRPr lang="en-US" dirty="0"/>
+              <a:t>jdbc</a:t>
+            </a:r>
+            <a:r>
+              <a:rPr lang="en-US" dirty="0"/>
+              <a:t> connector</a:t>
+            </a:r>
           </a:p>
         </p:txBody>
       </p:sp>
     </p:spTree>
     <p:extLst>
       <p:ext uri="{BB962C8B-B14F-4D97-AF65-F5344CB8AC3E}">
-        <p14:creationId xmlns:p14="http://schemas.microsoft.com/office/powerpoint/2010/main" val="1244290482"/>
+        <p14:creationId xmlns:p14="http://schemas.microsoft.com/office/powerpoint/2010/main" val="1856762012"/>
       </p:ext>
     </p:extLst>
   </p:cSld>
@@ -3680,30 +3655,27 @@
           </a:xfrm>
         </p:spPr>
         <p:txBody>
-          <a:bodyPr/>
-          <a:lstStyle/>
-          <a:p>
-            <a:r>
-              <a:rPr lang="en-US" dirty="0" err="1"/>
-              <a:t>Debezium</a:t>
-            </a:r>
-            <a:r>
-              <a:rPr lang="en-US" dirty="0"/>
+          <a:bodyPr>
+            <a:normAutofit/>
+          </a:bodyPr>
+          <a:lstStyle/>
+          <a:p>
+            <a:r>
+              <a:rPr lang="ru-RU" dirty="0"/>
+              <a:t>Известные и не очень способы организации </a:t>
+            </a:r>
+            <a:r>
+              <a:rPr lang="en-US" dirty="0"/>
+              <a:t>CDC</a:t>
+            </a:r>
+            <a:r>
+              <a:rPr lang="ru-RU" dirty="0"/>
               <a:t>: </a:t>
             </a:r>
             <a:r>
-              <a:rPr lang="ru-RU" dirty="0"/>
-              <a:t>«базовый </a:t>
-            </a:r>
-            <a:r>
-              <a:rPr lang="ru-RU" dirty="0" err="1"/>
-              <a:t>сетап</a:t>
-            </a:r>
-            <a:r>
-              <a:rPr lang="ru-RU" dirty="0"/>
-              <a:t>»</a:t>
-            </a:r>
-            <a:endParaRPr lang="en-US" dirty="0"/>
+              <a:rPr lang="en-US" dirty="0"/>
+              <a:t>SELECT</a:t>
+            </a:r>
           </a:p>
         </p:txBody>
       </p:sp>
@@ -3735,28 +3707,48 @@
           <a:p>
             <a:r>
               <a:rPr lang="ru-RU" dirty="0"/>
-              <a:t>Картинка: БД, приложение с </a:t>
-            </a:r>
-            <a:r>
-              <a:rPr lang="en-US" dirty="0" err="1"/>
-              <a:t>debezium</a:t>
-            </a:r>
-            <a:r>
-              <a:rPr lang="en-US" dirty="0"/>
-              <a:t>, </a:t>
-            </a:r>
-            <a:r>
-              <a:rPr lang="ru-RU" dirty="0" err="1"/>
-              <a:t>таргет</a:t>
-            </a:r>
-            <a:endParaRPr lang="en-US" dirty="0"/>
+              <a:t>Ограничения:</a:t>
+            </a:r>
+          </a:p>
+          <a:p>
+            <a:pPr lvl="1"/>
+            <a:r>
+              <a:rPr lang="ru-RU" dirty="0"/>
+              <a:t>Нет возможности перехватить удаления</a:t>
+            </a:r>
+          </a:p>
+          <a:p>
+            <a:pPr lvl="1"/>
+            <a:r>
+              <a:rPr lang="ru-RU" dirty="0"/>
+              <a:t>Эволюция схемы: запрос нужно поддерживать в актуальном состоянии</a:t>
+            </a:r>
+          </a:p>
+          <a:p>
+            <a:pPr lvl="2"/>
+            <a:r>
+              <a:rPr lang="ru-RU" dirty="0"/>
+              <a:t>Потенциально решается через </a:t>
+            </a:r>
+            <a:r>
+              <a:rPr lang="en-US" dirty="0"/>
+              <a:t>view</a:t>
+            </a:r>
+            <a:endParaRPr lang="ru-RU" dirty="0"/>
+          </a:p>
+          <a:p>
+            <a:pPr lvl="1"/>
+            <a:r>
+              <a:rPr lang="ru-RU" dirty="0"/>
+              <a:t>Не все таблицы обладают необходимыми свойствами для подобного механизма</a:t>
+            </a:r>
           </a:p>
         </p:txBody>
       </p:sp>
     </p:spTree>
     <p:extLst>
       <p:ext uri="{BB962C8B-B14F-4D97-AF65-F5344CB8AC3E}">
-        <p14:creationId xmlns:p14="http://schemas.microsoft.com/office/powerpoint/2010/main" val="3546497611"/>
+        <p14:creationId xmlns:p14="http://schemas.microsoft.com/office/powerpoint/2010/main" val="740198840"/>
       </p:ext>
     </p:extLst>
   </p:cSld>
@@ -3806,22 +3798,27 @@
           </a:xfrm>
         </p:spPr>
         <p:txBody>
-          <a:bodyPr/>
-          <a:lstStyle/>
-          <a:p>
-            <a:r>
-              <a:rPr lang="en-US" dirty="0" err="1"/>
-              <a:t>Debezium</a:t>
-            </a:r>
-            <a:r>
-              <a:rPr lang="en-US" dirty="0"/>
+          <a:bodyPr>
+            <a:normAutofit/>
+          </a:bodyPr>
+          <a:lstStyle/>
+          <a:p>
+            <a:r>
+              <a:rPr lang="ru-RU" dirty="0"/>
+              <a:t>Известные и не очень способы организации </a:t>
+            </a:r>
+            <a:r>
+              <a:rPr lang="en-US" dirty="0"/>
+              <a:t>CDC</a:t>
+            </a:r>
+            <a:r>
+              <a:rPr lang="ru-RU" dirty="0"/>
               <a:t>: </a:t>
             </a:r>
             <a:r>
-              <a:rPr lang="ru-RU" dirty="0" err="1"/>
-              <a:t>снепшоты</a:t>
-            </a:r>
-            <a:endParaRPr lang="en-US" dirty="0"/>
+              <a:rPr lang="en-US" dirty="0"/>
+              <a:t>Triggers / Outbox</a:t>
+            </a:r>
           </a:p>
         </p:txBody>
       </p:sp>
@@ -3843,332 +3840,64 @@
         </p:nvSpPr>
         <p:spPr>
           <a:xfrm>
-            <a:off x="-1" y="1343818"/>
-            <a:ext cx="11835925" cy="5381722"/>
+            <a:off x="0" y="1343818"/>
+            <a:ext cx="10515600" cy="4351338"/>
           </a:xfrm>
         </p:spPr>
         <p:txBody>
-          <a:bodyPr>
-            <a:normAutofit fontScale="77500" lnSpcReduction="20000"/>
-          </a:bodyPr>
-          <a:lstStyle/>
-          <a:p>
-            <a:r>
-              <a:rPr lang="ru-RU" dirty="0"/>
-              <a:t>Задача: перед стартом нужно получить текущее состояние таблицы</a:t>
-            </a:r>
-          </a:p>
-          <a:p>
-            <a:r>
-              <a:rPr lang="ru-RU" dirty="0"/>
-              <a:t>Решение: </a:t>
+          <a:bodyPr/>
+          <a:lstStyle/>
+          <a:p>
+            <a:r>
+              <a:rPr lang="ru-RU" dirty="0"/>
+              <a:t>Подробнее о механизме</a:t>
+            </a:r>
+          </a:p>
+          <a:p>
+            <a:r>
+              <a:rPr lang="ru-RU" dirty="0"/>
+              <a:t>По своей сути представляет собой эволюцию </a:t>
+            </a:r>
+            <a:r>
+              <a:rPr lang="en-US" dirty="0"/>
+              <a:t>SELECT</a:t>
+            </a:r>
+            <a:endParaRPr lang="ru-RU" dirty="0"/>
+          </a:p>
+          <a:p>
+            <a:r>
+              <a:rPr lang="ru-RU" dirty="0"/>
+              <a:t>Позволяет отслеживать в том числе и </a:t>
+            </a:r>
+            <a:r>
+              <a:rPr lang="en-US" dirty="0"/>
+              <a:t>DELETE </a:t>
+            </a:r>
+            <a:r>
+              <a:rPr lang="ru-RU" dirty="0"/>
+              <a:t>операции</a:t>
+            </a:r>
+          </a:p>
+          <a:p>
+            <a:r>
+              <a:rPr lang="ru-RU" dirty="0"/>
+              <a:t>Эволюция схемы более контролируема, так как есть отдельная таблица-«интерфейс» к </a:t>
             </a:r>
             <a:r>
               <a:rPr lang="ru-RU" dirty="0" err="1"/>
-              <a:t>снепшот</a:t>
+              <a:t>эвентам</a:t>
             </a:r>
             <a:endParaRPr lang="ru-RU" dirty="0"/>
           </a:p>
           <a:p>
-            <a:r>
-              <a:rPr lang="ru-RU" dirty="0"/>
-              <a:t>Проблема </a:t>
-            </a:r>
-            <a:r>
-              <a:rPr lang="en-US" dirty="0"/>
-              <a:t>#1</a:t>
-            </a:r>
-            <a:r>
-              <a:rPr lang="ru-RU" dirty="0"/>
-              <a:t>: </a:t>
-            </a:r>
-            <a:r>
-              <a:rPr lang="en-US" dirty="0"/>
-              <a:t>Blocking snapshot =&gt; </a:t>
-            </a:r>
-            <a:r>
-              <a:rPr lang="ru-RU" dirty="0"/>
-              <a:t>долгие транзакции в случае больших таблиц</a:t>
-            </a:r>
-          </a:p>
-          <a:p>
-            <a:pPr lvl="1"/>
-            <a:r>
-              <a:rPr lang="ru-RU" dirty="0"/>
-              <a:t>Решение: </a:t>
-            </a:r>
-            <a:r>
-              <a:rPr lang="en-US" dirty="0"/>
-              <a:t>Incremental snapshot</a:t>
-            </a:r>
-            <a:r>
-              <a:rPr lang="ru-RU" dirty="0"/>
-              <a:t> (но работает только для </a:t>
-            </a:r>
-            <a:r>
-              <a:rPr lang="en-US" dirty="0"/>
-              <a:t>signal=source</a:t>
-            </a:r>
-            <a:r>
-              <a:rPr lang="ru-RU" dirty="0"/>
-              <a:t>)</a:t>
-            </a:r>
-          </a:p>
-          <a:p>
-            <a:r>
-              <a:rPr lang="ru-RU" dirty="0"/>
-              <a:t>Проблема </a:t>
-            </a:r>
-            <a:r>
-              <a:rPr lang="en-US" dirty="0"/>
-              <a:t>#2: Incremental snapshot </a:t>
-            </a:r>
-            <a:r>
-              <a:rPr lang="ru-RU" dirty="0" err="1"/>
-              <a:t>рабоатет</a:t>
-            </a:r>
-            <a:r>
-              <a:rPr lang="ru-RU" dirty="0"/>
-              <a:t> только для таблиц с ПК</a:t>
-            </a:r>
-          </a:p>
-          <a:p>
-            <a:pPr lvl="1"/>
-            <a:r>
-              <a:rPr lang="ru-RU" dirty="0"/>
-              <a:t>Решение: </a:t>
-            </a:r>
-            <a:r>
-              <a:rPr lang="en-US" dirty="0"/>
-              <a:t>surrogate key</a:t>
-            </a:r>
-          </a:p>
-          <a:p>
-            <a:r>
-              <a:rPr lang="ru-RU" dirty="0"/>
-              <a:t>Проблема </a:t>
-            </a:r>
-            <a:r>
-              <a:rPr lang="en-US" dirty="0"/>
-              <a:t>#</a:t>
-            </a:r>
-            <a:r>
-              <a:rPr lang="ru-RU" dirty="0"/>
-              <a:t>3: долгий </a:t>
-            </a:r>
-            <a:r>
-              <a:rPr lang="ru-RU" dirty="0" err="1"/>
-              <a:t>снепшот</a:t>
-            </a:r>
-            <a:endParaRPr lang="ru-RU" dirty="0"/>
-          </a:p>
-          <a:p>
-            <a:pPr lvl="1"/>
-            <a:r>
-              <a:rPr lang="ru-RU" dirty="0"/>
-              <a:t>Решение: своя логика снятия </a:t>
-            </a:r>
-            <a:r>
-              <a:rPr lang="ru-RU" dirty="0" err="1"/>
-              <a:t>снепшота</a:t>
-            </a:r>
-            <a:r>
-              <a:rPr lang="ru-RU" dirty="0"/>
-              <a:t> или готовое решение (</a:t>
-            </a:r>
-            <a:r>
-              <a:rPr lang="en-US" dirty="0"/>
-              <a:t>ex. apache </a:t>
-            </a:r>
-            <a:r>
-              <a:rPr lang="en-US" dirty="0" err="1"/>
-              <a:t>flink</a:t>
-            </a:r>
-            <a:r>
-              <a:rPr lang="en-US" dirty="0"/>
-              <a:t> </a:t>
-            </a:r>
-            <a:r>
-              <a:rPr lang="en-US" dirty="0" err="1"/>
-              <a:t>cdc</a:t>
-            </a:r>
-            <a:r>
-              <a:rPr lang="ru-RU" dirty="0"/>
-              <a:t>)</a:t>
-            </a:r>
-          </a:p>
-          <a:p>
-            <a:r>
-              <a:rPr lang="ru-RU" dirty="0"/>
-              <a:t>Проблема </a:t>
-            </a:r>
-            <a:r>
-              <a:rPr lang="en-US" dirty="0"/>
-              <a:t>#</a:t>
-            </a:r>
-            <a:r>
-              <a:rPr lang="ru-RU" dirty="0"/>
-              <a:t>4</a:t>
-            </a:r>
-            <a:r>
-              <a:rPr lang="en-US" dirty="0"/>
-              <a:t>: </a:t>
-            </a:r>
-            <a:r>
-              <a:rPr lang="ru-RU" dirty="0" err="1"/>
-              <a:t>снепшоты</a:t>
-            </a:r>
-            <a:r>
-              <a:rPr lang="ru-RU" dirty="0"/>
-              <a:t> запускается повторно после рестарта приложения</a:t>
-            </a:r>
-          </a:p>
-          <a:p>
-            <a:pPr lvl="1"/>
-            <a:r>
-              <a:rPr lang="ru-RU" dirty="0"/>
-              <a:t>Решение: изменить настройку </a:t>
-            </a:r>
-            <a:r>
-              <a:rPr lang="en-US" dirty="0" err="1"/>
-              <a:t>snapshot.mode</a:t>
-            </a:r>
-            <a:r>
-              <a:rPr lang="en-US" dirty="0"/>
-              <a:t> </a:t>
-            </a:r>
-            <a:r>
-              <a:rPr lang="ru-RU" dirty="0"/>
-              <a:t>на </a:t>
-            </a:r>
-            <a:r>
-              <a:rPr lang="en-US" dirty="0"/>
-              <a:t>NO_DATA </a:t>
-            </a:r>
-            <a:r>
-              <a:rPr lang="ru-RU" dirty="0"/>
-              <a:t>и управлять </a:t>
-            </a:r>
-            <a:r>
-              <a:rPr lang="ru-RU" dirty="0" err="1"/>
-              <a:t>снепшотом</a:t>
-            </a:r>
-            <a:r>
-              <a:rPr lang="ru-RU" dirty="0"/>
-              <a:t> </a:t>
-            </a:r>
-            <a:r>
-              <a:rPr lang="ru-RU" dirty="0" err="1"/>
-              <a:t>самостоятльно</a:t>
-            </a:r>
-            <a:r>
-              <a:rPr lang="ru-RU" dirty="0"/>
-              <a:t> через сигналы</a:t>
-            </a:r>
-          </a:p>
-          <a:p>
-            <a:r>
-              <a:rPr lang="ru-RU" dirty="0"/>
-              <a:t>Проблема </a:t>
-            </a:r>
-            <a:r>
-              <a:rPr lang="en-US" dirty="0"/>
-              <a:t>#5</a:t>
-            </a:r>
-            <a:r>
-              <a:rPr lang="ru-RU" dirty="0"/>
-              <a:t>: </a:t>
-            </a:r>
-            <a:r>
-              <a:rPr lang="ru-RU" dirty="0" err="1"/>
-              <a:t>снепшоты</a:t>
-            </a:r>
-            <a:r>
-              <a:rPr lang="ru-RU" dirty="0"/>
-              <a:t> через сигналы не запускаются</a:t>
-            </a:r>
-          </a:p>
-          <a:p>
-            <a:pPr lvl="1"/>
-            <a:r>
-              <a:rPr lang="ru-RU" dirty="0"/>
-              <a:t>Решение </a:t>
-            </a:r>
-            <a:r>
-              <a:rPr lang="en-US" dirty="0"/>
-              <a:t>#1</a:t>
-            </a:r>
-            <a:r>
-              <a:rPr lang="ru-RU" dirty="0"/>
-              <a:t>: нужно </a:t>
-            </a:r>
-            <a:r>
-              <a:rPr lang="ru-RU" dirty="0" err="1"/>
-              <a:t>стригеррить</a:t>
-            </a:r>
-            <a:r>
-              <a:rPr lang="ru-RU" dirty="0"/>
-              <a:t> любое изменение в </a:t>
-            </a:r>
-            <a:r>
-              <a:rPr lang="en-US" dirty="0"/>
-              <a:t>WAL</a:t>
-            </a:r>
-            <a:r>
-              <a:rPr lang="ru-RU" dirty="0"/>
-              <a:t> по реплицируемых таблицам</a:t>
-            </a:r>
-          </a:p>
-          <a:p>
-            <a:pPr lvl="1"/>
-            <a:r>
-              <a:rPr lang="ru-RU" dirty="0"/>
-              <a:t>Решение </a:t>
-            </a:r>
-            <a:r>
-              <a:rPr lang="en-US" dirty="0"/>
-              <a:t>#2: heartbeat </a:t>
-            </a:r>
-            <a:r>
-              <a:rPr lang="ru-RU" dirty="0"/>
-              <a:t>таблица</a:t>
-            </a:r>
-          </a:p>
-          <a:p>
-            <a:r>
-              <a:rPr lang="ru-RU" dirty="0"/>
-              <a:t>Проблема </a:t>
-            </a:r>
-            <a:r>
-              <a:rPr lang="en-US" dirty="0"/>
-              <a:t>#6: </a:t>
-            </a:r>
-            <a:r>
-              <a:rPr lang="ru-RU" dirty="0"/>
-              <a:t>владельцы БД категорически против генерации любой дополнительной нагрузки на мастере</a:t>
-            </a:r>
-          </a:p>
-          <a:p>
-            <a:pPr lvl="1"/>
-            <a:r>
-              <a:rPr lang="ru-RU" dirty="0"/>
-              <a:t>Решение: с версии </a:t>
-            </a:r>
-            <a:r>
-              <a:rPr lang="en-US" dirty="0"/>
-              <a:t>pg16 </a:t>
-            </a:r>
-            <a:r>
-              <a:rPr lang="ru-RU" dirty="0"/>
-              <a:t>есть возможность использовать логический слот для репликации и на репликах</a:t>
-            </a:r>
+            <a:endParaRPr lang="en-US" dirty="0"/>
           </a:p>
         </p:txBody>
       </p:sp>
     </p:spTree>
     <p:extLst>
       <p:ext uri="{BB962C8B-B14F-4D97-AF65-F5344CB8AC3E}">
-        <p14:creationId xmlns:p14="http://schemas.microsoft.com/office/powerpoint/2010/main" val="1436139559"/>
+        <p14:creationId xmlns:p14="http://schemas.microsoft.com/office/powerpoint/2010/main" val="296076661"/>
       </p:ext>
     </p:extLst>
   </p:cSld>
@@ -4218,22 +3947,27 @@
           </a:xfrm>
         </p:spPr>
         <p:txBody>
-          <a:bodyPr/>
-          <a:lstStyle/>
-          <a:p>
-            <a:r>
-              <a:rPr lang="en-US" dirty="0" err="1"/>
-              <a:t>Debezium</a:t>
-            </a:r>
-            <a:r>
-              <a:rPr lang="en-US" dirty="0"/>
+          <a:bodyPr>
+            <a:normAutofit/>
+          </a:bodyPr>
+          <a:lstStyle/>
+          <a:p>
+            <a:r>
+              <a:rPr lang="ru-RU" dirty="0"/>
+              <a:t>Известные и не очень способы организации </a:t>
+            </a:r>
+            <a:r>
+              <a:rPr lang="en-US" dirty="0"/>
+              <a:t>CDC</a:t>
+            </a:r>
+            <a:r>
+              <a:rPr lang="ru-RU" dirty="0"/>
               <a:t>: </a:t>
             </a:r>
             <a:r>
-              <a:rPr lang="ru-RU" dirty="0" err="1"/>
-              <a:t>снепшоты</a:t>
-            </a:r>
-            <a:endParaRPr lang="en-US" dirty="0"/>
+              <a:rPr lang="en-US" dirty="0"/>
+              <a:t>Triggers / Outbox</a:t>
+            </a:r>
           </a:p>
         </p:txBody>
       </p:sp>
@@ -4260,44 +3994,90 @@
           </a:xfrm>
         </p:spPr>
         <p:txBody>
-          <a:bodyPr>
-            <a:normAutofit/>
-          </a:bodyPr>
-          <a:lstStyle/>
-          <a:p>
-            <a:r>
-              <a:rPr lang="ru-RU" dirty="0"/>
-              <a:t>Задача: восстановить </a:t>
+          <a:bodyPr/>
+          <a:lstStyle/>
+          <a:p>
+            <a:r>
+              <a:rPr lang="ru-RU" dirty="0"/>
+              <a:t>Пример реализации</a:t>
+            </a:r>
+          </a:p>
+          <a:p>
+            <a:pPr lvl="1"/>
+            <a:r>
+              <a:rPr lang="ru-RU" dirty="0"/>
+              <a:t>Тот же </a:t>
+            </a:r>
+            <a:r>
+              <a:rPr lang="en-US" dirty="0" err="1"/>
+              <a:t>kafka-connecT</a:t>
+            </a:r>
+            <a:r>
+              <a:rPr lang="en-US" dirty="0"/>
+              <a:t>: </a:t>
+            </a:r>
+            <a:r>
+              <a:rPr lang="en-US" dirty="0" err="1"/>
+              <a:t>jdbc</a:t>
+            </a:r>
+            <a:r>
+              <a:rPr lang="en-US" dirty="0"/>
+              <a:t> connector</a:t>
+            </a:r>
+          </a:p>
+          <a:p>
+            <a:pPr lvl="1"/>
+            <a:r>
+              <a:rPr lang="ru-RU" dirty="0"/>
+              <a:t>Своя </a:t>
             </a:r>
             <a:r>
               <a:rPr lang="ru-RU" dirty="0" err="1"/>
-              <a:t>потерянныйсрез</a:t>
-            </a:r>
-            <a:r>
-              <a:rPr lang="ru-RU" dirty="0"/>
-              <a:t> данных за заданные период</a:t>
-            </a:r>
-          </a:p>
-          <a:p>
-            <a:r>
-              <a:rPr lang="ru-RU" dirty="0"/>
-              <a:t>Решение: </a:t>
-            </a:r>
-            <a:r>
-              <a:rPr lang="ru-RU" dirty="0" err="1"/>
-              <a:t>снепшот</a:t>
-            </a:r>
-            <a:r>
-              <a:rPr lang="ru-RU" dirty="0"/>
-              <a:t> с фильтром</a:t>
-            </a:r>
+              <a:t>кастомная</a:t>
+            </a:r>
+            <a:r>
+              <a:rPr lang="ru-RU" dirty="0"/>
+              <a:t> реализация</a:t>
+            </a:r>
+          </a:p>
+          <a:p>
+            <a:pPr lvl="1"/>
+            <a:r>
+              <a:rPr lang="en-US" dirty="0" err="1"/>
+              <a:t>NiFi</a:t>
+            </a:r>
+            <a:r>
+              <a:rPr lang="en-US" dirty="0"/>
+              <a:t> / </a:t>
+            </a:r>
+            <a:r>
+              <a:rPr lang="en-US" dirty="0" err="1"/>
+              <a:t>Airbyte</a:t>
+            </a:r>
+            <a:r>
+              <a:rPr lang="en-US" dirty="0"/>
+              <a:t> / </a:t>
+            </a:r>
+            <a:r>
+              <a:rPr lang="ru-RU" dirty="0"/>
+              <a:t>любой другой </a:t>
+            </a:r>
+            <a:r>
+              <a:rPr lang="en-US" dirty="0"/>
+              <a:t>ETL/ELT </a:t>
+            </a:r>
+            <a:r>
+              <a:rPr lang="ru-RU" dirty="0"/>
+              <a:t>движок с возможностью регулярного запуска</a:t>
+            </a:r>
+            <a:endParaRPr lang="en-US" dirty="0"/>
           </a:p>
         </p:txBody>
       </p:sp>
     </p:spTree>
     <p:extLst>
       <p:ext uri="{BB962C8B-B14F-4D97-AF65-F5344CB8AC3E}">
-        <p14:creationId xmlns:p14="http://schemas.microsoft.com/office/powerpoint/2010/main" val="2994142072"/>
+        <p14:creationId xmlns:p14="http://schemas.microsoft.com/office/powerpoint/2010/main" val="335361329"/>
       </p:ext>
     </p:extLst>
   </p:cSld>
@@ -4347,22 +4127,27 @@
           </a:xfrm>
         </p:spPr>
         <p:txBody>
-          <a:bodyPr/>
-          <a:lstStyle/>
-          <a:p>
-            <a:r>
-              <a:rPr lang="en-US" dirty="0" err="1"/>
-              <a:t>Debezium</a:t>
-            </a:r>
-            <a:r>
-              <a:rPr lang="en-US" dirty="0"/>
+          <a:bodyPr>
+            <a:normAutofit/>
+          </a:bodyPr>
+          <a:lstStyle/>
+          <a:p>
+            <a:r>
+              <a:rPr lang="ru-RU" dirty="0"/>
+              <a:t>Известные и не очень способы организации </a:t>
+            </a:r>
+            <a:r>
+              <a:rPr lang="en-US" dirty="0"/>
+              <a:t>CDC</a:t>
+            </a:r>
+            <a:r>
+              <a:rPr lang="ru-RU" dirty="0"/>
               <a:t>: </a:t>
             </a:r>
             <a:r>
-              <a:rPr lang="ru-RU" dirty="0" err="1"/>
-              <a:t>снепшоты</a:t>
-            </a:r>
-            <a:endParaRPr lang="en-US" dirty="0"/>
+              <a:rPr lang="en-US" dirty="0"/>
+              <a:t>Triggers / Outbox</a:t>
+            </a:r>
           </a:p>
         </p:txBody>
       </p:sp>
@@ -4389,107 +4174,73 @@
           </a:xfrm>
         </p:spPr>
         <p:txBody>
-          <a:bodyPr>
-            <a:normAutofit/>
-          </a:bodyPr>
-          <a:lstStyle/>
-          <a:p>
-            <a:r>
-              <a:rPr lang="ru-RU" dirty="0"/>
-              <a:t>Контекст: запустили ручной </a:t>
+          <a:bodyPr/>
+          <a:lstStyle/>
+          <a:p>
+            <a:r>
+              <a:rPr lang="ru-RU" dirty="0"/>
+              <a:t>Ограничения / недостатки:</a:t>
+            </a:r>
+          </a:p>
+          <a:p>
+            <a:pPr lvl="1"/>
+            <a:r>
+              <a:rPr lang="ru-RU" dirty="0"/>
+              <a:t>Требует доработок на клиентской стороне с </a:t>
             </a:r>
             <a:r>
               <a:rPr lang="ru-RU" dirty="0" err="1"/>
-              <a:t>снепшот</a:t>
-            </a:r>
-            <a:r>
-              <a:rPr lang="ru-RU" dirty="0"/>
-              <a:t> таблицы, но забыли выдать права на чтение пользователю</a:t>
-            </a:r>
-          </a:p>
-          <a:p>
-            <a:r>
-              <a:rPr lang="ru-RU" dirty="0"/>
-              <a:t>Проблема: </a:t>
-            </a:r>
-            <a:r>
-              <a:rPr lang="en-US" dirty="0" err="1"/>
-              <a:t>cdc</a:t>
-            </a:r>
-            <a:r>
-              <a:rPr lang="en-US" dirty="0"/>
-              <a:t>-</a:t>
-            </a:r>
-            <a:r>
-              <a:rPr lang="ru-RU" dirty="0"/>
-              <a:t>приложение не упало, но и ничего не делает</a:t>
+              <a:t>т.з</a:t>
+            </a:r>
+            <a:r>
+              <a:rPr lang="ru-RU" dirty="0"/>
+              <a:t>. набора таблиц</a:t>
+            </a:r>
+          </a:p>
+          <a:p>
+            <a:pPr lvl="2"/>
+            <a:r>
+              <a:rPr lang="ru-RU" dirty="0"/>
+              <a:t>Если используется </a:t>
+            </a:r>
+            <a:r>
+              <a:rPr lang="en-US" dirty="0"/>
+              <a:t>outbox </a:t>
+            </a:r>
+            <a:r>
+              <a:rPr lang="ru-RU" dirty="0"/>
+              <a:t>таблица, то ее необходимо создать и поддерживать в актуальном состоянии</a:t>
+            </a:r>
+          </a:p>
+          <a:p>
+            <a:pPr lvl="2"/>
+            <a:r>
+              <a:rPr lang="ru-RU" dirty="0"/>
+              <a:t>Если триггеры, то их также необходимо создать</a:t>
             </a:r>
           </a:p>
           <a:p>
             <a:pPr lvl="1"/>
             <a:r>
               <a:rPr lang="ru-RU" dirty="0"/>
-              <a:t>Замечено на версии </a:t>
-            </a:r>
-            <a:r>
-              <a:rPr lang="en-US" dirty="0" err="1"/>
-              <a:t>debezium</a:t>
-            </a:r>
-            <a:r>
-              <a:rPr lang="en-US" dirty="0"/>
-              <a:t> </a:t>
-            </a:r>
-            <a:r>
-              <a:rPr lang="ru-RU" dirty="0"/>
-              <a:t>2.7 (проверить на более новых версиях)</a:t>
-            </a:r>
+              <a:t>Триггеры влияют на </a:t>
+            </a:r>
+            <a:r>
+              <a:rPr lang="ru-RU" dirty="0" err="1"/>
+              <a:t>перфоманс</a:t>
+            </a:r>
+            <a:endParaRPr lang="ru-RU" dirty="0"/>
           </a:p>
           <a:p>
             <a:pPr lvl="1"/>
-            <a:r>
-              <a:rPr lang="ru-RU" dirty="0"/>
-              <a:t>В метриках (</a:t>
-            </a:r>
-            <a:r>
-              <a:rPr lang="en-US" dirty="0" err="1"/>
-              <a:t>kafka</a:t>
-            </a:r>
-            <a:r>
-              <a:rPr lang="en-US" dirty="0"/>
-              <a:t>-connect</a:t>
-            </a:r>
-            <a:r>
-              <a:rPr lang="ru-RU" dirty="0"/>
-              <a:t>)</a:t>
-            </a:r>
-            <a:r>
-              <a:rPr lang="en-US" dirty="0"/>
-              <a:t> </a:t>
-            </a:r>
-            <a:r>
-              <a:rPr lang="ru-RU" dirty="0"/>
-              <a:t>приложение живо и работает</a:t>
-            </a:r>
-          </a:p>
-          <a:p>
-            <a:r>
-              <a:rPr lang="ru-RU" dirty="0"/>
-              <a:t>Решение:</a:t>
-            </a:r>
-          </a:p>
-          <a:p>
-            <a:pPr lvl="1"/>
-            <a:r>
-              <a:rPr lang="ru-RU" dirty="0"/>
-              <a:t>Только перезапуск приложения</a:t>
-            </a:r>
+            <a:endParaRPr lang="ru-RU" dirty="0"/>
           </a:p>
         </p:txBody>
       </p:sp>
     </p:spTree>
     <p:extLst>
       <p:ext uri="{BB962C8B-B14F-4D97-AF65-F5344CB8AC3E}">
-        <p14:creationId xmlns:p14="http://schemas.microsoft.com/office/powerpoint/2010/main" val="2518105868"/>
+        <p14:creationId xmlns:p14="http://schemas.microsoft.com/office/powerpoint/2010/main" val="3203871575"/>
       </p:ext>
     </p:extLst>
   </p:cSld>
@@ -4551,120 +4302,17 @@
               <a:t>: </a:t>
             </a:r>
             <a:r>
-              <a:rPr lang="ru-RU" dirty="0" err="1"/>
-              <a:t>снепшоты</a:t>
+              <a:rPr lang="ru-RU" dirty="0"/>
+              <a:t>где можно споткнуться</a:t>
             </a:r>
             <a:endParaRPr lang="en-US" dirty="0"/>
-          </a:p>
-        </p:txBody>
-      </p:sp>
-      <p:sp>
-        <p:nvSpPr>
-          <p:cNvPr id="3" name="Content Placeholder 2">
-            <a:extLst>
-              <a:ext uri="{FF2B5EF4-FFF2-40B4-BE49-F238E27FC236}">
-                <a16:creationId xmlns:a16="http://schemas.microsoft.com/office/drawing/2014/main" id="{DA11F9D3-C291-2245-AEA5-8D09537FB4E5}"/>
-              </a:ext>
-            </a:extLst>
-          </p:cNvPr>
-          <p:cNvSpPr>
-            <a:spLocks noGrp="1"/>
-          </p:cNvSpPr>
-          <p:nvPr>
-            <p:ph idx="1"/>
-          </p:nvPr>
-        </p:nvSpPr>
-        <p:spPr>
-          <a:xfrm>
-            <a:off x="0" y="1343818"/>
-            <a:ext cx="10515600" cy="4351338"/>
-          </a:xfrm>
-        </p:spPr>
-        <p:txBody>
-          <a:bodyPr>
-            <a:normAutofit/>
-          </a:bodyPr>
-          <a:lstStyle/>
-          <a:p>
-            <a:r>
-              <a:rPr lang="ru-RU" dirty="0"/>
-              <a:t>Контекст: отправили сигнал на запуск инкрементального </a:t>
-            </a:r>
-            <a:r>
-              <a:rPr lang="ru-RU" dirty="0" err="1"/>
-              <a:t>снепшота</a:t>
-            </a:r>
-            <a:r>
-              <a:rPr lang="ru-RU" dirty="0"/>
-              <a:t> таблицы, по которой еще не было ни одного </a:t>
-            </a:r>
-            <a:r>
-              <a:rPr lang="ru-RU" dirty="0" err="1"/>
-              <a:t>эвента</a:t>
-            </a:r>
-            <a:endParaRPr lang="ru-RU" dirty="0"/>
-          </a:p>
-          <a:p>
-            <a:r>
-              <a:rPr lang="ru-RU" dirty="0"/>
-              <a:t>Проблема: </a:t>
-            </a:r>
-            <a:r>
-              <a:rPr lang="ru-RU" dirty="0" err="1"/>
-              <a:t>снепшот</a:t>
-            </a:r>
-            <a:r>
-              <a:rPr lang="ru-RU" dirty="0"/>
-              <a:t> падает с ошибкой «ошибка про получение схемы»</a:t>
-            </a:r>
-          </a:p>
-          <a:p>
-            <a:r>
-              <a:rPr lang="ru-RU" dirty="0"/>
-              <a:t>Решения:</a:t>
-            </a:r>
-          </a:p>
-          <a:p>
-            <a:pPr lvl="1"/>
-            <a:r>
-              <a:rPr lang="ru-RU" dirty="0" err="1"/>
-              <a:t>Стригеррить</a:t>
-            </a:r>
-            <a:r>
-              <a:rPr lang="ru-RU" dirty="0"/>
-              <a:t> изменения по целевой таблице</a:t>
-            </a:r>
-          </a:p>
-          <a:p>
-            <a:pPr lvl="1"/>
-            <a:r>
-              <a:rPr lang="ru-RU" dirty="0"/>
-              <a:t>Обновить </a:t>
-            </a:r>
-            <a:r>
-              <a:rPr lang="en-US" dirty="0" err="1"/>
-              <a:t>debezium</a:t>
-            </a:r>
-            <a:r>
-              <a:rPr lang="en-US" dirty="0"/>
-              <a:t> </a:t>
-            </a:r>
-            <a:r>
-              <a:rPr lang="ru-RU" dirty="0"/>
-              <a:t>до версии выше </a:t>
-            </a:r>
-            <a:r>
-              <a:rPr lang="en-US" dirty="0"/>
-              <a:t>3.1.2+</a:t>
-            </a:r>
-            <a:endParaRPr lang="ru-RU" dirty="0"/>
           </a:p>
         </p:txBody>
       </p:sp>
     </p:spTree>
     <p:extLst>
       <p:ext uri="{BB962C8B-B14F-4D97-AF65-F5344CB8AC3E}">
-        <p14:creationId xmlns:p14="http://schemas.microsoft.com/office/powerpoint/2010/main" val="3287761478"/>
+        <p14:creationId xmlns:p14="http://schemas.microsoft.com/office/powerpoint/2010/main" val="3464816970"/>
       </p:ext>
     </p:extLst>
   </p:cSld>
@@ -4727,7 +4375,15 @@
             </a:r>
             <a:r>
               <a:rPr lang="ru-RU" dirty="0"/>
-              <a:t>редко обновляемые таблицы</a:t>
+              <a:t>«базовый </a:t>
+            </a:r>
+            <a:r>
+              <a:rPr lang="ru-RU" dirty="0" err="1"/>
+              <a:t>сетап</a:t>
+            </a:r>
+            <a:r>
+              <a:rPr lang="ru-RU" dirty="0"/>
+              <a:t>»</a:t>
             </a:r>
             <a:endParaRPr lang="en-US" dirty="0"/>
           </a:p>
@@ -4756,81 +4412,63 @@
           </a:xfrm>
         </p:spPr>
         <p:txBody>
-          <a:bodyPr>
-            <a:normAutofit/>
-          </a:bodyPr>
-          <a:lstStyle/>
-          <a:p>
-            <a:r>
-              <a:rPr lang="ru-RU" dirty="0"/>
-              <a:t>Контекст: в БД много таблиц, но реплицируем одну таблицу справочник, которая обновляется крайне редко</a:t>
-            </a:r>
-          </a:p>
-          <a:p>
-            <a:r>
-              <a:rPr lang="ru-RU" dirty="0"/>
-              <a:t>Проблема: Слот всегда отстает, </a:t>
-            </a:r>
-            <a:r>
-              <a:rPr lang="en-US" dirty="0"/>
-              <a:t>WAL </a:t>
-            </a:r>
-            <a:r>
-              <a:rPr lang="ru-RU" dirty="0"/>
-              <a:t>копится до «предела». Есть риск потери данных и переход </a:t>
-            </a:r>
-            <a:r>
-              <a:rPr lang="ru-RU" dirty="0" err="1"/>
-              <a:t>инстанса</a:t>
-            </a:r>
-            <a:r>
-              <a:rPr lang="ru-RU" dirty="0"/>
-              <a:t> в </a:t>
-            </a:r>
-            <a:r>
-              <a:rPr lang="en-US" dirty="0"/>
-              <a:t>RO</a:t>
-            </a:r>
-            <a:endParaRPr lang="ru-RU" dirty="0"/>
-          </a:p>
-          <a:p>
-            <a:r>
-              <a:rPr lang="ru-RU" dirty="0"/>
-              <a:t>Решение:</a:t>
-            </a:r>
-          </a:p>
-          <a:p>
-            <a:pPr lvl="1"/>
-            <a:r>
-              <a:rPr lang="en-US" dirty="0"/>
-              <a:t>Heartbeat </a:t>
-            </a:r>
-            <a:r>
-              <a:rPr lang="ru-RU" dirty="0"/>
-              <a:t>таблица</a:t>
-            </a:r>
-          </a:p>
-          <a:p>
-            <a:pPr lvl="1"/>
-            <a:r>
-              <a:rPr lang="ru-RU" dirty="0"/>
-              <a:t>Установить настройку, ограничивающую размер </a:t>
-            </a:r>
-            <a:r>
-              <a:rPr lang="en-US" dirty="0"/>
-              <a:t>WAL’</a:t>
-            </a:r>
-            <a:r>
-              <a:rPr lang="ru-RU" dirty="0"/>
-              <a:t>а</a:t>
-            </a:r>
+          <a:bodyPr/>
+          <a:lstStyle/>
+          <a:p>
+            <a:r>
+              <a:rPr lang="ru-RU" dirty="0"/>
+              <a:t>Все примеры на основе </a:t>
+            </a:r>
+            <a:r>
+              <a:rPr lang="en-US" dirty="0" err="1"/>
+              <a:t>Debezium</a:t>
+            </a:r>
+            <a:r>
+              <a:rPr lang="en-US" dirty="0"/>
+              <a:t> Engine, </a:t>
+            </a:r>
+            <a:r>
+              <a:rPr lang="ru-RU" dirty="0"/>
+              <a:t>но они также справедливы и для </a:t>
+            </a:r>
+            <a:r>
+              <a:rPr lang="en-US" dirty="0" err="1"/>
+              <a:t>kafka</a:t>
+            </a:r>
+            <a:r>
+              <a:rPr lang="en-US" dirty="0"/>
+              <a:t>-connect </a:t>
+            </a:r>
+            <a:r>
+              <a:rPr lang="ru-RU" dirty="0"/>
+              <a:t>коннектора, </a:t>
+            </a:r>
+            <a:r>
+              <a:rPr lang="en-US" dirty="0" err="1"/>
+              <a:t>Debezium</a:t>
+            </a:r>
+            <a:r>
+              <a:rPr lang="en-US" dirty="0"/>
+              <a:t> Server </a:t>
+            </a:r>
+            <a:r>
+              <a:rPr lang="ru-RU" dirty="0"/>
+              <a:t>и др.</a:t>
+            </a:r>
+          </a:p>
+          <a:p>
+            <a:r>
+              <a:rPr lang="ru-RU" dirty="0"/>
+              <a:t>Начальная конфигурация: 1 таблица</a:t>
+            </a:r>
+            <a:endParaRPr lang="en-US" dirty="0"/>
           </a:p>
         </p:txBody>
       </p:sp>
     </p:spTree>
     <p:extLst>
       <p:ext uri="{BB962C8B-B14F-4D97-AF65-F5344CB8AC3E}">
-        <p14:creationId xmlns:p14="http://schemas.microsoft.com/office/powerpoint/2010/main" val="1965460881"/>
+        <p14:creationId xmlns:p14="http://schemas.microsoft.com/office/powerpoint/2010/main" val="1244290482"/>
       </p:ext>
     </p:extLst>
   </p:cSld>
@@ -4892,12 +4530,16 @@
               <a:t>: </a:t>
             </a:r>
             <a:r>
+              <a:rPr lang="ru-RU" dirty="0"/>
+              <a:t>«базовый </a:t>
+            </a:r>
+            <a:r>
               <a:rPr lang="ru-RU" dirty="0" err="1"/>
-              <a:t>эвенты</a:t>
-            </a:r>
-            <a:r>
-              <a:rPr lang="ru-RU" dirty="0"/>
-              <a:t> с неполным состоянием</a:t>
+              <a:t>сетап</a:t>
+            </a:r>
+            <a:r>
+              <a:rPr lang="ru-RU" dirty="0"/>
+              <a:t>»</a:t>
             </a:r>
             <a:endParaRPr lang="en-US" dirty="0"/>
           </a:p>
@@ -4926,69 +4568,33 @@
           </a:xfrm>
         </p:spPr>
         <p:txBody>
-          <a:bodyPr>
-            <a:normAutofit/>
-          </a:bodyPr>
-          <a:lstStyle/>
-          <a:p>
-            <a:r>
-              <a:rPr lang="ru-RU" dirty="0"/>
-              <a:t>Контекст: реплицируется таблица с </a:t>
-            </a:r>
-            <a:r>
-              <a:rPr lang="en-US" dirty="0"/>
-              <a:t>TOAST </a:t>
-            </a:r>
-            <a:r>
-              <a:rPr lang="ru-RU" dirty="0"/>
-              <a:t>полями</a:t>
-            </a:r>
-          </a:p>
-          <a:p>
-            <a:r>
-              <a:rPr lang="ru-RU" dirty="0"/>
-              <a:t>Проблема: некоторые </a:t>
+          <a:bodyPr/>
+          <a:lstStyle/>
+          <a:p>
+            <a:r>
+              <a:rPr lang="ru-RU" dirty="0"/>
+              <a:t>Картинка: БД, приложение с </a:t>
+            </a:r>
+            <a:r>
+              <a:rPr lang="en-US" dirty="0" err="1"/>
+              <a:t>debezium</a:t>
+            </a:r>
+            <a:r>
+              <a:rPr lang="en-US" dirty="0"/>
+              <a:t>, </a:t>
             </a:r>
             <a:r>
               <a:rPr lang="ru-RU" dirty="0" err="1"/>
-              <a:t>эвенты</a:t>
-            </a:r>
-            <a:r>
-              <a:rPr lang="ru-RU" dirty="0"/>
-              <a:t> приходят только с частью заполненных колонок</a:t>
-            </a:r>
-          </a:p>
-          <a:p>
-            <a:r>
-              <a:rPr lang="ru-RU" dirty="0"/>
-              <a:t>Решения:</a:t>
-            </a:r>
-          </a:p>
-          <a:p>
-            <a:pPr lvl="1"/>
-            <a:r>
-              <a:rPr lang="en-US" dirty="0"/>
-              <a:t>REPLICA IDENTITY FULL</a:t>
-            </a:r>
-          </a:p>
-          <a:p>
-            <a:pPr lvl="1"/>
-            <a:r>
-              <a:rPr lang="ru-RU" dirty="0"/>
-              <a:t>Сделать поля частью </a:t>
-            </a:r>
-            <a:r>
-              <a:rPr lang="en-US" dirty="0"/>
-              <a:t>PK / Unique index</a:t>
-            </a:r>
-            <a:endParaRPr lang="ru-RU" dirty="0"/>
+              <a:t>таргет</a:t>
+            </a:r>
+            <a:endParaRPr lang="en-US" dirty="0"/>
           </a:p>
         </p:txBody>
       </p:sp>
     </p:spTree>
     <p:extLst>
       <p:ext uri="{BB962C8B-B14F-4D97-AF65-F5344CB8AC3E}">
-        <p14:creationId xmlns:p14="http://schemas.microsoft.com/office/powerpoint/2010/main" val="3406737331"/>
+        <p14:creationId xmlns:p14="http://schemas.microsoft.com/office/powerpoint/2010/main" val="3546497611"/>
       </p:ext>
     </p:extLst>
   </p:cSld>
@@ -5050,12 +4656,8 @@
               <a:t>: </a:t>
             </a:r>
             <a:r>
-              <a:rPr lang="ru-RU" dirty="0" err="1"/>
-              <a:t>партиционированные</a:t>
-            </a:r>
-            <a:r>
-              <a:rPr lang="ru-RU" dirty="0"/>
-              <a:t> таблицы</a:t>
+              <a:rPr lang="ru-RU" dirty="0"/>
+              <a:t>изменение списка реплицируемых таблиц</a:t>
             </a:r>
             <a:endParaRPr lang="en-US" dirty="0"/>
           </a:p>
@@ -5091,55 +4693,108 @@
           <a:p>
             <a:r>
               <a:rPr lang="ru-RU" dirty="0"/>
-              <a:t>Задача: нужно реплицировать </a:t>
+              <a:t>Задача: добавить новые таблицы в существующий процесс репликации</a:t>
+            </a:r>
+          </a:p>
+          <a:p>
+            <a:r>
+              <a:rPr lang="ru-RU" dirty="0"/>
+              <a:t>Решение: обновить список таблиц в </a:t>
+            </a:r>
+            <a:r>
+              <a:rPr lang="en-US" dirty="0"/>
+              <a:t>publication</a:t>
+            </a:r>
+            <a:endParaRPr lang="ru-RU" dirty="0"/>
+          </a:p>
+          <a:p>
+            <a:r>
+              <a:rPr lang="ru-RU" dirty="0"/>
+              <a:t>Проблема: как </a:t>
             </a:r>
             <a:r>
               <a:rPr lang="ru-RU" dirty="0" err="1"/>
-              <a:t>партиционированную</a:t>
-            </a:r>
-            <a:r>
-              <a:rPr lang="ru-RU" dirty="0"/>
-              <a:t> таблицу</a:t>
-            </a:r>
-          </a:p>
-          <a:p>
-            <a:r>
-              <a:rPr lang="ru-RU" dirty="0"/>
-              <a:t>Проблема: </a:t>
+              <a:t>стригеррить</a:t>
+            </a:r>
+            <a:r>
+              <a:rPr lang="ru-RU" dirty="0"/>
+              <a:t> </a:t>
             </a:r>
             <a:r>
               <a:rPr lang="ru-RU" dirty="0" err="1"/>
-              <a:t>эвенты</a:t>
-            </a:r>
-            <a:r>
-              <a:rPr lang="ru-RU" dirty="0"/>
-              <a:t> приходят не от корневой таблицы, а от </a:t>
+              <a:t>снепшот</a:t>
+            </a:r>
+            <a:r>
+              <a:rPr lang="ru-RU" dirty="0"/>
+              <a:t>?</a:t>
+            </a:r>
+          </a:p>
+          <a:p>
+            <a:pPr lvl="1"/>
+            <a:r>
+              <a:rPr lang="ru-RU" dirty="0"/>
+              <a:t>Решение: </a:t>
+            </a:r>
+            <a:r>
+              <a:rPr lang="en-US" dirty="0"/>
+              <a:t>ALWAYS</a:t>
+            </a:r>
+          </a:p>
+          <a:p>
+            <a:pPr lvl="2"/>
+            <a:r>
+              <a:rPr lang="ru-RU" dirty="0"/>
+              <a:t>Проблема: при перезапуске всегда стартует </a:t>
             </a:r>
             <a:r>
               <a:rPr lang="ru-RU" dirty="0" err="1"/>
-              <a:t>партиций</a:t>
+              <a:t>снепшот</a:t>
+            </a:r>
+            <a:r>
+              <a:rPr lang="ru-RU" dirty="0"/>
+              <a:t> всех таблиц</a:t>
+            </a:r>
+          </a:p>
+          <a:p>
+            <a:pPr lvl="3"/>
+            <a:r>
+              <a:rPr lang="ru-RU" dirty="0"/>
+              <a:t>Решение: </a:t>
+            </a:r>
+            <a:r>
+              <a:rPr lang="en-US" dirty="0"/>
+              <a:t>INITIAL / NO_DATA</a:t>
             </a:r>
             <a:endParaRPr lang="ru-RU" dirty="0"/>
           </a:p>
           <a:p>
-            <a:r>
-              <a:rPr lang="ru-RU" dirty="0"/>
-              <a:t>Решение:</a:t>
-            </a:r>
-          </a:p>
-          <a:p>
-            <a:pPr lvl="1"/>
-            <a:r>
-              <a:rPr lang="ru-RU" dirty="0"/>
-              <a:t>При создании публикации выставить флаг «</a:t>
-            </a:r>
-            <a:r>
-              <a:rPr lang="en-US" dirty="0" err="1"/>
-              <a:t>publish_via_partition_root</a:t>
-            </a:r>
-            <a:r>
-              <a:rPr lang="ru-RU" dirty="0"/>
-              <a:t>»</a:t>
+            <a:pPr lvl="4"/>
+            <a:r>
+              <a:rPr lang="ru-RU" dirty="0"/>
+              <a:t>Проблема: как теперь </a:t>
+            </a:r>
+            <a:r>
+              <a:rPr lang="ru-RU" dirty="0" err="1"/>
+              <a:t>тригеррить</a:t>
+            </a:r>
+            <a:r>
+              <a:rPr lang="ru-RU" dirty="0"/>
+              <a:t> </a:t>
+            </a:r>
+            <a:r>
+              <a:rPr lang="ru-RU" dirty="0" err="1"/>
+              <a:t>снепшоты</a:t>
+            </a:r>
+            <a:r>
+              <a:rPr lang="ru-RU" dirty="0"/>
+              <a:t>?</a:t>
+            </a:r>
+          </a:p>
+          <a:p>
+            <a:pPr lvl="5"/>
+            <a:r>
+              <a:rPr lang="ru-RU" dirty="0"/>
+              <a:t>Решение: сигналы</a:t>
             </a:r>
             <a:endParaRPr lang="en-US" dirty="0"/>
           </a:p>
@@ -5148,7 +4803,7 @@
     </p:spTree>
     <p:extLst>
       <p:ext uri="{BB962C8B-B14F-4D97-AF65-F5344CB8AC3E}">
-        <p14:creationId xmlns:p14="http://schemas.microsoft.com/office/powerpoint/2010/main" val="1856578306"/>
+        <p14:creationId xmlns:p14="http://schemas.microsoft.com/office/powerpoint/2010/main" val="587615054"/>
       </p:ext>
     </p:extLst>
   </p:cSld>
@@ -5210,8 +4865,8 @@
               <a:t>: </a:t>
             </a:r>
             <a:r>
-              <a:rPr lang="en-US" dirty="0" err="1"/>
-              <a:t>hypertable</a:t>
+              <a:rPr lang="ru-RU" dirty="0" err="1"/>
+              <a:t>снепшоты</a:t>
             </a:r>
             <a:endParaRPr lang="en-US" dirty="0"/>
           </a:p>
@@ -5235,37 +4890,159 @@
         </p:nvSpPr>
         <p:spPr>
           <a:xfrm>
-            <a:off x="0" y="1343818"/>
-            <a:ext cx="10515600" cy="4351338"/>
+            <a:off x="-1" y="1343818"/>
+            <a:ext cx="11835925" cy="5381722"/>
           </a:xfrm>
         </p:spPr>
         <p:txBody>
           <a:bodyPr>
-            <a:normAutofit/>
+            <a:normAutofit fontScale="77500" lnSpcReduction="20000"/>
           </a:bodyPr>
           <a:lstStyle/>
           <a:p>
             <a:r>
               <a:rPr lang="ru-RU" dirty="0"/>
-              <a:t>Задача: нужно реплицировать </a:t>
+              <a:t>Задача: перед стартом нужно получить текущее состояние таблицы</a:t>
+            </a:r>
+          </a:p>
+          <a:p>
+            <a:r>
+              <a:rPr lang="ru-RU" dirty="0"/>
+              <a:t>Решение: </a:t>
+            </a:r>
+            <a:r>
+              <a:rPr lang="ru-RU" dirty="0" err="1"/>
+              <a:t>снепшот</a:t>
+            </a:r>
+            <a:endParaRPr lang="ru-RU" dirty="0"/>
+          </a:p>
+          <a:p>
+            <a:r>
+              <a:rPr lang="ru-RU" dirty="0"/>
+              <a:t>Проблема </a:t>
+            </a:r>
+            <a:r>
+              <a:rPr lang="en-US" dirty="0"/>
+              <a:t>#1</a:t>
+            </a:r>
+            <a:r>
+              <a:rPr lang="ru-RU" dirty="0"/>
+              <a:t>: </a:t>
+            </a:r>
+            <a:r>
+              <a:rPr lang="en-US" dirty="0"/>
+              <a:t>Blocking snapshot =&gt; </a:t>
+            </a:r>
+            <a:r>
+              <a:rPr lang="ru-RU" dirty="0"/>
+              <a:t>долгие транзакции в случае больших таблиц</a:t>
+            </a:r>
+          </a:p>
+          <a:p>
+            <a:pPr lvl="1"/>
+            <a:r>
+              <a:rPr lang="ru-RU" dirty="0"/>
+              <a:t>Решение: </a:t>
+            </a:r>
+            <a:r>
+              <a:rPr lang="en-US" dirty="0"/>
+              <a:t>Incremental snapshot</a:t>
+            </a:r>
+            <a:r>
+              <a:rPr lang="ru-RU" dirty="0"/>
+              <a:t> (но работает только для </a:t>
+            </a:r>
+            <a:r>
+              <a:rPr lang="en-US" dirty="0"/>
+              <a:t>signal=source</a:t>
+            </a:r>
+            <a:r>
+              <a:rPr lang="ru-RU" dirty="0"/>
+              <a:t>)</a:t>
+            </a:r>
+          </a:p>
+          <a:p>
+            <a:r>
+              <a:rPr lang="ru-RU" dirty="0"/>
+              <a:t>Проблема </a:t>
+            </a:r>
+            <a:r>
+              <a:rPr lang="en-US" dirty="0"/>
+              <a:t>#2: Incremental snapshot </a:t>
+            </a:r>
+            <a:r>
+              <a:rPr lang="ru-RU" dirty="0" err="1"/>
+              <a:t>рабоатет</a:t>
+            </a:r>
+            <a:r>
+              <a:rPr lang="ru-RU" dirty="0"/>
+              <a:t> только для таблиц с ПК</a:t>
+            </a:r>
+          </a:p>
+          <a:p>
+            <a:pPr lvl="1"/>
+            <a:r>
+              <a:rPr lang="ru-RU" dirty="0"/>
+              <a:t>Решение: </a:t>
+            </a:r>
+            <a:r>
+              <a:rPr lang="en-US" dirty="0"/>
+              <a:t>surrogate key</a:t>
+            </a:r>
+          </a:p>
+          <a:p>
+            <a:r>
+              <a:rPr lang="ru-RU" dirty="0"/>
+              <a:t>Проблема </a:t>
+            </a:r>
+            <a:r>
+              <a:rPr lang="en-US" dirty="0"/>
+              <a:t>#</a:t>
+            </a:r>
+            <a:r>
+              <a:rPr lang="ru-RU" dirty="0"/>
+              <a:t>3: долгий </a:t>
+            </a:r>
+            <a:r>
+              <a:rPr lang="ru-RU" dirty="0" err="1"/>
+              <a:t>снепшот</a:t>
+            </a:r>
+            <a:endParaRPr lang="ru-RU" dirty="0"/>
+          </a:p>
+          <a:p>
+            <a:pPr lvl="1"/>
+            <a:r>
+              <a:rPr lang="ru-RU" dirty="0"/>
+              <a:t>Решение: своя логика снятия </a:t>
+            </a:r>
+            <a:r>
+              <a:rPr lang="ru-RU" dirty="0" err="1"/>
+              <a:t>снепшота</a:t>
+            </a:r>
+            <a:r>
+              <a:rPr lang="ru-RU" dirty="0"/>
+              <a:t> или готовое решение (</a:t>
+            </a:r>
+            <a:r>
+              <a:rPr lang="en-US" dirty="0"/>
+              <a:t>ex. apache </a:t>
             </a:r>
             <a:r>
               <a:rPr lang="en-US" dirty="0" err="1"/>
-              <a:t>hypertable</a:t>
-            </a:r>
-            <a:r>
-              <a:rPr lang="en-US" dirty="0"/>
-              <a:t> (</a:t>
+              <a:t>flink</a:t>
+            </a:r>
+            <a:r>
+              <a:rPr lang="en-US" dirty="0"/>
+              <a:t> </a:t>
             </a:r>
             <a:r>
               <a:rPr lang="en-US" dirty="0" err="1"/>
-              <a:t>timescaldb</a:t>
-            </a:r>
-            <a:r>
-              <a:rPr lang="en-US" dirty="0"/>
+              <a:t>cdc</a:t>
+            </a:r>
+            <a:r>
+              <a:rPr lang="ru-RU" dirty="0"/>
               <a:t>)</a:t>
             </a:r>
-            <a:endParaRPr lang="ru-RU" dirty="0"/>
           </a:p>
           <a:p>
             <a:r>
@@ -5274,66 +5051,171 @@
             </a:r>
             <a:r>
               <a:rPr lang="en-US" dirty="0"/>
+              <a:t>#</a:t>
+            </a:r>
+            <a:r>
+              <a:rPr lang="ru-RU" dirty="0"/>
+              <a:t>4</a:t>
+            </a:r>
+            <a:r>
+              <a:rPr lang="en-US" dirty="0"/>
+              <a:t>: </a:t>
+            </a:r>
+            <a:r>
+              <a:rPr lang="ru-RU" dirty="0" err="1"/>
+              <a:t>снепшоты</a:t>
+            </a:r>
+            <a:r>
+              <a:rPr lang="ru-RU" dirty="0"/>
+              <a:t> запускается повторно после рестарта приложения</a:t>
+            </a:r>
+          </a:p>
+          <a:p>
+            <a:pPr lvl="1"/>
+            <a:r>
+              <a:rPr lang="ru-RU" dirty="0"/>
+              <a:t>Решение: изменить настройку </a:t>
+            </a:r>
+            <a:r>
+              <a:rPr lang="en-US" dirty="0" err="1"/>
+              <a:t>snapshot.mode</a:t>
+            </a:r>
+            <a:r>
+              <a:rPr lang="en-US" dirty="0"/>
+              <a:t> </a:t>
+            </a:r>
+            <a:r>
+              <a:rPr lang="ru-RU" dirty="0"/>
+              <a:t>на </a:t>
+            </a:r>
+            <a:r>
+              <a:rPr lang="en-US" dirty="0"/>
+              <a:t>NO_DATA </a:t>
+            </a:r>
+            <a:r>
+              <a:rPr lang="ru-RU" dirty="0"/>
+              <a:t>и управлять </a:t>
+            </a:r>
+            <a:r>
+              <a:rPr lang="ru-RU" dirty="0" err="1"/>
+              <a:t>снепшотом</a:t>
+            </a:r>
+            <a:r>
+              <a:rPr lang="ru-RU" dirty="0"/>
+              <a:t> </a:t>
+            </a:r>
+            <a:r>
+              <a:rPr lang="ru-RU" dirty="0" err="1"/>
+              <a:t>самостоятльно</a:t>
+            </a:r>
+            <a:r>
+              <a:rPr lang="ru-RU" dirty="0"/>
+              <a:t> через сигналы</a:t>
+            </a:r>
+          </a:p>
+          <a:p>
+            <a:r>
+              <a:rPr lang="ru-RU" dirty="0"/>
+              <a:t>Проблема </a:t>
+            </a:r>
+            <a:r>
+              <a:rPr lang="en-US" dirty="0"/>
+              <a:t>#5</a:t>
+            </a:r>
+            <a:r>
+              <a:rPr lang="ru-RU" dirty="0"/>
+              <a:t>: </a:t>
+            </a:r>
+            <a:r>
+              <a:rPr lang="ru-RU" dirty="0" err="1"/>
+              <a:t>снепшоты</a:t>
+            </a:r>
+            <a:r>
+              <a:rPr lang="ru-RU" dirty="0"/>
+              <a:t> через сигналы не запускаются</a:t>
+            </a:r>
+          </a:p>
+          <a:p>
+            <a:pPr lvl="1"/>
+            <a:r>
+              <a:rPr lang="ru-RU" dirty="0"/>
+              <a:t>Решение </a:t>
+            </a:r>
+            <a:r>
+              <a:rPr lang="en-US" dirty="0"/>
               <a:t>#1</a:t>
             </a:r>
             <a:r>
               <a:rPr lang="ru-RU" dirty="0"/>
-              <a:t>: </a:t>
+              <a:t>: нужно </a:t>
             </a:r>
             <a:r>
               <a:rPr lang="ru-RU" dirty="0" err="1"/>
-              <a:t>эвенты</a:t>
-            </a:r>
-            <a:r>
-              <a:rPr lang="ru-RU" dirty="0"/>
-              <a:t> не приходят</a:t>
-            </a:r>
-          </a:p>
-          <a:p>
-            <a:r>
-              <a:rPr lang="ru-RU" dirty="0"/>
-              <a:t>Решение:</a:t>
+              <a:t>стригеррить</a:t>
+            </a:r>
+            <a:r>
+              <a:rPr lang="ru-RU" dirty="0"/>
+              <a:t> любое изменение в </a:t>
+            </a:r>
+            <a:r>
+              <a:rPr lang="en-US" dirty="0"/>
+              <a:t>WAL</a:t>
+            </a:r>
+            <a:r>
+              <a:rPr lang="ru-RU" dirty="0"/>
+              <a:t> по реплицируемых таблицам</a:t>
             </a:r>
           </a:p>
           <a:p>
             <a:pPr lvl="1"/>
             <a:r>
               <a:rPr lang="ru-RU" dirty="0"/>
-              <a:t>«Правильная настройка» (пример)</a:t>
-            </a:r>
-          </a:p>
-          <a:p>
-            <a:r>
-              <a:rPr lang="en-US" dirty="0"/>
-              <a:t> </a:t>
-            </a:r>
+              <a:t>Решение </a:t>
+            </a:r>
+            <a:r>
+              <a:rPr lang="en-US" dirty="0"/>
+              <a:t>#2: heartbeat </a:t>
+            </a:r>
+            <a:r>
+              <a:rPr lang="ru-RU" dirty="0"/>
+              <a:t>таблица</a:t>
+            </a:r>
+          </a:p>
+          <a:p>
             <a:r>
               <a:rPr lang="ru-RU" dirty="0"/>
               <a:t>Проблема </a:t>
             </a:r>
             <a:r>
               <a:rPr lang="en-US" dirty="0"/>
-              <a:t>#2: </a:t>
-            </a:r>
-            <a:r>
-              <a:rPr lang="ru-RU" dirty="0"/>
-              <a:t>процесс падает из-за системной таблицы</a:t>
+              <a:t>#6: </a:t>
+            </a:r>
+            <a:r>
+              <a:rPr lang="ru-RU" dirty="0"/>
+              <a:t>владельцы БД категорически против генерации любой дополнительной нагрузки на мастере</a:t>
             </a:r>
           </a:p>
           <a:p>
             <a:pPr lvl="1"/>
             <a:r>
               <a:rPr lang="ru-RU" dirty="0"/>
-              <a:t>Решение: явное исключение таблиц из репликации</a:t>
-            </a:r>
-            <a:endParaRPr lang="en-US" dirty="0"/>
+              <a:t>Решение: с версии </a:t>
+            </a:r>
+            <a:r>
+              <a:rPr lang="en-US" dirty="0"/>
+              <a:t>pg16 </a:t>
+            </a:r>
+            <a:r>
+              <a:rPr lang="ru-RU" dirty="0"/>
+              <a:t>есть возможность использовать логический слот для репликации и на репликах</a:t>
+            </a:r>
           </a:p>
         </p:txBody>
       </p:sp>
     </p:spTree>
     <p:extLst>
       <p:ext uri="{BB962C8B-B14F-4D97-AF65-F5344CB8AC3E}">
-        <p14:creationId xmlns:p14="http://schemas.microsoft.com/office/powerpoint/2010/main" val="1513835637"/>
+        <p14:creationId xmlns:p14="http://schemas.microsoft.com/office/powerpoint/2010/main" val="1436139559"/>
       </p:ext>
     </p:extLst>
   </p:cSld>
@@ -5537,8 +5419,8 @@
               <a:t>: </a:t>
             </a:r>
             <a:r>
-              <a:rPr lang="ru-RU" dirty="0"/>
-              <a:t>эволюция схем</a:t>
+              <a:rPr lang="ru-RU" dirty="0" err="1"/>
+              <a:t>снепшоты</a:t>
             </a:r>
             <a:endParaRPr lang="en-US" dirty="0"/>
           </a:p>
@@ -5574,98 +5456,21 @@
           <a:p>
             <a:r>
               <a:rPr lang="ru-RU" dirty="0"/>
-              <a:t>Контекст: </a:t>
-            </a:r>
-            <a:r>
-              <a:rPr lang="en-US" dirty="0" err="1"/>
-              <a:t>debezium</a:t>
-            </a:r>
-            <a:r>
-              <a:rPr lang="en-US" dirty="0"/>
-              <a:t> </a:t>
-            </a:r>
-            <a:r>
-              <a:rPr lang="ru-RU" dirty="0"/>
-              <a:t>использует </a:t>
-            </a:r>
-            <a:r>
-              <a:rPr lang="en-US" dirty="0" err="1"/>
-              <a:t>avro</a:t>
-            </a:r>
-            <a:r>
-              <a:rPr lang="en-US" dirty="0"/>
-              <a:t>-</a:t>
-            </a:r>
-            <a:r>
-              <a:rPr lang="ru-RU" dirty="0"/>
-              <a:t>формат. Владелец БД изменил схему реплицируемой таблицы</a:t>
-            </a:r>
-          </a:p>
-          <a:p>
-            <a:r>
-              <a:rPr lang="ru-RU" dirty="0"/>
-              <a:t>Проблема: после изменения схемы </a:t>
-            </a:r>
-            <a:r>
-              <a:rPr lang="en-US" dirty="0" err="1"/>
-              <a:t>debezium</a:t>
-            </a:r>
-            <a:r>
-              <a:rPr lang="en-US" dirty="0"/>
-              <a:t> </a:t>
-            </a:r>
-            <a:r>
-              <a:rPr lang="ru-RU" dirty="0"/>
-              <a:t>падает</a:t>
-            </a:r>
-          </a:p>
-          <a:p>
-            <a:r>
-              <a:rPr lang="ru-RU" dirty="0"/>
-              <a:t>Причина: несовместимое изменение схемы</a:t>
-            </a:r>
-          </a:p>
-          <a:p>
-            <a:r>
-              <a:rPr lang="ru-RU" dirty="0"/>
-              <a:t>Решения:</a:t>
-            </a:r>
-          </a:p>
-          <a:p>
-            <a:pPr lvl="1"/>
-            <a:r>
-              <a:rPr lang="ru-RU" dirty="0"/>
-              <a:t>Указать </a:t>
-            </a:r>
-            <a:r>
-              <a:rPr lang="en-US" dirty="0" err="1"/>
-              <a:t>compatibility.mode</a:t>
-            </a:r>
-            <a:r>
-              <a:rPr lang="en-US" dirty="0"/>
-              <a:t>=NONE</a:t>
-            </a:r>
-          </a:p>
-          <a:p>
-            <a:pPr lvl="1"/>
-            <a:r>
-              <a:rPr lang="ru-RU" dirty="0"/>
-              <a:t>Глобально запретить выполнять несовместимые изменения </a:t>
-            </a:r>
-          </a:p>
-          <a:p>
-            <a:pPr lvl="1"/>
-            <a:r>
-              <a:rPr lang="ru-RU" dirty="0"/>
-              <a:t>Контролировать </a:t>
+              <a:t>Задача: восстановить потерянный срез данных за заданный период</a:t>
+            </a:r>
+          </a:p>
+          <a:p>
+            <a:r>
+              <a:rPr lang="ru-RU" dirty="0"/>
+              <a:t>Решение: </a:t>
             </a:r>
             <a:r>
               <a:rPr lang="ru-RU" dirty="0" err="1"/>
-              <a:t>валидацию</a:t>
-            </a:r>
-            <a:r>
-              <a:rPr lang="ru-RU" dirty="0"/>
-              <a:t> эволюции схемы самостоятельно</a:t>
+              <a:t>снепшот</a:t>
+            </a:r>
+            <a:r>
+              <a:rPr lang="ru-RU" dirty="0"/>
+              <a:t> с фильтром</a:t>
             </a:r>
           </a:p>
         </p:txBody>
@@ -5673,7 +5478,7 @@
     </p:spTree>
     <p:extLst>
       <p:ext uri="{BB962C8B-B14F-4D97-AF65-F5344CB8AC3E}">
-        <p14:creationId xmlns:p14="http://schemas.microsoft.com/office/powerpoint/2010/main" val="3793313203"/>
+        <p14:creationId xmlns:p14="http://schemas.microsoft.com/office/powerpoint/2010/main" val="2994142072"/>
       </p:ext>
     </p:extLst>
   </p:cSld>
@@ -5735,8 +5540,8 @@
               <a:t>: </a:t>
             </a:r>
             <a:r>
-              <a:rPr lang="ru-RU" dirty="0"/>
-              <a:t>упавший мастер</a:t>
+              <a:rPr lang="ru-RU" dirty="0" err="1"/>
+              <a:t>снепшоты</a:t>
             </a:r>
             <a:endParaRPr lang="en-US" dirty="0"/>
           </a:p>
@@ -5772,15 +5577,40 @@
           <a:p>
             <a:r>
               <a:rPr lang="ru-RU" dirty="0"/>
-              <a:t>Проблема: мастер в кластере</a:t>
-            </a:r>
-            <a:r>
-              <a:rPr lang="en-US" dirty="0"/>
-              <a:t> PG </a:t>
-            </a:r>
-            <a:r>
-              <a:rPr lang="ru-RU" dirty="0"/>
-              <a:t>переехал, </a:t>
+              <a:t>Контекст: запустили ручной </a:t>
+            </a:r>
+            <a:r>
+              <a:rPr lang="ru-RU" dirty="0" err="1"/>
+              <a:t>снепшот</a:t>
+            </a:r>
+            <a:r>
+              <a:rPr lang="ru-RU" dirty="0"/>
+              <a:t> таблицы, но забыли выдать права на чтение пользователю</a:t>
+            </a:r>
+          </a:p>
+          <a:p>
+            <a:r>
+              <a:rPr lang="ru-RU" dirty="0"/>
+              <a:t>Проблема: </a:t>
+            </a:r>
+            <a:r>
+              <a:rPr lang="en-US" dirty="0" err="1"/>
+              <a:t>cdc</a:t>
+            </a:r>
+            <a:r>
+              <a:rPr lang="en-US" dirty="0"/>
+              <a:t>-</a:t>
+            </a:r>
+            <a:r>
+              <a:rPr lang="ru-RU" dirty="0"/>
+              <a:t>приложение не упало, но и ничего не делает</a:t>
+            </a:r>
+          </a:p>
+          <a:p>
+            <a:pPr lvl="1"/>
+            <a:r>
+              <a:rPr lang="ru-RU" dirty="0"/>
+              <a:t>Замечено на версии </a:t>
             </a:r>
             <a:r>
               <a:rPr lang="en-US" dirty="0" err="1"/>
@@ -5792,56 +5622,55 @@
             </a:r>
             <a:r>
               <a:rPr lang="ru-RU" dirty="0"/>
-              <a:t>упал</a:t>
-            </a:r>
-          </a:p>
-          <a:p>
-            <a:r>
-              <a:rPr lang="ru-RU" dirty="0"/>
-              <a:t>Решения:</a:t>
+              <a:t>2.7 (проверить на более новых версиях)</a:t>
             </a:r>
           </a:p>
           <a:p>
             <a:pPr lvl="1"/>
             <a:r>
               <a:rPr lang="ru-RU" dirty="0"/>
-              <a:t>Обновить настройки подключения, указав ссылку на новый мастер</a:t>
+              <a:t>В метриках (</a:t>
+            </a:r>
+            <a:r>
+              <a:rPr lang="en-US" dirty="0" err="1"/>
+              <a:t>kafka</a:t>
+            </a:r>
+            <a:r>
+              <a:rPr lang="en-US" dirty="0"/>
+              <a:t>-connect</a:t>
+            </a:r>
+            <a:r>
+              <a:rPr lang="ru-RU" dirty="0"/>
+              <a:t>)</a:t>
+            </a:r>
+            <a:r>
+              <a:rPr lang="en-US" dirty="0"/>
+              <a:t> </a:t>
+            </a:r>
+            <a:r>
+              <a:rPr lang="ru-RU" dirty="0"/>
+              <a:t>приложение живо и работает</a:t>
+            </a:r>
+          </a:p>
+          <a:p>
+            <a:r>
+              <a:rPr lang="ru-RU" dirty="0"/>
+              <a:t>Решение:</a:t>
             </a:r>
           </a:p>
           <a:p>
             <a:pPr lvl="1"/>
             <a:r>
               <a:rPr lang="ru-RU" dirty="0"/>
-              <a:t>Если </a:t>
-            </a:r>
-            <a:r>
-              <a:rPr lang="en-US" dirty="0"/>
-              <a:t>DNS </a:t>
-            </a:r>
-            <a:r>
-              <a:rPr lang="ru-RU" dirty="0"/>
-              <a:t>имя мастера не изменилось, то достаточно </a:t>
-            </a:r>
-            <a:r>
-              <a:rPr lang="ru-RU" dirty="0" err="1"/>
-              <a:t>ретраев</a:t>
-            </a:r>
-            <a:r>
-              <a:rPr lang="ru-RU" dirty="0"/>
-              <a:t> на стороне </a:t>
-            </a:r>
-            <a:r>
-              <a:rPr lang="en-US" dirty="0" err="1"/>
-              <a:t>debezium</a:t>
-            </a:r>
-            <a:endParaRPr lang="ru-RU" dirty="0"/>
+              <a:t>Только перезапуск приложения</a:t>
+            </a:r>
           </a:p>
         </p:txBody>
       </p:sp>
     </p:spTree>
     <p:extLst>
       <p:ext uri="{BB962C8B-B14F-4D97-AF65-F5344CB8AC3E}">
-        <p14:creationId xmlns:p14="http://schemas.microsoft.com/office/powerpoint/2010/main" val="2646893299"/>
+        <p14:creationId xmlns:p14="http://schemas.microsoft.com/office/powerpoint/2010/main" val="2518105868"/>
       </p:ext>
     </p:extLst>
   </p:cSld>
@@ -5903,20 +5732,8 @@
               <a:t>: </a:t>
             </a:r>
             <a:r>
-              <a:rPr lang="en-US" dirty="0" err="1"/>
-              <a:t>cdc</a:t>
-            </a:r>
-            <a:r>
-              <a:rPr lang="en-US" dirty="0"/>
-              <a:t> </a:t>
-            </a:r>
-            <a:r>
-              <a:rPr lang="ru-RU" dirty="0"/>
-              <a:t>для </a:t>
-            </a:r>
-            <a:r>
               <a:rPr lang="ru-RU" dirty="0" err="1"/>
-              <a:t>шардов</a:t>
+              <a:t>снепшоты</a:t>
             </a:r>
             <a:endParaRPr lang="en-US" dirty="0"/>
           </a:p>
@@ -5952,11 +5769,19 @@
           <a:p>
             <a:r>
               <a:rPr lang="ru-RU" dirty="0"/>
-              <a:t>Контекст: нужно перехватывать изменения по заданному набору таблиц в разных </a:t>
+              <a:t>Контекст: отправили сигнал на запуск инкрементального </a:t>
             </a:r>
             <a:r>
               <a:rPr lang="ru-RU" dirty="0" err="1"/>
-              <a:t>шардах</a:t>
+              <a:t>снепшота</a:t>
+            </a:r>
+            <a:r>
+              <a:rPr lang="ru-RU" dirty="0"/>
+              <a:t> таблицы, по которой еще не было ни одного </a:t>
+            </a:r>
+            <a:r>
+              <a:rPr lang="ru-RU" dirty="0" err="1"/>
+              <a:t>эвента</a:t>
             </a:r>
             <a:endParaRPr lang="ru-RU" dirty="0"/>
           </a:p>
@@ -5967,40 +5792,60 @@
             </a:r>
             <a:r>
               <a:rPr lang="ru-RU" dirty="0" err="1"/>
-              <a:t>эвенты</a:t>
-            </a:r>
-            <a:r>
-              <a:rPr lang="ru-RU" dirty="0"/>
-              <a:t> по одинаковым таблицам сохраняются в разные топики</a:t>
-            </a:r>
-          </a:p>
-          <a:p>
-            <a:r>
-              <a:rPr lang="ru-RU" dirty="0"/>
-              <a:t>Решение:</a:t>
+              <a:t>снепшот</a:t>
+            </a:r>
+            <a:r>
+              <a:rPr lang="ru-RU" dirty="0"/>
+              <a:t> падает с ошибкой «ошибка про получение схемы»</a:t>
+            </a:r>
+          </a:p>
+          <a:p>
+            <a:r>
+              <a:rPr lang="ru-RU" dirty="0"/>
+              <a:t>Решения:</a:t>
             </a:r>
           </a:p>
           <a:p>
             <a:pPr lvl="1"/>
             <a:r>
-              <a:rPr lang="ru-RU" dirty="0"/>
-              <a:t>Настройка </a:t>
-            </a:r>
-            <a:r>
               <a:rPr lang="ru-RU" dirty="0" err="1"/>
-              <a:t>роутинга</a:t>
-            </a:r>
-            <a:r>
-              <a:rPr lang="ru-RU" dirty="0"/>
-              <a:t> таблиц</a:t>
-            </a:r>
+              <a:t>Стригеррить</a:t>
+            </a:r>
+            <a:r>
+              <a:rPr lang="ru-RU" dirty="0"/>
+              <a:t> изменения по целевой таблице</a:t>
+            </a:r>
+          </a:p>
+          <a:p>
+            <a:pPr lvl="1"/>
+            <a:r>
+              <a:rPr lang="ru-RU" dirty="0"/>
+              <a:t>Обновить </a:t>
+            </a:r>
+            <a:r>
+              <a:rPr lang="en-US" dirty="0" err="1"/>
+              <a:t>debezium</a:t>
+            </a:r>
+            <a:r>
+              <a:rPr lang="en-US" dirty="0"/>
+              <a:t> </a:t>
+            </a:r>
+            <a:r>
+              <a:rPr lang="ru-RU" dirty="0"/>
+              <a:t>до версии выше </a:t>
+            </a:r>
+            <a:r>
+              <a:rPr lang="en-US" dirty="0"/>
+              <a:t>3.1.2+</a:t>
+            </a:r>
+            <a:endParaRPr lang="ru-RU" dirty="0"/>
           </a:p>
         </p:txBody>
       </p:sp>
     </p:spTree>
     <p:extLst>
       <p:ext uri="{BB962C8B-B14F-4D97-AF65-F5344CB8AC3E}">
-        <p14:creationId xmlns:p14="http://schemas.microsoft.com/office/powerpoint/2010/main" val="2860038133"/>
+        <p14:creationId xmlns:p14="http://schemas.microsoft.com/office/powerpoint/2010/main" val="3287761478"/>
       </p:ext>
     </p:extLst>
   </p:cSld>
@@ -6062,20 +5907,8 @@
               <a:t>: </a:t>
             </a:r>
             <a:r>
-              <a:rPr lang="en-US" dirty="0" err="1"/>
-              <a:t>cdc</a:t>
-            </a:r>
-            <a:r>
-              <a:rPr lang="en-US" dirty="0"/>
-              <a:t> </a:t>
-            </a:r>
-            <a:r>
-              <a:rPr lang="ru-RU" dirty="0"/>
-              <a:t>для </a:t>
-            </a:r>
-            <a:r>
-              <a:rPr lang="ru-RU" dirty="0" err="1"/>
-              <a:t>шардов</a:t>
+              <a:rPr lang="ru-RU" dirty="0"/>
+              <a:t>редко обновляемые таблицы</a:t>
             </a:r>
             <a:endParaRPr lang="en-US" dirty="0"/>
           </a:p>
@@ -6105,118 +5938,72 @@
         </p:spPr>
         <p:txBody>
           <a:bodyPr>
-            <a:normAutofit fontScale="92500" lnSpcReduction="10000"/>
+            <a:normAutofit/>
           </a:bodyPr>
           <a:lstStyle/>
           <a:p>
             <a:r>
               <a:rPr lang="ru-RU" dirty="0"/>
-              <a:t>Контекст: нужно перехватывать изменения по заданному набору таблиц в разных </a:t>
+              <a:t>Контекст: в БД много таблиц, но реплицируем одну таблицу справочник, которая обновляется крайне редко</a:t>
+            </a:r>
+          </a:p>
+          <a:p>
+            <a:r>
+              <a:rPr lang="ru-RU" dirty="0"/>
+              <a:t>Проблема: Слот всегда отстает, </a:t>
+            </a:r>
+            <a:r>
+              <a:rPr lang="en-US" dirty="0"/>
+              <a:t>WAL </a:t>
+            </a:r>
+            <a:r>
+              <a:rPr lang="ru-RU" dirty="0"/>
+              <a:t>копится до «предела». Есть риск потери данных и переход </a:t>
             </a:r>
             <a:r>
               <a:rPr lang="ru-RU" dirty="0" err="1"/>
-              <a:t>шардах</a:t>
-            </a:r>
-            <a:r>
-              <a:rPr lang="ru-RU" dirty="0"/>
-              <a:t> / </a:t>
-            </a:r>
-            <a:r>
-              <a:rPr lang="en-US" dirty="0" err="1"/>
-              <a:t>debezium</a:t>
-            </a:r>
-            <a:r>
-              <a:rPr lang="ru-RU" dirty="0"/>
-              <a:t> использует </a:t>
-            </a:r>
-            <a:r>
-              <a:rPr lang="en-US" dirty="0" err="1"/>
-              <a:t>avro</a:t>
+              <a:t>инстанса</a:t>
+            </a:r>
+            <a:r>
+              <a:rPr lang="ru-RU" dirty="0"/>
+              <a:t> в </a:t>
+            </a:r>
+            <a:r>
+              <a:rPr lang="en-US" dirty="0"/>
+              <a:t>RO</a:t>
             </a:r>
             <a:endParaRPr lang="ru-RU" dirty="0"/>
           </a:p>
           <a:p>
             <a:r>
               <a:rPr lang="ru-RU" dirty="0"/>
-              <a:t>Проблема </a:t>
-            </a:r>
-            <a:r>
-              <a:rPr lang="en-US" dirty="0"/>
-              <a:t>#1</a:t>
-            </a:r>
-            <a:r>
-              <a:rPr lang="ru-RU" dirty="0"/>
-              <a:t>: </a:t>
-            </a:r>
-            <a:r>
-              <a:rPr lang="ru-RU" dirty="0" err="1"/>
-              <a:t>эвенты</a:t>
-            </a:r>
-            <a:r>
-              <a:rPr lang="ru-RU" dirty="0"/>
-              <a:t> по одинаковым таблицам имею одинаковую структуру, но </a:t>
-            </a:r>
-            <a:r>
-              <a:rPr lang="en-US" dirty="0" err="1"/>
-              <a:t>debezium</a:t>
-            </a:r>
-            <a:r>
-              <a:rPr lang="en-US" dirty="0"/>
-              <a:t> </a:t>
-            </a:r>
-            <a:r>
-              <a:rPr lang="ru-RU" dirty="0"/>
-              <a:t>генерирует разные несовместимые схемы</a:t>
-            </a:r>
-          </a:p>
-          <a:p>
-            <a:r>
-              <a:rPr lang="ru-RU" dirty="0"/>
               <a:t>Решение:</a:t>
             </a:r>
           </a:p>
           <a:p>
             <a:pPr lvl="1"/>
             <a:r>
-              <a:rPr lang="ru-RU" dirty="0"/>
-              <a:t>Трансформ для переименования рекордов</a:t>
-            </a:r>
-            <a:endParaRPr lang="en-US" dirty="0"/>
-          </a:p>
-          <a:p>
-            <a:r>
-              <a:rPr lang="ru-RU" dirty="0"/>
-              <a:t>Проблема </a:t>
-            </a:r>
-            <a:r>
-              <a:rPr lang="en-US" dirty="0"/>
-              <a:t>#2: </a:t>
-            </a:r>
-            <a:r>
-              <a:rPr lang="ru-RU" dirty="0"/>
-              <a:t>переименование сработало только на верхнем уровне. Вложенные структуры также с разным </a:t>
-            </a:r>
-            <a:r>
-              <a:rPr lang="ru-RU" dirty="0" err="1"/>
-              <a:t>неймингом</a:t>
-            </a:r>
-            <a:endParaRPr lang="ru-RU" dirty="0"/>
-          </a:p>
-          <a:p>
-            <a:r>
-              <a:rPr lang="ru-RU" dirty="0"/>
-              <a:t>Решение:</a:t>
+              <a:rPr lang="en-US" dirty="0"/>
+              <a:t>Heartbeat </a:t>
+            </a:r>
+            <a:r>
+              <a:rPr lang="ru-RU" dirty="0"/>
+              <a:t>таблица</a:t>
             </a:r>
           </a:p>
           <a:p>
             <a:pPr lvl="1"/>
             <a:r>
-              <a:rPr lang="ru-RU" dirty="0" err="1"/>
-              <a:t>Кастомный</a:t>
-            </a:r>
-            <a:r>
-              <a:rPr lang="ru-RU" dirty="0"/>
-              <a:t> трансформ, который переименовывает в том числе и вложенные структуры</a:t>
+              <a:rPr lang="ru-RU" dirty="0"/>
+              <a:t>Установить настройку, ограничивающую размер </a:t>
+            </a:r>
+            <a:r>
+              <a:rPr lang="en-US" dirty="0"/>
+              <a:t>WAL’</a:t>
+            </a:r>
+            <a:r>
+              <a:rPr lang="ru-RU" dirty="0"/>
+              <a:t>а</a:t>
             </a:r>
           </a:p>
         </p:txBody>
@@ -6224,7 +6011,7 @@
     </p:spTree>
     <p:extLst>
       <p:ext uri="{BB962C8B-B14F-4D97-AF65-F5344CB8AC3E}">
-        <p14:creationId xmlns:p14="http://schemas.microsoft.com/office/powerpoint/2010/main" val="167980905"/>
+        <p14:creationId xmlns:p14="http://schemas.microsoft.com/office/powerpoint/2010/main" val="1965460881"/>
       </p:ext>
     </p:extLst>
   </p:cSld>
@@ -6283,11 +6070,15 @@
             </a:r>
             <a:r>
               <a:rPr lang="en-US" dirty="0"/>
-              <a:t>: timestamp / </a:t>
-            </a:r>
-            <a:r>
-              <a:rPr lang="en-US" dirty="0" err="1"/>
-              <a:t>timestamptz</a:t>
+              <a:t>: </a:t>
+            </a:r>
+            <a:r>
+              <a:rPr lang="ru-RU" dirty="0" err="1"/>
+              <a:t>эвенты</a:t>
+            </a:r>
+            <a:r>
+              <a:rPr lang="ru-RU" dirty="0"/>
+              <a:t> с неполным состоянием</a:t>
             </a:r>
             <a:endParaRPr lang="en-US" dirty="0"/>
           </a:p>
@@ -6323,108 +6114,62 @@
           <a:p>
             <a:r>
               <a:rPr lang="ru-RU" dirty="0"/>
-              <a:t>Контекст: нужно реплицировать </a:t>
+              <a:t>Контекст: реплицируется таблица с </a:t>
+            </a:r>
+            <a:r>
+              <a:rPr lang="en-US" dirty="0"/>
+              <a:t>TOAST </a:t>
+            </a:r>
+            <a:r>
+              <a:rPr lang="ru-RU" dirty="0"/>
+              <a:t>полями</a:t>
+            </a:r>
+          </a:p>
+          <a:p>
+            <a:r>
+              <a:rPr lang="ru-RU" dirty="0"/>
+              <a:t>Проблема: некоторые </a:t>
             </a:r>
             <a:r>
               <a:rPr lang="ru-RU" dirty="0" err="1"/>
-              <a:t>таблцы</a:t>
-            </a:r>
-            <a:r>
-              <a:rPr lang="ru-RU" dirty="0"/>
-              <a:t> с колонками типов </a:t>
-            </a:r>
-            <a:r>
-              <a:rPr lang="en-US" dirty="0"/>
-              <a:t>timestamp / </a:t>
-            </a:r>
-            <a:r>
-              <a:rPr lang="en-US" dirty="0" err="1"/>
-              <a:t>timestamptz</a:t>
+              <a:t>эвенты</a:t>
+            </a:r>
+            <a:r>
+              <a:rPr lang="ru-RU" dirty="0"/>
+              <a:t> приходят только с частью заполненных колонок</a:t>
+            </a:r>
+          </a:p>
+          <a:p>
+            <a:r>
+              <a:rPr lang="ru-RU" dirty="0"/>
+              <a:t>Решения:</a:t>
+            </a:r>
+          </a:p>
+          <a:p>
+            <a:pPr lvl="1"/>
+            <a:r>
+              <a:rPr lang="en-US" dirty="0"/>
+              <a:t>REPLICA IDENTITY FULL</a:t>
+            </a:r>
+          </a:p>
+          <a:p>
+            <a:pPr lvl="1"/>
+            <a:r>
+              <a:rPr lang="ru-RU" dirty="0"/>
+              <a:t>Сделать поля частью </a:t>
+            </a:r>
+            <a:r>
+              <a:rPr lang="en-US" dirty="0"/>
+              <a:t>PK / Unique index</a:t>
             </a:r>
             <a:endParaRPr lang="ru-RU" dirty="0"/>
-          </a:p>
-          <a:p>
-            <a:r>
-              <a:rPr lang="ru-RU" dirty="0"/>
-              <a:t>Проблема </a:t>
-            </a:r>
-            <a:r>
-              <a:rPr lang="en-US" dirty="0"/>
-              <a:t>#1</a:t>
-            </a:r>
-            <a:r>
-              <a:rPr lang="ru-RU" dirty="0"/>
-              <a:t>: </a:t>
-            </a:r>
-            <a:r>
-              <a:rPr lang="en-US" dirty="0" err="1"/>
-              <a:t>debezium</a:t>
-            </a:r>
-            <a:r>
-              <a:rPr lang="en-US" dirty="0"/>
-              <a:t> </a:t>
-            </a:r>
-            <a:r>
-              <a:rPr lang="ru-RU" dirty="0"/>
-              <a:t>конвертирует один тип в </a:t>
-            </a:r>
-            <a:r>
-              <a:rPr lang="en-US" dirty="0"/>
-              <a:t>long, </a:t>
-            </a:r>
-            <a:r>
-              <a:rPr lang="ru-RU" dirty="0"/>
-              <a:t>другой в </a:t>
-            </a:r>
-            <a:r>
-              <a:rPr lang="en-US" dirty="0"/>
-              <a:t>string</a:t>
-            </a:r>
-            <a:endParaRPr lang="ru-RU" dirty="0"/>
-          </a:p>
-          <a:p>
-            <a:r>
-              <a:rPr lang="ru-RU" dirty="0"/>
-              <a:t>Решение:</a:t>
-            </a:r>
-          </a:p>
-          <a:p>
-            <a:pPr lvl="1"/>
-            <a:r>
-              <a:rPr lang="ru-RU" dirty="0"/>
-              <a:t>Трансформ для конвертации типов</a:t>
-            </a:r>
-          </a:p>
-          <a:p>
-            <a:pPr lvl="1"/>
-            <a:r>
-              <a:rPr lang="ru-RU" dirty="0"/>
-              <a:t>Указывать явно </a:t>
-            </a:r>
-            <a:r>
-              <a:rPr lang="en-US" dirty="0" err="1"/>
-              <a:t>timezone</a:t>
-            </a:r>
-            <a:r>
-              <a:rPr lang="en-US" dirty="0"/>
-              <a:t>, </a:t>
-            </a:r>
-            <a:r>
-              <a:rPr lang="ru-RU" dirty="0"/>
-              <a:t> которую нужно конвертировать </a:t>
-            </a:r>
-            <a:r>
-              <a:rPr lang="en-US" dirty="0" err="1"/>
-              <a:t>timestamptz</a:t>
-            </a:r>
-            <a:endParaRPr lang="en-US" dirty="0"/>
           </a:p>
         </p:txBody>
       </p:sp>
     </p:spTree>
     <p:extLst>
       <p:ext uri="{BB962C8B-B14F-4D97-AF65-F5344CB8AC3E}">
-        <p14:creationId xmlns:p14="http://schemas.microsoft.com/office/powerpoint/2010/main" val="281530354"/>
+        <p14:creationId xmlns:p14="http://schemas.microsoft.com/office/powerpoint/2010/main" val="3406737331"/>
       </p:ext>
     </p:extLst>
   </p:cSld>
@@ -6478,8 +6223,20 @@
           <a:lstStyle/>
           <a:p>
             <a:r>
-              <a:rPr lang="ru-RU" dirty="0"/>
-              <a:t>Выводы</a:t>
+              <a:rPr lang="en-US" dirty="0" err="1"/>
+              <a:t>Debezium</a:t>
+            </a:r>
+            <a:r>
+              <a:rPr lang="en-US" dirty="0"/>
+              <a:t>: </a:t>
+            </a:r>
+            <a:r>
+              <a:rPr lang="ru-RU" dirty="0" err="1"/>
+              <a:t>партиционированные</a:t>
+            </a:r>
+            <a:r>
+              <a:rPr lang="ru-RU" dirty="0"/>
+              <a:t> таблицы</a:t>
             </a:r>
             <a:endParaRPr lang="en-US" dirty="0"/>
           </a:p>
@@ -6509,76 +6266,780 @@
         </p:spPr>
         <p:txBody>
           <a:bodyPr>
-            <a:normAutofit lnSpcReduction="10000"/>
+            <a:normAutofit/>
           </a:bodyPr>
           <a:lstStyle/>
           <a:p>
             <a:r>
               <a:rPr lang="ru-RU" dirty="0"/>
-              <a:t>Одну и ту же задачу можно решать разными способами</a:t>
-            </a:r>
-          </a:p>
-          <a:p>
-            <a:r>
-              <a:rPr lang="ru-RU" dirty="0"/>
-              <a:t>Каждый способ имеет право на жизнь и выбор конкретного решения зависит от таких факторов, как например:</a:t>
+              <a:t>Задача: нужно реплицировать </a:t>
+            </a:r>
+            <a:r>
+              <a:rPr lang="ru-RU" dirty="0" err="1"/>
+              <a:t>партиционированную</a:t>
+            </a:r>
+            <a:r>
+              <a:rPr lang="ru-RU" dirty="0"/>
+              <a:t> таблицу</a:t>
+            </a:r>
+          </a:p>
+          <a:p>
+            <a:r>
+              <a:rPr lang="ru-RU" dirty="0"/>
+              <a:t>Проблема: </a:t>
+            </a:r>
+            <a:r>
+              <a:rPr lang="ru-RU" dirty="0" err="1"/>
+              <a:t>эвенты</a:t>
+            </a:r>
+            <a:r>
+              <a:rPr lang="ru-RU" dirty="0"/>
+              <a:t> приходят не от корневой таблицы, а от </a:t>
+            </a:r>
+            <a:r>
+              <a:rPr lang="ru-RU" dirty="0" err="1"/>
+              <a:t>партиций</a:t>
+            </a:r>
+            <a:endParaRPr lang="ru-RU" dirty="0"/>
+          </a:p>
+          <a:p>
+            <a:r>
+              <a:rPr lang="ru-RU" dirty="0"/>
+              <a:t>Решение:</a:t>
             </a:r>
           </a:p>
           <a:p>
             <a:pPr lvl="1"/>
             <a:r>
               <a:rPr lang="ru-RU" dirty="0"/>
-              <a:t>Стоимость разработки</a:t>
-            </a:r>
-          </a:p>
-          <a:p>
-            <a:pPr lvl="1"/>
-            <a:r>
-              <a:rPr lang="ru-RU" dirty="0"/>
-              <a:t>Влияние на процессы владельцев БД</a:t>
-            </a:r>
-          </a:p>
-          <a:p>
-            <a:pPr lvl="1"/>
-            <a:r>
-              <a:rPr lang="ru-RU" dirty="0"/>
-              <a:t>Влияние на БД</a:t>
-            </a:r>
-          </a:p>
-          <a:p>
-            <a:pPr lvl="1"/>
-            <a:r>
-              <a:rPr lang="ru-RU" dirty="0"/>
-              <a:t>Возможность адаптироваться под новые требования</a:t>
-            </a:r>
-          </a:p>
-          <a:p>
-            <a:pPr lvl="1"/>
-            <a:r>
-              <a:rPr lang="ru-RU" dirty="0"/>
-              <a:t>Гарантии доставки</a:t>
-            </a:r>
-          </a:p>
-          <a:p>
+              <a:t>При создании публикации выставить флаг «</a:t>
+            </a:r>
             <a:r>
               <a:rPr lang="en-US" dirty="0" err="1"/>
-              <a:t>Debezium</a:t>
-            </a:r>
-            <a:r>
-              <a:rPr lang="en-US" dirty="0"/>
-              <a:t> </a:t>
-            </a:r>
-            <a:r>
-              <a:rPr lang="ru-RU" dirty="0"/>
-              <a:t>может показаться «готовым» решением, но для некоторых задач может оказаться проще использовать другой подход</a:t>
-            </a:r>
+              <a:t>publish_via_partition_root</a:t>
+            </a:r>
+            <a:r>
+              <a:rPr lang="ru-RU" dirty="0"/>
+              <a:t>»</a:t>
+            </a:r>
+            <a:endParaRPr lang="en-US" dirty="0"/>
           </a:p>
         </p:txBody>
       </p:sp>
     </p:spTree>
     <p:extLst>
       <p:ext uri="{BB962C8B-B14F-4D97-AF65-F5344CB8AC3E}">
-        <p14:creationId xmlns:p14="http://schemas.microsoft.com/office/powerpoint/2010/main" val="1224448155"/>
+        <p14:creationId xmlns:p14="http://schemas.microsoft.com/office/powerpoint/2010/main" val="1856578306"/>
+      </p:ext>
+    </p:extLst>
+  </p:cSld>
+  <p:clrMapOvr>
+    <a:masterClrMapping/>
+  </p:clrMapOvr>
+</p:sld>
+</file>
+
+<file path=ppt/slides/slide26.xml><?xml version="1.0" encoding="utf-8"?>
+<p:sld xmlns:a="http://schemas.openxmlformats.org/drawingml/2006/main" xmlns:r="http://schemas.openxmlformats.org/officeDocument/2006/relationships" xmlns:p="http://schemas.openxmlformats.org/presentationml/2006/main">
+  <p:cSld>
+    <p:spTree>
+      <p:nvGrpSpPr>
+        <p:cNvPr id="1" name=""/>
+        <p:cNvGrpSpPr/>
+        <p:nvPr/>
+      </p:nvGrpSpPr>
+      <p:grpSpPr>
+        <a:xfrm>
+          <a:off x="0" y="0"/>
+          <a:ext cx="0" cy="0"/>
+          <a:chOff x="0" y="0"/>
+          <a:chExt cx="0" cy="0"/>
+        </a:xfrm>
+      </p:grpSpPr>
+      <p:sp>
+        <p:nvSpPr>
+          <p:cNvPr id="2" name="Title 1">
+            <a:extLst>
+              <a:ext uri="{FF2B5EF4-FFF2-40B4-BE49-F238E27FC236}">
+                <a16:creationId xmlns:a16="http://schemas.microsoft.com/office/drawing/2014/main" id="{00888323-12E8-8C4F-8E27-23BD5B7DEE03}"/>
+              </a:ext>
+            </a:extLst>
+          </p:cNvPr>
+          <p:cNvSpPr>
+            <a:spLocks noGrp="1"/>
+          </p:cNvSpPr>
+          <p:nvPr>
+            <p:ph type="title"/>
+          </p:nvPr>
+        </p:nvSpPr>
+        <p:spPr>
+          <a:xfrm>
+            <a:off x="0" y="18255"/>
+            <a:ext cx="10515600" cy="1325563"/>
+          </a:xfrm>
+        </p:spPr>
+        <p:txBody>
+          <a:bodyPr/>
+          <a:lstStyle/>
+          <a:p>
+            <a:r>
+              <a:rPr lang="en-US" dirty="0" err="1"/>
+              <a:t>Debezium</a:t>
+            </a:r>
+            <a:r>
+              <a:rPr lang="en-US" dirty="0"/>
+              <a:t>: </a:t>
+            </a:r>
+            <a:r>
+              <a:rPr lang="en-US" dirty="0" err="1"/>
+              <a:t>hypertable</a:t>
+            </a:r>
+            <a:endParaRPr lang="en-US" dirty="0"/>
+          </a:p>
+        </p:txBody>
+      </p:sp>
+      <p:sp>
+        <p:nvSpPr>
+          <p:cNvPr id="3" name="Content Placeholder 2">
+            <a:extLst>
+              <a:ext uri="{FF2B5EF4-FFF2-40B4-BE49-F238E27FC236}">
+                <a16:creationId xmlns:a16="http://schemas.microsoft.com/office/drawing/2014/main" id="{DA11F9D3-C291-2245-AEA5-8D09537FB4E5}"/>
+              </a:ext>
+            </a:extLst>
+          </p:cNvPr>
+          <p:cNvSpPr>
+            <a:spLocks noGrp="1"/>
+          </p:cNvSpPr>
+          <p:nvPr>
+            <p:ph idx="1"/>
+          </p:nvPr>
+        </p:nvSpPr>
+        <p:spPr>
+          <a:xfrm>
+            <a:off x="0" y="1343818"/>
+            <a:ext cx="10515600" cy="4351338"/>
+          </a:xfrm>
+        </p:spPr>
+        <p:txBody>
+          <a:bodyPr>
+            <a:normAutofit/>
+          </a:bodyPr>
+          <a:lstStyle/>
+          <a:p>
+            <a:r>
+              <a:rPr lang="ru-RU" dirty="0"/>
+              <a:t>Задача: нужно реплицировать </a:t>
+            </a:r>
+            <a:r>
+              <a:rPr lang="en-US" dirty="0" err="1"/>
+              <a:t>hypertable</a:t>
+            </a:r>
+            <a:r>
+              <a:rPr lang="en-US" dirty="0"/>
+              <a:t> (</a:t>
+            </a:r>
+            <a:r>
+              <a:rPr lang="en-US" dirty="0" err="1"/>
+              <a:t>timescaldb</a:t>
+            </a:r>
+            <a:r>
+              <a:rPr lang="en-US" dirty="0"/>
+              <a:t>)</a:t>
+            </a:r>
+            <a:endParaRPr lang="ru-RU" dirty="0"/>
+          </a:p>
+          <a:p>
+            <a:r>
+              <a:rPr lang="ru-RU" dirty="0"/>
+              <a:t>Проблема </a:t>
+            </a:r>
+            <a:r>
+              <a:rPr lang="en-US" dirty="0"/>
+              <a:t>#1</a:t>
+            </a:r>
+            <a:r>
+              <a:rPr lang="ru-RU" dirty="0"/>
+              <a:t>: </a:t>
+            </a:r>
+            <a:r>
+              <a:rPr lang="ru-RU" dirty="0" err="1"/>
+              <a:t>эвенты</a:t>
+            </a:r>
+            <a:r>
+              <a:rPr lang="ru-RU" dirty="0"/>
+              <a:t> не приходят</a:t>
+            </a:r>
+          </a:p>
+          <a:p>
+            <a:r>
+              <a:rPr lang="ru-RU" dirty="0"/>
+              <a:t>Решение:</a:t>
+            </a:r>
+          </a:p>
+          <a:p>
+            <a:pPr lvl="1"/>
+            <a:r>
+              <a:rPr lang="ru-RU" dirty="0"/>
+              <a:t>«Правильная настройка» (пример)</a:t>
+            </a:r>
+          </a:p>
+          <a:p>
+            <a:r>
+              <a:rPr lang="en-US" dirty="0"/>
+              <a:t> </a:t>
+            </a:r>
+            <a:r>
+              <a:rPr lang="ru-RU" dirty="0"/>
+              <a:t>Проблема </a:t>
+            </a:r>
+            <a:r>
+              <a:rPr lang="en-US" dirty="0"/>
+              <a:t>#2: </a:t>
+            </a:r>
+            <a:r>
+              <a:rPr lang="ru-RU" dirty="0"/>
+              <a:t>процесс падает из-за системной таблицы</a:t>
+            </a:r>
+          </a:p>
+          <a:p>
+            <a:pPr lvl="1"/>
+            <a:r>
+              <a:rPr lang="ru-RU" dirty="0"/>
+              <a:t>Решение: явное исключение таблиц из репликации</a:t>
+            </a:r>
+            <a:endParaRPr lang="en-US" dirty="0"/>
+          </a:p>
+        </p:txBody>
+      </p:sp>
+    </p:spTree>
+    <p:extLst>
+      <p:ext uri="{BB962C8B-B14F-4D97-AF65-F5344CB8AC3E}">
+        <p14:creationId xmlns:p14="http://schemas.microsoft.com/office/powerpoint/2010/main" val="1513835637"/>
+      </p:ext>
+    </p:extLst>
+  </p:cSld>
+  <p:clrMapOvr>
+    <a:masterClrMapping/>
+  </p:clrMapOvr>
+</p:sld>
+</file>
+
+<file path=ppt/slides/slide27.xml><?xml version="1.0" encoding="utf-8"?>
+<p:sld xmlns:a="http://schemas.openxmlformats.org/drawingml/2006/main" xmlns:r="http://schemas.openxmlformats.org/officeDocument/2006/relationships" xmlns:p="http://schemas.openxmlformats.org/presentationml/2006/main">
+  <p:cSld>
+    <p:spTree>
+      <p:nvGrpSpPr>
+        <p:cNvPr id="1" name=""/>
+        <p:cNvGrpSpPr/>
+        <p:nvPr/>
+      </p:nvGrpSpPr>
+      <p:grpSpPr>
+        <a:xfrm>
+          <a:off x="0" y="0"/>
+          <a:ext cx="0" cy="0"/>
+          <a:chOff x="0" y="0"/>
+          <a:chExt cx="0" cy="0"/>
+        </a:xfrm>
+      </p:grpSpPr>
+      <p:sp>
+        <p:nvSpPr>
+          <p:cNvPr id="2" name="Title 1">
+            <a:extLst>
+              <a:ext uri="{FF2B5EF4-FFF2-40B4-BE49-F238E27FC236}">
+                <a16:creationId xmlns:a16="http://schemas.microsoft.com/office/drawing/2014/main" id="{00888323-12E8-8C4F-8E27-23BD5B7DEE03}"/>
+              </a:ext>
+            </a:extLst>
+          </p:cNvPr>
+          <p:cNvSpPr>
+            <a:spLocks noGrp="1"/>
+          </p:cNvSpPr>
+          <p:nvPr>
+            <p:ph type="title"/>
+          </p:nvPr>
+        </p:nvSpPr>
+        <p:spPr>
+          <a:xfrm>
+            <a:off x="0" y="18255"/>
+            <a:ext cx="10515600" cy="1325563"/>
+          </a:xfrm>
+        </p:spPr>
+        <p:txBody>
+          <a:bodyPr/>
+          <a:lstStyle/>
+          <a:p>
+            <a:r>
+              <a:rPr lang="en-US" dirty="0" err="1"/>
+              <a:t>Debezium</a:t>
+            </a:r>
+            <a:r>
+              <a:rPr lang="en-US" dirty="0"/>
+              <a:t>: </a:t>
+            </a:r>
+            <a:r>
+              <a:rPr lang="ru-RU" dirty="0"/>
+              <a:t>эволюция схем</a:t>
+            </a:r>
+            <a:endParaRPr lang="en-US" dirty="0"/>
+          </a:p>
+        </p:txBody>
+      </p:sp>
+      <p:sp>
+        <p:nvSpPr>
+          <p:cNvPr id="3" name="Content Placeholder 2">
+            <a:extLst>
+              <a:ext uri="{FF2B5EF4-FFF2-40B4-BE49-F238E27FC236}">
+                <a16:creationId xmlns:a16="http://schemas.microsoft.com/office/drawing/2014/main" id="{DA11F9D3-C291-2245-AEA5-8D09537FB4E5}"/>
+              </a:ext>
+            </a:extLst>
+          </p:cNvPr>
+          <p:cNvSpPr>
+            <a:spLocks noGrp="1"/>
+          </p:cNvSpPr>
+          <p:nvPr>
+            <p:ph idx="1"/>
+          </p:nvPr>
+        </p:nvSpPr>
+        <p:spPr>
+          <a:xfrm>
+            <a:off x="0" y="1343818"/>
+            <a:ext cx="10515600" cy="4351338"/>
+          </a:xfrm>
+        </p:spPr>
+        <p:txBody>
+          <a:bodyPr>
+            <a:normAutofit/>
+          </a:bodyPr>
+          <a:lstStyle/>
+          <a:p>
+            <a:r>
+              <a:rPr lang="ru-RU" dirty="0"/>
+              <a:t>Контекст: </a:t>
+            </a:r>
+            <a:r>
+              <a:rPr lang="en-US" dirty="0" err="1"/>
+              <a:t>debezium</a:t>
+            </a:r>
+            <a:r>
+              <a:rPr lang="en-US" dirty="0"/>
+              <a:t> </a:t>
+            </a:r>
+            <a:r>
+              <a:rPr lang="ru-RU" dirty="0"/>
+              <a:t>использует </a:t>
+            </a:r>
+            <a:r>
+              <a:rPr lang="en-US" dirty="0" err="1"/>
+              <a:t>avro</a:t>
+            </a:r>
+            <a:r>
+              <a:rPr lang="en-US" dirty="0"/>
+              <a:t>-</a:t>
+            </a:r>
+            <a:r>
+              <a:rPr lang="ru-RU" dirty="0"/>
+              <a:t>формат. Владелец БД изменил схему реплицируемой таблицы</a:t>
+            </a:r>
+          </a:p>
+          <a:p>
+            <a:r>
+              <a:rPr lang="ru-RU" dirty="0"/>
+              <a:t>Проблема: после изменения схемы </a:t>
+            </a:r>
+            <a:r>
+              <a:rPr lang="en-US" dirty="0" err="1"/>
+              <a:t>debezium</a:t>
+            </a:r>
+            <a:r>
+              <a:rPr lang="en-US" dirty="0"/>
+              <a:t> </a:t>
+            </a:r>
+            <a:r>
+              <a:rPr lang="ru-RU" dirty="0"/>
+              <a:t>падает</a:t>
+            </a:r>
+          </a:p>
+          <a:p>
+            <a:r>
+              <a:rPr lang="ru-RU" dirty="0"/>
+              <a:t>Причина: несовместимое изменение схемы</a:t>
+            </a:r>
+          </a:p>
+          <a:p>
+            <a:r>
+              <a:rPr lang="ru-RU" dirty="0"/>
+              <a:t>Решения:</a:t>
+            </a:r>
+          </a:p>
+          <a:p>
+            <a:pPr lvl="1"/>
+            <a:r>
+              <a:rPr lang="ru-RU" dirty="0"/>
+              <a:t>Указать </a:t>
+            </a:r>
+            <a:r>
+              <a:rPr lang="en-US" dirty="0" err="1"/>
+              <a:t>compatibility.mode</a:t>
+            </a:r>
+            <a:r>
+              <a:rPr lang="en-US" dirty="0"/>
+              <a:t>=NONE</a:t>
+            </a:r>
+          </a:p>
+          <a:p>
+            <a:pPr lvl="1"/>
+            <a:r>
+              <a:rPr lang="ru-RU" dirty="0"/>
+              <a:t>Глобально запретить выполнять несовместимые изменения </a:t>
+            </a:r>
+          </a:p>
+          <a:p>
+            <a:pPr lvl="1"/>
+            <a:r>
+              <a:rPr lang="ru-RU" dirty="0"/>
+              <a:t>Контролировать </a:t>
+            </a:r>
+            <a:r>
+              <a:rPr lang="ru-RU" dirty="0" err="1"/>
+              <a:t>валидацию</a:t>
+            </a:r>
+            <a:r>
+              <a:rPr lang="ru-RU" dirty="0"/>
+              <a:t> эволюции схемы самостоятельно</a:t>
+            </a:r>
+          </a:p>
+        </p:txBody>
+      </p:sp>
+    </p:spTree>
+    <p:extLst>
+      <p:ext uri="{BB962C8B-B14F-4D97-AF65-F5344CB8AC3E}">
+        <p14:creationId xmlns:p14="http://schemas.microsoft.com/office/powerpoint/2010/main" val="3793313203"/>
+      </p:ext>
+    </p:extLst>
+  </p:cSld>
+  <p:clrMapOvr>
+    <a:masterClrMapping/>
+  </p:clrMapOvr>
+</p:sld>
+</file>
+
+<file path=ppt/slides/slide28.xml><?xml version="1.0" encoding="utf-8"?>
+<p:sld xmlns:a="http://schemas.openxmlformats.org/drawingml/2006/main" xmlns:r="http://schemas.openxmlformats.org/officeDocument/2006/relationships" xmlns:p="http://schemas.openxmlformats.org/presentationml/2006/main">
+  <p:cSld>
+    <p:spTree>
+      <p:nvGrpSpPr>
+        <p:cNvPr id="1" name=""/>
+        <p:cNvGrpSpPr/>
+        <p:nvPr/>
+      </p:nvGrpSpPr>
+      <p:grpSpPr>
+        <a:xfrm>
+          <a:off x="0" y="0"/>
+          <a:ext cx="0" cy="0"/>
+          <a:chOff x="0" y="0"/>
+          <a:chExt cx="0" cy="0"/>
+        </a:xfrm>
+      </p:grpSpPr>
+      <p:sp>
+        <p:nvSpPr>
+          <p:cNvPr id="2" name="Title 1">
+            <a:extLst>
+              <a:ext uri="{FF2B5EF4-FFF2-40B4-BE49-F238E27FC236}">
+                <a16:creationId xmlns:a16="http://schemas.microsoft.com/office/drawing/2014/main" id="{00888323-12E8-8C4F-8E27-23BD5B7DEE03}"/>
+              </a:ext>
+            </a:extLst>
+          </p:cNvPr>
+          <p:cNvSpPr>
+            <a:spLocks noGrp="1"/>
+          </p:cNvSpPr>
+          <p:nvPr>
+            <p:ph type="title"/>
+          </p:nvPr>
+        </p:nvSpPr>
+        <p:spPr>
+          <a:xfrm>
+            <a:off x="0" y="18255"/>
+            <a:ext cx="10515600" cy="1325563"/>
+          </a:xfrm>
+        </p:spPr>
+        <p:txBody>
+          <a:bodyPr/>
+          <a:lstStyle/>
+          <a:p>
+            <a:r>
+              <a:rPr lang="en-US" dirty="0" err="1"/>
+              <a:t>Debezium</a:t>
+            </a:r>
+            <a:r>
+              <a:rPr lang="en-US" dirty="0"/>
+              <a:t>: </a:t>
+            </a:r>
+            <a:r>
+              <a:rPr lang="ru-RU" dirty="0"/>
+              <a:t>упавший мастер</a:t>
+            </a:r>
+            <a:endParaRPr lang="en-US" dirty="0"/>
+          </a:p>
+        </p:txBody>
+      </p:sp>
+      <p:sp>
+        <p:nvSpPr>
+          <p:cNvPr id="3" name="Content Placeholder 2">
+            <a:extLst>
+              <a:ext uri="{FF2B5EF4-FFF2-40B4-BE49-F238E27FC236}">
+                <a16:creationId xmlns:a16="http://schemas.microsoft.com/office/drawing/2014/main" id="{DA11F9D3-C291-2245-AEA5-8D09537FB4E5}"/>
+              </a:ext>
+            </a:extLst>
+          </p:cNvPr>
+          <p:cNvSpPr>
+            <a:spLocks noGrp="1"/>
+          </p:cNvSpPr>
+          <p:nvPr>
+            <p:ph idx="1"/>
+          </p:nvPr>
+        </p:nvSpPr>
+        <p:spPr>
+          <a:xfrm>
+            <a:off x="0" y="1343818"/>
+            <a:ext cx="10515600" cy="4351338"/>
+          </a:xfrm>
+        </p:spPr>
+        <p:txBody>
+          <a:bodyPr>
+            <a:normAutofit/>
+          </a:bodyPr>
+          <a:lstStyle/>
+          <a:p>
+            <a:r>
+              <a:rPr lang="ru-RU" dirty="0"/>
+              <a:t>Проблема: мастер в кластере</a:t>
+            </a:r>
+            <a:r>
+              <a:rPr lang="en-US" dirty="0"/>
+              <a:t> PG </a:t>
+            </a:r>
+            <a:r>
+              <a:rPr lang="ru-RU" dirty="0"/>
+              <a:t>переехал, </a:t>
+            </a:r>
+            <a:r>
+              <a:rPr lang="en-US" dirty="0" err="1"/>
+              <a:t>debezium</a:t>
+            </a:r>
+            <a:r>
+              <a:rPr lang="en-US" dirty="0"/>
+              <a:t> </a:t>
+            </a:r>
+            <a:r>
+              <a:rPr lang="ru-RU" dirty="0"/>
+              <a:t>упал</a:t>
+            </a:r>
+          </a:p>
+          <a:p>
+            <a:r>
+              <a:rPr lang="ru-RU" dirty="0"/>
+              <a:t>Решения:</a:t>
+            </a:r>
+          </a:p>
+          <a:p>
+            <a:pPr lvl="1"/>
+            <a:r>
+              <a:rPr lang="ru-RU" dirty="0"/>
+              <a:t>Обновить настройки подключения, указав ссылку на новый мастер</a:t>
+            </a:r>
+          </a:p>
+          <a:p>
+            <a:pPr lvl="1"/>
+            <a:r>
+              <a:rPr lang="ru-RU" dirty="0"/>
+              <a:t>Если </a:t>
+            </a:r>
+            <a:r>
+              <a:rPr lang="en-US" dirty="0"/>
+              <a:t>DNS </a:t>
+            </a:r>
+            <a:r>
+              <a:rPr lang="ru-RU" dirty="0"/>
+              <a:t>имя мастера не изменилось, то достаточно </a:t>
+            </a:r>
+            <a:r>
+              <a:rPr lang="ru-RU" dirty="0" err="1"/>
+              <a:t>ретраев</a:t>
+            </a:r>
+            <a:r>
+              <a:rPr lang="ru-RU" dirty="0"/>
+              <a:t> на стороне </a:t>
+            </a:r>
+            <a:r>
+              <a:rPr lang="en-US" dirty="0" err="1"/>
+              <a:t>debezium</a:t>
+            </a:r>
+            <a:endParaRPr lang="ru-RU" dirty="0"/>
+          </a:p>
+        </p:txBody>
+      </p:sp>
+    </p:spTree>
+    <p:extLst>
+      <p:ext uri="{BB962C8B-B14F-4D97-AF65-F5344CB8AC3E}">
+        <p14:creationId xmlns:p14="http://schemas.microsoft.com/office/powerpoint/2010/main" val="2646893299"/>
+      </p:ext>
+    </p:extLst>
+  </p:cSld>
+  <p:clrMapOvr>
+    <a:masterClrMapping/>
+  </p:clrMapOvr>
+</p:sld>
+</file>
+
+<file path=ppt/slides/slide29.xml><?xml version="1.0" encoding="utf-8"?>
+<p:sld xmlns:a="http://schemas.openxmlformats.org/drawingml/2006/main" xmlns:r="http://schemas.openxmlformats.org/officeDocument/2006/relationships" xmlns:p="http://schemas.openxmlformats.org/presentationml/2006/main">
+  <p:cSld>
+    <p:spTree>
+      <p:nvGrpSpPr>
+        <p:cNvPr id="1" name=""/>
+        <p:cNvGrpSpPr/>
+        <p:nvPr/>
+      </p:nvGrpSpPr>
+      <p:grpSpPr>
+        <a:xfrm>
+          <a:off x="0" y="0"/>
+          <a:ext cx="0" cy="0"/>
+          <a:chOff x="0" y="0"/>
+          <a:chExt cx="0" cy="0"/>
+        </a:xfrm>
+      </p:grpSpPr>
+      <p:sp>
+        <p:nvSpPr>
+          <p:cNvPr id="2" name="Title 1">
+            <a:extLst>
+              <a:ext uri="{FF2B5EF4-FFF2-40B4-BE49-F238E27FC236}">
+                <a16:creationId xmlns:a16="http://schemas.microsoft.com/office/drawing/2014/main" id="{00888323-12E8-8C4F-8E27-23BD5B7DEE03}"/>
+              </a:ext>
+            </a:extLst>
+          </p:cNvPr>
+          <p:cNvSpPr>
+            <a:spLocks noGrp="1"/>
+          </p:cNvSpPr>
+          <p:nvPr>
+            <p:ph type="title"/>
+          </p:nvPr>
+        </p:nvSpPr>
+        <p:spPr>
+          <a:xfrm>
+            <a:off x="0" y="18255"/>
+            <a:ext cx="10515600" cy="1325563"/>
+          </a:xfrm>
+        </p:spPr>
+        <p:txBody>
+          <a:bodyPr/>
+          <a:lstStyle/>
+          <a:p>
+            <a:r>
+              <a:rPr lang="en-US" dirty="0" err="1"/>
+              <a:t>Debezium</a:t>
+            </a:r>
+            <a:r>
+              <a:rPr lang="en-US" dirty="0"/>
+              <a:t>: </a:t>
+            </a:r>
+            <a:r>
+              <a:rPr lang="en-US" dirty="0" err="1"/>
+              <a:t>cdc</a:t>
+            </a:r>
+            <a:r>
+              <a:rPr lang="en-US" dirty="0"/>
+              <a:t> </a:t>
+            </a:r>
+            <a:r>
+              <a:rPr lang="ru-RU" dirty="0"/>
+              <a:t>для </a:t>
+            </a:r>
+            <a:r>
+              <a:rPr lang="ru-RU" dirty="0" err="1"/>
+              <a:t>шардов</a:t>
+            </a:r>
+            <a:endParaRPr lang="en-US" dirty="0"/>
+          </a:p>
+        </p:txBody>
+      </p:sp>
+      <p:sp>
+        <p:nvSpPr>
+          <p:cNvPr id="3" name="Content Placeholder 2">
+            <a:extLst>
+              <a:ext uri="{FF2B5EF4-FFF2-40B4-BE49-F238E27FC236}">
+                <a16:creationId xmlns:a16="http://schemas.microsoft.com/office/drawing/2014/main" id="{DA11F9D3-C291-2245-AEA5-8D09537FB4E5}"/>
+              </a:ext>
+            </a:extLst>
+          </p:cNvPr>
+          <p:cNvSpPr>
+            <a:spLocks noGrp="1"/>
+          </p:cNvSpPr>
+          <p:nvPr>
+            <p:ph idx="1"/>
+          </p:nvPr>
+        </p:nvSpPr>
+        <p:spPr>
+          <a:xfrm>
+            <a:off x="0" y="1343818"/>
+            <a:ext cx="10515600" cy="4351338"/>
+          </a:xfrm>
+        </p:spPr>
+        <p:txBody>
+          <a:bodyPr>
+            <a:normAutofit/>
+          </a:bodyPr>
+          <a:lstStyle/>
+          <a:p>
+            <a:r>
+              <a:rPr lang="ru-RU" dirty="0"/>
+              <a:t>Контекст: нужно перехватывать изменения по заданному набору таблиц в разных </a:t>
+            </a:r>
+            <a:r>
+              <a:rPr lang="ru-RU" dirty="0" err="1"/>
+              <a:t>шардах</a:t>
+            </a:r>
+            <a:endParaRPr lang="ru-RU" dirty="0"/>
+          </a:p>
+          <a:p>
+            <a:r>
+              <a:rPr lang="ru-RU" dirty="0"/>
+              <a:t>Проблема: </a:t>
+            </a:r>
+            <a:r>
+              <a:rPr lang="ru-RU" dirty="0" err="1"/>
+              <a:t>эвенты</a:t>
+            </a:r>
+            <a:r>
+              <a:rPr lang="ru-RU" dirty="0"/>
+              <a:t> по одинаковым таблицам сохраняются в разные топики</a:t>
+            </a:r>
+          </a:p>
+          <a:p>
+            <a:r>
+              <a:rPr lang="ru-RU" dirty="0"/>
+              <a:t>Решение:</a:t>
+            </a:r>
+          </a:p>
+          <a:p>
+            <a:pPr lvl="1"/>
+            <a:r>
+              <a:rPr lang="ru-RU" dirty="0"/>
+              <a:t>Настройка </a:t>
+            </a:r>
+            <a:r>
+              <a:rPr lang="ru-RU" dirty="0" err="1"/>
+              <a:t>роутинга</a:t>
+            </a:r>
+            <a:r>
+              <a:rPr lang="ru-RU" dirty="0"/>
+              <a:t> таблиц</a:t>
+            </a:r>
+          </a:p>
+        </p:txBody>
+      </p:sp>
+    </p:spTree>
+    <p:extLst>
+      <p:ext uri="{BB962C8B-B14F-4D97-AF65-F5344CB8AC3E}">
+        <p14:creationId xmlns:p14="http://schemas.microsoft.com/office/powerpoint/2010/main" val="2860038133"/>
       </p:ext>
     </p:extLst>
   </p:cSld>
@@ -6690,6 +7151,584 @@
     <p:extLst>
       <p:ext uri="{BB962C8B-B14F-4D97-AF65-F5344CB8AC3E}">
         <p14:creationId xmlns:p14="http://schemas.microsoft.com/office/powerpoint/2010/main" val="3701959771"/>
+      </p:ext>
+    </p:extLst>
+  </p:cSld>
+  <p:clrMapOvr>
+    <a:masterClrMapping/>
+  </p:clrMapOvr>
+</p:sld>
+</file>
+
+<file path=ppt/slides/slide30.xml><?xml version="1.0" encoding="utf-8"?>
+<p:sld xmlns:a="http://schemas.openxmlformats.org/drawingml/2006/main" xmlns:r="http://schemas.openxmlformats.org/officeDocument/2006/relationships" xmlns:p="http://schemas.openxmlformats.org/presentationml/2006/main">
+  <p:cSld>
+    <p:spTree>
+      <p:nvGrpSpPr>
+        <p:cNvPr id="1" name=""/>
+        <p:cNvGrpSpPr/>
+        <p:nvPr/>
+      </p:nvGrpSpPr>
+      <p:grpSpPr>
+        <a:xfrm>
+          <a:off x="0" y="0"/>
+          <a:ext cx="0" cy="0"/>
+          <a:chOff x="0" y="0"/>
+          <a:chExt cx="0" cy="0"/>
+        </a:xfrm>
+      </p:grpSpPr>
+      <p:sp>
+        <p:nvSpPr>
+          <p:cNvPr id="2" name="Title 1">
+            <a:extLst>
+              <a:ext uri="{FF2B5EF4-FFF2-40B4-BE49-F238E27FC236}">
+                <a16:creationId xmlns:a16="http://schemas.microsoft.com/office/drawing/2014/main" id="{00888323-12E8-8C4F-8E27-23BD5B7DEE03}"/>
+              </a:ext>
+            </a:extLst>
+          </p:cNvPr>
+          <p:cNvSpPr>
+            <a:spLocks noGrp="1"/>
+          </p:cNvSpPr>
+          <p:nvPr>
+            <p:ph type="title"/>
+          </p:nvPr>
+        </p:nvSpPr>
+        <p:spPr>
+          <a:xfrm>
+            <a:off x="0" y="18255"/>
+            <a:ext cx="10515600" cy="1325563"/>
+          </a:xfrm>
+        </p:spPr>
+        <p:txBody>
+          <a:bodyPr/>
+          <a:lstStyle/>
+          <a:p>
+            <a:r>
+              <a:rPr lang="en-US" dirty="0" err="1"/>
+              <a:t>Debezium</a:t>
+            </a:r>
+            <a:r>
+              <a:rPr lang="en-US" dirty="0"/>
+              <a:t>: </a:t>
+            </a:r>
+            <a:r>
+              <a:rPr lang="en-US" dirty="0" err="1"/>
+              <a:t>cdc</a:t>
+            </a:r>
+            <a:r>
+              <a:rPr lang="en-US" dirty="0"/>
+              <a:t> </a:t>
+            </a:r>
+            <a:r>
+              <a:rPr lang="ru-RU" dirty="0"/>
+              <a:t>для </a:t>
+            </a:r>
+            <a:r>
+              <a:rPr lang="ru-RU" dirty="0" err="1"/>
+              <a:t>шардов</a:t>
+            </a:r>
+            <a:endParaRPr lang="en-US" dirty="0"/>
+          </a:p>
+        </p:txBody>
+      </p:sp>
+      <p:sp>
+        <p:nvSpPr>
+          <p:cNvPr id="3" name="Content Placeholder 2">
+            <a:extLst>
+              <a:ext uri="{FF2B5EF4-FFF2-40B4-BE49-F238E27FC236}">
+                <a16:creationId xmlns:a16="http://schemas.microsoft.com/office/drawing/2014/main" id="{DA11F9D3-C291-2245-AEA5-8D09537FB4E5}"/>
+              </a:ext>
+            </a:extLst>
+          </p:cNvPr>
+          <p:cNvSpPr>
+            <a:spLocks noGrp="1"/>
+          </p:cNvSpPr>
+          <p:nvPr>
+            <p:ph idx="1"/>
+          </p:nvPr>
+        </p:nvSpPr>
+        <p:spPr>
+          <a:xfrm>
+            <a:off x="0" y="1343818"/>
+            <a:ext cx="10515600" cy="4351338"/>
+          </a:xfrm>
+        </p:spPr>
+        <p:txBody>
+          <a:bodyPr>
+            <a:normAutofit fontScale="92500" lnSpcReduction="10000"/>
+          </a:bodyPr>
+          <a:lstStyle/>
+          <a:p>
+            <a:r>
+              <a:rPr lang="ru-RU" dirty="0"/>
+              <a:t>Контекст: нужно перехватывать изменения по заданному набору таблиц в разных </a:t>
+            </a:r>
+            <a:r>
+              <a:rPr lang="ru-RU" dirty="0" err="1"/>
+              <a:t>шардах</a:t>
+            </a:r>
+            <a:r>
+              <a:rPr lang="ru-RU" dirty="0"/>
+              <a:t> / </a:t>
+            </a:r>
+            <a:r>
+              <a:rPr lang="en-US" dirty="0" err="1"/>
+              <a:t>debezium</a:t>
+            </a:r>
+            <a:r>
+              <a:rPr lang="ru-RU" dirty="0"/>
+              <a:t> использует </a:t>
+            </a:r>
+            <a:r>
+              <a:rPr lang="en-US" dirty="0" err="1"/>
+              <a:t>avro</a:t>
+            </a:r>
+            <a:endParaRPr lang="ru-RU" dirty="0"/>
+          </a:p>
+          <a:p>
+            <a:r>
+              <a:rPr lang="ru-RU" dirty="0"/>
+              <a:t>Проблема </a:t>
+            </a:r>
+            <a:r>
+              <a:rPr lang="en-US" dirty="0"/>
+              <a:t>#1</a:t>
+            </a:r>
+            <a:r>
+              <a:rPr lang="ru-RU" dirty="0"/>
+              <a:t>: </a:t>
+            </a:r>
+            <a:r>
+              <a:rPr lang="ru-RU" dirty="0" err="1"/>
+              <a:t>эвенты</a:t>
+            </a:r>
+            <a:r>
+              <a:rPr lang="ru-RU" dirty="0"/>
+              <a:t> по одинаковым таблицам имею одинаковую структуру, но </a:t>
+            </a:r>
+            <a:r>
+              <a:rPr lang="en-US" dirty="0" err="1"/>
+              <a:t>debezium</a:t>
+            </a:r>
+            <a:r>
+              <a:rPr lang="en-US" dirty="0"/>
+              <a:t> </a:t>
+            </a:r>
+            <a:r>
+              <a:rPr lang="ru-RU" dirty="0"/>
+              <a:t>генерирует разные несовместимые схемы</a:t>
+            </a:r>
+          </a:p>
+          <a:p>
+            <a:r>
+              <a:rPr lang="ru-RU" dirty="0"/>
+              <a:t>Решение:</a:t>
+            </a:r>
+          </a:p>
+          <a:p>
+            <a:pPr lvl="1"/>
+            <a:r>
+              <a:rPr lang="ru-RU" dirty="0"/>
+              <a:t>Трансформ для переименования рекордов</a:t>
+            </a:r>
+            <a:endParaRPr lang="en-US" dirty="0"/>
+          </a:p>
+          <a:p>
+            <a:r>
+              <a:rPr lang="ru-RU" dirty="0"/>
+              <a:t>Проблема </a:t>
+            </a:r>
+            <a:r>
+              <a:rPr lang="en-US" dirty="0"/>
+              <a:t>#2: </a:t>
+            </a:r>
+            <a:r>
+              <a:rPr lang="ru-RU" dirty="0"/>
+              <a:t>переименование сработало только на верхнем уровне. Вложенные структуры также с разным </a:t>
+            </a:r>
+            <a:r>
+              <a:rPr lang="ru-RU" dirty="0" err="1"/>
+              <a:t>неймингом</a:t>
+            </a:r>
+            <a:endParaRPr lang="ru-RU" dirty="0"/>
+          </a:p>
+          <a:p>
+            <a:r>
+              <a:rPr lang="ru-RU" dirty="0"/>
+              <a:t>Решение:</a:t>
+            </a:r>
+          </a:p>
+          <a:p>
+            <a:pPr lvl="1"/>
+            <a:r>
+              <a:rPr lang="ru-RU" dirty="0" err="1"/>
+              <a:t>Кастомный</a:t>
+            </a:r>
+            <a:r>
+              <a:rPr lang="ru-RU" dirty="0"/>
+              <a:t> трансформ, который переименовывает в том числе и вложенные структуры</a:t>
+            </a:r>
+          </a:p>
+        </p:txBody>
+      </p:sp>
+    </p:spTree>
+    <p:extLst>
+      <p:ext uri="{BB962C8B-B14F-4D97-AF65-F5344CB8AC3E}">
+        <p14:creationId xmlns:p14="http://schemas.microsoft.com/office/powerpoint/2010/main" val="167980905"/>
+      </p:ext>
+    </p:extLst>
+  </p:cSld>
+  <p:clrMapOvr>
+    <a:masterClrMapping/>
+  </p:clrMapOvr>
+</p:sld>
+</file>
+
+<file path=ppt/slides/slide31.xml><?xml version="1.0" encoding="utf-8"?>
+<p:sld xmlns:a="http://schemas.openxmlformats.org/drawingml/2006/main" xmlns:r="http://schemas.openxmlformats.org/officeDocument/2006/relationships" xmlns:p="http://schemas.openxmlformats.org/presentationml/2006/main">
+  <p:cSld>
+    <p:spTree>
+      <p:nvGrpSpPr>
+        <p:cNvPr id="1" name=""/>
+        <p:cNvGrpSpPr/>
+        <p:nvPr/>
+      </p:nvGrpSpPr>
+      <p:grpSpPr>
+        <a:xfrm>
+          <a:off x="0" y="0"/>
+          <a:ext cx="0" cy="0"/>
+          <a:chOff x="0" y="0"/>
+          <a:chExt cx="0" cy="0"/>
+        </a:xfrm>
+      </p:grpSpPr>
+      <p:sp>
+        <p:nvSpPr>
+          <p:cNvPr id="2" name="Title 1">
+            <a:extLst>
+              <a:ext uri="{FF2B5EF4-FFF2-40B4-BE49-F238E27FC236}">
+                <a16:creationId xmlns:a16="http://schemas.microsoft.com/office/drawing/2014/main" id="{00888323-12E8-8C4F-8E27-23BD5B7DEE03}"/>
+              </a:ext>
+            </a:extLst>
+          </p:cNvPr>
+          <p:cNvSpPr>
+            <a:spLocks noGrp="1"/>
+          </p:cNvSpPr>
+          <p:nvPr>
+            <p:ph type="title"/>
+          </p:nvPr>
+        </p:nvSpPr>
+        <p:spPr>
+          <a:xfrm>
+            <a:off x="0" y="18255"/>
+            <a:ext cx="10515600" cy="1325563"/>
+          </a:xfrm>
+        </p:spPr>
+        <p:txBody>
+          <a:bodyPr/>
+          <a:lstStyle/>
+          <a:p>
+            <a:r>
+              <a:rPr lang="en-US" dirty="0" err="1"/>
+              <a:t>Debezium</a:t>
+            </a:r>
+            <a:r>
+              <a:rPr lang="en-US" dirty="0"/>
+              <a:t>: timestamp / </a:t>
+            </a:r>
+            <a:r>
+              <a:rPr lang="en-US" dirty="0" err="1"/>
+              <a:t>timestamptz</a:t>
+            </a:r>
+            <a:endParaRPr lang="en-US" dirty="0"/>
+          </a:p>
+        </p:txBody>
+      </p:sp>
+      <p:sp>
+        <p:nvSpPr>
+          <p:cNvPr id="3" name="Content Placeholder 2">
+            <a:extLst>
+              <a:ext uri="{FF2B5EF4-FFF2-40B4-BE49-F238E27FC236}">
+                <a16:creationId xmlns:a16="http://schemas.microsoft.com/office/drawing/2014/main" id="{DA11F9D3-C291-2245-AEA5-8D09537FB4E5}"/>
+              </a:ext>
+            </a:extLst>
+          </p:cNvPr>
+          <p:cNvSpPr>
+            <a:spLocks noGrp="1"/>
+          </p:cNvSpPr>
+          <p:nvPr>
+            <p:ph idx="1"/>
+          </p:nvPr>
+        </p:nvSpPr>
+        <p:spPr>
+          <a:xfrm>
+            <a:off x="0" y="1343818"/>
+            <a:ext cx="10515600" cy="4351338"/>
+          </a:xfrm>
+        </p:spPr>
+        <p:txBody>
+          <a:bodyPr>
+            <a:normAutofit/>
+          </a:bodyPr>
+          <a:lstStyle/>
+          <a:p>
+            <a:r>
+              <a:rPr lang="ru-RU" dirty="0"/>
+              <a:t>Контекст: нужно реплицировать </a:t>
+            </a:r>
+            <a:r>
+              <a:rPr lang="ru-RU" dirty="0" err="1"/>
+              <a:t>таблцы</a:t>
+            </a:r>
+            <a:r>
+              <a:rPr lang="ru-RU" dirty="0"/>
+              <a:t> с колонками типов </a:t>
+            </a:r>
+            <a:r>
+              <a:rPr lang="en-US" dirty="0"/>
+              <a:t>timestamp / </a:t>
+            </a:r>
+            <a:r>
+              <a:rPr lang="en-US" dirty="0" err="1"/>
+              <a:t>timestamptz</a:t>
+            </a:r>
+            <a:endParaRPr lang="ru-RU" dirty="0"/>
+          </a:p>
+          <a:p>
+            <a:r>
+              <a:rPr lang="ru-RU" dirty="0"/>
+              <a:t>Проблема </a:t>
+            </a:r>
+            <a:r>
+              <a:rPr lang="en-US" dirty="0"/>
+              <a:t>#1</a:t>
+            </a:r>
+            <a:r>
+              <a:rPr lang="ru-RU" dirty="0"/>
+              <a:t>: </a:t>
+            </a:r>
+            <a:r>
+              <a:rPr lang="en-US" dirty="0" err="1"/>
+              <a:t>debezium</a:t>
+            </a:r>
+            <a:r>
+              <a:rPr lang="en-US" dirty="0"/>
+              <a:t> </a:t>
+            </a:r>
+            <a:r>
+              <a:rPr lang="ru-RU" dirty="0"/>
+              <a:t>конвертирует один тип в </a:t>
+            </a:r>
+            <a:r>
+              <a:rPr lang="en-US" dirty="0"/>
+              <a:t>long, </a:t>
+            </a:r>
+            <a:r>
+              <a:rPr lang="ru-RU" dirty="0"/>
+              <a:t>другой в </a:t>
+            </a:r>
+            <a:r>
+              <a:rPr lang="en-US" dirty="0"/>
+              <a:t>string</a:t>
+            </a:r>
+            <a:endParaRPr lang="ru-RU" dirty="0"/>
+          </a:p>
+          <a:p>
+            <a:r>
+              <a:rPr lang="ru-RU" dirty="0"/>
+              <a:t>Решение:</a:t>
+            </a:r>
+          </a:p>
+          <a:p>
+            <a:pPr lvl="1"/>
+            <a:r>
+              <a:rPr lang="ru-RU" dirty="0"/>
+              <a:t>Трансформ для конвертации типов</a:t>
+            </a:r>
+          </a:p>
+          <a:p>
+            <a:pPr lvl="1"/>
+            <a:r>
+              <a:rPr lang="ru-RU" dirty="0"/>
+              <a:t>Указывать явно </a:t>
+            </a:r>
+            <a:r>
+              <a:rPr lang="en-US" dirty="0" err="1"/>
+              <a:t>timezone</a:t>
+            </a:r>
+            <a:r>
+              <a:rPr lang="en-US" dirty="0"/>
+              <a:t>, </a:t>
+            </a:r>
+            <a:r>
+              <a:rPr lang="ru-RU" dirty="0"/>
+              <a:t> которую нужно конвертировать </a:t>
+            </a:r>
+            <a:r>
+              <a:rPr lang="en-US" dirty="0" err="1"/>
+              <a:t>timestamptz</a:t>
+            </a:r>
+            <a:endParaRPr lang="en-US" dirty="0"/>
+          </a:p>
+        </p:txBody>
+      </p:sp>
+    </p:spTree>
+    <p:extLst>
+      <p:ext uri="{BB962C8B-B14F-4D97-AF65-F5344CB8AC3E}">
+        <p14:creationId xmlns:p14="http://schemas.microsoft.com/office/powerpoint/2010/main" val="281530354"/>
+      </p:ext>
+    </p:extLst>
+  </p:cSld>
+  <p:clrMapOvr>
+    <a:masterClrMapping/>
+  </p:clrMapOvr>
+</p:sld>
+</file>
+
+<file path=ppt/slides/slide32.xml><?xml version="1.0" encoding="utf-8"?>
+<p:sld xmlns:a="http://schemas.openxmlformats.org/drawingml/2006/main" xmlns:r="http://schemas.openxmlformats.org/officeDocument/2006/relationships" xmlns:p="http://schemas.openxmlformats.org/presentationml/2006/main">
+  <p:cSld>
+    <p:spTree>
+      <p:nvGrpSpPr>
+        <p:cNvPr id="1" name=""/>
+        <p:cNvGrpSpPr/>
+        <p:nvPr/>
+      </p:nvGrpSpPr>
+      <p:grpSpPr>
+        <a:xfrm>
+          <a:off x="0" y="0"/>
+          <a:ext cx="0" cy="0"/>
+          <a:chOff x="0" y="0"/>
+          <a:chExt cx="0" cy="0"/>
+        </a:xfrm>
+      </p:grpSpPr>
+      <p:sp>
+        <p:nvSpPr>
+          <p:cNvPr id="2" name="Title 1">
+            <a:extLst>
+              <a:ext uri="{FF2B5EF4-FFF2-40B4-BE49-F238E27FC236}">
+                <a16:creationId xmlns:a16="http://schemas.microsoft.com/office/drawing/2014/main" id="{00888323-12E8-8C4F-8E27-23BD5B7DEE03}"/>
+              </a:ext>
+            </a:extLst>
+          </p:cNvPr>
+          <p:cNvSpPr>
+            <a:spLocks noGrp="1"/>
+          </p:cNvSpPr>
+          <p:nvPr>
+            <p:ph type="title"/>
+          </p:nvPr>
+        </p:nvSpPr>
+        <p:spPr>
+          <a:xfrm>
+            <a:off x="0" y="18255"/>
+            <a:ext cx="10515600" cy="1325563"/>
+          </a:xfrm>
+        </p:spPr>
+        <p:txBody>
+          <a:bodyPr/>
+          <a:lstStyle/>
+          <a:p>
+            <a:r>
+              <a:rPr lang="ru-RU" dirty="0"/>
+              <a:t>Выводы</a:t>
+            </a:r>
+            <a:endParaRPr lang="en-US" dirty="0"/>
+          </a:p>
+        </p:txBody>
+      </p:sp>
+      <p:sp>
+        <p:nvSpPr>
+          <p:cNvPr id="3" name="Content Placeholder 2">
+            <a:extLst>
+              <a:ext uri="{FF2B5EF4-FFF2-40B4-BE49-F238E27FC236}">
+                <a16:creationId xmlns:a16="http://schemas.microsoft.com/office/drawing/2014/main" id="{DA11F9D3-C291-2245-AEA5-8D09537FB4E5}"/>
+              </a:ext>
+            </a:extLst>
+          </p:cNvPr>
+          <p:cNvSpPr>
+            <a:spLocks noGrp="1"/>
+          </p:cNvSpPr>
+          <p:nvPr>
+            <p:ph idx="1"/>
+          </p:nvPr>
+        </p:nvSpPr>
+        <p:spPr>
+          <a:xfrm>
+            <a:off x="0" y="1343818"/>
+            <a:ext cx="10515600" cy="4351338"/>
+          </a:xfrm>
+        </p:spPr>
+        <p:txBody>
+          <a:bodyPr>
+            <a:normAutofit lnSpcReduction="10000"/>
+          </a:bodyPr>
+          <a:lstStyle/>
+          <a:p>
+            <a:r>
+              <a:rPr lang="ru-RU" dirty="0"/>
+              <a:t>Одну и ту же задачу можно решать разными способами</a:t>
+            </a:r>
+          </a:p>
+          <a:p>
+            <a:r>
+              <a:rPr lang="ru-RU" dirty="0"/>
+              <a:t>Каждый способ имеет право на жизнь и выбор конкретного решения зависит от таких факторов, как например:</a:t>
+            </a:r>
+          </a:p>
+          <a:p>
+            <a:pPr lvl="1"/>
+            <a:r>
+              <a:rPr lang="ru-RU" dirty="0"/>
+              <a:t>Стоимость разработки</a:t>
+            </a:r>
+          </a:p>
+          <a:p>
+            <a:pPr lvl="1"/>
+            <a:r>
+              <a:rPr lang="ru-RU" dirty="0"/>
+              <a:t>Влияние на процессы владельцев БД</a:t>
+            </a:r>
+          </a:p>
+          <a:p>
+            <a:pPr lvl="1"/>
+            <a:r>
+              <a:rPr lang="ru-RU" dirty="0"/>
+              <a:t>Влияние на БД</a:t>
+            </a:r>
+          </a:p>
+          <a:p>
+            <a:pPr lvl="1"/>
+            <a:r>
+              <a:rPr lang="ru-RU" dirty="0"/>
+              <a:t>Возможность адаптироваться под новые требования</a:t>
+            </a:r>
+          </a:p>
+          <a:p>
+            <a:pPr lvl="1"/>
+            <a:r>
+              <a:rPr lang="ru-RU" dirty="0"/>
+              <a:t>Гарантии доставки</a:t>
+            </a:r>
+          </a:p>
+          <a:p>
+            <a:r>
+              <a:rPr lang="en-US" dirty="0" err="1"/>
+              <a:t>Debezium</a:t>
+            </a:r>
+            <a:r>
+              <a:rPr lang="en-US" dirty="0"/>
+              <a:t> </a:t>
+            </a:r>
+            <a:r>
+              <a:rPr lang="ru-RU" dirty="0"/>
+              <a:t>может показаться «готовым» решением, но для некоторых задач может оказаться проще использовать другой подход</a:t>
+            </a:r>
+          </a:p>
+        </p:txBody>
+      </p:sp>
+    </p:spTree>
+    <p:extLst>
+      <p:ext uri="{BB962C8B-B14F-4D97-AF65-F5344CB8AC3E}">
+        <p14:creationId xmlns:p14="http://schemas.microsoft.com/office/powerpoint/2010/main" val="1224448155"/>
       </p:ext>
     </p:extLst>
   </p:cSld>
@@ -7106,6 +8145,50 @@
           <a:bodyPr/>
           <a:lstStyle/>
           <a:p>
+            <a:r>
+              <a:rPr lang="ru-RU" dirty="0"/>
+              <a:t>Подробности о механизме</a:t>
+            </a:r>
+          </a:p>
+          <a:p>
+            <a:r>
+              <a:rPr lang="ru-RU" dirty="0"/>
+              <a:t>В каких случаях может пригодиться</a:t>
+            </a:r>
+          </a:p>
+          <a:p>
+            <a:pPr lvl="1"/>
+            <a:r>
+              <a:rPr lang="ru-RU" dirty="0"/>
+              <a:t>Когда нет необходимости в отслеживании абсолютно каждых изменений, но есть необходимость в отслеживании «как таковом»</a:t>
+            </a:r>
+          </a:p>
+          <a:p>
+            <a:pPr lvl="1"/>
+            <a:r>
+              <a:rPr lang="ru-RU" dirty="0"/>
+              <a:t>Когда система толерантна к потерям </a:t>
+            </a:r>
+            <a:r>
+              <a:rPr lang="ru-RU" dirty="0" err="1"/>
+              <a:t>эвентов</a:t>
+            </a:r>
+            <a:endParaRPr lang="ru-RU" dirty="0"/>
+          </a:p>
+          <a:p>
+            <a:pPr lvl="1"/>
+            <a:r>
+              <a:rPr lang="ru-RU" dirty="0"/>
+              <a:t>Если нужно построить простую </a:t>
+            </a:r>
+            <a:r>
+              <a:rPr lang="en-US" dirty="0"/>
+              <a:t>event-sourcing </a:t>
+            </a:r>
+            <a:r>
+              <a:rPr lang="ru-RU" dirty="0"/>
+              <a:t>модель взаимодействия</a:t>
+            </a:r>
             <a:endParaRPr lang="en-US" dirty="0"/>
           </a:p>
         </p:txBody>
@@ -7182,7 +8265,7 @@
             </a:r>
             <a:r>
               <a:rPr lang="en-US" dirty="0"/>
-              <a:t>SELECT</a:t>
+              <a:t>LISTEN/NOTIFY</a:t>
             </a:r>
           </a:p>
         </p:txBody>
@@ -7213,6 +8296,28 @@
           <a:bodyPr/>
           <a:lstStyle/>
           <a:p>
+            <a:r>
+              <a:rPr lang="ru-RU" dirty="0"/>
+              <a:t>Список ограничений</a:t>
+            </a:r>
+          </a:p>
+          <a:p>
+            <a:r>
+              <a:rPr lang="ru-RU" dirty="0"/>
+              <a:t>Требует вмешательства на клиентское стороне (кто обновляет таблицы) – клиент должен отправлять нотификации</a:t>
+            </a:r>
+          </a:p>
+          <a:p>
+            <a:r>
+              <a:rPr lang="ru-RU" dirty="0"/>
+              <a:t>Есть отдельная очередь для хранения необработанных нотификаций. По умолчанию размер 8Гб</a:t>
+            </a:r>
+          </a:p>
+          <a:p>
+            <a:r>
+              <a:rPr lang="ru-RU" dirty="0"/>
+              <a:t>Гарантии доставки</a:t>
+            </a:r>
             <a:endParaRPr lang="en-US" dirty="0"/>
           </a:p>
         </p:txBody>
@@ -7220,7 +8325,7 @@
     </p:spTree>
     <p:extLst>
       <p:ext uri="{BB962C8B-B14F-4D97-AF65-F5344CB8AC3E}">
-        <p14:creationId xmlns:p14="http://schemas.microsoft.com/office/powerpoint/2010/main" val="137624388"/>
+        <p14:creationId xmlns:p14="http://schemas.microsoft.com/office/powerpoint/2010/main" val="3065819652"/>
       </p:ext>
     </p:extLst>
   </p:cSld>
@@ -7289,7 +8394,7 @@
             </a:r>
             <a:r>
               <a:rPr lang="en-US" dirty="0"/>
-              <a:t>Triggers / Outbox</a:t>
+              <a:t>LISTEN/NOTIFY</a:t>
             </a:r>
           </a:p>
         </p:txBody>
@@ -7320,14 +8425,21 @@
           <a:bodyPr/>
           <a:lstStyle/>
           <a:p>
-            <a:endParaRPr lang="en-US" dirty="0"/>
+            <a:r>
+              <a:rPr lang="ru-RU" dirty="0"/>
+              <a:t>Пример настройки всего процесса с использованием </a:t>
+            </a:r>
+            <a:r>
+              <a:rPr lang="en-US" dirty="0"/>
+              <a:t>apache camel</a:t>
+            </a:r>
           </a:p>
         </p:txBody>
       </p:sp>
     </p:spTree>
     <p:extLst>
       <p:ext uri="{BB962C8B-B14F-4D97-AF65-F5344CB8AC3E}">
-        <p14:creationId xmlns:p14="http://schemas.microsoft.com/office/powerpoint/2010/main" val="296076661"/>
+        <p14:creationId xmlns:p14="http://schemas.microsoft.com/office/powerpoint/2010/main" val="137624388"/>
       </p:ext>
     </p:extLst>
   </p:cSld>
@@ -7377,29 +8489,100 @@
           </a:xfrm>
         </p:spPr>
         <p:txBody>
+          <a:bodyPr>
+            <a:normAutofit/>
+          </a:bodyPr>
+          <a:lstStyle/>
+          <a:p>
+            <a:r>
+              <a:rPr lang="ru-RU" dirty="0"/>
+              <a:t>Известные и не очень способы организации </a:t>
+            </a:r>
+            <a:r>
+              <a:rPr lang="en-US" dirty="0"/>
+              <a:t>CDC</a:t>
+            </a:r>
+            <a:r>
+              <a:rPr lang="ru-RU" dirty="0"/>
+              <a:t>: </a:t>
+            </a:r>
+            <a:r>
+              <a:rPr lang="en-US" dirty="0"/>
+              <a:t>SELECT</a:t>
+            </a:r>
+          </a:p>
+        </p:txBody>
+      </p:sp>
+      <p:sp>
+        <p:nvSpPr>
+          <p:cNvPr id="3" name="Content Placeholder 2">
+            <a:extLst>
+              <a:ext uri="{FF2B5EF4-FFF2-40B4-BE49-F238E27FC236}">
+                <a16:creationId xmlns:a16="http://schemas.microsoft.com/office/drawing/2014/main" id="{DA11F9D3-C291-2245-AEA5-8D09537FB4E5}"/>
+              </a:ext>
+            </a:extLst>
+          </p:cNvPr>
+          <p:cNvSpPr>
+            <a:spLocks noGrp="1"/>
+          </p:cNvSpPr>
+          <p:nvPr>
+            <p:ph idx="1"/>
+          </p:nvPr>
+        </p:nvSpPr>
+        <p:spPr>
+          <a:xfrm>
+            <a:off x="0" y="1343818"/>
+            <a:ext cx="10515600" cy="4351338"/>
+          </a:xfrm>
+        </p:spPr>
+        <p:txBody>
           <a:bodyPr/>
           <a:lstStyle/>
           <a:p>
             <a:r>
-              <a:rPr lang="en-US" dirty="0" err="1"/>
-              <a:t>Debezium</a:t>
-            </a:r>
-            <a:r>
-              <a:rPr lang="en-US" dirty="0"/>
-              <a:t>: </a:t>
-            </a:r>
-            <a:r>
-              <a:rPr lang="ru-RU" dirty="0"/>
-              <a:t>где можно споткнуться</a:t>
-            </a:r>
-            <a:endParaRPr lang="en-US" dirty="0"/>
+              <a:rPr lang="ru-RU" dirty="0"/>
+              <a:t>Подробности о механизме: </a:t>
+            </a:r>
+            <a:r>
+              <a:rPr lang="en-US" dirty="0"/>
+              <a:t>SELECT </a:t>
+            </a:r>
+            <a:r>
+              <a:rPr lang="ru-RU" dirty="0"/>
+              <a:t>по колонке</a:t>
+            </a:r>
+          </a:p>
+          <a:p>
+            <a:r>
+              <a:rPr lang="ru-RU" dirty="0"/>
+              <a:t>Колонка должна быть монотонно</a:t>
+            </a:r>
+            <a:r>
+              <a:rPr lang="en-US" dirty="0"/>
+              <a:t>-</a:t>
+            </a:r>
+            <a:r>
+              <a:rPr lang="ru-RU" dirty="0"/>
+              <a:t>возрастающей </a:t>
+            </a:r>
+          </a:p>
+          <a:p>
+            <a:pPr lvl="1"/>
+            <a:r>
+              <a:rPr lang="ru-RU" dirty="0"/>
+              <a:t>Примеры: </a:t>
+            </a:r>
+            <a:r>
+              <a:rPr lang="en-US" dirty="0"/>
+              <a:t>serial id, timestamp</a:t>
+            </a:r>
           </a:p>
         </p:txBody>
       </p:sp>
     </p:spTree>
     <p:extLst>
       <p:ext uri="{BB962C8B-B14F-4D97-AF65-F5344CB8AC3E}">
-        <p14:creationId xmlns:p14="http://schemas.microsoft.com/office/powerpoint/2010/main" val="3464816970"/>
+        <p14:creationId xmlns:p14="http://schemas.microsoft.com/office/powerpoint/2010/main" val="1728951361"/>
       </p:ext>
     </p:extLst>
   </p:cSld>

</xml_diff>

<commit_message>
doc: update debezium presentation
</commit_message>
<xml_diff>
--- a/smartdata/cdc-via-debezium/debezium-smartdata2025.pptx
+++ b/smartdata/cdc-via-debezium/debezium-smartdata2025.pptx
@@ -22,21 +22,26 @@
     <p:sldId id="261" r:id="rId16"/>
     <p:sldId id="265" r:id="rId17"/>
     <p:sldId id="266" r:id="rId18"/>
-    <p:sldId id="287" r:id="rId19"/>
-    <p:sldId id="267" r:id="rId20"/>
-    <p:sldId id="268" r:id="rId21"/>
-    <p:sldId id="271" r:id="rId22"/>
-    <p:sldId id="272" r:id="rId23"/>
-    <p:sldId id="269" r:id="rId24"/>
-    <p:sldId id="270" r:id="rId25"/>
-    <p:sldId id="273" r:id="rId26"/>
-    <p:sldId id="278" r:id="rId27"/>
-    <p:sldId id="274" r:id="rId28"/>
-    <p:sldId id="275" r:id="rId29"/>
-    <p:sldId id="276" r:id="rId30"/>
-    <p:sldId id="277" r:id="rId31"/>
-    <p:sldId id="279" r:id="rId32"/>
-    <p:sldId id="280" r:id="rId33"/>
+    <p:sldId id="291" r:id="rId19"/>
+    <p:sldId id="287" r:id="rId20"/>
+    <p:sldId id="267" r:id="rId21"/>
+    <p:sldId id="268" r:id="rId22"/>
+    <p:sldId id="271" r:id="rId23"/>
+    <p:sldId id="272" r:id="rId24"/>
+    <p:sldId id="269" r:id="rId25"/>
+    <p:sldId id="270" r:id="rId26"/>
+    <p:sldId id="273" r:id="rId27"/>
+    <p:sldId id="278" r:id="rId28"/>
+    <p:sldId id="274" r:id="rId29"/>
+    <p:sldId id="275" r:id="rId30"/>
+    <p:sldId id="276" r:id="rId31"/>
+    <p:sldId id="277" r:id="rId32"/>
+    <p:sldId id="288" r:id="rId33"/>
+    <p:sldId id="290" r:id="rId34"/>
+    <p:sldId id="289" r:id="rId35"/>
+    <p:sldId id="279" r:id="rId36"/>
+    <p:sldId id="292" r:id="rId37"/>
+    <p:sldId id="280" r:id="rId38"/>
   </p:sldIdLst>
   <p:sldSz cx="12192000" cy="6858000"/>
   <p:notesSz cx="6858000" cy="9144000"/>
@@ -290,7 +295,7 @@
           <a:p>
             <a:fld id="{0A80387B-3432-BD42-8238-00F612919BB5}" type="datetimeFigureOut">
               <a:rPr lang="en-US" smtClean="0"/>
-              <a:t>8/19/25</a:t>
+              <a:t>8/20/25</a:t>
             </a:fld>
             <a:endParaRPr lang="en-US"/>
           </a:p>
@@ -488,7 +493,7 @@
           <a:p>
             <a:fld id="{0A80387B-3432-BD42-8238-00F612919BB5}" type="datetimeFigureOut">
               <a:rPr lang="en-US" smtClean="0"/>
-              <a:t>8/19/25</a:t>
+              <a:t>8/20/25</a:t>
             </a:fld>
             <a:endParaRPr lang="en-US"/>
           </a:p>
@@ -696,7 +701,7 @@
           <a:p>
             <a:fld id="{0A80387B-3432-BD42-8238-00F612919BB5}" type="datetimeFigureOut">
               <a:rPr lang="en-US" smtClean="0"/>
-              <a:t>8/19/25</a:t>
+              <a:t>8/20/25</a:t>
             </a:fld>
             <a:endParaRPr lang="en-US"/>
           </a:p>
@@ -894,7 +899,7 @@
           <a:p>
             <a:fld id="{0A80387B-3432-BD42-8238-00F612919BB5}" type="datetimeFigureOut">
               <a:rPr lang="en-US" smtClean="0"/>
-              <a:t>8/19/25</a:t>
+              <a:t>8/20/25</a:t>
             </a:fld>
             <a:endParaRPr lang="en-US"/>
           </a:p>
@@ -1169,7 +1174,7 @@
           <a:p>
             <a:fld id="{0A80387B-3432-BD42-8238-00F612919BB5}" type="datetimeFigureOut">
               <a:rPr lang="en-US" smtClean="0"/>
-              <a:t>8/19/25</a:t>
+              <a:t>8/20/25</a:t>
             </a:fld>
             <a:endParaRPr lang="en-US"/>
           </a:p>
@@ -1434,7 +1439,7 @@
           <a:p>
             <a:fld id="{0A80387B-3432-BD42-8238-00F612919BB5}" type="datetimeFigureOut">
               <a:rPr lang="en-US" smtClean="0"/>
-              <a:t>8/19/25</a:t>
+              <a:t>8/20/25</a:t>
             </a:fld>
             <a:endParaRPr lang="en-US"/>
           </a:p>
@@ -1846,7 +1851,7 @@
           <a:p>
             <a:fld id="{0A80387B-3432-BD42-8238-00F612919BB5}" type="datetimeFigureOut">
               <a:rPr lang="en-US" smtClean="0"/>
-              <a:t>8/19/25</a:t>
+              <a:t>8/20/25</a:t>
             </a:fld>
             <a:endParaRPr lang="en-US"/>
           </a:p>
@@ -1987,7 +1992,7 @@
           <a:p>
             <a:fld id="{0A80387B-3432-BD42-8238-00F612919BB5}" type="datetimeFigureOut">
               <a:rPr lang="en-US" smtClean="0"/>
-              <a:t>8/19/25</a:t>
+              <a:t>8/20/25</a:t>
             </a:fld>
             <a:endParaRPr lang="en-US"/>
           </a:p>
@@ -2100,7 +2105,7 @@
           <a:p>
             <a:fld id="{0A80387B-3432-BD42-8238-00F612919BB5}" type="datetimeFigureOut">
               <a:rPr lang="en-US" smtClean="0"/>
-              <a:t>8/19/25</a:t>
+              <a:t>8/20/25</a:t>
             </a:fld>
             <a:endParaRPr lang="en-US"/>
           </a:p>
@@ -2411,7 +2416,7 @@
           <a:p>
             <a:fld id="{0A80387B-3432-BD42-8238-00F612919BB5}" type="datetimeFigureOut">
               <a:rPr lang="en-US" smtClean="0"/>
-              <a:t>8/19/25</a:t>
+              <a:t>8/20/25</a:t>
             </a:fld>
             <a:endParaRPr lang="en-US"/>
           </a:p>
@@ -2699,7 +2704,7 @@
           <a:p>
             <a:fld id="{0A80387B-3432-BD42-8238-00F612919BB5}" type="datetimeFigureOut">
               <a:rPr lang="en-US" smtClean="0"/>
-              <a:t>8/19/25</a:t>
+              <a:t>8/20/25</a:t>
             </a:fld>
             <a:endParaRPr lang="en-US"/>
           </a:p>
@@ -2940,7 +2945,7 @@
           <a:p>
             <a:fld id="{0A80387B-3432-BD42-8238-00F612919BB5}" type="datetimeFigureOut">
               <a:rPr lang="en-US" smtClean="0"/>
-              <a:t>8/19/25</a:t>
+              <a:t>8/20/25</a:t>
             </a:fld>
             <a:endParaRPr lang="en-US"/>
           </a:p>
@@ -4657,7 +4662,15 @@
             </a:r>
             <a:r>
               <a:rPr lang="ru-RU" dirty="0"/>
-              <a:t>изменение списка реплицируемых таблиц</a:t>
+              <a:t>«базовый </a:t>
+            </a:r>
+            <a:r>
+              <a:rPr lang="ru-RU" dirty="0" err="1"/>
+              <a:t>сетап</a:t>
+            </a:r>
+            <a:r>
+              <a:rPr lang="ru-RU" dirty="0"/>
+              <a:t>»</a:t>
             </a:r>
             <a:endParaRPr lang="en-US" dirty="0"/>
           </a:p>
@@ -4686,115 +4699,12 @@
           </a:xfrm>
         </p:spPr>
         <p:txBody>
-          <a:bodyPr>
-            <a:normAutofit/>
-          </a:bodyPr>
-          <a:lstStyle/>
-          <a:p>
-            <a:r>
-              <a:rPr lang="ru-RU" dirty="0"/>
-              <a:t>Задача: добавить новые таблицы в существующий процесс репликации</a:t>
-            </a:r>
-          </a:p>
-          <a:p>
-            <a:r>
-              <a:rPr lang="ru-RU" dirty="0"/>
-              <a:t>Решение: обновить список таблиц в </a:t>
-            </a:r>
-            <a:r>
-              <a:rPr lang="en-US" dirty="0"/>
-              <a:t>publication</a:t>
-            </a:r>
-            <a:endParaRPr lang="ru-RU" dirty="0"/>
-          </a:p>
-          <a:p>
-            <a:r>
-              <a:rPr lang="ru-RU" dirty="0"/>
-              <a:t>Проблема: как </a:t>
-            </a:r>
-            <a:r>
-              <a:rPr lang="ru-RU" dirty="0" err="1"/>
-              <a:t>стригеррить</a:t>
-            </a:r>
-            <a:r>
-              <a:rPr lang="ru-RU" dirty="0"/>
-              <a:t> </a:t>
-            </a:r>
-            <a:r>
-              <a:rPr lang="ru-RU" dirty="0" err="1"/>
-              <a:t>снепшот</a:t>
-            </a:r>
-            <a:r>
-              <a:rPr lang="ru-RU" dirty="0"/>
-              <a:t>?</a:t>
-            </a:r>
-          </a:p>
-          <a:p>
-            <a:pPr lvl="1"/>
-            <a:r>
-              <a:rPr lang="ru-RU" dirty="0"/>
-              <a:t>Решение: </a:t>
-            </a:r>
-            <a:r>
-              <a:rPr lang="en-US" dirty="0"/>
-              <a:t>ALWAYS</a:t>
-            </a:r>
-          </a:p>
-          <a:p>
-            <a:pPr lvl="2"/>
-            <a:r>
-              <a:rPr lang="ru-RU" dirty="0"/>
-              <a:t>Проблема: при перезапуске всегда стартует </a:t>
-            </a:r>
-            <a:r>
-              <a:rPr lang="ru-RU" dirty="0" err="1"/>
-              <a:t>снепшот</a:t>
-            </a:r>
-            <a:r>
-              <a:rPr lang="ru-RU" dirty="0"/>
-              <a:t> всех таблиц</a:t>
-            </a:r>
-          </a:p>
-          <a:p>
-            <a:pPr lvl="3"/>
-            <a:r>
-              <a:rPr lang="ru-RU" dirty="0"/>
-              <a:t>Решение: </a:t>
-            </a:r>
-            <a:r>
-              <a:rPr lang="en-US" dirty="0"/>
-              <a:t>INITIAL / NO_DATA</a:t>
-            </a:r>
-            <a:endParaRPr lang="ru-RU" dirty="0"/>
-          </a:p>
-          <a:p>
-            <a:pPr lvl="4"/>
-            <a:r>
-              <a:rPr lang="ru-RU" dirty="0"/>
-              <a:t>Проблема: как теперь </a:t>
-            </a:r>
-            <a:r>
-              <a:rPr lang="ru-RU" dirty="0" err="1"/>
-              <a:t>тригеррить</a:t>
-            </a:r>
-            <a:r>
-              <a:rPr lang="ru-RU" dirty="0"/>
-              <a:t> </a:t>
-            </a:r>
-            <a:r>
-              <a:rPr lang="ru-RU" dirty="0" err="1"/>
-              <a:t>снепшоты</a:t>
-            </a:r>
-            <a:r>
-              <a:rPr lang="ru-RU" dirty="0"/>
-              <a:t>?</a:t>
-            </a:r>
-          </a:p>
-          <a:p>
-            <a:pPr lvl="5"/>
-            <a:r>
-              <a:rPr lang="ru-RU" dirty="0"/>
-              <a:t>Решение: сигналы</a:t>
+          <a:bodyPr/>
+          <a:lstStyle/>
+          <a:p>
+            <a:r>
+              <a:rPr lang="ru-RU" dirty="0"/>
+              <a:t>Пример конфигурации</a:t>
             </a:r>
             <a:endParaRPr lang="en-US" dirty="0"/>
           </a:p>
@@ -4803,7 +4713,7 @@
     </p:spTree>
     <p:extLst>
       <p:ext uri="{BB962C8B-B14F-4D97-AF65-F5344CB8AC3E}">
-        <p14:creationId xmlns:p14="http://schemas.microsoft.com/office/powerpoint/2010/main" val="587615054"/>
+        <p14:creationId xmlns:p14="http://schemas.microsoft.com/office/powerpoint/2010/main" val="2474036890"/>
       </p:ext>
     </p:extLst>
   </p:cSld>
@@ -4865,357 +4775,154 @@
               <a:t>: </a:t>
             </a:r>
             <a:r>
+              <a:rPr lang="ru-RU" dirty="0"/>
+              <a:t>изменение списка реплицируемых таблиц</a:t>
+            </a:r>
+            <a:endParaRPr lang="en-US" dirty="0"/>
+          </a:p>
+        </p:txBody>
+      </p:sp>
+      <p:sp>
+        <p:nvSpPr>
+          <p:cNvPr id="3" name="Content Placeholder 2">
+            <a:extLst>
+              <a:ext uri="{FF2B5EF4-FFF2-40B4-BE49-F238E27FC236}">
+                <a16:creationId xmlns:a16="http://schemas.microsoft.com/office/drawing/2014/main" id="{DA11F9D3-C291-2245-AEA5-8D09537FB4E5}"/>
+              </a:ext>
+            </a:extLst>
+          </p:cNvPr>
+          <p:cNvSpPr>
+            <a:spLocks noGrp="1"/>
+          </p:cNvSpPr>
+          <p:nvPr>
+            <p:ph idx="1"/>
+          </p:nvPr>
+        </p:nvSpPr>
+        <p:spPr>
+          <a:xfrm>
+            <a:off x="0" y="1343818"/>
+            <a:ext cx="10515600" cy="4351338"/>
+          </a:xfrm>
+        </p:spPr>
+        <p:txBody>
+          <a:bodyPr>
+            <a:normAutofit/>
+          </a:bodyPr>
+          <a:lstStyle/>
+          <a:p>
+            <a:r>
+              <a:rPr lang="ru-RU" dirty="0"/>
+              <a:t>Задача: добавить новые таблицы в существующий процесс репликации</a:t>
+            </a:r>
+          </a:p>
+          <a:p>
+            <a:r>
+              <a:rPr lang="ru-RU" dirty="0"/>
+              <a:t>Решение: обновить список таблиц в </a:t>
+            </a:r>
+            <a:r>
+              <a:rPr lang="en-US" dirty="0"/>
+              <a:t>publication</a:t>
+            </a:r>
+            <a:endParaRPr lang="ru-RU" dirty="0"/>
+          </a:p>
+          <a:p>
+            <a:r>
+              <a:rPr lang="ru-RU" dirty="0"/>
+              <a:t>Проблема: как </a:t>
+            </a:r>
+            <a:r>
+              <a:rPr lang="ru-RU" dirty="0" err="1"/>
+              <a:t>стригеррить</a:t>
+            </a:r>
+            <a:r>
+              <a:rPr lang="ru-RU" dirty="0"/>
+              <a:t> </a:t>
+            </a:r>
+            <a:r>
+              <a:rPr lang="ru-RU" dirty="0" err="1"/>
+              <a:t>снепшот</a:t>
+            </a:r>
+            <a:r>
+              <a:rPr lang="ru-RU" dirty="0"/>
+              <a:t>?</a:t>
+            </a:r>
+          </a:p>
+          <a:p>
+            <a:pPr lvl="1"/>
+            <a:r>
+              <a:rPr lang="ru-RU" dirty="0"/>
+              <a:t>Решение: </a:t>
+            </a:r>
+            <a:r>
+              <a:rPr lang="en-US" dirty="0"/>
+              <a:t>ALWAYS</a:t>
+            </a:r>
+          </a:p>
+          <a:p>
+            <a:pPr lvl="2"/>
+            <a:r>
+              <a:rPr lang="ru-RU" dirty="0"/>
+              <a:t>Проблема: при перезапуске всегда стартует </a:t>
+            </a:r>
+            <a:r>
+              <a:rPr lang="ru-RU" dirty="0" err="1"/>
+              <a:t>снепшот</a:t>
+            </a:r>
+            <a:r>
+              <a:rPr lang="ru-RU" dirty="0"/>
+              <a:t> всех таблиц</a:t>
+            </a:r>
+          </a:p>
+          <a:p>
+            <a:pPr lvl="3"/>
+            <a:r>
+              <a:rPr lang="ru-RU" dirty="0"/>
+              <a:t>Решение: </a:t>
+            </a:r>
+            <a:r>
+              <a:rPr lang="en-US" dirty="0"/>
+              <a:t>INITIAL / NO_DATA</a:t>
+            </a:r>
+            <a:endParaRPr lang="ru-RU" dirty="0"/>
+          </a:p>
+          <a:p>
+            <a:pPr lvl="4"/>
+            <a:r>
+              <a:rPr lang="ru-RU" dirty="0"/>
+              <a:t>Проблема: как теперь </a:t>
+            </a:r>
+            <a:r>
+              <a:rPr lang="ru-RU" dirty="0" err="1"/>
+              <a:t>тригеррить</a:t>
+            </a:r>
+            <a:r>
+              <a:rPr lang="ru-RU" dirty="0"/>
+              <a:t> </a:t>
+            </a:r>
+            <a:r>
               <a:rPr lang="ru-RU" dirty="0" err="1"/>
               <a:t>снепшоты</a:t>
             </a:r>
+            <a:r>
+              <a:rPr lang="ru-RU" dirty="0"/>
+              <a:t>?</a:t>
+            </a:r>
+          </a:p>
+          <a:p>
+            <a:pPr lvl="5"/>
+            <a:r>
+              <a:rPr lang="ru-RU" dirty="0"/>
+              <a:t>Решение: сигналы</a:t>
+            </a:r>
             <a:endParaRPr lang="en-US" dirty="0"/>
-          </a:p>
-        </p:txBody>
-      </p:sp>
-      <p:sp>
-        <p:nvSpPr>
-          <p:cNvPr id="3" name="Content Placeholder 2">
-            <a:extLst>
-              <a:ext uri="{FF2B5EF4-FFF2-40B4-BE49-F238E27FC236}">
-                <a16:creationId xmlns:a16="http://schemas.microsoft.com/office/drawing/2014/main" id="{DA11F9D3-C291-2245-AEA5-8D09537FB4E5}"/>
-              </a:ext>
-            </a:extLst>
-          </p:cNvPr>
-          <p:cNvSpPr>
-            <a:spLocks noGrp="1"/>
-          </p:cNvSpPr>
-          <p:nvPr>
-            <p:ph idx="1"/>
-          </p:nvPr>
-        </p:nvSpPr>
-        <p:spPr>
-          <a:xfrm>
-            <a:off x="-1" y="1343818"/>
-            <a:ext cx="11835925" cy="5381722"/>
-          </a:xfrm>
-        </p:spPr>
-        <p:txBody>
-          <a:bodyPr>
-            <a:normAutofit fontScale="77500" lnSpcReduction="20000"/>
-          </a:bodyPr>
-          <a:lstStyle/>
-          <a:p>
-            <a:r>
-              <a:rPr lang="ru-RU" dirty="0"/>
-              <a:t>Задача: перед стартом нужно получить текущее состояние таблицы</a:t>
-            </a:r>
-          </a:p>
-          <a:p>
-            <a:r>
-              <a:rPr lang="ru-RU" dirty="0"/>
-              <a:t>Решение: </a:t>
-            </a:r>
-            <a:r>
-              <a:rPr lang="ru-RU" dirty="0" err="1"/>
-              <a:t>снепшот</a:t>
-            </a:r>
-            <a:endParaRPr lang="ru-RU" dirty="0"/>
-          </a:p>
-          <a:p>
-            <a:r>
-              <a:rPr lang="ru-RU" dirty="0"/>
-              <a:t>Проблема </a:t>
-            </a:r>
-            <a:r>
-              <a:rPr lang="en-US" dirty="0"/>
-              <a:t>#1</a:t>
-            </a:r>
-            <a:r>
-              <a:rPr lang="ru-RU" dirty="0"/>
-              <a:t>: </a:t>
-            </a:r>
-            <a:r>
-              <a:rPr lang="en-US" dirty="0"/>
-              <a:t>Blocking snapshot =&gt; </a:t>
-            </a:r>
-            <a:r>
-              <a:rPr lang="ru-RU" dirty="0"/>
-              <a:t>долгие транзакции в случае больших таблиц</a:t>
-            </a:r>
-          </a:p>
-          <a:p>
-            <a:pPr lvl="1"/>
-            <a:r>
-              <a:rPr lang="ru-RU" dirty="0"/>
-              <a:t>Решение: </a:t>
-            </a:r>
-            <a:r>
-              <a:rPr lang="en-US" dirty="0"/>
-              <a:t>Incremental snapshot</a:t>
-            </a:r>
-            <a:r>
-              <a:rPr lang="ru-RU" dirty="0"/>
-              <a:t> (но работает только для </a:t>
-            </a:r>
-            <a:r>
-              <a:rPr lang="en-US" dirty="0"/>
-              <a:t>signal=source</a:t>
-            </a:r>
-            <a:r>
-              <a:rPr lang="ru-RU" dirty="0"/>
-              <a:t>)</a:t>
-            </a:r>
-          </a:p>
-          <a:p>
-            <a:r>
-              <a:rPr lang="ru-RU" dirty="0"/>
-              <a:t>Проблема </a:t>
-            </a:r>
-            <a:r>
-              <a:rPr lang="en-US" dirty="0"/>
-              <a:t>#2: Incremental snapshot </a:t>
-            </a:r>
-            <a:r>
-              <a:rPr lang="ru-RU" dirty="0" err="1"/>
-              <a:t>рабоатет</a:t>
-            </a:r>
-            <a:r>
-              <a:rPr lang="ru-RU" dirty="0"/>
-              <a:t> только для таблиц с ПК</a:t>
-            </a:r>
-          </a:p>
-          <a:p>
-            <a:pPr lvl="1"/>
-            <a:r>
-              <a:rPr lang="ru-RU" dirty="0"/>
-              <a:t>Решение: </a:t>
-            </a:r>
-            <a:r>
-              <a:rPr lang="en-US" dirty="0"/>
-              <a:t>surrogate key</a:t>
-            </a:r>
-          </a:p>
-          <a:p>
-            <a:r>
-              <a:rPr lang="ru-RU" dirty="0"/>
-              <a:t>Проблема </a:t>
-            </a:r>
-            <a:r>
-              <a:rPr lang="en-US" dirty="0"/>
-              <a:t>#</a:t>
-            </a:r>
-            <a:r>
-              <a:rPr lang="ru-RU" dirty="0"/>
-              <a:t>3: долгий </a:t>
-            </a:r>
-            <a:r>
-              <a:rPr lang="ru-RU" dirty="0" err="1"/>
-              <a:t>снепшот</a:t>
-            </a:r>
-            <a:endParaRPr lang="ru-RU" dirty="0"/>
-          </a:p>
-          <a:p>
-            <a:pPr lvl="1"/>
-            <a:r>
-              <a:rPr lang="ru-RU" dirty="0"/>
-              <a:t>Решение: своя логика снятия </a:t>
-            </a:r>
-            <a:r>
-              <a:rPr lang="ru-RU" dirty="0" err="1"/>
-              <a:t>снепшота</a:t>
-            </a:r>
-            <a:r>
-              <a:rPr lang="ru-RU" dirty="0"/>
-              <a:t> или готовое решение (</a:t>
-            </a:r>
-            <a:r>
-              <a:rPr lang="en-US" dirty="0"/>
-              <a:t>ex. apache </a:t>
-            </a:r>
-            <a:r>
-              <a:rPr lang="en-US" dirty="0" err="1"/>
-              <a:t>flink</a:t>
-            </a:r>
-            <a:r>
-              <a:rPr lang="en-US" dirty="0"/>
-              <a:t> </a:t>
-            </a:r>
-            <a:r>
-              <a:rPr lang="en-US" dirty="0" err="1"/>
-              <a:t>cdc</a:t>
-            </a:r>
-            <a:r>
-              <a:rPr lang="ru-RU" dirty="0"/>
-              <a:t>)</a:t>
-            </a:r>
-          </a:p>
-          <a:p>
-            <a:r>
-              <a:rPr lang="ru-RU" dirty="0"/>
-              <a:t>Проблема </a:t>
-            </a:r>
-            <a:r>
-              <a:rPr lang="en-US" dirty="0"/>
-              <a:t>#</a:t>
-            </a:r>
-            <a:r>
-              <a:rPr lang="ru-RU" dirty="0"/>
-              <a:t>4</a:t>
-            </a:r>
-            <a:r>
-              <a:rPr lang="en-US" dirty="0"/>
-              <a:t>: </a:t>
-            </a:r>
-            <a:r>
-              <a:rPr lang="ru-RU" dirty="0" err="1"/>
-              <a:t>снепшоты</a:t>
-            </a:r>
-            <a:r>
-              <a:rPr lang="ru-RU" dirty="0"/>
-              <a:t> запускается повторно после рестарта приложения</a:t>
-            </a:r>
-          </a:p>
-          <a:p>
-            <a:pPr lvl="1"/>
-            <a:r>
-              <a:rPr lang="ru-RU" dirty="0"/>
-              <a:t>Решение: изменить настройку </a:t>
-            </a:r>
-            <a:r>
-              <a:rPr lang="en-US" dirty="0" err="1"/>
-              <a:t>snapshot.mode</a:t>
-            </a:r>
-            <a:r>
-              <a:rPr lang="en-US" dirty="0"/>
-              <a:t> </a:t>
-            </a:r>
-            <a:r>
-              <a:rPr lang="ru-RU" dirty="0"/>
-              <a:t>на </a:t>
-            </a:r>
-            <a:r>
-              <a:rPr lang="en-US" dirty="0"/>
-              <a:t>NO_DATA </a:t>
-            </a:r>
-            <a:r>
-              <a:rPr lang="ru-RU" dirty="0"/>
-              <a:t>и управлять </a:t>
-            </a:r>
-            <a:r>
-              <a:rPr lang="ru-RU" dirty="0" err="1"/>
-              <a:t>снепшотом</a:t>
-            </a:r>
-            <a:r>
-              <a:rPr lang="ru-RU" dirty="0"/>
-              <a:t> </a:t>
-            </a:r>
-            <a:r>
-              <a:rPr lang="ru-RU" dirty="0" err="1"/>
-              <a:t>самостоятльно</a:t>
-            </a:r>
-            <a:r>
-              <a:rPr lang="ru-RU" dirty="0"/>
-              <a:t> через сигналы</a:t>
-            </a:r>
-          </a:p>
-          <a:p>
-            <a:r>
-              <a:rPr lang="ru-RU" dirty="0"/>
-              <a:t>Проблема </a:t>
-            </a:r>
-            <a:r>
-              <a:rPr lang="en-US" dirty="0"/>
-              <a:t>#5</a:t>
-            </a:r>
-            <a:r>
-              <a:rPr lang="ru-RU" dirty="0"/>
-              <a:t>: </a:t>
-            </a:r>
-            <a:r>
-              <a:rPr lang="ru-RU" dirty="0" err="1"/>
-              <a:t>снепшоты</a:t>
-            </a:r>
-            <a:r>
-              <a:rPr lang="ru-RU" dirty="0"/>
-              <a:t> через сигналы не запускаются</a:t>
-            </a:r>
-          </a:p>
-          <a:p>
-            <a:pPr lvl="1"/>
-            <a:r>
-              <a:rPr lang="ru-RU" dirty="0"/>
-              <a:t>Решение </a:t>
-            </a:r>
-            <a:r>
-              <a:rPr lang="en-US" dirty="0"/>
-              <a:t>#1</a:t>
-            </a:r>
-            <a:r>
-              <a:rPr lang="ru-RU" dirty="0"/>
-              <a:t>: нужно </a:t>
-            </a:r>
-            <a:r>
-              <a:rPr lang="ru-RU" dirty="0" err="1"/>
-              <a:t>стригеррить</a:t>
-            </a:r>
-            <a:r>
-              <a:rPr lang="ru-RU" dirty="0"/>
-              <a:t> любое изменение в </a:t>
-            </a:r>
-            <a:r>
-              <a:rPr lang="en-US" dirty="0"/>
-              <a:t>WAL</a:t>
-            </a:r>
-            <a:r>
-              <a:rPr lang="ru-RU" dirty="0"/>
-              <a:t> по реплицируемых таблицам</a:t>
-            </a:r>
-          </a:p>
-          <a:p>
-            <a:pPr lvl="1"/>
-            <a:r>
-              <a:rPr lang="ru-RU" dirty="0"/>
-              <a:t>Решение </a:t>
-            </a:r>
-            <a:r>
-              <a:rPr lang="en-US" dirty="0"/>
-              <a:t>#2: heartbeat </a:t>
-            </a:r>
-            <a:r>
-              <a:rPr lang="ru-RU" dirty="0"/>
-              <a:t>таблица</a:t>
-            </a:r>
-          </a:p>
-          <a:p>
-            <a:r>
-              <a:rPr lang="ru-RU" dirty="0"/>
-              <a:t>Проблема </a:t>
-            </a:r>
-            <a:r>
-              <a:rPr lang="en-US" dirty="0"/>
-              <a:t>#6: </a:t>
-            </a:r>
-            <a:r>
-              <a:rPr lang="ru-RU" dirty="0"/>
-              <a:t>владельцы БД категорически против генерации любой дополнительной нагрузки на мастере</a:t>
-            </a:r>
-          </a:p>
-          <a:p>
-            <a:pPr lvl="1"/>
-            <a:r>
-              <a:rPr lang="ru-RU" dirty="0"/>
-              <a:t>Решение: с версии </a:t>
-            </a:r>
-            <a:r>
-              <a:rPr lang="en-US" dirty="0"/>
-              <a:t>pg16 </a:t>
-            </a:r>
-            <a:r>
-              <a:rPr lang="ru-RU" dirty="0"/>
-              <a:t>есть возможность использовать логический слот для репликации и на репликах</a:t>
-            </a:r>
           </a:p>
         </p:txBody>
       </p:sp>
     </p:spTree>
     <p:extLst>
       <p:ext uri="{BB962C8B-B14F-4D97-AF65-F5344CB8AC3E}">
-        <p14:creationId xmlns:p14="http://schemas.microsoft.com/office/powerpoint/2010/main" val="1436139559"/>
+        <p14:creationId xmlns:p14="http://schemas.microsoft.com/office/powerpoint/2010/main" val="587615054"/>
       </p:ext>
     </p:extLst>
   </p:cSld>
@@ -5444,19 +5151,19 @@
         </p:nvSpPr>
         <p:spPr>
           <a:xfrm>
-            <a:off x="0" y="1343818"/>
-            <a:ext cx="10515600" cy="4351338"/>
+            <a:off x="-1" y="1343818"/>
+            <a:ext cx="11835925" cy="5381722"/>
           </a:xfrm>
         </p:spPr>
         <p:txBody>
           <a:bodyPr>
-            <a:normAutofit/>
+            <a:normAutofit fontScale="77500" lnSpcReduction="20000"/>
           </a:bodyPr>
           <a:lstStyle/>
           <a:p>
             <a:r>
               <a:rPr lang="ru-RU" dirty="0"/>
-              <a:t>Задача: восстановить потерянный срез данных за заданный период</a:t>
+              <a:t>Задача: перед стартом нужно получить текущее состояние таблицы</a:t>
             </a:r>
           </a:p>
           <a:p>
@@ -5468,9 +5175,300 @@
               <a:rPr lang="ru-RU" dirty="0" err="1"/>
               <a:t>снепшот</a:t>
             </a:r>
-            <a:r>
-              <a:rPr lang="ru-RU" dirty="0"/>
-              <a:t> с фильтром</a:t>
+            <a:endParaRPr lang="ru-RU" dirty="0"/>
+          </a:p>
+          <a:p>
+            <a:r>
+              <a:rPr lang="ru-RU" dirty="0"/>
+              <a:t>Проблема </a:t>
+            </a:r>
+            <a:r>
+              <a:rPr lang="en-US" dirty="0"/>
+              <a:t>#1</a:t>
+            </a:r>
+            <a:r>
+              <a:rPr lang="ru-RU" dirty="0"/>
+              <a:t>: </a:t>
+            </a:r>
+            <a:r>
+              <a:rPr lang="en-US" dirty="0"/>
+              <a:t>Blocking snapshot =&gt; </a:t>
+            </a:r>
+            <a:r>
+              <a:rPr lang="ru-RU" dirty="0"/>
+              <a:t>долгие транзакции в случае больших таблиц</a:t>
+            </a:r>
+          </a:p>
+          <a:p>
+            <a:pPr lvl="1"/>
+            <a:r>
+              <a:rPr lang="ru-RU" dirty="0"/>
+              <a:t>Решение: </a:t>
+            </a:r>
+            <a:r>
+              <a:rPr lang="en-US" dirty="0"/>
+              <a:t>Incremental snapshot</a:t>
+            </a:r>
+            <a:r>
+              <a:rPr lang="ru-RU" dirty="0"/>
+              <a:t> (но работает только для </a:t>
+            </a:r>
+            <a:r>
+              <a:rPr lang="en-US" dirty="0"/>
+              <a:t>signal=source</a:t>
+            </a:r>
+            <a:r>
+              <a:rPr lang="ru-RU" dirty="0"/>
+              <a:t>)</a:t>
+            </a:r>
+          </a:p>
+          <a:p>
+            <a:r>
+              <a:rPr lang="ru-RU" dirty="0"/>
+              <a:t>Проблема </a:t>
+            </a:r>
+            <a:r>
+              <a:rPr lang="en-US" dirty="0"/>
+              <a:t>#2: Incremental snapshot </a:t>
+            </a:r>
+            <a:r>
+              <a:rPr lang="ru-RU" dirty="0" err="1"/>
+              <a:t>рабоатет</a:t>
+            </a:r>
+            <a:r>
+              <a:rPr lang="ru-RU" dirty="0"/>
+              <a:t> только для таблиц с ПК</a:t>
+            </a:r>
+          </a:p>
+          <a:p>
+            <a:pPr lvl="1"/>
+            <a:r>
+              <a:rPr lang="ru-RU" dirty="0"/>
+              <a:t>Решение: </a:t>
+            </a:r>
+            <a:r>
+              <a:rPr lang="en-US" dirty="0"/>
+              <a:t>surrogate key</a:t>
+            </a:r>
+          </a:p>
+          <a:p>
+            <a:r>
+              <a:rPr lang="ru-RU" dirty="0"/>
+              <a:t>Проблема </a:t>
+            </a:r>
+            <a:r>
+              <a:rPr lang="en-US" dirty="0"/>
+              <a:t>#</a:t>
+            </a:r>
+            <a:r>
+              <a:rPr lang="ru-RU" dirty="0"/>
+              <a:t>3: долгий </a:t>
+            </a:r>
+            <a:r>
+              <a:rPr lang="ru-RU" dirty="0" err="1"/>
+              <a:t>снепшот</a:t>
+            </a:r>
+            <a:endParaRPr lang="ru-RU" dirty="0"/>
+          </a:p>
+          <a:p>
+            <a:pPr lvl="1"/>
+            <a:r>
+              <a:rPr lang="ru-RU" dirty="0"/>
+              <a:t>Решение: своя логика снятия </a:t>
+            </a:r>
+            <a:r>
+              <a:rPr lang="ru-RU" dirty="0" err="1"/>
+              <a:t>снепшота</a:t>
+            </a:r>
+            <a:r>
+              <a:rPr lang="ru-RU" dirty="0"/>
+              <a:t> или готовое решение (</a:t>
+            </a:r>
+            <a:r>
+              <a:rPr lang="en-US" dirty="0"/>
+              <a:t>ex. apache </a:t>
+            </a:r>
+            <a:r>
+              <a:rPr lang="en-US" dirty="0" err="1"/>
+              <a:t>flink</a:t>
+            </a:r>
+            <a:r>
+              <a:rPr lang="en-US" dirty="0"/>
+              <a:t> </a:t>
+            </a:r>
+            <a:r>
+              <a:rPr lang="en-US" dirty="0" err="1"/>
+              <a:t>cdc</a:t>
+            </a:r>
+            <a:r>
+              <a:rPr lang="ru-RU" dirty="0"/>
+              <a:t>)</a:t>
+            </a:r>
+          </a:p>
+          <a:p>
+            <a:r>
+              <a:rPr lang="ru-RU" dirty="0"/>
+              <a:t>Проблема </a:t>
+            </a:r>
+            <a:r>
+              <a:rPr lang="en-US" dirty="0"/>
+              <a:t>#</a:t>
+            </a:r>
+            <a:r>
+              <a:rPr lang="ru-RU" dirty="0"/>
+              <a:t>4</a:t>
+            </a:r>
+            <a:r>
+              <a:rPr lang="en-US" dirty="0"/>
+              <a:t>: </a:t>
+            </a:r>
+            <a:r>
+              <a:rPr lang="ru-RU" dirty="0" err="1"/>
+              <a:t>снепшоты</a:t>
+            </a:r>
+            <a:r>
+              <a:rPr lang="ru-RU" dirty="0"/>
+              <a:t> запускается повторно после рестарта приложения</a:t>
+            </a:r>
+          </a:p>
+          <a:p>
+            <a:pPr lvl="1"/>
+            <a:r>
+              <a:rPr lang="ru-RU" dirty="0"/>
+              <a:t>Решение: изменить настройку </a:t>
+            </a:r>
+            <a:r>
+              <a:rPr lang="en-US" dirty="0" err="1"/>
+              <a:t>snapshot.mode</a:t>
+            </a:r>
+            <a:r>
+              <a:rPr lang="en-US" dirty="0"/>
+              <a:t> </a:t>
+            </a:r>
+            <a:r>
+              <a:rPr lang="ru-RU" dirty="0"/>
+              <a:t>на </a:t>
+            </a:r>
+            <a:r>
+              <a:rPr lang="en-US" dirty="0"/>
+              <a:t>NO_DATA </a:t>
+            </a:r>
+            <a:r>
+              <a:rPr lang="ru-RU" dirty="0"/>
+              <a:t>и управлять </a:t>
+            </a:r>
+            <a:r>
+              <a:rPr lang="ru-RU" dirty="0" err="1"/>
+              <a:t>снепшотом</a:t>
+            </a:r>
+            <a:r>
+              <a:rPr lang="ru-RU" dirty="0"/>
+              <a:t> </a:t>
+            </a:r>
+            <a:r>
+              <a:rPr lang="ru-RU" dirty="0" err="1"/>
+              <a:t>самостоятльно</a:t>
+            </a:r>
+            <a:r>
+              <a:rPr lang="ru-RU" dirty="0"/>
+              <a:t> через сигналы</a:t>
+            </a:r>
+          </a:p>
+          <a:p>
+            <a:r>
+              <a:rPr lang="ru-RU" dirty="0"/>
+              <a:t>Проблема </a:t>
+            </a:r>
+            <a:r>
+              <a:rPr lang="en-US" dirty="0"/>
+              <a:t>#5</a:t>
+            </a:r>
+            <a:r>
+              <a:rPr lang="ru-RU" dirty="0"/>
+              <a:t>: </a:t>
+            </a:r>
+            <a:r>
+              <a:rPr lang="ru-RU" dirty="0" err="1"/>
+              <a:t>снепшоты</a:t>
+            </a:r>
+            <a:r>
+              <a:rPr lang="ru-RU" dirty="0"/>
+              <a:t> через сигналы не запускаются</a:t>
+            </a:r>
+          </a:p>
+          <a:p>
+            <a:pPr lvl="1"/>
+            <a:r>
+              <a:rPr lang="ru-RU" dirty="0"/>
+              <a:t>Решение </a:t>
+            </a:r>
+            <a:r>
+              <a:rPr lang="en-US" dirty="0"/>
+              <a:t>#1</a:t>
+            </a:r>
+            <a:r>
+              <a:rPr lang="ru-RU" dirty="0"/>
+              <a:t>: нужно </a:t>
+            </a:r>
+            <a:r>
+              <a:rPr lang="ru-RU" dirty="0" err="1"/>
+              <a:t>стригеррить</a:t>
+            </a:r>
+            <a:r>
+              <a:rPr lang="ru-RU" dirty="0"/>
+              <a:t> любое изменение в </a:t>
+            </a:r>
+            <a:r>
+              <a:rPr lang="en-US" dirty="0"/>
+              <a:t>WAL</a:t>
+            </a:r>
+            <a:r>
+              <a:rPr lang="ru-RU" dirty="0"/>
+              <a:t> по реплицируемых таблицам</a:t>
+            </a:r>
+          </a:p>
+          <a:p>
+            <a:pPr lvl="1"/>
+            <a:r>
+              <a:rPr lang="ru-RU" dirty="0"/>
+              <a:t>Решение </a:t>
+            </a:r>
+            <a:r>
+              <a:rPr lang="en-US" dirty="0"/>
+              <a:t>#2: heartbeat </a:t>
+            </a:r>
+            <a:r>
+              <a:rPr lang="ru-RU" dirty="0"/>
+              <a:t>таблица</a:t>
+            </a:r>
+          </a:p>
+          <a:p>
+            <a:r>
+              <a:rPr lang="ru-RU" dirty="0"/>
+              <a:t>Проблема </a:t>
+            </a:r>
+            <a:r>
+              <a:rPr lang="en-US" dirty="0"/>
+              <a:t>#6: </a:t>
+            </a:r>
+            <a:r>
+              <a:rPr lang="ru-RU" dirty="0"/>
+              <a:t>владельцы БД категорически против генерации любой дополнительной нагрузки на мастере</a:t>
+            </a:r>
+          </a:p>
+          <a:p>
+            <a:pPr lvl="1"/>
+            <a:r>
+              <a:rPr lang="ru-RU" dirty="0"/>
+              <a:t>Решение: с версии </a:t>
+            </a:r>
+            <a:r>
+              <a:rPr lang="en-US" dirty="0"/>
+              <a:t>pg16 </a:t>
+            </a:r>
+            <a:r>
+              <a:rPr lang="ru-RU" dirty="0"/>
+              <a:t>есть возможность использовать логический слот для репликации и на репликах</a:t>
             </a:r>
           </a:p>
         </p:txBody>
@@ -5478,7 +5476,7 @@
     </p:spTree>
     <p:extLst>
       <p:ext uri="{BB962C8B-B14F-4D97-AF65-F5344CB8AC3E}">
-        <p14:creationId xmlns:p14="http://schemas.microsoft.com/office/powerpoint/2010/main" val="2994142072"/>
+        <p14:creationId xmlns:p14="http://schemas.microsoft.com/office/powerpoint/2010/main" val="1436139559"/>
       </p:ext>
     </p:extLst>
   </p:cSld>
@@ -5577,7 +5575,13 @@
           <a:p>
             <a:r>
               <a:rPr lang="ru-RU" dirty="0"/>
-              <a:t>Контекст: запустили ручной </a:t>
+              <a:t>Задача: восстановить потерянный срез данных за заданный период</a:t>
+            </a:r>
+          </a:p>
+          <a:p>
+            <a:r>
+              <a:rPr lang="ru-RU" dirty="0"/>
+              <a:t>Решение: </a:t>
             </a:r>
             <a:r>
               <a:rPr lang="ru-RU" dirty="0" err="1"/>
@@ -5585,84 +5589,7 @@
             </a:r>
             <a:r>
               <a:rPr lang="ru-RU" dirty="0"/>
-              <a:t> таблицы, но забыли выдать права на чтение пользователю</a:t>
-            </a:r>
-          </a:p>
-          <a:p>
-            <a:r>
-              <a:rPr lang="ru-RU" dirty="0"/>
-              <a:t>Проблема: </a:t>
-            </a:r>
-            <a:r>
-              <a:rPr lang="en-US" dirty="0" err="1"/>
-              <a:t>cdc</a:t>
-            </a:r>
-            <a:r>
-              <a:rPr lang="en-US" dirty="0"/>
-              <a:t>-</a:t>
-            </a:r>
-            <a:r>
-              <a:rPr lang="ru-RU" dirty="0"/>
-              <a:t>приложение не упало, но и ничего не делает</a:t>
-            </a:r>
-          </a:p>
-          <a:p>
-            <a:pPr lvl="1"/>
-            <a:r>
-              <a:rPr lang="ru-RU" dirty="0"/>
-              <a:t>Замечено на версии </a:t>
-            </a:r>
-            <a:r>
-              <a:rPr lang="en-US" dirty="0" err="1"/>
-              <a:t>debezium</a:t>
-            </a:r>
-            <a:r>
-              <a:rPr lang="en-US" dirty="0"/>
-              <a:t> </a:t>
-            </a:r>
-            <a:r>
-              <a:rPr lang="ru-RU" dirty="0"/>
-              <a:t>2.7 (проверить на более новых версиях)</a:t>
-            </a:r>
-          </a:p>
-          <a:p>
-            <a:pPr lvl="1"/>
-            <a:r>
-              <a:rPr lang="ru-RU" dirty="0"/>
-              <a:t>В метриках (</a:t>
-            </a:r>
-            <a:r>
-              <a:rPr lang="en-US" dirty="0" err="1"/>
-              <a:t>kafka</a:t>
-            </a:r>
-            <a:r>
-              <a:rPr lang="en-US" dirty="0"/>
-              <a:t>-connect</a:t>
-            </a:r>
-            <a:r>
-              <a:rPr lang="ru-RU" dirty="0"/>
-              <a:t>)</a:t>
-            </a:r>
-            <a:r>
-              <a:rPr lang="en-US" dirty="0"/>
-              <a:t> </a:t>
-            </a:r>
-            <a:r>
-              <a:rPr lang="ru-RU" dirty="0"/>
-              <a:t>приложение живо и работает</a:t>
-            </a:r>
-          </a:p>
-          <a:p>
-            <a:r>
-              <a:rPr lang="ru-RU" dirty="0"/>
-              <a:t>Решение:</a:t>
-            </a:r>
-          </a:p>
-          <a:p>
-            <a:pPr lvl="1"/>
-            <a:r>
-              <a:rPr lang="ru-RU" dirty="0"/>
-              <a:t>Только перезапуск приложения</a:t>
+              <a:t> с фильтром</a:t>
             </a:r>
           </a:p>
         </p:txBody>
@@ -5670,7 +5597,7 @@
     </p:spTree>
     <p:extLst>
       <p:ext uri="{BB962C8B-B14F-4D97-AF65-F5344CB8AC3E}">
-        <p14:creationId xmlns:p14="http://schemas.microsoft.com/office/powerpoint/2010/main" val="2518105868"/>
+        <p14:creationId xmlns:p14="http://schemas.microsoft.com/office/powerpoint/2010/main" val="2994142072"/>
       </p:ext>
     </p:extLst>
   </p:cSld>
@@ -5769,26 +5696,7 @@
           <a:p>
             <a:r>
               <a:rPr lang="ru-RU" dirty="0"/>
-              <a:t>Контекст: отправили сигнал на запуск инкрементального </a:t>
-            </a:r>
-            <a:r>
-              <a:rPr lang="ru-RU" dirty="0" err="1"/>
-              <a:t>снепшота</a:t>
-            </a:r>
-            <a:r>
-              <a:rPr lang="ru-RU" dirty="0"/>
-              <a:t> таблицы, по которой еще не было ни одного </a:t>
-            </a:r>
-            <a:r>
-              <a:rPr lang="ru-RU" dirty="0" err="1"/>
-              <a:t>эвента</a:t>
-            </a:r>
-            <a:endParaRPr lang="ru-RU" dirty="0"/>
-          </a:p>
-          <a:p>
-            <a:r>
-              <a:rPr lang="ru-RU" dirty="0"/>
-              <a:t>Проблема: </a:t>
+              <a:t>Контекст: запустили ручной </a:t>
             </a:r>
             <a:r>
               <a:rPr lang="ru-RU" dirty="0" err="1"/>
@@ -5796,31 +5704,32 @@
             </a:r>
             <a:r>
               <a:rPr lang="ru-RU" dirty="0"/>
-              <a:t> падает с ошибкой «ошибка про получение схемы»</a:t>
-            </a:r>
-          </a:p>
-          <a:p>
-            <a:r>
-              <a:rPr lang="ru-RU" dirty="0"/>
-              <a:t>Решения:</a:t>
+              <a:t> таблицы, но забыли выдать права на чтение пользователю</a:t>
+            </a:r>
+          </a:p>
+          <a:p>
+            <a:r>
+              <a:rPr lang="ru-RU" dirty="0"/>
+              <a:t>Проблема: </a:t>
+            </a:r>
+            <a:r>
+              <a:rPr lang="en-US" dirty="0" err="1"/>
+              <a:t>cdc</a:t>
+            </a:r>
+            <a:r>
+              <a:rPr lang="en-US" dirty="0"/>
+              <a:t>-</a:t>
+            </a:r>
+            <a:r>
+              <a:rPr lang="ru-RU" dirty="0"/>
+              <a:t>приложение не упало, но и ничего не делает</a:t>
             </a:r>
           </a:p>
           <a:p>
             <a:pPr lvl="1"/>
             <a:r>
-              <a:rPr lang="ru-RU" dirty="0" err="1"/>
-              <a:t>Стригеррить</a:t>
-            </a:r>
-            <a:r>
-              <a:rPr lang="ru-RU" dirty="0"/>
-              <a:t> изменения по целевой таблице</a:t>
-            </a:r>
-          </a:p>
-          <a:p>
-            <a:pPr lvl="1"/>
-            <a:r>
-              <a:rPr lang="ru-RU" dirty="0"/>
-              <a:t>Обновить </a:t>
+              <a:rPr lang="ru-RU" dirty="0"/>
+              <a:t>Замечено на версии </a:t>
             </a:r>
             <a:r>
               <a:rPr lang="en-US" dirty="0" err="1"/>
@@ -5832,20 +5741,55 @@
             </a:r>
             <a:r>
               <a:rPr lang="ru-RU" dirty="0"/>
-              <a:t>до версии выше </a:t>
-            </a:r>
-            <a:r>
-              <a:rPr lang="en-US" dirty="0"/>
-              <a:t>3.1.2+</a:t>
-            </a:r>
-            <a:endParaRPr lang="ru-RU" dirty="0"/>
+              <a:t>2.7 (проверить на более новых версиях)</a:t>
+            </a:r>
+          </a:p>
+          <a:p>
+            <a:pPr lvl="1"/>
+            <a:r>
+              <a:rPr lang="ru-RU" dirty="0"/>
+              <a:t>В метриках (</a:t>
+            </a:r>
+            <a:r>
+              <a:rPr lang="en-US" dirty="0" err="1"/>
+              <a:t>kafka</a:t>
+            </a:r>
+            <a:r>
+              <a:rPr lang="en-US" dirty="0"/>
+              <a:t>-connect</a:t>
+            </a:r>
+            <a:r>
+              <a:rPr lang="ru-RU" dirty="0"/>
+              <a:t>)</a:t>
+            </a:r>
+            <a:r>
+              <a:rPr lang="en-US" dirty="0"/>
+              <a:t> </a:t>
+            </a:r>
+            <a:r>
+              <a:rPr lang="ru-RU" dirty="0"/>
+              <a:t>приложение живо и работает</a:t>
+            </a:r>
+          </a:p>
+          <a:p>
+            <a:r>
+              <a:rPr lang="ru-RU" dirty="0"/>
+              <a:t>Решение:</a:t>
+            </a:r>
+          </a:p>
+          <a:p>
+            <a:pPr lvl="1"/>
+            <a:r>
+              <a:rPr lang="ru-RU" dirty="0"/>
+              <a:t>Только перезапуск приложения</a:t>
+            </a:r>
           </a:p>
         </p:txBody>
       </p:sp>
     </p:spTree>
     <p:extLst>
       <p:ext uri="{BB962C8B-B14F-4D97-AF65-F5344CB8AC3E}">
-        <p14:creationId xmlns:p14="http://schemas.microsoft.com/office/powerpoint/2010/main" val="3287761478"/>
+        <p14:creationId xmlns:p14="http://schemas.microsoft.com/office/powerpoint/2010/main" val="2518105868"/>
       </p:ext>
     </p:extLst>
   </p:cSld>
@@ -5907,8 +5851,8 @@
               <a:t>: </a:t>
             </a:r>
             <a:r>
-              <a:rPr lang="ru-RU" dirty="0"/>
-              <a:t>редко обновляемые таблицы</a:t>
+              <a:rPr lang="ru-RU" dirty="0" err="1"/>
+              <a:t>снепшоты</a:t>
             </a:r>
             <a:endParaRPr lang="en-US" dirty="0"/>
           </a:p>
@@ -5944,74 +5888,83 @@
           <a:p>
             <a:r>
               <a:rPr lang="ru-RU" dirty="0"/>
-              <a:t>Контекст: в БД много таблиц, но реплицируем одну таблицу справочник, которая обновляется крайне редко</a:t>
-            </a:r>
-          </a:p>
-          <a:p>
-            <a:r>
-              <a:rPr lang="ru-RU" dirty="0"/>
-              <a:t>Проблема: Слот всегда отстает, </a:t>
-            </a:r>
-            <a:r>
-              <a:rPr lang="en-US" dirty="0"/>
-              <a:t>WAL </a:t>
-            </a:r>
-            <a:r>
-              <a:rPr lang="ru-RU" dirty="0"/>
-              <a:t>копится до «предела». Есть риск потери данных и переход </a:t>
+              <a:t>Контекст: отправили сигнал на запуск инкрементального </a:t>
             </a:r>
             <a:r>
               <a:rPr lang="ru-RU" dirty="0" err="1"/>
-              <a:t>инстанса</a:t>
-            </a:r>
-            <a:r>
-              <a:rPr lang="ru-RU" dirty="0"/>
-              <a:t> в </a:t>
-            </a:r>
-            <a:r>
-              <a:rPr lang="en-US" dirty="0"/>
-              <a:t>RO</a:t>
+              <a:t>снепшота</a:t>
+            </a:r>
+            <a:r>
+              <a:rPr lang="ru-RU" dirty="0"/>
+              <a:t> таблицы, по которой еще не было ни одного </a:t>
+            </a:r>
+            <a:r>
+              <a:rPr lang="ru-RU" dirty="0" err="1"/>
+              <a:t>эвента</a:t>
             </a:r>
             <a:endParaRPr lang="ru-RU" dirty="0"/>
           </a:p>
           <a:p>
             <a:r>
               <a:rPr lang="ru-RU" dirty="0"/>
-              <a:t>Решение:</a:t>
+              <a:t>Проблема: </a:t>
+            </a:r>
+            <a:r>
+              <a:rPr lang="ru-RU" dirty="0" err="1"/>
+              <a:t>снепшот</a:t>
+            </a:r>
+            <a:r>
+              <a:rPr lang="ru-RU" dirty="0"/>
+              <a:t> падает с ошибкой «ошибка про получение схемы»</a:t>
+            </a:r>
+          </a:p>
+          <a:p>
+            <a:r>
+              <a:rPr lang="ru-RU" dirty="0"/>
+              <a:t>Решения:</a:t>
             </a:r>
           </a:p>
           <a:p>
             <a:pPr lvl="1"/>
             <a:r>
-              <a:rPr lang="en-US" dirty="0"/>
-              <a:t>Heartbeat </a:t>
-            </a:r>
-            <a:r>
-              <a:rPr lang="ru-RU" dirty="0"/>
-              <a:t>таблица</a:t>
+              <a:rPr lang="ru-RU" dirty="0" err="1"/>
+              <a:t>Стригеррить</a:t>
+            </a:r>
+            <a:r>
+              <a:rPr lang="ru-RU" dirty="0"/>
+              <a:t> изменения по целевой таблице</a:t>
             </a:r>
           </a:p>
           <a:p>
             <a:pPr lvl="1"/>
             <a:r>
               <a:rPr lang="ru-RU" dirty="0"/>
-              <a:t>Установить настройку, ограничивающую размер </a:t>
-            </a:r>
-            <a:r>
-              <a:rPr lang="en-US" dirty="0"/>
-              <a:t>WAL’</a:t>
-            </a:r>
-            <a:r>
-              <a:rPr lang="ru-RU" dirty="0"/>
-              <a:t>а</a:t>
-            </a:r>
+              <a:t>Обновить </a:t>
+            </a:r>
+            <a:r>
+              <a:rPr lang="en-US" dirty="0" err="1"/>
+              <a:t>debezium</a:t>
+            </a:r>
+            <a:r>
+              <a:rPr lang="en-US" dirty="0"/>
+              <a:t> </a:t>
+            </a:r>
+            <a:r>
+              <a:rPr lang="ru-RU" dirty="0"/>
+              <a:t>до версии выше </a:t>
+            </a:r>
+            <a:r>
+              <a:rPr lang="en-US" dirty="0"/>
+              <a:t>3.1.2+</a:t>
+            </a:r>
+            <a:endParaRPr lang="ru-RU" dirty="0"/>
           </a:p>
         </p:txBody>
       </p:sp>
     </p:spTree>
     <p:extLst>
       <p:ext uri="{BB962C8B-B14F-4D97-AF65-F5344CB8AC3E}">
-        <p14:creationId xmlns:p14="http://schemas.microsoft.com/office/powerpoint/2010/main" val="1965460881"/>
+        <p14:creationId xmlns:p14="http://schemas.microsoft.com/office/powerpoint/2010/main" val="3287761478"/>
       </p:ext>
     </p:extLst>
   </p:cSld>
@@ -6073,12 +6026,8 @@
               <a:t>: </a:t>
             </a:r>
             <a:r>
-              <a:rPr lang="ru-RU" dirty="0" err="1"/>
-              <a:t>эвенты</a:t>
-            </a:r>
-            <a:r>
-              <a:rPr lang="ru-RU" dirty="0"/>
-              <a:t> с неполным состоянием</a:t>
+              <a:rPr lang="ru-RU" dirty="0"/>
+              <a:t>редко обновляемые таблицы</a:t>
             </a:r>
             <a:endParaRPr lang="en-US" dirty="0"/>
           </a:p>
@@ -6114,62 +6063,74 @@
           <a:p>
             <a:r>
               <a:rPr lang="ru-RU" dirty="0"/>
-              <a:t>Контекст: реплицируется таблица с </a:t>
-            </a:r>
-            <a:r>
-              <a:rPr lang="en-US" dirty="0"/>
-              <a:t>TOAST </a:t>
-            </a:r>
-            <a:r>
-              <a:rPr lang="ru-RU" dirty="0"/>
-              <a:t>полями</a:t>
-            </a:r>
-          </a:p>
-          <a:p>
-            <a:r>
-              <a:rPr lang="ru-RU" dirty="0"/>
-              <a:t>Проблема: некоторые </a:t>
+              <a:t>Контекст: в БД много таблиц, но реплицируем одну таблицу справочник, которая обновляется крайне редко</a:t>
+            </a:r>
+          </a:p>
+          <a:p>
+            <a:r>
+              <a:rPr lang="ru-RU" dirty="0"/>
+              <a:t>Проблема: Слот всегда отстает, </a:t>
+            </a:r>
+            <a:r>
+              <a:rPr lang="en-US" dirty="0"/>
+              <a:t>WAL </a:t>
+            </a:r>
+            <a:r>
+              <a:rPr lang="ru-RU" dirty="0"/>
+              <a:t>копится до «предела». Есть риск потери данных и переход </a:t>
             </a:r>
             <a:r>
               <a:rPr lang="ru-RU" dirty="0" err="1"/>
-              <a:t>эвенты</a:t>
-            </a:r>
-            <a:r>
-              <a:rPr lang="ru-RU" dirty="0"/>
-              <a:t> приходят только с частью заполненных колонок</a:t>
-            </a:r>
-          </a:p>
-          <a:p>
-            <a:r>
-              <a:rPr lang="ru-RU" dirty="0"/>
-              <a:t>Решения:</a:t>
+              <a:t>инстанса</a:t>
+            </a:r>
+            <a:r>
+              <a:rPr lang="ru-RU" dirty="0"/>
+              <a:t> в </a:t>
+            </a:r>
+            <a:r>
+              <a:rPr lang="en-US" dirty="0"/>
+              <a:t>RO</a:t>
+            </a:r>
+            <a:endParaRPr lang="ru-RU" dirty="0"/>
+          </a:p>
+          <a:p>
+            <a:r>
+              <a:rPr lang="ru-RU" dirty="0"/>
+              <a:t>Решение:</a:t>
             </a:r>
           </a:p>
           <a:p>
             <a:pPr lvl="1"/>
             <a:r>
               <a:rPr lang="en-US" dirty="0"/>
-              <a:t>REPLICA IDENTITY FULL</a:t>
+              <a:t>Heartbeat </a:t>
+            </a:r>
+            <a:r>
+              <a:rPr lang="ru-RU" dirty="0"/>
+              <a:t>таблица</a:t>
             </a:r>
           </a:p>
           <a:p>
             <a:pPr lvl="1"/>
             <a:r>
               <a:rPr lang="ru-RU" dirty="0"/>
-              <a:t>Сделать поля частью </a:t>
-            </a:r>
-            <a:r>
-              <a:rPr lang="en-US" dirty="0"/>
-              <a:t>PK / Unique index</a:t>
-            </a:r>
-            <a:endParaRPr lang="ru-RU" dirty="0"/>
+              <a:t>Установить настройку, ограничивающую размер </a:t>
+            </a:r>
+            <a:r>
+              <a:rPr lang="en-US" dirty="0"/>
+              <a:t>WAL’</a:t>
+            </a:r>
+            <a:r>
+              <a:rPr lang="ru-RU" dirty="0"/>
+              <a:t>а</a:t>
+            </a:r>
           </a:p>
         </p:txBody>
       </p:sp>
     </p:spTree>
     <p:extLst>
       <p:ext uri="{BB962C8B-B14F-4D97-AF65-F5344CB8AC3E}">
-        <p14:creationId xmlns:p14="http://schemas.microsoft.com/office/powerpoint/2010/main" val="3406737331"/>
+        <p14:creationId xmlns:p14="http://schemas.microsoft.com/office/powerpoint/2010/main" val="1965460881"/>
       </p:ext>
     </p:extLst>
   </p:cSld>
@@ -6232,11 +6193,11 @@
             </a:r>
             <a:r>
               <a:rPr lang="ru-RU" dirty="0" err="1"/>
-              <a:t>партиционированные</a:t>
-            </a:r>
-            <a:r>
-              <a:rPr lang="ru-RU" dirty="0"/>
-              <a:t> таблицы</a:t>
+              <a:t>эвенты</a:t>
+            </a:r>
+            <a:r>
+              <a:rPr lang="ru-RU" dirty="0"/>
+              <a:t> с неполным состоянием</a:t>
             </a:r>
             <a:endParaRPr lang="en-US" dirty="0"/>
           </a:p>
@@ -6272,21 +6233,21 @@
           <a:p>
             <a:r>
               <a:rPr lang="ru-RU" dirty="0"/>
-              <a:t>Задача: нужно реплицировать </a:t>
-            </a:r>
-            <a:r>
-              <a:rPr lang="ru-RU" dirty="0" err="1"/>
-              <a:t>партиционированную</a:t>
-            </a:r>
-            <a:r>
-              <a:rPr lang="ru-RU" dirty="0"/>
-              <a:t> таблицу</a:t>
-            </a:r>
-          </a:p>
-          <a:p>
-            <a:r>
-              <a:rPr lang="ru-RU" dirty="0"/>
-              <a:t>Проблема: </a:t>
+              <a:t>Контекст: реплицируется таблица с </a:t>
+            </a:r>
+            <a:r>
+              <a:rPr lang="en-US" dirty="0"/>
+              <a:t>TOAST </a:t>
+            </a:r>
+            <a:r>
+              <a:rPr lang="ru-RU" dirty="0"/>
+              <a:t>полями</a:t>
+            </a:r>
+          </a:p>
+          <a:p>
+            <a:r>
+              <a:rPr lang="ru-RU" dirty="0"/>
+              <a:t>Проблема: некоторые </a:t>
             </a:r>
             <a:r>
               <a:rPr lang="ru-RU" dirty="0" err="1"/>
@@ -6294,42 +6255,40 @@
             </a:r>
             <a:r>
               <a:rPr lang="ru-RU" dirty="0"/>
-              <a:t> приходят не от корневой таблицы, а от </a:t>
-            </a:r>
-            <a:r>
-              <a:rPr lang="ru-RU" dirty="0" err="1"/>
-              <a:t>партиций</a:t>
+              <a:t> приходят только с частью заполненных колонок</a:t>
+            </a:r>
+          </a:p>
+          <a:p>
+            <a:r>
+              <a:rPr lang="ru-RU" dirty="0"/>
+              <a:t>Решения:</a:t>
+            </a:r>
+          </a:p>
+          <a:p>
+            <a:pPr lvl="1"/>
+            <a:r>
+              <a:rPr lang="en-US" dirty="0"/>
+              <a:t>REPLICA IDENTITY FULL</a:t>
+            </a:r>
+          </a:p>
+          <a:p>
+            <a:pPr lvl="1"/>
+            <a:r>
+              <a:rPr lang="ru-RU" dirty="0"/>
+              <a:t>Сделать поля частью </a:t>
+            </a:r>
+            <a:r>
+              <a:rPr lang="en-US" dirty="0"/>
+              <a:t>PK / Unique index</a:t>
             </a:r>
             <a:endParaRPr lang="ru-RU" dirty="0"/>
-          </a:p>
-          <a:p>
-            <a:r>
-              <a:rPr lang="ru-RU" dirty="0"/>
-              <a:t>Решение:</a:t>
-            </a:r>
-          </a:p>
-          <a:p>
-            <a:pPr lvl="1"/>
-            <a:r>
-              <a:rPr lang="ru-RU" dirty="0"/>
-              <a:t>При создании публикации выставить флаг «</a:t>
-            </a:r>
-            <a:r>
-              <a:rPr lang="en-US" dirty="0" err="1"/>
-              <a:t>publish_via_partition_root</a:t>
-            </a:r>
-            <a:r>
-              <a:rPr lang="ru-RU" dirty="0"/>
-              <a:t>»</a:t>
-            </a:r>
-            <a:endParaRPr lang="en-US" dirty="0"/>
           </a:p>
         </p:txBody>
       </p:sp>
     </p:spTree>
     <p:extLst>
       <p:ext uri="{BB962C8B-B14F-4D97-AF65-F5344CB8AC3E}">
-        <p14:creationId xmlns:p14="http://schemas.microsoft.com/office/powerpoint/2010/main" val="1856578306"/>
+        <p14:creationId xmlns:p14="http://schemas.microsoft.com/office/powerpoint/2010/main" val="3406737331"/>
       </p:ext>
     </p:extLst>
   </p:cSld>
@@ -6391,8 +6350,12 @@
               <a:t>: </a:t>
             </a:r>
             <a:r>
-              <a:rPr lang="en-US" dirty="0" err="1"/>
-              <a:t>hypertable</a:t>
+              <a:rPr lang="ru-RU" dirty="0" err="1"/>
+              <a:t>партиционированные</a:t>
+            </a:r>
+            <a:r>
+              <a:rPr lang="ru-RU" dirty="0"/>
+              <a:t> таблицы</a:t>
             </a:r>
             <a:endParaRPr lang="en-US" dirty="0"/>
           </a:p>
@@ -6431,35 +6394,18 @@
               <a:t>Задача: нужно реплицировать </a:t>
             </a:r>
             <a:r>
-              <a:rPr lang="en-US" dirty="0" err="1"/>
-              <a:t>hypertable</a:t>
-            </a:r>
-            <a:r>
-              <a:rPr lang="en-US" dirty="0"/>
-              <a:t> (</a:t>
-            </a:r>
-            <a:r>
-              <a:rPr lang="en-US" dirty="0" err="1"/>
-              <a:t>timescaldb</a:t>
-            </a:r>
-            <a:r>
-              <a:rPr lang="en-US" dirty="0"/>
-              <a:t>)</a:t>
-            </a:r>
-            <a:endParaRPr lang="ru-RU" dirty="0"/>
-          </a:p>
-          <a:p>
-            <a:r>
-              <a:rPr lang="ru-RU" dirty="0"/>
-              <a:t>Проблема </a:t>
-            </a:r>
-            <a:r>
-              <a:rPr lang="en-US" dirty="0"/>
-              <a:t>#1</a:t>
-            </a:r>
-            <a:r>
-              <a:rPr lang="ru-RU" dirty="0"/>
-              <a:t>: </a:t>
+              <a:rPr lang="ru-RU" dirty="0" err="1"/>
+              <a:t>партиционированную</a:t>
+            </a:r>
+            <a:r>
+              <a:rPr lang="ru-RU" dirty="0"/>
+              <a:t> таблицу</a:t>
+            </a:r>
+          </a:p>
+          <a:p>
+            <a:r>
+              <a:rPr lang="ru-RU" dirty="0"/>
+              <a:t>Проблема: </a:t>
             </a:r>
             <a:r>
               <a:rPr lang="ru-RU" dirty="0" err="1"/>
@@ -6467,8 +6413,13 @@
             </a:r>
             <a:r>
               <a:rPr lang="ru-RU" dirty="0"/>
-              <a:t> не приходят</a:t>
-            </a:r>
+              <a:t> приходят не от корневой таблицы, а от </a:t>
+            </a:r>
+            <a:r>
+              <a:rPr lang="ru-RU" dirty="0" err="1"/>
+              <a:t>партиций</a:t>
+            </a:r>
+            <a:endParaRPr lang="ru-RU" dirty="0"/>
           </a:p>
           <a:p>
             <a:r>
@@ -6480,32 +6431,15 @@
             <a:pPr lvl="1"/>
             <a:r>
               <a:rPr lang="ru-RU" dirty="0"/>
-              <a:t>«Правильная настройка» (пример)</a:t>
-            </a:r>
-          </a:p>
-          <a:p>
-            <a:r>
-              <a:rPr lang="en-US" dirty="0"/>
-              <a:t> </a:t>
-            </a:r>
-            <a:r>
-              <a:rPr lang="ru-RU" dirty="0"/>
-              <a:t>Проблема </a:t>
-            </a:r>
-            <a:r>
-              <a:rPr lang="en-US" dirty="0"/>
-              <a:t>#2: </a:t>
-            </a:r>
-            <a:r>
-              <a:rPr lang="ru-RU" dirty="0"/>
-              <a:t>процесс падает из-за системной таблицы</a:t>
-            </a:r>
-          </a:p>
-          <a:p>
-            <a:pPr lvl="1"/>
-            <a:r>
-              <a:rPr lang="ru-RU" dirty="0"/>
-              <a:t>Решение: явное исключение таблиц из репликации</a:t>
+              <a:t>При создании публикации выставить флаг «</a:t>
+            </a:r>
+            <a:r>
+              <a:rPr lang="en-US" dirty="0" err="1"/>
+              <a:t>publish_via_partition_root</a:t>
+            </a:r>
+            <a:r>
+              <a:rPr lang="ru-RU" dirty="0"/>
+              <a:t>»</a:t>
             </a:r>
             <a:endParaRPr lang="en-US" dirty="0"/>
           </a:p>
@@ -6514,7 +6448,7 @@
     </p:spTree>
     <p:extLst>
       <p:ext uri="{BB962C8B-B14F-4D97-AF65-F5344CB8AC3E}">
-        <p14:creationId xmlns:p14="http://schemas.microsoft.com/office/powerpoint/2010/main" val="1513835637"/>
+        <p14:creationId xmlns:p14="http://schemas.microsoft.com/office/powerpoint/2010/main" val="1856578306"/>
       </p:ext>
     </p:extLst>
   </p:cSld>
@@ -6576,8 +6510,8 @@
               <a:t>: </a:t>
             </a:r>
             <a:r>
-              <a:rPr lang="ru-RU" dirty="0"/>
-              <a:t>эволюция схем</a:t>
+              <a:rPr lang="en-US" dirty="0" err="1"/>
+              <a:t>hypertable</a:t>
             </a:r>
             <a:endParaRPr lang="en-US" dirty="0"/>
           </a:p>
@@ -6613,106 +6547,93 @@
           <a:p>
             <a:r>
               <a:rPr lang="ru-RU" dirty="0"/>
-              <a:t>Контекст: </a:t>
+              <a:t>Задача: нужно реплицировать </a:t>
             </a:r>
             <a:r>
               <a:rPr lang="en-US" dirty="0" err="1"/>
-              <a:t>debezium</a:t>
-            </a:r>
+              <a:t>hypertable</a:t>
+            </a:r>
+            <a:r>
+              <a:rPr lang="en-US" dirty="0"/>
+              <a:t> (</a:t>
+            </a:r>
+            <a:r>
+              <a:rPr lang="en-US" dirty="0" err="1"/>
+              <a:t>timescaldb</a:t>
+            </a:r>
+            <a:r>
+              <a:rPr lang="en-US" dirty="0"/>
+              <a:t>)</a:t>
+            </a:r>
+            <a:endParaRPr lang="ru-RU" dirty="0"/>
+          </a:p>
+          <a:p>
+            <a:r>
+              <a:rPr lang="ru-RU" dirty="0"/>
+              <a:t>Проблема </a:t>
+            </a:r>
+            <a:r>
+              <a:rPr lang="en-US" dirty="0"/>
+              <a:t>#1</a:t>
+            </a:r>
+            <a:r>
+              <a:rPr lang="ru-RU" dirty="0"/>
+              <a:t>: </a:t>
+            </a:r>
+            <a:r>
+              <a:rPr lang="ru-RU" dirty="0" err="1"/>
+              <a:t>эвенты</a:t>
+            </a:r>
+            <a:r>
+              <a:rPr lang="ru-RU" dirty="0"/>
+              <a:t> не приходят</a:t>
+            </a:r>
+          </a:p>
+          <a:p>
+            <a:r>
+              <a:rPr lang="ru-RU" dirty="0"/>
+              <a:t>Решение:</a:t>
+            </a:r>
+          </a:p>
+          <a:p>
+            <a:pPr lvl="1"/>
+            <a:r>
+              <a:rPr lang="ru-RU" dirty="0"/>
+              <a:t>«Правильная настройка» (пример)</a:t>
+            </a:r>
+          </a:p>
+          <a:p>
             <a:r>
               <a:rPr lang="en-US" dirty="0"/>
               <a:t> </a:t>
             </a:r>
             <a:r>
               <a:rPr lang="ru-RU" dirty="0"/>
-              <a:t>использует </a:t>
-            </a:r>
-            <a:r>
-              <a:rPr lang="en-US" dirty="0" err="1"/>
-              <a:t>avro</a:t>
-            </a:r>
-            <a:r>
-              <a:rPr lang="en-US" dirty="0"/>
-              <a:t>-</a:t>
-            </a:r>
-            <a:r>
-              <a:rPr lang="ru-RU" dirty="0"/>
-              <a:t>формат. Владелец БД изменил схему реплицируемой таблицы</a:t>
-            </a:r>
-          </a:p>
-          <a:p>
-            <a:r>
-              <a:rPr lang="ru-RU" dirty="0"/>
-              <a:t>Проблема: после изменения схемы </a:t>
-            </a:r>
-            <a:r>
-              <a:rPr lang="en-US" dirty="0" err="1"/>
-              <a:t>debezium</a:t>
-            </a:r>
-            <a:r>
-              <a:rPr lang="en-US" dirty="0"/>
-              <a:t> </a:t>
-            </a:r>
-            <a:r>
-              <a:rPr lang="ru-RU" dirty="0"/>
-              <a:t>падает</a:t>
-            </a:r>
-          </a:p>
-          <a:p>
-            <a:r>
-              <a:rPr lang="ru-RU" dirty="0"/>
-              <a:t>Причина: несовместимое изменение схемы</a:t>
-            </a:r>
-          </a:p>
-          <a:p>
-            <a:r>
-              <a:rPr lang="ru-RU" dirty="0"/>
-              <a:t>Решения:</a:t>
+              <a:t>Проблема </a:t>
+            </a:r>
+            <a:r>
+              <a:rPr lang="en-US" dirty="0"/>
+              <a:t>#2: </a:t>
+            </a:r>
+            <a:r>
+              <a:rPr lang="ru-RU" dirty="0"/>
+              <a:t>процесс падает из-за системной таблицы</a:t>
             </a:r>
           </a:p>
           <a:p>
             <a:pPr lvl="1"/>
             <a:r>
               <a:rPr lang="ru-RU" dirty="0"/>
-              <a:t>Указать </a:t>
-            </a:r>
-            <a:r>
-              <a:rPr lang="en-US" dirty="0" err="1"/>
-              <a:t>compatibility.mode</a:t>
-            </a:r>
-            <a:r>
-              <a:rPr lang="en-US" dirty="0"/>
-              <a:t>=NONE</a:t>
-            </a:r>
-          </a:p>
-          <a:p>
-            <a:pPr lvl="1"/>
-            <a:r>
-              <a:rPr lang="ru-RU" dirty="0"/>
-              <a:t>Глобально запретить выполнять несовместимые изменения </a:t>
-            </a:r>
-          </a:p>
-          <a:p>
-            <a:pPr lvl="1"/>
-            <a:r>
-              <a:rPr lang="ru-RU" dirty="0"/>
-              <a:t>Контролировать </a:t>
-            </a:r>
-            <a:r>
-              <a:rPr lang="ru-RU" dirty="0" err="1"/>
-              <a:t>валидацию</a:t>
-            </a:r>
-            <a:r>
-              <a:rPr lang="ru-RU" dirty="0"/>
-              <a:t> эволюции схемы самостоятельно</a:t>
-            </a:r>
+              <a:t>Решение: явное исключение таблиц из репликации</a:t>
+            </a:r>
+            <a:endParaRPr lang="en-US" dirty="0"/>
           </a:p>
         </p:txBody>
       </p:sp>
     </p:spTree>
     <p:extLst>
       <p:ext uri="{BB962C8B-B14F-4D97-AF65-F5344CB8AC3E}">
-        <p14:creationId xmlns:p14="http://schemas.microsoft.com/office/powerpoint/2010/main" val="3793313203"/>
+        <p14:creationId xmlns:p14="http://schemas.microsoft.com/office/powerpoint/2010/main" val="1513835637"/>
       </p:ext>
     </p:extLst>
   </p:cSld>
@@ -6775,7 +6696,7 @@
             </a:r>
             <a:r>
               <a:rPr lang="ru-RU" dirty="0"/>
-              <a:t>упавший мастер</a:t>
+              <a:t>эволюция схем</a:t>
             </a:r>
             <a:endParaRPr lang="en-US" dirty="0"/>
           </a:p>
@@ -6811,15 +6732,7 @@
           <a:p>
             <a:r>
               <a:rPr lang="ru-RU" dirty="0"/>
-              <a:t>Проблема: мастер в кластере</a:t>
-            </a:r>
-            <a:r>
-              <a:rPr lang="en-US" dirty="0"/>
-              <a:t> PG </a:t>
-            </a:r>
-            <a:r>
-              <a:rPr lang="ru-RU" dirty="0"/>
-              <a:t>переехал, </a:t>
+              <a:t>Контекст: </a:t>
             </a:r>
             <a:r>
               <a:rPr lang="en-US" dirty="0" err="1"/>
@@ -6831,56 +6744,94 @@
             </a:r>
             <a:r>
               <a:rPr lang="ru-RU" dirty="0"/>
-              <a:t>упал</a:t>
-            </a:r>
-          </a:p>
-          <a:p>
-            <a:r>
-              <a:rPr lang="ru-RU" dirty="0"/>
-              <a:t>Решения:</a:t>
-            </a:r>
-          </a:p>
-          <a:p>
-            <a:pPr lvl="1"/>
-            <a:r>
-              <a:rPr lang="ru-RU" dirty="0"/>
-              <a:t>Обновить настройки подключения, указав ссылку на новый мастер</a:t>
-            </a:r>
-          </a:p>
-          <a:p>
-            <a:pPr lvl="1"/>
-            <a:r>
-              <a:rPr lang="ru-RU" dirty="0"/>
-              <a:t>Если </a:t>
-            </a:r>
-            <a:r>
-              <a:rPr lang="en-US" dirty="0"/>
-              <a:t>DNS </a:t>
-            </a:r>
-            <a:r>
-              <a:rPr lang="ru-RU" dirty="0"/>
-              <a:t>имя мастера не изменилось, то достаточно </a:t>
-            </a:r>
-            <a:r>
-              <a:rPr lang="ru-RU" dirty="0" err="1"/>
-              <a:t>ретраев</a:t>
-            </a:r>
-            <a:r>
-              <a:rPr lang="ru-RU" dirty="0"/>
-              <a:t> на стороне </a:t>
+              <a:t>использует </a:t>
+            </a:r>
+            <a:r>
+              <a:rPr lang="en-US" dirty="0" err="1"/>
+              <a:t>avro</a:t>
+            </a:r>
+            <a:r>
+              <a:rPr lang="en-US" dirty="0"/>
+              <a:t>-</a:t>
+            </a:r>
+            <a:r>
+              <a:rPr lang="ru-RU" dirty="0"/>
+              <a:t>формат. Владелец БД изменил схему реплицируемой таблицы</a:t>
+            </a:r>
+          </a:p>
+          <a:p>
+            <a:r>
+              <a:rPr lang="ru-RU" dirty="0"/>
+              <a:t>Проблема: после изменения схемы </a:t>
             </a:r>
             <a:r>
               <a:rPr lang="en-US" dirty="0" err="1"/>
               <a:t>debezium</a:t>
             </a:r>
-            <a:endParaRPr lang="ru-RU" dirty="0"/>
+            <a:r>
+              <a:rPr lang="en-US" dirty="0"/>
+              <a:t> </a:t>
+            </a:r>
+            <a:r>
+              <a:rPr lang="ru-RU" dirty="0"/>
+              <a:t>падает</a:t>
+            </a:r>
+          </a:p>
+          <a:p>
+            <a:r>
+              <a:rPr lang="ru-RU" dirty="0"/>
+              <a:t>Причина: несовместимое изменение схемы</a:t>
+            </a:r>
+          </a:p>
+          <a:p>
+            <a:r>
+              <a:rPr lang="ru-RU" dirty="0"/>
+              <a:t>Решения:</a:t>
+            </a:r>
+          </a:p>
+          <a:p>
+            <a:pPr lvl="1"/>
+            <a:r>
+              <a:rPr lang="ru-RU" dirty="0"/>
+              <a:t>Указать </a:t>
+            </a:r>
+            <a:r>
+              <a:rPr lang="en-US" dirty="0" err="1"/>
+              <a:t>compatibility.mode</a:t>
+            </a:r>
+            <a:r>
+              <a:rPr lang="en-US" dirty="0"/>
+              <a:t>=NONE</a:t>
+            </a:r>
+          </a:p>
+          <a:p>
+            <a:pPr lvl="1"/>
+            <a:r>
+              <a:rPr lang="ru-RU" dirty="0"/>
+              <a:t>Глобально запретить выполнять несовместимые изменения </a:t>
+            </a:r>
+          </a:p>
+          <a:p>
+            <a:pPr lvl="1"/>
+            <a:r>
+              <a:rPr lang="ru-RU" dirty="0"/>
+              <a:t>Контролировать </a:t>
+            </a:r>
+            <a:r>
+              <a:rPr lang="ru-RU" dirty="0" err="1"/>
+              <a:t>валидацию</a:t>
+            </a:r>
+            <a:r>
+              <a:rPr lang="ru-RU" dirty="0"/>
+              <a:t> эволюции схемы самостоятельно</a:t>
+            </a:r>
           </a:p>
         </p:txBody>
       </p:sp>
     </p:spTree>
     <p:extLst>
       <p:ext uri="{BB962C8B-B14F-4D97-AF65-F5344CB8AC3E}">
-        <p14:creationId xmlns:p14="http://schemas.microsoft.com/office/powerpoint/2010/main" val="2646893299"/>
+        <p14:creationId xmlns:p14="http://schemas.microsoft.com/office/powerpoint/2010/main" val="3793313203"/>
       </p:ext>
     </p:extLst>
   </p:cSld>
@@ -6942,20 +6893,8 @@
               <a:t>: </a:t>
             </a:r>
             <a:r>
-              <a:rPr lang="en-US" dirty="0" err="1"/>
-              <a:t>cdc</a:t>
-            </a:r>
-            <a:r>
-              <a:rPr lang="en-US" dirty="0"/>
-              <a:t> </a:t>
-            </a:r>
-            <a:r>
-              <a:rPr lang="ru-RU" dirty="0"/>
-              <a:t>для </a:t>
-            </a:r>
-            <a:r>
-              <a:rPr lang="ru-RU" dirty="0" err="1"/>
-              <a:t>шардов</a:t>
+              <a:rPr lang="ru-RU" dirty="0"/>
+              <a:t>упавший мастер</a:t>
             </a:r>
             <a:endParaRPr lang="en-US" dirty="0"/>
           </a:p>
@@ -6991,55 +6930,76 @@
           <a:p>
             <a:r>
               <a:rPr lang="ru-RU" dirty="0"/>
-              <a:t>Контекст: нужно перехватывать изменения по заданному набору таблиц в разных </a:t>
+              <a:t>Проблема: мастер в кластере</a:t>
+            </a:r>
+            <a:r>
+              <a:rPr lang="en-US" dirty="0"/>
+              <a:t> PG </a:t>
+            </a:r>
+            <a:r>
+              <a:rPr lang="ru-RU" dirty="0"/>
+              <a:t>переехал, </a:t>
+            </a:r>
+            <a:r>
+              <a:rPr lang="en-US" dirty="0" err="1"/>
+              <a:t>debezium</a:t>
+            </a:r>
+            <a:r>
+              <a:rPr lang="en-US" dirty="0"/>
+              <a:t> </a:t>
+            </a:r>
+            <a:r>
+              <a:rPr lang="ru-RU" dirty="0"/>
+              <a:t>упал</a:t>
+            </a:r>
+          </a:p>
+          <a:p>
+            <a:r>
+              <a:rPr lang="ru-RU" dirty="0"/>
+              <a:t>Решения:</a:t>
+            </a:r>
+          </a:p>
+          <a:p>
+            <a:pPr lvl="1"/>
+            <a:r>
+              <a:rPr lang="ru-RU" dirty="0"/>
+              <a:t>Обновить настройки подключения, указав ссылку на новый мастер</a:t>
+            </a:r>
+          </a:p>
+          <a:p>
+            <a:pPr lvl="1"/>
+            <a:r>
+              <a:rPr lang="ru-RU" dirty="0"/>
+              <a:t>Если </a:t>
+            </a:r>
+            <a:r>
+              <a:rPr lang="en-US" dirty="0"/>
+              <a:t>DNS </a:t>
+            </a:r>
+            <a:r>
+              <a:rPr lang="ru-RU" dirty="0"/>
+              <a:t>имя мастера не изменилось, то достаточно </a:t>
             </a:r>
             <a:r>
               <a:rPr lang="ru-RU" dirty="0" err="1"/>
-              <a:t>шардах</a:t>
+              <a:t>ретраев</a:t>
+            </a:r>
+            <a:r>
+              <a:rPr lang="ru-RU" dirty="0"/>
+              <a:t> на стороне </a:t>
+            </a:r>
+            <a:r>
+              <a:rPr lang="en-US" dirty="0" err="1"/>
+              <a:t>debezium</a:t>
             </a:r>
             <a:endParaRPr lang="ru-RU" dirty="0"/>
-          </a:p>
-          <a:p>
-            <a:r>
-              <a:rPr lang="ru-RU" dirty="0"/>
-              <a:t>Проблема: </a:t>
-            </a:r>
-            <a:r>
-              <a:rPr lang="ru-RU" dirty="0" err="1"/>
-              <a:t>эвенты</a:t>
-            </a:r>
-            <a:r>
-              <a:rPr lang="ru-RU" dirty="0"/>
-              <a:t> по одинаковым таблицам сохраняются в разные топики</a:t>
-            </a:r>
-          </a:p>
-          <a:p>
-            <a:r>
-              <a:rPr lang="ru-RU" dirty="0"/>
-              <a:t>Решение:</a:t>
-            </a:r>
-          </a:p>
-          <a:p>
-            <a:pPr lvl="1"/>
-            <a:r>
-              <a:rPr lang="ru-RU" dirty="0"/>
-              <a:t>Настройка </a:t>
-            </a:r>
-            <a:r>
-              <a:rPr lang="ru-RU" dirty="0" err="1"/>
-              <a:t>роутинга</a:t>
-            </a:r>
-            <a:r>
-              <a:rPr lang="ru-RU" dirty="0"/>
-              <a:t> таблиц</a:t>
-            </a:r>
           </a:p>
         </p:txBody>
       </p:sp>
     </p:spTree>
     <p:extLst>
       <p:ext uri="{BB962C8B-B14F-4D97-AF65-F5344CB8AC3E}">
-        <p14:creationId xmlns:p14="http://schemas.microsoft.com/office/powerpoint/2010/main" val="2860038133"/>
+        <p14:creationId xmlns:p14="http://schemas.microsoft.com/office/powerpoint/2010/main" val="2646893299"/>
       </p:ext>
     </p:extLst>
   </p:cSld>
@@ -7227,6 +7187,18 @@
               <a:rPr lang="ru-RU" dirty="0" err="1"/>
               <a:t>шардов</a:t>
             </a:r>
+            <a:r>
+              <a:rPr lang="ru-RU" dirty="0"/>
+              <a:t> </a:t>
+            </a:r>
+            <a:r>
+              <a:rPr lang="en-US" dirty="0"/>
+              <a:t># </a:t>
+            </a:r>
+            <a:r>
+              <a:rPr lang="ru-RU" dirty="0" err="1"/>
+              <a:t>роутинг</a:t>
+            </a:r>
             <a:endParaRPr lang="en-US" dirty="0"/>
           </a:p>
         </p:txBody>
@@ -7255,7 +7227,7 @@
         </p:spPr>
         <p:txBody>
           <a:bodyPr>
-            <a:normAutofit fontScale="92500" lnSpcReduction="10000"/>
+            <a:normAutofit/>
           </a:bodyPr>
           <a:lstStyle/>
           <a:p>
@@ -7267,36 +7239,12 @@
               <a:rPr lang="ru-RU" dirty="0" err="1"/>
               <a:t>шардах</a:t>
             </a:r>
-            <a:r>
-              <a:rPr lang="ru-RU" dirty="0"/>
-              <a:t> / </a:t>
-            </a:r>
-            <a:r>
-              <a:rPr lang="en-US" dirty="0" err="1"/>
-              <a:t>debezium</a:t>
-            </a:r>
-            <a:r>
-              <a:rPr lang="ru-RU" dirty="0"/>
-              <a:t> использует </a:t>
-            </a:r>
-            <a:r>
-              <a:rPr lang="en-US" dirty="0" err="1"/>
-              <a:t>avro</a:t>
-            </a:r>
             <a:endParaRPr lang="ru-RU" dirty="0"/>
           </a:p>
           <a:p>
             <a:r>
               <a:rPr lang="ru-RU" dirty="0"/>
-              <a:t>Проблема </a:t>
-            </a:r>
-            <a:r>
-              <a:rPr lang="en-US" dirty="0"/>
-              <a:t>#1</a:t>
-            </a:r>
-            <a:r>
-              <a:rPr lang="ru-RU" dirty="0"/>
-              <a:t>: </a:t>
+              <a:t>Проблема: </a:t>
             </a:r>
             <a:r>
               <a:rPr lang="ru-RU" dirty="0" err="1"/>
@@ -7304,19 +7252,7 @@
             </a:r>
             <a:r>
               <a:rPr lang="ru-RU" dirty="0"/>
-              <a:t> по одинаковым таблицам имею одинаковую структуру, но </a:t>
-            </a:r>
-            <a:r>
-              <a:rPr lang="en-US" dirty="0" err="1"/>
-              <a:t>debezium</a:t>
-            </a:r>
-            <a:r>
-              <a:rPr lang="en-US" dirty="0"/>
-              <a:t> </a:t>
-            </a:r>
-            <a:r>
-              <a:rPr lang="ru-RU" dirty="0"/>
-              <a:t>генерирует разные несовместимые схемы</a:t>
+              <a:t> по одинаковым таблицам сохраняются в разные топики</a:t>
             </a:r>
           </a:p>
           <a:p>
@@ -7329,44 +7265,15 @@
             <a:pPr lvl="1"/>
             <a:r>
               <a:rPr lang="ru-RU" dirty="0"/>
-              <a:t>Трансформ для переименования рекордов</a:t>
-            </a:r>
-            <a:endParaRPr lang="en-US" dirty="0"/>
-          </a:p>
-          <a:p>
-            <a:r>
-              <a:rPr lang="ru-RU" dirty="0"/>
-              <a:t>Проблема </a:t>
-            </a:r>
-            <a:r>
-              <a:rPr lang="en-US" dirty="0"/>
-              <a:t>#2: </a:t>
-            </a:r>
-            <a:r>
-              <a:rPr lang="ru-RU" dirty="0"/>
-              <a:t>переименование сработало только на верхнем уровне. Вложенные структуры также с разным </a:t>
+              <a:t>Настройка </a:t>
             </a:r>
             <a:r>
               <a:rPr lang="ru-RU" dirty="0" err="1"/>
-              <a:t>неймингом</a:t>
-            </a:r>
-            <a:endParaRPr lang="ru-RU" dirty="0"/>
-          </a:p>
-          <a:p>
-            <a:r>
-              <a:rPr lang="ru-RU" dirty="0"/>
-              <a:t>Решение:</a:t>
-            </a:r>
-          </a:p>
-          <a:p>
-            <a:pPr lvl="1"/>
-            <a:r>
-              <a:rPr lang="ru-RU" dirty="0" err="1"/>
-              <a:t>Кастомный</a:t>
-            </a:r>
-            <a:r>
-              <a:rPr lang="ru-RU" dirty="0"/>
-              <a:t> трансформ, который переименовывает в том числе и вложенные структуры</a:t>
+              <a:t>роутинга</a:t>
+            </a:r>
+            <a:r>
+              <a:rPr lang="ru-RU" dirty="0"/>
+              <a:t> таблиц</a:t>
             </a:r>
           </a:p>
         </p:txBody>
@@ -7374,7 +7281,7 @@
     </p:spTree>
     <p:extLst>
       <p:ext uri="{BB962C8B-B14F-4D97-AF65-F5344CB8AC3E}">
-        <p14:creationId xmlns:p14="http://schemas.microsoft.com/office/powerpoint/2010/main" val="167980905"/>
+        <p14:creationId xmlns:p14="http://schemas.microsoft.com/office/powerpoint/2010/main" val="2860038133"/>
       </p:ext>
     </p:extLst>
   </p:cSld>
@@ -7419,8 +7326,8 @@
         </p:nvSpPr>
         <p:spPr>
           <a:xfrm>
-            <a:off x="0" y="18255"/>
-            <a:ext cx="10515600" cy="1325563"/>
+            <a:off x="-1" y="18255"/>
+            <a:ext cx="11867745" cy="1325563"/>
           </a:xfrm>
         </p:spPr>
         <p:txBody>
@@ -7433,13 +7340,28 @@
             </a:r>
             <a:r>
               <a:rPr lang="en-US" dirty="0"/>
-              <a:t>: timestamp / </a:t>
+              <a:t>: </a:t>
             </a:r>
             <a:r>
               <a:rPr lang="en-US" dirty="0" err="1"/>
-              <a:t>timestamptz</a:t>
-            </a:r>
-            <a:endParaRPr lang="en-US" dirty="0"/>
+              <a:t>cdc</a:t>
+            </a:r>
+            <a:r>
+              <a:rPr lang="en-US" dirty="0"/>
+              <a:t> </a:t>
+            </a:r>
+            <a:r>
+              <a:rPr lang="ru-RU" dirty="0"/>
+              <a:t>для </a:t>
+            </a:r>
+            <a:r>
+              <a:rPr lang="ru-RU" dirty="0" err="1"/>
+              <a:t>шардов</a:t>
+            </a:r>
+            <a:r>
+              <a:rPr lang="en-US" dirty="0"/>
+              <a:t> # schema evolution</a:t>
+            </a:r>
           </a:p>
         </p:txBody>
       </p:sp>
@@ -7467,21 +7389,735 @@
         </p:spPr>
         <p:txBody>
           <a:bodyPr>
+            <a:normAutofit fontScale="92500" lnSpcReduction="10000"/>
+          </a:bodyPr>
+          <a:lstStyle/>
+          <a:p>
+            <a:r>
+              <a:rPr lang="ru-RU" dirty="0"/>
+              <a:t>Контекст: нужно перехватывать изменения по заданному набору таблиц в разных </a:t>
+            </a:r>
+            <a:r>
+              <a:rPr lang="ru-RU" dirty="0" err="1"/>
+              <a:t>шардах</a:t>
+            </a:r>
+            <a:r>
+              <a:rPr lang="ru-RU" dirty="0"/>
+              <a:t> / </a:t>
+            </a:r>
+            <a:r>
+              <a:rPr lang="en-US" dirty="0" err="1"/>
+              <a:t>debezium</a:t>
+            </a:r>
+            <a:r>
+              <a:rPr lang="ru-RU" dirty="0"/>
+              <a:t> использует </a:t>
+            </a:r>
+            <a:r>
+              <a:rPr lang="en-US" dirty="0" err="1"/>
+              <a:t>avro</a:t>
+            </a:r>
+            <a:endParaRPr lang="ru-RU" dirty="0"/>
+          </a:p>
+          <a:p>
+            <a:r>
+              <a:rPr lang="ru-RU" dirty="0"/>
+              <a:t>Проблема </a:t>
+            </a:r>
+            <a:r>
+              <a:rPr lang="en-US" dirty="0"/>
+              <a:t>#1</a:t>
+            </a:r>
+            <a:r>
+              <a:rPr lang="ru-RU" dirty="0"/>
+              <a:t>: </a:t>
+            </a:r>
+            <a:r>
+              <a:rPr lang="ru-RU" dirty="0" err="1"/>
+              <a:t>эвенты</a:t>
+            </a:r>
+            <a:r>
+              <a:rPr lang="ru-RU" dirty="0"/>
+              <a:t> по одинаковым таблицам имею одинаковую структуру, но </a:t>
+            </a:r>
+            <a:r>
+              <a:rPr lang="en-US" dirty="0" err="1"/>
+              <a:t>debezium</a:t>
+            </a:r>
+            <a:r>
+              <a:rPr lang="en-US" dirty="0"/>
+              <a:t> </a:t>
+            </a:r>
+            <a:r>
+              <a:rPr lang="ru-RU" dirty="0"/>
+              <a:t>генерирует разные несовместимые схемы</a:t>
+            </a:r>
+          </a:p>
+          <a:p>
+            <a:r>
+              <a:rPr lang="ru-RU" dirty="0"/>
+              <a:t>Решение:</a:t>
+            </a:r>
+          </a:p>
+          <a:p>
+            <a:pPr lvl="1"/>
+            <a:r>
+              <a:rPr lang="ru-RU" dirty="0"/>
+              <a:t>Трансформ для переименования рекордов</a:t>
+            </a:r>
+            <a:endParaRPr lang="en-US" dirty="0"/>
+          </a:p>
+          <a:p>
+            <a:r>
+              <a:rPr lang="ru-RU" dirty="0"/>
+              <a:t>Проблема </a:t>
+            </a:r>
+            <a:r>
+              <a:rPr lang="en-US" dirty="0"/>
+              <a:t>#2: </a:t>
+            </a:r>
+            <a:r>
+              <a:rPr lang="ru-RU" dirty="0"/>
+              <a:t>переименование сработало только на верхнем уровне. Вложенные структуры также с разным </a:t>
+            </a:r>
+            <a:r>
+              <a:rPr lang="ru-RU" dirty="0" err="1"/>
+              <a:t>неймингом</a:t>
+            </a:r>
+            <a:endParaRPr lang="ru-RU" dirty="0"/>
+          </a:p>
+          <a:p>
+            <a:r>
+              <a:rPr lang="ru-RU" dirty="0"/>
+              <a:t>Решение:</a:t>
+            </a:r>
+          </a:p>
+          <a:p>
+            <a:pPr lvl="1"/>
+            <a:r>
+              <a:rPr lang="ru-RU" dirty="0" err="1"/>
+              <a:t>Кастомный</a:t>
+            </a:r>
+            <a:r>
+              <a:rPr lang="ru-RU" dirty="0"/>
+              <a:t> трансформ, который переименовывает в том числе и вложенные структуры</a:t>
+            </a:r>
+          </a:p>
+        </p:txBody>
+      </p:sp>
+    </p:spTree>
+    <p:extLst>
+      <p:ext uri="{BB962C8B-B14F-4D97-AF65-F5344CB8AC3E}">
+        <p14:creationId xmlns:p14="http://schemas.microsoft.com/office/powerpoint/2010/main" val="167980905"/>
+      </p:ext>
+    </p:extLst>
+  </p:cSld>
+  <p:clrMapOvr>
+    <a:masterClrMapping/>
+  </p:clrMapOvr>
+</p:sld>
+</file>
+
+<file path=ppt/slides/slide32.xml><?xml version="1.0" encoding="utf-8"?>
+<p:sld xmlns:a="http://schemas.openxmlformats.org/drawingml/2006/main" xmlns:r="http://schemas.openxmlformats.org/officeDocument/2006/relationships" xmlns:p="http://schemas.openxmlformats.org/presentationml/2006/main">
+  <p:cSld>
+    <p:spTree>
+      <p:nvGrpSpPr>
+        <p:cNvPr id="1" name=""/>
+        <p:cNvGrpSpPr/>
+        <p:nvPr/>
+      </p:nvGrpSpPr>
+      <p:grpSpPr>
+        <a:xfrm>
+          <a:off x="0" y="0"/>
+          <a:ext cx="0" cy="0"/>
+          <a:chOff x="0" y="0"/>
+          <a:chExt cx="0" cy="0"/>
+        </a:xfrm>
+      </p:grpSpPr>
+      <p:sp>
+        <p:nvSpPr>
+          <p:cNvPr id="2" name="Title 1">
+            <a:extLst>
+              <a:ext uri="{FF2B5EF4-FFF2-40B4-BE49-F238E27FC236}">
+                <a16:creationId xmlns:a16="http://schemas.microsoft.com/office/drawing/2014/main" id="{00888323-12E8-8C4F-8E27-23BD5B7DEE03}"/>
+              </a:ext>
+            </a:extLst>
+          </p:cNvPr>
+          <p:cNvSpPr>
+            <a:spLocks noGrp="1"/>
+          </p:cNvSpPr>
+          <p:nvPr>
+            <p:ph type="title"/>
+          </p:nvPr>
+        </p:nvSpPr>
+        <p:spPr>
+          <a:xfrm>
+            <a:off x="0" y="18255"/>
+            <a:ext cx="10515600" cy="1325563"/>
+          </a:xfrm>
+        </p:spPr>
+        <p:txBody>
+          <a:bodyPr/>
+          <a:lstStyle/>
+          <a:p>
+            <a:r>
+              <a:rPr lang="en-US" dirty="0" err="1"/>
+              <a:t>Debezium</a:t>
+            </a:r>
+            <a:r>
+              <a:rPr lang="en-US" dirty="0"/>
+              <a:t>: transaction boundaries</a:t>
+            </a:r>
+          </a:p>
+        </p:txBody>
+      </p:sp>
+      <p:sp>
+        <p:nvSpPr>
+          <p:cNvPr id="3" name="Content Placeholder 2">
+            <a:extLst>
+              <a:ext uri="{FF2B5EF4-FFF2-40B4-BE49-F238E27FC236}">
+                <a16:creationId xmlns:a16="http://schemas.microsoft.com/office/drawing/2014/main" id="{DA11F9D3-C291-2245-AEA5-8D09537FB4E5}"/>
+              </a:ext>
+            </a:extLst>
+          </p:cNvPr>
+          <p:cNvSpPr>
+            <a:spLocks noGrp="1"/>
+          </p:cNvSpPr>
+          <p:nvPr>
+            <p:ph idx="1"/>
+          </p:nvPr>
+        </p:nvSpPr>
+        <p:spPr>
+          <a:xfrm>
+            <a:off x="0" y="1343818"/>
+            <a:ext cx="10515600" cy="4351338"/>
+          </a:xfrm>
+        </p:spPr>
+        <p:txBody>
+          <a:bodyPr>
             <a:normAutofit/>
           </a:bodyPr>
           <a:lstStyle/>
           <a:p>
             <a:r>
               <a:rPr lang="ru-RU" dirty="0"/>
-              <a:t>Контекст: нужно реплицировать </a:t>
+              <a:t>Проблема: </a:t>
             </a:r>
             <a:r>
               <a:rPr lang="ru-RU" dirty="0" err="1"/>
-              <a:t>таблцы</a:t>
-            </a:r>
-            <a:r>
-              <a:rPr lang="ru-RU" dirty="0"/>
-              <a:t> с колонками типов </a:t>
+              <a:t>эвенты</a:t>
+            </a:r>
+            <a:r>
+              <a:rPr lang="ru-RU" dirty="0"/>
+              <a:t> от источника приходят сплошным потоком, но есть требование сохранять данные с учетом границ исходных транзакций</a:t>
+            </a:r>
+          </a:p>
+          <a:p>
+            <a:r>
+              <a:rPr lang="ru-RU" dirty="0"/>
+              <a:t>Решение:</a:t>
+            </a:r>
+            <a:r>
+              <a:rPr lang="en-US" dirty="0"/>
+              <a:t> provide.transaction.metadata=true</a:t>
+            </a:r>
+            <a:endParaRPr lang="en-US" b="0" i="0" u="none" strike="noStrike" dirty="0">
+              <a:solidFill>
+                <a:srgbClr val="1565C0"/>
+              </a:solidFill>
+              <a:effectLst/>
+              <a:latin typeface="acumin-pro"/>
+            </a:endParaRPr>
+          </a:p>
+          <a:p>
+            <a:endParaRPr lang="en-US" dirty="0">
+              <a:solidFill>
+                <a:srgbClr val="1565C0"/>
+              </a:solidFill>
+              <a:latin typeface="acumin-pro"/>
+            </a:endParaRPr>
+          </a:p>
+          <a:p>
+            <a:pPr marL="0" indent="0">
+              <a:buNone/>
+            </a:pPr>
+            <a:endParaRPr lang="ru-RU" dirty="0"/>
+          </a:p>
+        </p:txBody>
+      </p:sp>
+    </p:spTree>
+    <p:extLst>
+      <p:ext uri="{BB962C8B-B14F-4D97-AF65-F5344CB8AC3E}">
+        <p14:creationId xmlns:p14="http://schemas.microsoft.com/office/powerpoint/2010/main" val="1533522270"/>
+      </p:ext>
+    </p:extLst>
+  </p:cSld>
+  <p:clrMapOvr>
+    <a:masterClrMapping/>
+  </p:clrMapOvr>
+</p:sld>
+</file>
+
+<file path=ppt/slides/slide33.xml><?xml version="1.0" encoding="utf-8"?>
+<p:sld xmlns:a="http://schemas.openxmlformats.org/drawingml/2006/main" xmlns:r="http://schemas.openxmlformats.org/officeDocument/2006/relationships" xmlns:p="http://schemas.openxmlformats.org/presentationml/2006/main">
+  <p:cSld>
+    <p:spTree>
+      <p:nvGrpSpPr>
+        <p:cNvPr id="1" name=""/>
+        <p:cNvGrpSpPr/>
+        <p:nvPr/>
+      </p:nvGrpSpPr>
+      <p:grpSpPr>
+        <a:xfrm>
+          <a:off x="0" y="0"/>
+          <a:ext cx="0" cy="0"/>
+          <a:chOff x="0" y="0"/>
+          <a:chExt cx="0" cy="0"/>
+        </a:xfrm>
+      </p:grpSpPr>
+      <p:sp>
+        <p:nvSpPr>
+          <p:cNvPr id="2" name="Title 1">
+            <a:extLst>
+              <a:ext uri="{FF2B5EF4-FFF2-40B4-BE49-F238E27FC236}">
+                <a16:creationId xmlns:a16="http://schemas.microsoft.com/office/drawing/2014/main" id="{00888323-12E8-8C4F-8E27-23BD5B7DEE03}"/>
+              </a:ext>
+            </a:extLst>
+          </p:cNvPr>
+          <p:cNvSpPr>
+            <a:spLocks noGrp="1"/>
+          </p:cNvSpPr>
+          <p:nvPr>
+            <p:ph type="title"/>
+          </p:nvPr>
+        </p:nvSpPr>
+        <p:spPr>
+          <a:xfrm>
+            <a:off x="0" y="18255"/>
+            <a:ext cx="10515600" cy="1325563"/>
+          </a:xfrm>
+        </p:spPr>
+        <p:txBody>
+          <a:bodyPr/>
+          <a:lstStyle/>
+          <a:p>
+            <a:r>
+              <a:rPr lang="en-US" dirty="0" err="1"/>
+              <a:t>Debezium</a:t>
+            </a:r>
+            <a:r>
+              <a:rPr lang="en-US" dirty="0"/>
+              <a:t>: </a:t>
+            </a:r>
+            <a:r>
+              <a:rPr lang="ru-RU" dirty="0"/>
+              <a:t>дубли</a:t>
+            </a:r>
+            <a:endParaRPr lang="en-US" dirty="0"/>
+          </a:p>
+        </p:txBody>
+      </p:sp>
+      <p:sp>
+        <p:nvSpPr>
+          <p:cNvPr id="3" name="Content Placeholder 2">
+            <a:extLst>
+              <a:ext uri="{FF2B5EF4-FFF2-40B4-BE49-F238E27FC236}">
+                <a16:creationId xmlns:a16="http://schemas.microsoft.com/office/drawing/2014/main" id="{DA11F9D3-C291-2245-AEA5-8D09537FB4E5}"/>
+              </a:ext>
+            </a:extLst>
+          </p:cNvPr>
+          <p:cNvSpPr>
+            <a:spLocks noGrp="1"/>
+          </p:cNvSpPr>
+          <p:nvPr>
+            <p:ph idx="1"/>
+          </p:nvPr>
+        </p:nvSpPr>
+        <p:spPr>
+          <a:xfrm>
+            <a:off x="0" y="1343818"/>
+            <a:ext cx="10515600" cy="4351338"/>
+          </a:xfrm>
+        </p:spPr>
+        <p:txBody>
+          <a:bodyPr>
+            <a:normAutofit/>
+          </a:bodyPr>
+          <a:lstStyle/>
+          <a:p>
+            <a:r>
+              <a:rPr lang="ru-RU" dirty="0"/>
+              <a:t>Задача: </a:t>
+            </a:r>
+            <a:r>
+              <a:rPr lang="en-US" dirty="0" err="1"/>
+              <a:t>debezium</a:t>
+            </a:r>
+            <a:r>
+              <a:rPr lang="en-US" dirty="0"/>
+              <a:t> </a:t>
+            </a:r>
+            <a:r>
+              <a:rPr lang="ru-RU" dirty="0"/>
+              <a:t>обещает </a:t>
+            </a:r>
+            <a:r>
+              <a:rPr lang="en-US" dirty="0"/>
+              <a:t>at-least-once </a:t>
+            </a:r>
+            <a:r>
+              <a:rPr lang="ru-RU" dirty="0"/>
+              <a:t>семантику, но есть требование прийти к (</a:t>
+            </a:r>
+            <a:r>
+              <a:rPr lang="en-US" dirty="0"/>
+              <a:t>effectively</a:t>
+            </a:r>
+            <a:r>
+              <a:rPr lang="ru-RU" dirty="0"/>
+              <a:t>)</a:t>
+            </a:r>
+            <a:r>
+              <a:rPr lang="en-US" dirty="0"/>
+              <a:t>exactly-once. </a:t>
+            </a:r>
+            <a:endParaRPr lang="ru-RU" dirty="0"/>
+          </a:p>
+          <a:p>
+            <a:r>
+              <a:rPr lang="ru-RU" dirty="0"/>
+              <a:t>Решение:</a:t>
+            </a:r>
+            <a:r>
+              <a:rPr lang="en-US" dirty="0"/>
+              <a:t> </a:t>
+            </a:r>
+            <a:r>
+              <a:rPr lang="ru-RU" dirty="0" err="1"/>
+              <a:t>дедубликация</a:t>
+            </a:r>
+            <a:r>
+              <a:rPr lang="ru-RU" dirty="0"/>
+              <a:t> по </a:t>
+            </a:r>
+            <a:r>
+              <a:rPr lang="en-US" dirty="0" err="1"/>
+              <a:t>lsn</a:t>
+            </a:r>
+            <a:endParaRPr lang="en-US" b="0" i="0" u="none" strike="noStrike" dirty="0">
+              <a:solidFill>
+                <a:srgbClr val="1565C0"/>
+              </a:solidFill>
+              <a:effectLst/>
+              <a:latin typeface="acumin-pro"/>
+            </a:endParaRPr>
+          </a:p>
+          <a:p>
+            <a:endParaRPr lang="en-US" dirty="0">
+              <a:solidFill>
+                <a:srgbClr val="1565C0"/>
+              </a:solidFill>
+              <a:latin typeface="acumin-pro"/>
+            </a:endParaRPr>
+          </a:p>
+          <a:p>
+            <a:pPr marL="0" indent="0">
+              <a:buNone/>
+            </a:pPr>
+            <a:endParaRPr lang="ru-RU" dirty="0"/>
+          </a:p>
+        </p:txBody>
+      </p:sp>
+    </p:spTree>
+    <p:extLst>
+      <p:ext uri="{BB962C8B-B14F-4D97-AF65-F5344CB8AC3E}">
+        <p14:creationId xmlns:p14="http://schemas.microsoft.com/office/powerpoint/2010/main" val="710608870"/>
+      </p:ext>
+    </p:extLst>
+  </p:cSld>
+  <p:clrMapOvr>
+    <a:masterClrMapping/>
+  </p:clrMapOvr>
+</p:sld>
+</file>
+
+<file path=ppt/slides/slide34.xml><?xml version="1.0" encoding="utf-8"?>
+<p:sld xmlns:a="http://schemas.openxmlformats.org/drawingml/2006/main" xmlns:r="http://schemas.openxmlformats.org/officeDocument/2006/relationships" xmlns:p="http://schemas.openxmlformats.org/presentationml/2006/main">
+  <p:cSld>
+    <p:spTree>
+      <p:nvGrpSpPr>
+        <p:cNvPr id="1" name=""/>
+        <p:cNvGrpSpPr/>
+        <p:nvPr/>
+      </p:nvGrpSpPr>
+      <p:grpSpPr>
+        <a:xfrm>
+          <a:off x="0" y="0"/>
+          <a:ext cx="0" cy="0"/>
+          <a:chOff x="0" y="0"/>
+          <a:chExt cx="0" cy="0"/>
+        </a:xfrm>
+      </p:grpSpPr>
+      <p:sp>
+        <p:nvSpPr>
+          <p:cNvPr id="2" name="Title 1">
+            <a:extLst>
+              <a:ext uri="{FF2B5EF4-FFF2-40B4-BE49-F238E27FC236}">
+                <a16:creationId xmlns:a16="http://schemas.microsoft.com/office/drawing/2014/main" id="{00888323-12E8-8C4F-8E27-23BD5B7DEE03}"/>
+              </a:ext>
+            </a:extLst>
+          </p:cNvPr>
+          <p:cNvSpPr>
+            <a:spLocks noGrp="1"/>
+          </p:cNvSpPr>
+          <p:nvPr>
+            <p:ph type="title"/>
+          </p:nvPr>
+        </p:nvSpPr>
+        <p:spPr>
+          <a:xfrm>
+            <a:off x="0" y="18255"/>
+            <a:ext cx="10515600" cy="1325563"/>
+          </a:xfrm>
+        </p:spPr>
+        <p:txBody>
+          <a:bodyPr/>
+          <a:lstStyle/>
+          <a:p>
+            <a:r>
+              <a:rPr lang="en-US" dirty="0" err="1"/>
+              <a:t>Debezium</a:t>
+            </a:r>
+            <a:r>
+              <a:rPr lang="en-US" dirty="0"/>
+              <a:t>: before/after diff</a:t>
+            </a:r>
+          </a:p>
+        </p:txBody>
+      </p:sp>
+      <p:sp>
+        <p:nvSpPr>
+          <p:cNvPr id="3" name="Content Placeholder 2">
+            <a:extLst>
+              <a:ext uri="{FF2B5EF4-FFF2-40B4-BE49-F238E27FC236}">
+                <a16:creationId xmlns:a16="http://schemas.microsoft.com/office/drawing/2014/main" id="{DA11F9D3-C291-2245-AEA5-8D09537FB4E5}"/>
+              </a:ext>
+            </a:extLst>
+          </p:cNvPr>
+          <p:cNvSpPr>
+            <a:spLocks noGrp="1"/>
+          </p:cNvSpPr>
+          <p:nvPr>
+            <p:ph idx="1"/>
+          </p:nvPr>
+        </p:nvSpPr>
+        <p:spPr>
+          <a:xfrm>
+            <a:off x="0" y="1343818"/>
+            <a:ext cx="10515600" cy="4351338"/>
+          </a:xfrm>
+        </p:spPr>
+        <p:txBody>
+          <a:bodyPr>
+            <a:normAutofit/>
+          </a:bodyPr>
+          <a:lstStyle/>
+          <a:p>
+            <a:r>
+              <a:rPr lang="ru-RU" dirty="0"/>
+              <a:t>Задача: нужно получить </a:t>
+            </a:r>
+            <a:r>
+              <a:rPr lang="en-US" dirty="0"/>
+              <a:t>diff </a:t>
+            </a:r>
+            <a:r>
+              <a:rPr lang="ru-RU" dirty="0"/>
+              <a:t>обновленных значений (</a:t>
+            </a:r>
+            <a:r>
+              <a:rPr lang="en-US" dirty="0"/>
+              <a:t>before &lt;-&gt; after</a:t>
+            </a:r>
+            <a:r>
+              <a:rPr lang="ru-RU" dirty="0"/>
+              <a:t>), но приходят только </a:t>
+            </a:r>
+            <a:r>
+              <a:rPr lang="en-US" dirty="0"/>
+              <a:t>after (</a:t>
+            </a:r>
+            <a:r>
+              <a:rPr lang="ru-RU" dirty="0"/>
+              <a:t>для </a:t>
+            </a:r>
+            <a:r>
+              <a:rPr lang="en-US" dirty="0"/>
+              <a:t>update/create) </a:t>
+            </a:r>
+            <a:r>
+              <a:rPr lang="ru-RU" dirty="0"/>
+              <a:t>и </a:t>
+            </a:r>
+            <a:r>
+              <a:rPr lang="en-US" dirty="0"/>
+              <a:t>before (</a:t>
+            </a:r>
+            <a:r>
+              <a:rPr lang="ru-RU" dirty="0"/>
+              <a:t>для </a:t>
+            </a:r>
+            <a:r>
+              <a:rPr lang="en-US" dirty="0"/>
+              <a:t>delete)</a:t>
+            </a:r>
+            <a:endParaRPr lang="ru-RU" dirty="0"/>
+          </a:p>
+          <a:p>
+            <a:r>
+              <a:rPr lang="ru-RU" dirty="0"/>
+              <a:t>Решение:</a:t>
+            </a:r>
+            <a:r>
+              <a:rPr lang="en-US" dirty="0"/>
+              <a:t> REPLICA IDENTITY FULL</a:t>
+            </a:r>
+            <a:endParaRPr lang="en-US" b="0" i="0" u="none" strike="noStrike" dirty="0">
+              <a:solidFill>
+                <a:srgbClr val="1565C0"/>
+              </a:solidFill>
+              <a:effectLst/>
+              <a:latin typeface="acumin-pro"/>
+            </a:endParaRPr>
+          </a:p>
+          <a:p>
+            <a:endParaRPr lang="en-US" dirty="0">
+              <a:solidFill>
+                <a:srgbClr val="1565C0"/>
+              </a:solidFill>
+              <a:latin typeface="acumin-pro"/>
+            </a:endParaRPr>
+          </a:p>
+          <a:p>
+            <a:pPr marL="0" indent="0">
+              <a:buNone/>
+            </a:pPr>
+            <a:endParaRPr lang="ru-RU" dirty="0"/>
+          </a:p>
+        </p:txBody>
+      </p:sp>
+    </p:spTree>
+    <p:extLst>
+      <p:ext uri="{BB962C8B-B14F-4D97-AF65-F5344CB8AC3E}">
+        <p14:creationId xmlns:p14="http://schemas.microsoft.com/office/powerpoint/2010/main" val="1754120474"/>
+      </p:ext>
+    </p:extLst>
+  </p:cSld>
+  <p:clrMapOvr>
+    <a:masterClrMapping/>
+  </p:clrMapOvr>
+</p:sld>
+</file>
+
+<file path=ppt/slides/slide35.xml><?xml version="1.0" encoding="utf-8"?>
+<p:sld xmlns:a="http://schemas.openxmlformats.org/drawingml/2006/main" xmlns:r="http://schemas.openxmlformats.org/officeDocument/2006/relationships" xmlns:p="http://schemas.openxmlformats.org/presentationml/2006/main">
+  <p:cSld>
+    <p:spTree>
+      <p:nvGrpSpPr>
+        <p:cNvPr id="1" name=""/>
+        <p:cNvGrpSpPr/>
+        <p:nvPr/>
+      </p:nvGrpSpPr>
+      <p:grpSpPr>
+        <a:xfrm>
+          <a:off x="0" y="0"/>
+          <a:ext cx="0" cy="0"/>
+          <a:chOff x="0" y="0"/>
+          <a:chExt cx="0" cy="0"/>
+        </a:xfrm>
+      </p:grpSpPr>
+      <p:sp>
+        <p:nvSpPr>
+          <p:cNvPr id="2" name="Title 1">
+            <a:extLst>
+              <a:ext uri="{FF2B5EF4-FFF2-40B4-BE49-F238E27FC236}">
+                <a16:creationId xmlns:a16="http://schemas.microsoft.com/office/drawing/2014/main" id="{00888323-12E8-8C4F-8E27-23BD5B7DEE03}"/>
+              </a:ext>
+            </a:extLst>
+          </p:cNvPr>
+          <p:cNvSpPr>
+            <a:spLocks noGrp="1"/>
+          </p:cNvSpPr>
+          <p:nvPr>
+            <p:ph type="title"/>
+          </p:nvPr>
+        </p:nvSpPr>
+        <p:spPr>
+          <a:xfrm>
+            <a:off x="0" y="18255"/>
+            <a:ext cx="10515600" cy="1325563"/>
+          </a:xfrm>
+        </p:spPr>
+        <p:txBody>
+          <a:bodyPr/>
+          <a:lstStyle/>
+          <a:p>
+            <a:r>
+              <a:rPr lang="en-US" dirty="0" err="1"/>
+              <a:t>Debezium</a:t>
+            </a:r>
+            <a:r>
+              <a:rPr lang="en-US" dirty="0"/>
+              <a:t>: timestamp / </a:t>
+            </a:r>
+            <a:r>
+              <a:rPr lang="en-US" dirty="0" err="1"/>
+              <a:t>timestamptz</a:t>
+            </a:r>
+            <a:r>
+              <a:rPr lang="en-US" dirty="0"/>
+              <a:t> # </a:t>
+            </a:r>
+            <a:r>
+              <a:rPr lang="ru-RU" dirty="0"/>
+              <a:t>представление значений</a:t>
+            </a:r>
+            <a:endParaRPr lang="en-US" dirty="0"/>
+          </a:p>
+        </p:txBody>
+      </p:sp>
+      <p:sp>
+        <p:nvSpPr>
+          <p:cNvPr id="3" name="Content Placeholder 2">
+            <a:extLst>
+              <a:ext uri="{FF2B5EF4-FFF2-40B4-BE49-F238E27FC236}">
+                <a16:creationId xmlns:a16="http://schemas.microsoft.com/office/drawing/2014/main" id="{DA11F9D3-C291-2245-AEA5-8D09537FB4E5}"/>
+              </a:ext>
+            </a:extLst>
+          </p:cNvPr>
+          <p:cNvSpPr>
+            <a:spLocks noGrp="1"/>
+          </p:cNvSpPr>
+          <p:nvPr>
+            <p:ph idx="1"/>
+          </p:nvPr>
+        </p:nvSpPr>
+        <p:spPr>
+          <a:xfrm>
+            <a:off x="0" y="1343818"/>
+            <a:ext cx="10515600" cy="4351338"/>
+          </a:xfrm>
+        </p:spPr>
+        <p:txBody>
+          <a:bodyPr>
+            <a:normAutofit/>
+          </a:bodyPr>
+          <a:lstStyle/>
+          <a:p>
+            <a:r>
+              <a:rPr lang="ru-RU" dirty="0"/>
+              <a:t>Контекст: нужно реплицировать таблицы с колонками типов </a:t>
             </a:r>
             <a:r>
               <a:rPr lang="en-US" dirty="0"/>
@@ -7584,7 +8220,211 @@
 </p:sld>
 </file>
 
-<file path=ppt/slides/slide32.xml><?xml version="1.0" encoding="utf-8"?>
+<file path=ppt/slides/slide36.xml><?xml version="1.0" encoding="utf-8"?>
+<p:sld xmlns:a="http://schemas.openxmlformats.org/drawingml/2006/main" xmlns:r="http://schemas.openxmlformats.org/officeDocument/2006/relationships" xmlns:p="http://schemas.openxmlformats.org/presentationml/2006/main">
+  <p:cSld>
+    <p:spTree>
+      <p:nvGrpSpPr>
+        <p:cNvPr id="1" name=""/>
+        <p:cNvGrpSpPr/>
+        <p:nvPr/>
+      </p:nvGrpSpPr>
+      <p:grpSpPr>
+        <a:xfrm>
+          <a:off x="0" y="0"/>
+          <a:ext cx="0" cy="0"/>
+          <a:chOff x="0" y="0"/>
+          <a:chExt cx="0" cy="0"/>
+        </a:xfrm>
+      </p:grpSpPr>
+      <p:sp>
+        <p:nvSpPr>
+          <p:cNvPr id="2" name="Title 1">
+            <a:extLst>
+              <a:ext uri="{FF2B5EF4-FFF2-40B4-BE49-F238E27FC236}">
+                <a16:creationId xmlns:a16="http://schemas.microsoft.com/office/drawing/2014/main" id="{00888323-12E8-8C4F-8E27-23BD5B7DEE03}"/>
+              </a:ext>
+            </a:extLst>
+          </p:cNvPr>
+          <p:cNvSpPr>
+            <a:spLocks noGrp="1"/>
+          </p:cNvSpPr>
+          <p:nvPr>
+            <p:ph type="title"/>
+          </p:nvPr>
+        </p:nvSpPr>
+        <p:spPr>
+          <a:xfrm>
+            <a:off x="0" y="18255"/>
+            <a:ext cx="12192000" cy="1325563"/>
+          </a:xfrm>
+        </p:spPr>
+        <p:txBody>
+          <a:bodyPr/>
+          <a:lstStyle/>
+          <a:p>
+            <a:r>
+              <a:rPr lang="en-US" dirty="0" err="1"/>
+              <a:t>Debezium</a:t>
+            </a:r>
+            <a:r>
+              <a:rPr lang="en-US" dirty="0"/>
+              <a:t>: timestamp / </a:t>
+            </a:r>
+            <a:r>
+              <a:rPr lang="en-US" dirty="0" err="1"/>
+              <a:t>timestamptz</a:t>
+            </a:r>
+            <a:r>
+              <a:rPr lang="ru-RU" dirty="0"/>
+              <a:t> </a:t>
+            </a:r>
+            <a:r>
+              <a:rPr lang="en-US" dirty="0"/>
+              <a:t>#</a:t>
+            </a:r>
+            <a:r>
+              <a:rPr lang="ru-RU" dirty="0"/>
+              <a:t> потеря точности</a:t>
+            </a:r>
+            <a:endParaRPr lang="en-US" dirty="0"/>
+          </a:p>
+        </p:txBody>
+      </p:sp>
+      <p:sp>
+        <p:nvSpPr>
+          <p:cNvPr id="3" name="Content Placeholder 2">
+            <a:extLst>
+              <a:ext uri="{FF2B5EF4-FFF2-40B4-BE49-F238E27FC236}">
+                <a16:creationId xmlns:a16="http://schemas.microsoft.com/office/drawing/2014/main" id="{DA11F9D3-C291-2245-AEA5-8D09537FB4E5}"/>
+              </a:ext>
+            </a:extLst>
+          </p:cNvPr>
+          <p:cNvSpPr>
+            <a:spLocks noGrp="1"/>
+          </p:cNvSpPr>
+          <p:nvPr>
+            <p:ph idx="1"/>
+          </p:nvPr>
+        </p:nvSpPr>
+        <p:spPr>
+          <a:xfrm>
+            <a:off x="0" y="1343818"/>
+            <a:ext cx="10515600" cy="4351338"/>
+          </a:xfrm>
+        </p:spPr>
+        <p:txBody>
+          <a:bodyPr>
+            <a:normAutofit/>
+          </a:bodyPr>
+          <a:lstStyle/>
+          <a:p>
+            <a:r>
+              <a:rPr lang="ru-RU" dirty="0"/>
+              <a:t>Контекст: нужно реплицировать таблицы с колонками типов </a:t>
+            </a:r>
+            <a:r>
+              <a:rPr lang="en-US" dirty="0"/>
+              <a:t>timestamp / </a:t>
+            </a:r>
+            <a:r>
+              <a:rPr lang="en-US" dirty="0" err="1"/>
+              <a:t>timestamptz</a:t>
+            </a:r>
+            <a:endParaRPr lang="ru-RU" dirty="0"/>
+          </a:p>
+          <a:p>
+            <a:r>
+              <a:rPr lang="ru-RU" dirty="0"/>
+              <a:t>Проблема </a:t>
+            </a:r>
+            <a:r>
+              <a:rPr lang="en-US" dirty="0"/>
+              <a:t>#1</a:t>
+            </a:r>
+            <a:r>
+              <a:rPr lang="ru-RU" dirty="0"/>
+              <a:t>: </a:t>
+            </a:r>
+            <a:r>
+              <a:rPr lang="en-US" dirty="0" err="1"/>
+              <a:t>debezium</a:t>
+            </a:r>
+            <a:r>
+              <a:rPr lang="en-US" dirty="0"/>
+              <a:t> </a:t>
+            </a:r>
+            <a:r>
+              <a:rPr lang="ru-RU" dirty="0"/>
+              <a:t>конвертирует один тип в </a:t>
+            </a:r>
+            <a:r>
+              <a:rPr lang="en-US" dirty="0"/>
+              <a:t>long, </a:t>
+            </a:r>
+            <a:r>
+              <a:rPr lang="ru-RU" dirty="0"/>
+              <a:t>другой в </a:t>
+            </a:r>
+            <a:r>
+              <a:rPr lang="en-US" dirty="0"/>
+              <a:t>string</a:t>
+            </a:r>
+            <a:endParaRPr lang="ru-RU" dirty="0"/>
+          </a:p>
+          <a:p>
+            <a:r>
+              <a:rPr lang="ru-RU" dirty="0"/>
+              <a:t>Решение:</a:t>
+            </a:r>
+          </a:p>
+          <a:p>
+            <a:pPr lvl="1"/>
+            <a:r>
+              <a:rPr lang="ru-RU" dirty="0"/>
+              <a:t>Трансформ для конвертации типов</a:t>
+            </a:r>
+          </a:p>
+          <a:p>
+            <a:pPr lvl="1"/>
+            <a:r>
+              <a:rPr lang="ru-RU" dirty="0"/>
+              <a:t>Указывать явно </a:t>
+            </a:r>
+            <a:r>
+              <a:rPr lang="en-US" dirty="0" err="1"/>
+              <a:t>timezone</a:t>
+            </a:r>
+            <a:r>
+              <a:rPr lang="en-US" dirty="0"/>
+              <a:t>, </a:t>
+            </a:r>
+            <a:r>
+              <a:rPr lang="ru-RU" dirty="0"/>
+              <a:t> которую нужно конвертировать </a:t>
+            </a:r>
+            <a:r>
+              <a:rPr lang="en-US" dirty="0" err="1"/>
+              <a:t>timestamptz</a:t>
+            </a:r>
+            <a:endParaRPr lang="en-US" dirty="0"/>
+          </a:p>
+        </p:txBody>
+      </p:sp>
+    </p:spTree>
+    <p:extLst>
+      <p:ext uri="{BB962C8B-B14F-4D97-AF65-F5344CB8AC3E}">
+        <p14:creationId xmlns:p14="http://schemas.microsoft.com/office/powerpoint/2010/main" val="1481861357"/>
+      </p:ext>
+    </p:extLst>
+  </p:cSld>
+  <p:clrMapOvr>
+    <a:masterClrMapping/>
+  </p:clrMapOvr>
+</p:sld>
+</file>
+
+<file path=ppt/slides/slide37.xml><?xml version="1.0" encoding="utf-8"?>
 <p:sld xmlns:a="http://schemas.openxmlformats.org/drawingml/2006/main" xmlns:r="http://schemas.openxmlformats.org/officeDocument/2006/relationships" xmlns:p="http://schemas.openxmlformats.org/presentationml/2006/main">
   <p:cSld>
     <p:spTree>

</xml_diff>

<commit_message>
doc: update smarddata2025 slides
</commit_message>
<xml_diff>
--- a/smartdata/cdc-via-debezium/debezium-smartdata2025.pptx
+++ b/smartdata/cdc-via-debezium/debezium-smartdata2025.pptx
@@ -30,23 +30,26 @@
     <p:sldId id="293" r:id="rId24"/>
     <p:sldId id="296" r:id="rId25"/>
     <p:sldId id="297" r:id="rId26"/>
-    <p:sldId id="268" r:id="rId27"/>
-    <p:sldId id="271" r:id="rId28"/>
-    <p:sldId id="272" r:id="rId29"/>
-    <p:sldId id="269" r:id="rId30"/>
-    <p:sldId id="270" r:id="rId31"/>
-    <p:sldId id="273" r:id="rId32"/>
-    <p:sldId id="278" r:id="rId33"/>
-    <p:sldId id="274" r:id="rId34"/>
-    <p:sldId id="275" r:id="rId35"/>
-    <p:sldId id="276" r:id="rId36"/>
-    <p:sldId id="277" r:id="rId37"/>
-    <p:sldId id="288" r:id="rId38"/>
-    <p:sldId id="290" r:id="rId39"/>
-    <p:sldId id="289" r:id="rId40"/>
-    <p:sldId id="279" r:id="rId41"/>
-    <p:sldId id="292" r:id="rId42"/>
-    <p:sldId id="280" r:id="rId43"/>
+    <p:sldId id="271" r:id="rId27"/>
+    <p:sldId id="272" r:id="rId28"/>
+    <p:sldId id="269" r:id="rId29"/>
+    <p:sldId id="273" r:id="rId30"/>
+    <p:sldId id="278" r:id="rId31"/>
+    <p:sldId id="275" r:id="rId32"/>
+    <p:sldId id="274" r:id="rId33"/>
+    <p:sldId id="276" r:id="rId34"/>
+    <p:sldId id="277" r:id="rId35"/>
+    <p:sldId id="288" r:id="rId36"/>
+    <p:sldId id="290" r:id="rId37"/>
+    <p:sldId id="268" r:id="rId38"/>
+    <p:sldId id="298" r:id="rId39"/>
+    <p:sldId id="299" r:id="rId40"/>
+    <p:sldId id="270" r:id="rId41"/>
+    <p:sldId id="289" r:id="rId42"/>
+    <p:sldId id="279" r:id="rId43"/>
+    <p:sldId id="292" r:id="rId44"/>
+    <p:sldId id="300" r:id="rId45"/>
+    <p:sldId id="280" r:id="rId46"/>
   </p:sldIdLst>
   <p:sldSz cx="12192000" cy="6858000"/>
   <p:notesSz cx="6858000" cy="9144000"/>
@@ -300,7 +303,7 @@
           <a:p>
             <a:fld id="{0A80387B-3432-BD42-8238-00F612919BB5}" type="datetimeFigureOut">
               <a:rPr lang="en-US" smtClean="0"/>
-              <a:t>8/21/25</a:t>
+              <a:t>8/27/25</a:t>
             </a:fld>
             <a:endParaRPr lang="en-US"/>
           </a:p>
@@ -498,7 +501,7 @@
           <a:p>
             <a:fld id="{0A80387B-3432-BD42-8238-00F612919BB5}" type="datetimeFigureOut">
               <a:rPr lang="en-US" smtClean="0"/>
-              <a:t>8/21/25</a:t>
+              <a:t>8/27/25</a:t>
             </a:fld>
             <a:endParaRPr lang="en-US"/>
           </a:p>
@@ -706,7 +709,7 @@
           <a:p>
             <a:fld id="{0A80387B-3432-BD42-8238-00F612919BB5}" type="datetimeFigureOut">
               <a:rPr lang="en-US" smtClean="0"/>
-              <a:t>8/21/25</a:t>
+              <a:t>8/27/25</a:t>
             </a:fld>
             <a:endParaRPr lang="en-US"/>
           </a:p>
@@ -904,7 +907,7 @@
           <a:p>
             <a:fld id="{0A80387B-3432-BD42-8238-00F612919BB5}" type="datetimeFigureOut">
               <a:rPr lang="en-US" smtClean="0"/>
-              <a:t>8/21/25</a:t>
+              <a:t>8/27/25</a:t>
             </a:fld>
             <a:endParaRPr lang="en-US"/>
           </a:p>
@@ -1179,7 +1182,7 @@
           <a:p>
             <a:fld id="{0A80387B-3432-BD42-8238-00F612919BB5}" type="datetimeFigureOut">
               <a:rPr lang="en-US" smtClean="0"/>
-              <a:t>8/21/25</a:t>
+              <a:t>8/27/25</a:t>
             </a:fld>
             <a:endParaRPr lang="en-US"/>
           </a:p>
@@ -1444,7 +1447,7 @@
           <a:p>
             <a:fld id="{0A80387B-3432-BD42-8238-00F612919BB5}" type="datetimeFigureOut">
               <a:rPr lang="en-US" smtClean="0"/>
-              <a:t>8/21/25</a:t>
+              <a:t>8/27/25</a:t>
             </a:fld>
             <a:endParaRPr lang="en-US"/>
           </a:p>
@@ -1856,7 +1859,7 @@
           <a:p>
             <a:fld id="{0A80387B-3432-BD42-8238-00F612919BB5}" type="datetimeFigureOut">
               <a:rPr lang="en-US" smtClean="0"/>
-              <a:t>8/21/25</a:t>
+              <a:t>8/27/25</a:t>
             </a:fld>
             <a:endParaRPr lang="en-US"/>
           </a:p>
@@ -1997,7 +2000,7 @@
           <a:p>
             <a:fld id="{0A80387B-3432-BD42-8238-00F612919BB5}" type="datetimeFigureOut">
               <a:rPr lang="en-US" smtClean="0"/>
-              <a:t>8/21/25</a:t>
+              <a:t>8/27/25</a:t>
             </a:fld>
             <a:endParaRPr lang="en-US"/>
           </a:p>
@@ -2110,7 +2113,7 @@
           <a:p>
             <a:fld id="{0A80387B-3432-BD42-8238-00F612919BB5}" type="datetimeFigureOut">
               <a:rPr lang="en-US" smtClean="0"/>
-              <a:t>8/21/25</a:t>
+              <a:t>8/27/25</a:t>
             </a:fld>
             <a:endParaRPr lang="en-US"/>
           </a:p>
@@ -2421,7 +2424,7 @@
           <a:p>
             <a:fld id="{0A80387B-3432-BD42-8238-00F612919BB5}" type="datetimeFigureOut">
               <a:rPr lang="en-US" smtClean="0"/>
-              <a:t>8/21/25</a:t>
+              <a:t>8/27/25</a:t>
             </a:fld>
             <a:endParaRPr lang="en-US"/>
           </a:p>
@@ -2709,7 +2712,7 @@
           <a:p>
             <a:fld id="{0A80387B-3432-BD42-8238-00F612919BB5}" type="datetimeFigureOut">
               <a:rPr lang="en-US" smtClean="0"/>
-              <a:t>8/21/25</a:t>
+              <a:t>8/27/25</a:t>
             </a:fld>
             <a:endParaRPr lang="en-US"/>
           </a:p>
@@ -2950,7 +2953,7 @@
           <a:p>
             <a:fld id="{0A80387B-3432-BD42-8238-00F612919BB5}" type="datetimeFigureOut">
               <a:rPr lang="en-US" smtClean="0"/>
-              <a:t>8/21/25</a:t>
+              <a:t>8/27/25</a:t>
             </a:fld>
             <a:endParaRPr lang="en-US"/>
           </a:p>
@@ -5353,6 +5356,17 @@
               <a:t>surrogate key</a:t>
             </a:r>
           </a:p>
+          <a:p>
+            <a:pPr lvl="1"/>
+            <a:r>
+              <a:rPr lang="ru-RU" dirty="0"/>
+              <a:t>Доступно с версии </a:t>
+            </a:r>
+            <a:r>
+              <a:rPr lang="en-US" dirty="0"/>
+              <a:t>2.2</a:t>
+            </a:r>
+          </a:p>
         </p:txBody>
       </p:sp>
     </p:spTree>
@@ -5655,7 +5669,15 @@
             </a:r>
             <a:r>
               <a:rPr lang="en-US" dirty="0"/>
-              <a:t>NO_DATA </a:t>
+              <a:t>NO_DATA</a:t>
+            </a:r>
+            <a:r>
+              <a:rPr lang="ru-RU" dirty="0"/>
+              <a:t>/</a:t>
+            </a:r>
+            <a:r>
+              <a:rPr lang="en-US" dirty="0"/>
+              <a:t>INITIAL </a:t>
             </a:r>
             <a:r>
               <a:rPr lang="ru-RU" dirty="0"/>
@@ -5667,15 +5689,7 @@
             </a:r>
             <a:r>
               <a:rPr lang="ru-RU" dirty="0"/>
-              <a:t> </a:t>
-            </a:r>
-            <a:r>
-              <a:rPr lang="ru-RU" dirty="0" err="1"/>
-              <a:t>самостоятльно</a:t>
-            </a:r>
-            <a:r>
-              <a:rPr lang="ru-RU" dirty="0"/>
-              <a:t> через сигналы</a:t>
+              <a:t> самостоятельно через сигналы</a:t>
             </a:r>
           </a:p>
         </p:txBody>
@@ -6081,13 +6095,7 @@
           <a:p>
             <a:r>
               <a:rPr lang="ru-RU" dirty="0"/>
-              <a:t>Задача: восстановить потерянный срез данных за заданный период</a:t>
-            </a:r>
-          </a:p>
-          <a:p>
-            <a:r>
-              <a:rPr lang="ru-RU" dirty="0"/>
-              <a:t>Решение: </a:t>
+              <a:t>Контекст: запустили ручной </a:t>
             </a:r>
             <a:r>
               <a:rPr lang="ru-RU" dirty="0" err="1"/>
@@ -6095,7 +6103,84 @@
             </a:r>
             <a:r>
               <a:rPr lang="ru-RU" dirty="0"/>
-              <a:t> с фильтром</a:t>
+              <a:t> таблицы, но забыли выдать права на чтение пользователю</a:t>
+            </a:r>
+          </a:p>
+          <a:p>
+            <a:r>
+              <a:rPr lang="ru-RU" dirty="0"/>
+              <a:t>Проблема: </a:t>
+            </a:r>
+            <a:r>
+              <a:rPr lang="en-US" dirty="0" err="1"/>
+              <a:t>cdc</a:t>
+            </a:r>
+            <a:r>
+              <a:rPr lang="en-US" dirty="0"/>
+              <a:t>-</a:t>
+            </a:r>
+            <a:r>
+              <a:rPr lang="ru-RU" dirty="0"/>
+              <a:t>приложение не упало, но и ничего не делает</a:t>
+            </a:r>
+          </a:p>
+          <a:p>
+            <a:pPr lvl="1"/>
+            <a:r>
+              <a:rPr lang="ru-RU" dirty="0"/>
+              <a:t>Замечено на версии </a:t>
+            </a:r>
+            <a:r>
+              <a:rPr lang="en-US" dirty="0" err="1"/>
+              <a:t>debezium</a:t>
+            </a:r>
+            <a:r>
+              <a:rPr lang="en-US" dirty="0"/>
+              <a:t> </a:t>
+            </a:r>
+            <a:r>
+              <a:rPr lang="ru-RU" dirty="0"/>
+              <a:t>2.7 (проверить на более новых версиях)</a:t>
+            </a:r>
+          </a:p>
+          <a:p>
+            <a:pPr lvl="1"/>
+            <a:r>
+              <a:rPr lang="ru-RU" dirty="0"/>
+              <a:t>В метриках (</a:t>
+            </a:r>
+            <a:r>
+              <a:rPr lang="en-US" dirty="0" err="1"/>
+              <a:t>kafka</a:t>
+            </a:r>
+            <a:r>
+              <a:rPr lang="en-US" dirty="0"/>
+              <a:t>-connect</a:t>
+            </a:r>
+            <a:r>
+              <a:rPr lang="ru-RU" dirty="0"/>
+              <a:t>)</a:t>
+            </a:r>
+            <a:r>
+              <a:rPr lang="en-US" dirty="0"/>
+              <a:t> </a:t>
+            </a:r>
+            <a:r>
+              <a:rPr lang="ru-RU" dirty="0"/>
+              <a:t>приложение живо и работает</a:t>
+            </a:r>
+          </a:p>
+          <a:p>
+            <a:r>
+              <a:rPr lang="ru-RU" dirty="0"/>
+              <a:t>Решение:</a:t>
+            </a:r>
+          </a:p>
+          <a:p>
+            <a:pPr lvl="1"/>
+            <a:r>
+              <a:rPr lang="ru-RU" dirty="0"/>
+              <a:t>Только перезапуск приложения</a:t>
             </a:r>
           </a:p>
         </p:txBody>
@@ -6103,7 +6188,7 @@
     </p:spTree>
     <p:extLst>
       <p:ext uri="{BB962C8B-B14F-4D97-AF65-F5344CB8AC3E}">
-        <p14:creationId xmlns:p14="http://schemas.microsoft.com/office/powerpoint/2010/main" val="2994142072"/>
+        <p14:creationId xmlns:p14="http://schemas.microsoft.com/office/powerpoint/2010/main" val="2518105868"/>
       </p:ext>
     </p:extLst>
   </p:cSld>
@@ -6202,7 +6287,26 @@
           <a:p>
             <a:r>
               <a:rPr lang="ru-RU" dirty="0"/>
-              <a:t>Контекст: запустили ручной </a:t>
+              <a:t>Контекст: отправили сигнал на запуск инкрементального </a:t>
+            </a:r>
+            <a:r>
+              <a:rPr lang="ru-RU" dirty="0" err="1"/>
+              <a:t>снепшота</a:t>
+            </a:r>
+            <a:r>
+              <a:rPr lang="ru-RU" dirty="0"/>
+              <a:t> таблицы, по которой еще не было ни одного </a:t>
+            </a:r>
+            <a:r>
+              <a:rPr lang="ru-RU" dirty="0" err="1"/>
+              <a:t>эвента</a:t>
+            </a:r>
+            <a:endParaRPr lang="ru-RU" dirty="0"/>
+          </a:p>
+          <a:p>
+            <a:r>
+              <a:rPr lang="ru-RU" dirty="0"/>
+              <a:t>Проблема: </a:t>
             </a:r>
             <a:r>
               <a:rPr lang="ru-RU" dirty="0" err="1"/>
@@ -6210,32 +6314,31 @@
             </a:r>
             <a:r>
               <a:rPr lang="ru-RU" dirty="0"/>
-              <a:t> таблицы, но забыли выдать права на чтение пользователю</a:t>
-            </a:r>
-          </a:p>
-          <a:p>
-            <a:r>
-              <a:rPr lang="ru-RU" dirty="0"/>
-              <a:t>Проблема: </a:t>
-            </a:r>
-            <a:r>
-              <a:rPr lang="en-US" dirty="0" err="1"/>
-              <a:t>cdc</a:t>
-            </a:r>
-            <a:r>
-              <a:rPr lang="en-US" dirty="0"/>
-              <a:t>-</a:t>
-            </a:r>
-            <a:r>
-              <a:rPr lang="ru-RU" dirty="0"/>
-              <a:t>приложение не упало, но и ничего не делает</a:t>
+              <a:t> падает с ошибкой «ошибка про получение схемы»</a:t>
+            </a:r>
+          </a:p>
+          <a:p>
+            <a:r>
+              <a:rPr lang="ru-RU" dirty="0"/>
+              <a:t>Решения:</a:t>
             </a:r>
           </a:p>
           <a:p>
             <a:pPr lvl="1"/>
             <a:r>
-              <a:rPr lang="ru-RU" dirty="0"/>
-              <a:t>Замечено на версии </a:t>
+              <a:rPr lang="ru-RU" dirty="0" err="1"/>
+              <a:t>Стригеррить</a:t>
+            </a:r>
+            <a:r>
+              <a:rPr lang="ru-RU" dirty="0"/>
+              <a:t> изменения по целевой таблице</a:t>
+            </a:r>
+          </a:p>
+          <a:p>
+            <a:pPr lvl="1"/>
+            <a:r>
+              <a:rPr lang="ru-RU" dirty="0"/>
+              <a:t>Обновить </a:t>
             </a:r>
             <a:r>
               <a:rPr lang="en-US" dirty="0" err="1"/>
@@ -6247,55 +6350,20 @@
             </a:r>
             <a:r>
               <a:rPr lang="ru-RU" dirty="0"/>
-              <a:t>2.7 (проверить на более новых версиях)</a:t>
-            </a:r>
-          </a:p>
-          <a:p>
-            <a:pPr lvl="1"/>
-            <a:r>
-              <a:rPr lang="ru-RU" dirty="0"/>
-              <a:t>В метриках (</a:t>
-            </a:r>
-            <a:r>
-              <a:rPr lang="en-US" dirty="0" err="1"/>
-              <a:t>kafka</a:t>
-            </a:r>
-            <a:r>
-              <a:rPr lang="en-US" dirty="0"/>
-              <a:t>-connect</a:t>
-            </a:r>
-            <a:r>
-              <a:rPr lang="ru-RU" dirty="0"/>
-              <a:t>)</a:t>
-            </a:r>
-            <a:r>
-              <a:rPr lang="en-US" dirty="0"/>
-              <a:t> </a:t>
-            </a:r>
-            <a:r>
-              <a:rPr lang="ru-RU" dirty="0"/>
-              <a:t>приложение живо и работает</a:t>
-            </a:r>
-          </a:p>
-          <a:p>
-            <a:r>
-              <a:rPr lang="ru-RU" dirty="0"/>
-              <a:t>Решение:</a:t>
-            </a:r>
-          </a:p>
-          <a:p>
-            <a:pPr lvl="1"/>
-            <a:r>
-              <a:rPr lang="ru-RU" dirty="0"/>
-              <a:t>Только перезапуск приложения</a:t>
-            </a:r>
+              <a:t>до версии выше </a:t>
+            </a:r>
+            <a:r>
+              <a:rPr lang="en-US" dirty="0"/>
+              <a:t>3.1.2+</a:t>
+            </a:r>
+            <a:endParaRPr lang="ru-RU" dirty="0"/>
           </a:p>
         </p:txBody>
       </p:sp>
     </p:spTree>
     <p:extLst>
       <p:ext uri="{BB962C8B-B14F-4D97-AF65-F5344CB8AC3E}">
-        <p14:creationId xmlns:p14="http://schemas.microsoft.com/office/powerpoint/2010/main" val="2518105868"/>
+        <p14:creationId xmlns:p14="http://schemas.microsoft.com/office/powerpoint/2010/main" val="3287761478"/>
       </p:ext>
     </p:extLst>
   </p:cSld>
@@ -6357,8 +6425,8 @@
               <a:t>: </a:t>
             </a:r>
             <a:r>
-              <a:rPr lang="ru-RU" dirty="0" err="1"/>
-              <a:t>снепшоты</a:t>
+              <a:rPr lang="ru-RU" dirty="0"/>
+              <a:t>редко обновляемые таблицы</a:t>
             </a:r>
             <a:endParaRPr lang="en-US" dirty="0"/>
           </a:p>
@@ -6394,83 +6462,74 @@
           <a:p>
             <a:r>
               <a:rPr lang="ru-RU" dirty="0"/>
-              <a:t>Контекст: отправили сигнал на запуск инкрементального </a:t>
+              <a:t>Контекст: в БД много таблиц, но реплицируем одну таблицу справочник, которая обновляется крайне редко</a:t>
+            </a:r>
+          </a:p>
+          <a:p>
+            <a:r>
+              <a:rPr lang="ru-RU" dirty="0"/>
+              <a:t>Проблема: Слот всегда отстает, </a:t>
+            </a:r>
+            <a:r>
+              <a:rPr lang="en-US" dirty="0"/>
+              <a:t>WAL </a:t>
+            </a:r>
+            <a:r>
+              <a:rPr lang="ru-RU" dirty="0"/>
+              <a:t>копится до «предела». Есть риск потери данных и переход </a:t>
             </a:r>
             <a:r>
               <a:rPr lang="ru-RU" dirty="0" err="1"/>
-              <a:t>снепшота</a:t>
-            </a:r>
-            <a:r>
-              <a:rPr lang="ru-RU" dirty="0"/>
-              <a:t> таблицы, по которой еще не было ни одного </a:t>
-            </a:r>
-            <a:r>
-              <a:rPr lang="ru-RU" dirty="0" err="1"/>
-              <a:t>эвента</a:t>
+              <a:t>инстанса</a:t>
+            </a:r>
+            <a:r>
+              <a:rPr lang="ru-RU" dirty="0"/>
+              <a:t> в </a:t>
+            </a:r>
+            <a:r>
+              <a:rPr lang="en-US" dirty="0"/>
+              <a:t>RO</a:t>
             </a:r>
             <a:endParaRPr lang="ru-RU" dirty="0"/>
           </a:p>
           <a:p>
             <a:r>
               <a:rPr lang="ru-RU" dirty="0"/>
-              <a:t>Проблема: </a:t>
-            </a:r>
-            <a:r>
-              <a:rPr lang="ru-RU" dirty="0" err="1"/>
-              <a:t>снепшот</a:t>
-            </a:r>
-            <a:r>
-              <a:rPr lang="ru-RU" dirty="0"/>
-              <a:t> падает с ошибкой «ошибка про получение схемы»</a:t>
-            </a:r>
-          </a:p>
-          <a:p>
-            <a:r>
-              <a:rPr lang="ru-RU" dirty="0"/>
-              <a:t>Решения:</a:t>
+              <a:t>Решение:</a:t>
             </a:r>
           </a:p>
           <a:p>
             <a:pPr lvl="1"/>
             <a:r>
-              <a:rPr lang="ru-RU" dirty="0" err="1"/>
-              <a:t>Стригеррить</a:t>
-            </a:r>
-            <a:r>
-              <a:rPr lang="ru-RU" dirty="0"/>
-              <a:t> изменения по целевой таблице</a:t>
+              <a:rPr lang="en-US" dirty="0"/>
+              <a:t>Heartbeat </a:t>
+            </a:r>
+            <a:r>
+              <a:rPr lang="ru-RU" dirty="0"/>
+              <a:t>таблица</a:t>
             </a:r>
           </a:p>
           <a:p>
             <a:pPr lvl="1"/>
             <a:r>
               <a:rPr lang="ru-RU" dirty="0"/>
-              <a:t>Обновить </a:t>
-            </a:r>
-            <a:r>
-              <a:rPr lang="en-US" dirty="0" err="1"/>
-              <a:t>debezium</a:t>
-            </a:r>
-            <a:r>
-              <a:rPr lang="en-US" dirty="0"/>
-              <a:t> </a:t>
-            </a:r>
-            <a:r>
-              <a:rPr lang="ru-RU" dirty="0"/>
-              <a:t>до версии выше </a:t>
-            </a:r>
-            <a:r>
-              <a:rPr lang="en-US" dirty="0"/>
-              <a:t>3.1.2+</a:t>
-            </a:r>
-            <a:endParaRPr lang="ru-RU" dirty="0"/>
+              <a:t>Установить настройку, ограничивающую размер </a:t>
+            </a:r>
+            <a:r>
+              <a:rPr lang="en-US" dirty="0"/>
+              <a:t>WAL’</a:t>
+            </a:r>
+            <a:r>
+              <a:rPr lang="ru-RU" dirty="0"/>
+              <a:t>а</a:t>
+            </a:r>
           </a:p>
         </p:txBody>
       </p:sp>
     </p:spTree>
     <p:extLst>
       <p:ext uri="{BB962C8B-B14F-4D97-AF65-F5344CB8AC3E}">
-        <p14:creationId xmlns:p14="http://schemas.microsoft.com/office/powerpoint/2010/main" val="3287761478"/>
+        <p14:creationId xmlns:p14="http://schemas.microsoft.com/office/powerpoint/2010/main" val="1965460881"/>
       </p:ext>
     </p:extLst>
   </p:cSld>
@@ -6532,8 +6591,12 @@
               <a:t>: </a:t>
             </a:r>
             <a:r>
-              <a:rPr lang="ru-RU" dirty="0"/>
-              <a:t>редко обновляемые таблицы</a:t>
+              <a:rPr lang="ru-RU" dirty="0" err="1"/>
+              <a:t>партиционированные</a:t>
+            </a:r>
+            <a:r>
+              <a:rPr lang="ru-RU" dirty="0"/>
+              <a:t> таблицы</a:t>
             </a:r>
             <a:endParaRPr lang="en-US" dirty="0"/>
           </a:p>
@@ -6569,33 +6632,33 @@
           <a:p>
             <a:r>
               <a:rPr lang="ru-RU" dirty="0"/>
-              <a:t>Контекст: в БД много таблиц, но реплицируем одну таблицу справочник, которая обновляется крайне редко</a:t>
-            </a:r>
-          </a:p>
-          <a:p>
-            <a:r>
-              <a:rPr lang="ru-RU" dirty="0"/>
-              <a:t>Проблема: Слот всегда отстает, </a:t>
-            </a:r>
-            <a:r>
-              <a:rPr lang="en-US" dirty="0"/>
-              <a:t>WAL </a:t>
-            </a:r>
-            <a:r>
-              <a:rPr lang="ru-RU" dirty="0"/>
-              <a:t>копится до «предела». Есть риск потери данных и переход </a:t>
+              <a:t>Задача: нужно реплицировать </a:t>
             </a:r>
             <a:r>
               <a:rPr lang="ru-RU" dirty="0" err="1"/>
-              <a:t>инстанса</a:t>
-            </a:r>
-            <a:r>
-              <a:rPr lang="ru-RU" dirty="0"/>
-              <a:t> в </a:t>
-            </a:r>
-            <a:r>
-              <a:rPr lang="en-US" dirty="0"/>
-              <a:t>RO</a:t>
+              <a:t>партиционированную</a:t>
+            </a:r>
+            <a:r>
+              <a:rPr lang="ru-RU" dirty="0"/>
+              <a:t> таблицу</a:t>
+            </a:r>
+          </a:p>
+          <a:p>
+            <a:r>
+              <a:rPr lang="ru-RU" dirty="0"/>
+              <a:t>Проблема: </a:t>
+            </a:r>
+            <a:r>
+              <a:rPr lang="ru-RU" dirty="0" err="1"/>
+              <a:t>эвенты</a:t>
+            </a:r>
+            <a:r>
+              <a:rPr lang="ru-RU" dirty="0"/>
+              <a:t> приходят не от корневой таблицы, а от </a:t>
+            </a:r>
+            <a:r>
+              <a:rPr lang="ru-RU" dirty="0" err="1"/>
+              <a:t>партиций</a:t>
             </a:r>
             <a:endParaRPr lang="ru-RU" dirty="0"/>
           </a:p>
@@ -6608,35 +6671,25 @@
           <a:p>
             <a:pPr lvl="1"/>
             <a:r>
-              <a:rPr lang="en-US" dirty="0"/>
-              <a:t>Heartbeat </a:t>
-            </a:r>
-            <a:r>
-              <a:rPr lang="ru-RU" dirty="0"/>
-              <a:t>таблица</a:t>
-            </a:r>
-          </a:p>
-          <a:p>
-            <a:pPr lvl="1"/>
-            <a:r>
-              <a:rPr lang="ru-RU" dirty="0"/>
-              <a:t>Установить настройку, ограничивающую размер </a:t>
-            </a:r>
-            <a:r>
-              <a:rPr lang="en-US" dirty="0"/>
-              <a:t>WAL’</a:t>
-            </a:r>
-            <a:r>
-              <a:rPr lang="ru-RU" dirty="0"/>
-              <a:t>а</a:t>
-            </a:r>
+              <a:rPr lang="ru-RU" dirty="0"/>
+              <a:t>При создании публикации выставить флаг «</a:t>
+            </a:r>
+            <a:r>
+              <a:rPr lang="en-US" dirty="0" err="1"/>
+              <a:t>publish_via_partition_root</a:t>
+            </a:r>
+            <a:r>
+              <a:rPr lang="ru-RU" dirty="0"/>
+              <a:t>»</a:t>
+            </a:r>
+            <a:endParaRPr lang="en-US" dirty="0"/>
           </a:p>
         </p:txBody>
       </p:sp>
     </p:spTree>
     <p:extLst>
       <p:ext uri="{BB962C8B-B14F-4D97-AF65-F5344CB8AC3E}">
-        <p14:creationId xmlns:p14="http://schemas.microsoft.com/office/powerpoint/2010/main" val="1965460881"/>
+        <p14:creationId xmlns:p14="http://schemas.microsoft.com/office/powerpoint/2010/main" val="1856578306"/>
       </p:ext>
     </p:extLst>
   </p:cSld>
@@ -6809,12 +6862,8 @@
               <a:t>: </a:t>
             </a:r>
             <a:r>
-              <a:rPr lang="ru-RU" dirty="0" err="1"/>
-              <a:t>эвенты</a:t>
-            </a:r>
-            <a:r>
-              <a:rPr lang="ru-RU" dirty="0"/>
-              <a:t> с неполным состоянием</a:t>
+              <a:rPr lang="en-US" dirty="0" err="1"/>
+              <a:t>hypertable</a:t>
             </a:r>
             <a:endParaRPr lang="en-US" dirty="0"/>
           </a:p>
@@ -6850,21 +6899,38 @@
           <a:p>
             <a:r>
               <a:rPr lang="ru-RU" dirty="0"/>
-              <a:t>Контекст: реплицируется таблица с </a:t>
-            </a:r>
-            <a:r>
-              <a:rPr lang="en-US" dirty="0"/>
-              <a:t>TOAST </a:t>
-            </a:r>
-            <a:r>
-              <a:rPr lang="ru-RU" dirty="0"/>
-              <a:t>полями</a:t>
-            </a:r>
-          </a:p>
-          <a:p>
-            <a:r>
-              <a:rPr lang="ru-RU" dirty="0"/>
-              <a:t>Проблема: некоторые </a:t>
+              <a:t>Задача: нужно реплицировать </a:t>
+            </a:r>
+            <a:r>
+              <a:rPr lang="en-US" dirty="0" err="1"/>
+              <a:t>hypertable</a:t>
+            </a:r>
+            <a:r>
+              <a:rPr lang="en-US" dirty="0"/>
+              <a:t> (</a:t>
+            </a:r>
+            <a:r>
+              <a:rPr lang="en-US" dirty="0" err="1"/>
+              <a:t>timescaldb</a:t>
+            </a:r>
+            <a:r>
+              <a:rPr lang="en-US" dirty="0"/>
+              <a:t>)</a:t>
+            </a:r>
+            <a:endParaRPr lang="ru-RU" dirty="0"/>
+          </a:p>
+          <a:p>
+            <a:r>
+              <a:rPr lang="ru-RU" dirty="0"/>
+              <a:t>Проблема </a:t>
+            </a:r>
+            <a:r>
+              <a:rPr lang="en-US" dirty="0"/>
+              <a:t>#1</a:t>
+            </a:r>
+            <a:r>
+              <a:rPr lang="ru-RU" dirty="0"/>
+              <a:t>: </a:t>
             </a:r>
             <a:r>
               <a:rPr lang="ru-RU" dirty="0" err="1"/>
@@ -6872,40 +6938,54 @@
             </a:r>
             <a:r>
               <a:rPr lang="ru-RU" dirty="0"/>
-              <a:t> приходят только с частью заполненных колонок</a:t>
-            </a:r>
-          </a:p>
-          <a:p>
-            <a:r>
-              <a:rPr lang="ru-RU" dirty="0"/>
-              <a:t>Решения:</a:t>
+              <a:t> не приходят</a:t>
+            </a:r>
+          </a:p>
+          <a:p>
+            <a:r>
+              <a:rPr lang="ru-RU" dirty="0"/>
+              <a:t>Решение:</a:t>
             </a:r>
           </a:p>
           <a:p>
             <a:pPr lvl="1"/>
             <a:r>
-              <a:rPr lang="en-US" dirty="0"/>
-              <a:t>REPLICA IDENTITY FULL</a:t>
+              <a:rPr lang="ru-RU" dirty="0"/>
+              <a:t>«Правильная настройка» (пример)</a:t>
+            </a:r>
+          </a:p>
+          <a:p>
+            <a:r>
+              <a:rPr lang="en-US" dirty="0"/>
+              <a:t> </a:t>
+            </a:r>
+            <a:r>
+              <a:rPr lang="ru-RU" dirty="0"/>
+              <a:t>Проблема </a:t>
+            </a:r>
+            <a:r>
+              <a:rPr lang="en-US" dirty="0"/>
+              <a:t>#2: </a:t>
+            </a:r>
+            <a:r>
+              <a:rPr lang="ru-RU" dirty="0"/>
+              <a:t>процесс падает из-за системной таблицы</a:t>
             </a:r>
           </a:p>
           <a:p>
             <a:pPr lvl="1"/>
             <a:r>
               <a:rPr lang="ru-RU" dirty="0"/>
-              <a:t>Сделать поля частью </a:t>
-            </a:r>
-            <a:r>
-              <a:rPr lang="en-US" dirty="0"/>
-              <a:t>PK / Unique index</a:t>
-            </a:r>
-            <a:endParaRPr lang="ru-RU" dirty="0"/>
+              <a:t>Решение: явное исключение таблиц из репликации</a:t>
+            </a:r>
+            <a:endParaRPr lang="en-US" dirty="0"/>
           </a:p>
         </p:txBody>
       </p:sp>
     </p:spTree>
     <p:extLst>
       <p:ext uri="{BB962C8B-B14F-4D97-AF65-F5344CB8AC3E}">
-        <p14:creationId xmlns:p14="http://schemas.microsoft.com/office/powerpoint/2010/main" val="3406737331"/>
+        <p14:creationId xmlns:p14="http://schemas.microsoft.com/office/powerpoint/2010/main" val="1513835637"/>
       </p:ext>
     </p:extLst>
   </p:cSld>
@@ -6967,12 +7047,8 @@
               <a:t>: </a:t>
             </a:r>
             <a:r>
-              <a:rPr lang="ru-RU" dirty="0" err="1"/>
-              <a:t>партиционированные</a:t>
-            </a:r>
-            <a:r>
-              <a:rPr lang="ru-RU" dirty="0"/>
-              <a:t> таблицы</a:t>
+              <a:rPr lang="ru-RU" dirty="0"/>
+              <a:t>упавший мастер</a:t>
             </a:r>
             <a:endParaRPr lang="en-US" dirty="0"/>
           </a:p>
@@ -7008,64 +7084,76 @@
           <a:p>
             <a:r>
               <a:rPr lang="ru-RU" dirty="0"/>
-              <a:t>Задача: нужно реплицировать </a:t>
+              <a:t>Проблема: мастер в кластере</a:t>
+            </a:r>
+            <a:r>
+              <a:rPr lang="en-US" dirty="0"/>
+              <a:t> PG </a:t>
+            </a:r>
+            <a:r>
+              <a:rPr lang="ru-RU" dirty="0"/>
+              <a:t>переехал, </a:t>
+            </a:r>
+            <a:r>
+              <a:rPr lang="en-US" dirty="0" err="1"/>
+              <a:t>debezium</a:t>
+            </a:r>
+            <a:r>
+              <a:rPr lang="en-US" dirty="0"/>
+              <a:t> </a:t>
+            </a:r>
+            <a:r>
+              <a:rPr lang="ru-RU" dirty="0"/>
+              <a:t>упал</a:t>
+            </a:r>
+          </a:p>
+          <a:p>
+            <a:r>
+              <a:rPr lang="ru-RU" dirty="0"/>
+              <a:t>Решения:</a:t>
+            </a:r>
+          </a:p>
+          <a:p>
+            <a:pPr lvl="1"/>
+            <a:r>
+              <a:rPr lang="ru-RU" dirty="0"/>
+              <a:t>Обновить настройки подключения, указав ссылку на новый мастер</a:t>
+            </a:r>
+          </a:p>
+          <a:p>
+            <a:pPr lvl="1"/>
+            <a:r>
+              <a:rPr lang="ru-RU" dirty="0"/>
+              <a:t>Если </a:t>
+            </a:r>
+            <a:r>
+              <a:rPr lang="en-US" dirty="0"/>
+              <a:t>DNS </a:t>
+            </a:r>
+            <a:r>
+              <a:rPr lang="ru-RU" dirty="0"/>
+              <a:t>имя мастера не изменилось, то достаточно </a:t>
             </a:r>
             <a:r>
               <a:rPr lang="ru-RU" dirty="0" err="1"/>
-              <a:t>партиционированную</a:t>
-            </a:r>
-            <a:r>
-              <a:rPr lang="ru-RU" dirty="0"/>
-              <a:t> таблицу</a:t>
-            </a:r>
-          </a:p>
-          <a:p>
-            <a:r>
-              <a:rPr lang="ru-RU" dirty="0"/>
-              <a:t>Проблема: </a:t>
-            </a:r>
-            <a:r>
-              <a:rPr lang="ru-RU" dirty="0" err="1"/>
-              <a:t>эвенты</a:t>
-            </a:r>
-            <a:r>
-              <a:rPr lang="ru-RU" dirty="0"/>
-              <a:t> приходят не от корневой таблицы, а от </a:t>
-            </a:r>
-            <a:r>
-              <a:rPr lang="ru-RU" dirty="0" err="1"/>
-              <a:t>партиций</a:t>
+              <a:t>ретраев</a:t>
+            </a:r>
+            <a:r>
+              <a:rPr lang="ru-RU" dirty="0"/>
+              <a:t> на стороне </a:t>
+            </a:r>
+            <a:r>
+              <a:rPr lang="en-US" dirty="0" err="1"/>
+              <a:t>debezium</a:t>
             </a:r>
             <a:endParaRPr lang="ru-RU" dirty="0"/>
-          </a:p>
-          <a:p>
-            <a:r>
-              <a:rPr lang="ru-RU" dirty="0"/>
-              <a:t>Решение:</a:t>
-            </a:r>
-          </a:p>
-          <a:p>
-            <a:pPr lvl="1"/>
-            <a:r>
-              <a:rPr lang="ru-RU" dirty="0"/>
-              <a:t>При создании публикации выставить флаг «</a:t>
-            </a:r>
-            <a:r>
-              <a:rPr lang="en-US" dirty="0" err="1"/>
-              <a:t>publish_via_partition_root</a:t>
-            </a:r>
-            <a:r>
-              <a:rPr lang="ru-RU" dirty="0"/>
-              <a:t>»</a:t>
-            </a:r>
-            <a:endParaRPr lang="en-US" dirty="0"/>
           </a:p>
         </p:txBody>
       </p:sp>
     </p:spTree>
     <p:extLst>
       <p:ext uri="{BB962C8B-B14F-4D97-AF65-F5344CB8AC3E}">
-        <p14:creationId xmlns:p14="http://schemas.microsoft.com/office/powerpoint/2010/main" val="1856578306"/>
+        <p14:creationId xmlns:p14="http://schemas.microsoft.com/office/powerpoint/2010/main" val="2646893299"/>
       </p:ext>
     </p:extLst>
   </p:cSld>
@@ -7127,8 +7215,8 @@
               <a:t>: </a:t>
             </a:r>
             <a:r>
-              <a:rPr lang="en-US" dirty="0" err="1"/>
-              <a:t>hypertable</a:t>
+              <a:rPr lang="ru-RU" dirty="0"/>
+              <a:t>эволюция схем</a:t>
             </a:r>
             <a:endParaRPr lang="en-US" dirty="0"/>
           </a:p>
@@ -7164,93 +7252,106 @@
           <a:p>
             <a:r>
               <a:rPr lang="ru-RU" dirty="0"/>
-              <a:t>Задача: нужно реплицировать </a:t>
+              <a:t>Контекст: </a:t>
             </a:r>
             <a:r>
               <a:rPr lang="en-US" dirty="0" err="1"/>
-              <a:t>hypertable</a:t>
-            </a:r>
-            <a:r>
-              <a:rPr lang="en-US" dirty="0"/>
-              <a:t> (</a:t>
+              <a:t>debezium</a:t>
+            </a:r>
+            <a:r>
+              <a:rPr lang="en-US" dirty="0"/>
+              <a:t> </a:t>
+            </a:r>
+            <a:r>
+              <a:rPr lang="ru-RU" dirty="0"/>
+              <a:t>использует </a:t>
             </a:r>
             <a:r>
               <a:rPr lang="en-US" dirty="0" err="1"/>
-              <a:t>timescaldb</a:t>
-            </a:r>
-            <a:r>
-              <a:rPr lang="en-US" dirty="0"/>
-              <a:t>)</a:t>
-            </a:r>
-            <a:endParaRPr lang="ru-RU" dirty="0"/>
-          </a:p>
-          <a:p>
-            <a:r>
-              <a:rPr lang="ru-RU" dirty="0"/>
-              <a:t>Проблема </a:t>
-            </a:r>
-            <a:r>
-              <a:rPr lang="en-US" dirty="0"/>
-              <a:t>#1</a:t>
-            </a:r>
-            <a:r>
-              <a:rPr lang="ru-RU" dirty="0"/>
-              <a:t>: </a:t>
+              <a:t>avro</a:t>
+            </a:r>
+            <a:r>
+              <a:rPr lang="en-US" dirty="0"/>
+              <a:t>-</a:t>
+            </a:r>
+            <a:r>
+              <a:rPr lang="ru-RU" dirty="0"/>
+              <a:t>формат. Владелец БД изменил схему реплицируемой таблицы</a:t>
+            </a:r>
+          </a:p>
+          <a:p>
+            <a:r>
+              <a:rPr lang="ru-RU" dirty="0"/>
+              <a:t>Проблема: после изменения схемы </a:t>
+            </a:r>
+            <a:r>
+              <a:rPr lang="en-US" dirty="0" err="1"/>
+              <a:t>debezium</a:t>
+            </a:r>
+            <a:r>
+              <a:rPr lang="en-US" dirty="0"/>
+              <a:t> </a:t>
+            </a:r>
+            <a:r>
+              <a:rPr lang="ru-RU" dirty="0"/>
+              <a:t>падает</a:t>
+            </a:r>
+          </a:p>
+          <a:p>
+            <a:r>
+              <a:rPr lang="ru-RU" dirty="0"/>
+              <a:t>Причина: несовместимое изменение схемы</a:t>
+            </a:r>
+          </a:p>
+          <a:p>
+            <a:r>
+              <a:rPr lang="ru-RU" dirty="0"/>
+              <a:t>Решения:</a:t>
+            </a:r>
+          </a:p>
+          <a:p>
+            <a:pPr lvl="1"/>
+            <a:r>
+              <a:rPr lang="ru-RU" dirty="0"/>
+              <a:t>Указать </a:t>
+            </a:r>
+            <a:r>
+              <a:rPr lang="en-US" dirty="0" err="1"/>
+              <a:t>compatibility.mode</a:t>
+            </a:r>
+            <a:r>
+              <a:rPr lang="en-US" dirty="0"/>
+              <a:t>=NONE</a:t>
+            </a:r>
+          </a:p>
+          <a:p>
+            <a:pPr lvl="1"/>
+            <a:r>
+              <a:rPr lang="ru-RU" dirty="0"/>
+              <a:t>Глобально запретить выполнять несовместимые изменения </a:t>
+            </a:r>
+          </a:p>
+          <a:p>
+            <a:pPr lvl="1"/>
+            <a:r>
+              <a:rPr lang="ru-RU" dirty="0"/>
+              <a:t>Контролировать </a:t>
             </a:r>
             <a:r>
               <a:rPr lang="ru-RU" dirty="0" err="1"/>
-              <a:t>эвенты</a:t>
-            </a:r>
-            <a:r>
-              <a:rPr lang="ru-RU" dirty="0"/>
-              <a:t> не приходят</a:t>
-            </a:r>
-          </a:p>
-          <a:p>
-            <a:r>
-              <a:rPr lang="ru-RU" dirty="0"/>
-              <a:t>Решение:</a:t>
-            </a:r>
-          </a:p>
-          <a:p>
-            <a:pPr lvl="1"/>
-            <a:r>
-              <a:rPr lang="ru-RU" dirty="0"/>
-              <a:t>«Правильная настройка» (пример)</a:t>
-            </a:r>
-          </a:p>
-          <a:p>
-            <a:r>
-              <a:rPr lang="en-US" dirty="0"/>
-              <a:t> </a:t>
-            </a:r>
-            <a:r>
-              <a:rPr lang="ru-RU" dirty="0"/>
-              <a:t>Проблема </a:t>
-            </a:r>
-            <a:r>
-              <a:rPr lang="en-US" dirty="0"/>
-              <a:t>#2: </a:t>
-            </a:r>
-            <a:r>
-              <a:rPr lang="ru-RU" dirty="0"/>
-              <a:t>процесс падает из-за системной таблицы</a:t>
-            </a:r>
-          </a:p>
-          <a:p>
-            <a:pPr lvl="1"/>
-            <a:r>
-              <a:rPr lang="ru-RU" dirty="0"/>
-              <a:t>Решение: явное исключение таблиц из репликации</a:t>
-            </a:r>
-            <a:endParaRPr lang="en-US" dirty="0"/>
+              <a:t>валидацию</a:t>
+            </a:r>
+            <a:r>
+              <a:rPr lang="ru-RU" dirty="0"/>
+              <a:t> эволюции схемы самостоятельно</a:t>
+            </a:r>
           </a:p>
         </p:txBody>
       </p:sp>
     </p:spTree>
     <p:extLst>
       <p:ext uri="{BB962C8B-B14F-4D97-AF65-F5344CB8AC3E}">
-        <p14:creationId xmlns:p14="http://schemas.microsoft.com/office/powerpoint/2010/main" val="1513835637"/>
+        <p14:creationId xmlns:p14="http://schemas.microsoft.com/office/powerpoint/2010/main" val="3793313203"/>
       </p:ext>
     </p:extLst>
   </p:cSld>
@@ -7312,8 +7413,32 @@
               <a:t>: </a:t>
             </a:r>
             <a:r>
-              <a:rPr lang="ru-RU" dirty="0"/>
-              <a:t>эволюция схем</a:t>
+              <a:rPr lang="en-US" dirty="0" err="1"/>
+              <a:t>cdc</a:t>
+            </a:r>
+            <a:r>
+              <a:rPr lang="en-US" dirty="0"/>
+              <a:t> </a:t>
+            </a:r>
+            <a:r>
+              <a:rPr lang="ru-RU" dirty="0"/>
+              <a:t>для </a:t>
+            </a:r>
+            <a:r>
+              <a:rPr lang="ru-RU" dirty="0" err="1"/>
+              <a:t>шардов</a:t>
+            </a:r>
+            <a:r>
+              <a:rPr lang="ru-RU" dirty="0"/>
+              <a:t> </a:t>
+            </a:r>
+            <a:r>
+              <a:rPr lang="en-US" dirty="0"/>
+              <a:t># </a:t>
+            </a:r>
+            <a:r>
+              <a:rPr lang="ru-RU" dirty="0" err="1"/>
+              <a:t>роутинг</a:t>
             </a:r>
             <a:endParaRPr lang="en-US" dirty="0"/>
           </a:p>
@@ -7349,98 +7474,47 @@
           <a:p>
             <a:r>
               <a:rPr lang="ru-RU" dirty="0"/>
-              <a:t>Контекст: </a:t>
-            </a:r>
-            <a:r>
-              <a:rPr lang="en-US" dirty="0" err="1"/>
-              <a:t>debezium</a:t>
-            </a:r>
-            <a:r>
-              <a:rPr lang="en-US" dirty="0"/>
-              <a:t> </a:t>
-            </a:r>
-            <a:r>
-              <a:rPr lang="ru-RU" dirty="0"/>
-              <a:t>использует </a:t>
-            </a:r>
-            <a:r>
-              <a:rPr lang="en-US" dirty="0" err="1"/>
-              <a:t>avro</a:t>
-            </a:r>
-            <a:r>
-              <a:rPr lang="en-US" dirty="0"/>
-              <a:t>-</a:t>
-            </a:r>
-            <a:r>
-              <a:rPr lang="ru-RU" dirty="0"/>
-              <a:t>формат. Владелец БД изменил схему реплицируемой таблицы</a:t>
-            </a:r>
-          </a:p>
-          <a:p>
-            <a:r>
-              <a:rPr lang="ru-RU" dirty="0"/>
-              <a:t>Проблема: после изменения схемы </a:t>
-            </a:r>
-            <a:r>
-              <a:rPr lang="en-US" dirty="0" err="1"/>
-              <a:t>debezium</a:t>
-            </a:r>
-            <a:r>
-              <a:rPr lang="en-US" dirty="0"/>
-              <a:t> </a:t>
-            </a:r>
-            <a:r>
-              <a:rPr lang="ru-RU" dirty="0"/>
-              <a:t>падает</a:t>
-            </a:r>
-          </a:p>
-          <a:p>
-            <a:r>
-              <a:rPr lang="ru-RU" dirty="0"/>
-              <a:t>Причина: несовместимое изменение схемы</a:t>
-            </a:r>
-          </a:p>
-          <a:p>
-            <a:r>
-              <a:rPr lang="ru-RU" dirty="0"/>
-              <a:t>Решения:</a:t>
+              <a:t>Контекст: нужно перехватывать изменения по заданному набору таблиц в разных </a:t>
+            </a:r>
+            <a:r>
+              <a:rPr lang="ru-RU" dirty="0" err="1"/>
+              <a:t>шардах</a:t>
+            </a:r>
+            <a:endParaRPr lang="ru-RU" dirty="0"/>
+          </a:p>
+          <a:p>
+            <a:r>
+              <a:rPr lang="ru-RU" dirty="0"/>
+              <a:t>Проблема: </a:t>
+            </a:r>
+            <a:r>
+              <a:rPr lang="ru-RU" dirty="0" err="1"/>
+              <a:t>эвенты</a:t>
+            </a:r>
+            <a:r>
+              <a:rPr lang="ru-RU" dirty="0"/>
+              <a:t> по одинаковым таблицам сохраняются в разные топики</a:t>
+            </a:r>
+          </a:p>
+          <a:p>
+            <a:r>
+              <a:rPr lang="ru-RU" dirty="0"/>
+              <a:t>Решение:</a:t>
             </a:r>
           </a:p>
           <a:p>
             <a:pPr lvl="1"/>
             <a:r>
               <a:rPr lang="ru-RU" dirty="0"/>
-              <a:t>Указать </a:t>
-            </a:r>
-            <a:r>
-              <a:rPr lang="en-US" dirty="0" err="1"/>
-              <a:t>compatibility.mode</a:t>
-            </a:r>
-            <a:r>
-              <a:rPr lang="en-US" dirty="0"/>
-              <a:t>=NONE</a:t>
-            </a:r>
-          </a:p>
-          <a:p>
-            <a:pPr lvl="1"/>
-            <a:r>
-              <a:rPr lang="ru-RU" dirty="0"/>
-              <a:t>Глобально запретить выполнять несовместимые изменения </a:t>
-            </a:r>
-          </a:p>
-          <a:p>
-            <a:pPr lvl="1"/>
-            <a:r>
-              <a:rPr lang="ru-RU" dirty="0"/>
-              <a:t>Контролировать </a:t>
+              <a:t>Настройка </a:t>
             </a:r>
             <a:r>
               <a:rPr lang="ru-RU" dirty="0" err="1"/>
-              <a:t>валидацию</a:t>
-            </a:r>
-            <a:r>
-              <a:rPr lang="ru-RU" dirty="0"/>
-              <a:t> эволюции схемы самостоятельно</a:t>
+              <a:t>роутинга</a:t>
+            </a:r>
+            <a:r>
+              <a:rPr lang="ru-RU" dirty="0"/>
+              <a:t> таблиц</a:t>
             </a:r>
           </a:p>
         </p:txBody>
@@ -7448,7 +7522,7 @@
     </p:spTree>
     <p:extLst>
       <p:ext uri="{BB962C8B-B14F-4D97-AF65-F5344CB8AC3E}">
-        <p14:creationId xmlns:p14="http://schemas.microsoft.com/office/powerpoint/2010/main" val="3793313203"/>
+        <p14:creationId xmlns:p14="http://schemas.microsoft.com/office/powerpoint/2010/main" val="2860038133"/>
       </p:ext>
     </p:extLst>
   </p:cSld>
@@ -7493,8 +7567,8 @@
         </p:nvSpPr>
         <p:spPr>
           <a:xfrm>
-            <a:off x="0" y="18255"/>
-            <a:ext cx="10515600" cy="1325563"/>
+            <a:off x="-1" y="18255"/>
+            <a:ext cx="11867745" cy="1325563"/>
           </a:xfrm>
         </p:spPr>
         <p:txBody>
@@ -7510,10 +7584,25 @@
               <a:t>: </a:t>
             </a:r>
             <a:r>
-              <a:rPr lang="ru-RU" dirty="0"/>
-              <a:t>упавший мастер</a:t>
-            </a:r>
-            <a:endParaRPr lang="en-US" dirty="0"/>
+              <a:rPr lang="en-US" dirty="0" err="1"/>
+              <a:t>cdc</a:t>
+            </a:r>
+            <a:r>
+              <a:rPr lang="en-US" dirty="0"/>
+              <a:t> </a:t>
+            </a:r>
+            <a:r>
+              <a:rPr lang="ru-RU" dirty="0"/>
+              <a:t>для </a:t>
+            </a:r>
+            <a:r>
+              <a:rPr lang="ru-RU" dirty="0" err="1"/>
+              <a:t>шардов</a:t>
+            </a:r>
+            <a:r>
+              <a:rPr lang="en-US" dirty="0"/>
+              <a:t> # schema evolution</a:t>
+            </a:r>
           </a:p>
         </p:txBody>
       </p:sp>
@@ -7541,82 +7630,126 @@
         </p:spPr>
         <p:txBody>
           <a:bodyPr>
-            <a:normAutofit/>
+            <a:normAutofit fontScale="92500" lnSpcReduction="10000"/>
           </a:bodyPr>
           <a:lstStyle/>
           <a:p>
             <a:r>
               <a:rPr lang="ru-RU" dirty="0"/>
-              <a:t>Проблема: мастер в кластере</a:t>
-            </a:r>
-            <a:r>
-              <a:rPr lang="en-US" dirty="0"/>
-              <a:t> PG </a:t>
-            </a:r>
-            <a:r>
-              <a:rPr lang="ru-RU" dirty="0"/>
-              <a:t>переехал, </a:t>
+              <a:t>Контекст: нужно перехватывать изменения по заданному набору таблиц в разных </a:t>
+            </a:r>
+            <a:r>
+              <a:rPr lang="ru-RU" dirty="0" err="1"/>
+              <a:t>шардах</a:t>
+            </a:r>
+            <a:r>
+              <a:rPr lang="ru-RU" dirty="0"/>
+              <a:t> / </a:t>
             </a:r>
             <a:r>
               <a:rPr lang="en-US" dirty="0" err="1"/>
               <a:t>debezium</a:t>
             </a:r>
             <a:r>
-              <a:rPr lang="en-US" dirty="0"/>
-              <a:t> </a:t>
-            </a:r>
-            <a:r>
-              <a:rPr lang="ru-RU" dirty="0"/>
-              <a:t>упал</a:t>
-            </a:r>
-          </a:p>
-          <a:p>
-            <a:r>
-              <a:rPr lang="ru-RU" dirty="0"/>
-              <a:t>Решения:</a:t>
-            </a:r>
-          </a:p>
-          <a:p>
-            <a:pPr lvl="1"/>
-            <a:r>
-              <a:rPr lang="ru-RU" dirty="0"/>
-              <a:t>Обновить настройки подключения, указав ссылку на новый мастер</a:t>
-            </a:r>
-          </a:p>
-          <a:p>
-            <a:pPr lvl="1"/>
-            <a:r>
-              <a:rPr lang="ru-RU" dirty="0"/>
-              <a:t>Если </a:t>
-            </a:r>
-            <a:r>
-              <a:rPr lang="en-US" dirty="0"/>
-              <a:t>DNS </a:t>
-            </a:r>
-            <a:r>
-              <a:rPr lang="ru-RU" dirty="0"/>
-              <a:t>имя мастера не изменилось, то достаточно </a:t>
+              <a:rPr lang="ru-RU" dirty="0"/>
+              <a:t> использует </a:t>
+            </a:r>
+            <a:r>
+              <a:rPr lang="en-US" dirty="0" err="1"/>
+              <a:t>avro</a:t>
+            </a:r>
+            <a:endParaRPr lang="ru-RU" dirty="0"/>
+          </a:p>
+          <a:p>
+            <a:r>
+              <a:rPr lang="ru-RU" dirty="0"/>
+              <a:t>Проблема </a:t>
+            </a:r>
+            <a:r>
+              <a:rPr lang="en-US" dirty="0"/>
+              <a:t>#1</a:t>
+            </a:r>
+            <a:r>
+              <a:rPr lang="ru-RU" dirty="0"/>
+              <a:t>: </a:t>
             </a:r>
             <a:r>
               <a:rPr lang="ru-RU" dirty="0" err="1"/>
-              <a:t>ретраев</a:t>
-            </a:r>
-            <a:r>
-              <a:rPr lang="ru-RU" dirty="0"/>
-              <a:t> на стороне </a:t>
+              <a:t>эвенты</a:t>
+            </a:r>
+            <a:r>
+              <a:rPr lang="ru-RU" dirty="0"/>
+              <a:t> по одинаковым таблицам имею одинаковую структуру, но </a:t>
             </a:r>
             <a:r>
               <a:rPr lang="en-US" dirty="0" err="1"/>
               <a:t>debezium</a:t>
             </a:r>
+            <a:r>
+              <a:rPr lang="en-US" dirty="0"/>
+              <a:t> </a:t>
+            </a:r>
+            <a:r>
+              <a:rPr lang="ru-RU" dirty="0"/>
+              <a:t>генерирует разные несовместимые схемы</a:t>
+            </a:r>
+          </a:p>
+          <a:p>
+            <a:r>
+              <a:rPr lang="ru-RU" dirty="0"/>
+              <a:t>Решение:</a:t>
+            </a:r>
+          </a:p>
+          <a:p>
+            <a:pPr lvl="1"/>
+            <a:r>
+              <a:rPr lang="ru-RU" dirty="0"/>
+              <a:t>Трансформ для переименования рекордов</a:t>
+            </a:r>
+            <a:endParaRPr lang="en-US" dirty="0"/>
+          </a:p>
+          <a:p>
+            <a:r>
+              <a:rPr lang="ru-RU" dirty="0"/>
+              <a:t>Проблема </a:t>
+            </a:r>
+            <a:r>
+              <a:rPr lang="en-US" dirty="0"/>
+              <a:t>#2: </a:t>
+            </a:r>
+            <a:r>
+              <a:rPr lang="ru-RU" dirty="0"/>
+              <a:t>переименование сработало только на верхнем уровне. Вложенные структуры также с разным </a:t>
+            </a:r>
+            <a:r>
+              <a:rPr lang="ru-RU" dirty="0" err="1"/>
+              <a:t>неймингом</a:t>
+            </a:r>
             <a:endParaRPr lang="ru-RU" dirty="0"/>
+          </a:p>
+          <a:p>
+            <a:r>
+              <a:rPr lang="ru-RU" dirty="0"/>
+              <a:t>Решение:</a:t>
+            </a:r>
+          </a:p>
+          <a:p>
+            <a:pPr lvl="1"/>
+            <a:r>
+              <a:rPr lang="ru-RU" dirty="0" err="1"/>
+              <a:t>Кастомный</a:t>
+            </a:r>
+            <a:r>
+              <a:rPr lang="ru-RU" dirty="0"/>
+              <a:t> трансформ, который переименовывает в том числе и вложенные структуры</a:t>
+            </a:r>
           </a:p>
         </p:txBody>
       </p:sp>
     </p:spTree>
     <p:extLst>
       <p:ext uri="{BB962C8B-B14F-4D97-AF65-F5344CB8AC3E}">
-        <p14:creationId xmlns:p14="http://schemas.microsoft.com/office/powerpoint/2010/main" val="2646893299"/>
+        <p14:creationId xmlns:p14="http://schemas.microsoft.com/office/powerpoint/2010/main" val="167980905"/>
       </p:ext>
     </p:extLst>
   </p:cSld>
@@ -7675,37 +7808,8 @@
             </a:r>
             <a:r>
               <a:rPr lang="en-US" dirty="0"/>
-              <a:t>: </a:t>
-            </a:r>
-            <a:r>
-              <a:rPr lang="en-US" dirty="0" err="1"/>
-              <a:t>cdc</a:t>
-            </a:r>
-            <a:r>
-              <a:rPr lang="en-US" dirty="0"/>
-              <a:t> </a:t>
-            </a:r>
-            <a:r>
-              <a:rPr lang="ru-RU" dirty="0"/>
-              <a:t>для </a:t>
-            </a:r>
-            <a:r>
-              <a:rPr lang="ru-RU" dirty="0" err="1"/>
-              <a:t>шардов</a:t>
-            </a:r>
-            <a:r>
-              <a:rPr lang="ru-RU" dirty="0"/>
-              <a:t> </a:t>
-            </a:r>
-            <a:r>
-              <a:rPr lang="en-US" dirty="0"/>
-              <a:t># </a:t>
-            </a:r>
-            <a:r>
-              <a:rPr lang="ru-RU" dirty="0" err="1"/>
-              <a:t>роутинг</a:t>
-            </a:r>
-            <a:endParaRPr lang="en-US" dirty="0"/>
+              <a:t>: transaction boundaries</a:t>
+            </a:r>
           </a:p>
         </p:txBody>
       </p:sp>
@@ -7739,17 +7843,6 @@
           <a:p>
             <a:r>
               <a:rPr lang="ru-RU" dirty="0"/>
-              <a:t>Контекст: нужно перехватывать изменения по заданному набору таблиц в разных </a:t>
-            </a:r>
-            <a:r>
-              <a:rPr lang="ru-RU" dirty="0" err="1"/>
-              <a:t>шардах</a:t>
-            </a:r>
-            <a:endParaRPr lang="ru-RU" dirty="0"/>
-          </a:p>
-          <a:p>
-            <a:r>
-              <a:rPr lang="ru-RU" dirty="0"/>
               <a:t>Проблема: </a:t>
             </a:r>
             <a:r>
@@ -7758,7 +7851,7 @@
             </a:r>
             <a:r>
               <a:rPr lang="ru-RU" dirty="0"/>
-              <a:t> по одинаковым таблицам сохраняются в разные топики</a:t>
+              <a:t> от источника приходят сплошным потоком, но есть требование сохранять данные с учетом границ исходных транзакций</a:t>
             </a:r>
           </a:p>
           <a:p>
@@ -7766,28 +7859,38 @@
               <a:rPr lang="ru-RU" dirty="0"/>
               <a:t>Решение:</a:t>
             </a:r>
-          </a:p>
-          <a:p>
-            <a:pPr lvl="1"/>
-            <a:r>
-              <a:rPr lang="ru-RU" dirty="0"/>
-              <a:t>Настройка </a:t>
-            </a:r>
-            <a:r>
-              <a:rPr lang="ru-RU" dirty="0" err="1"/>
-              <a:t>роутинга</a:t>
-            </a:r>
-            <a:r>
-              <a:rPr lang="ru-RU" dirty="0"/>
-              <a:t> таблиц</a:t>
-            </a:r>
+            <a:r>
+              <a:rPr lang="en-US" dirty="0"/>
+              <a:t> provide.transaction.metadata=true</a:t>
+            </a:r>
+            <a:endParaRPr lang="en-US" b="0" i="0" u="none" strike="noStrike" dirty="0">
+              <a:solidFill>
+                <a:srgbClr val="1565C0"/>
+              </a:solidFill>
+              <a:effectLst/>
+              <a:latin typeface="acumin-pro"/>
+            </a:endParaRPr>
+          </a:p>
+          <a:p>
+            <a:endParaRPr lang="en-US" dirty="0">
+              <a:solidFill>
+                <a:srgbClr val="1565C0"/>
+              </a:solidFill>
+              <a:latin typeface="acumin-pro"/>
+            </a:endParaRPr>
+          </a:p>
+          <a:p>
+            <a:pPr marL="0" indent="0">
+              <a:buNone/>
+            </a:pPr>
+            <a:endParaRPr lang="ru-RU" dirty="0"/>
           </a:p>
         </p:txBody>
       </p:sp>
     </p:spTree>
     <p:extLst>
       <p:ext uri="{BB962C8B-B14F-4D97-AF65-F5344CB8AC3E}">
-        <p14:creationId xmlns:p14="http://schemas.microsoft.com/office/powerpoint/2010/main" val="2860038133"/>
+        <p14:creationId xmlns:p14="http://schemas.microsoft.com/office/powerpoint/2010/main" val="1533522270"/>
       </p:ext>
     </p:extLst>
   </p:cSld>
@@ -7832,8 +7935,8 @@
         </p:nvSpPr>
         <p:spPr>
           <a:xfrm>
-            <a:off x="-1" y="18255"/>
-            <a:ext cx="11867745" cy="1325563"/>
+            <a:off x="0" y="18255"/>
+            <a:ext cx="10515600" cy="1325563"/>
           </a:xfrm>
         </p:spPr>
         <p:txBody>
@@ -7849,25 +7952,10 @@
               <a:t>: </a:t>
             </a:r>
             <a:r>
-              <a:rPr lang="en-US" dirty="0" err="1"/>
-              <a:t>cdc</a:t>
-            </a:r>
-            <a:r>
-              <a:rPr lang="en-US" dirty="0"/>
-              <a:t> </a:t>
-            </a:r>
-            <a:r>
-              <a:rPr lang="ru-RU" dirty="0"/>
-              <a:t>для </a:t>
-            </a:r>
-            <a:r>
-              <a:rPr lang="ru-RU" dirty="0" err="1"/>
-              <a:t>шардов</a:t>
-            </a:r>
-            <a:r>
-              <a:rPr lang="en-US" dirty="0"/>
-              <a:t> # schema evolution</a:t>
-            </a:r>
+              <a:rPr lang="ru-RU" dirty="0"/>
+              <a:t>дубли</a:t>
+            </a:r>
+            <a:endParaRPr lang="en-US" dirty="0"/>
           </a:p>
         </p:txBody>
       </p:sp>
@@ -7895,126 +7983,118 @@
         </p:spPr>
         <p:txBody>
           <a:bodyPr>
-            <a:normAutofit fontScale="92500" lnSpcReduction="10000"/>
+            <a:normAutofit/>
           </a:bodyPr>
           <a:lstStyle/>
           <a:p>
             <a:r>
               <a:rPr lang="ru-RU" dirty="0"/>
-              <a:t>Контекст: нужно перехватывать изменения по заданному набору таблиц в разных </a:t>
-            </a:r>
-            <a:r>
-              <a:rPr lang="ru-RU" dirty="0" err="1"/>
-              <a:t>шардах</a:t>
-            </a:r>
-            <a:r>
-              <a:rPr lang="ru-RU" dirty="0"/>
-              <a:t> / </a:t>
+              <a:t>Задача: </a:t>
             </a:r>
             <a:r>
               <a:rPr lang="en-US" dirty="0" err="1"/>
               <a:t>debezium</a:t>
             </a:r>
             <a:r>
-              <a:rPr lang="ru-RU" dirty="0"/>
-              <a:t> использует </a:t>
+              <a:rPr lang="en-US" dirty="0"/>
+              <a:t> </a:t>
+            </a:r>
+            <a:r>
+              <a:rPr lang="ru-RU" dirty="0"/>
+              <a:t>обещает </a:t>
+            </a:r>
+            <a:r>
+              <a:rPr lang="en-US" dirty="0"/>
+              <a:t>at-least-once </a:t>
+            </a:r>
+            <a:r>
+              <a:rPr lang="ru-RU" dirty="0"/>
+              <a:t>семантику, но есть требование прийти к (</a:t>
+            </a:r>
+            <a:r>
+              <a:rPr lang="en-US" dirty="0"/>
+              <a:t>effectively</a:t>
+            </a:r>
+            <a:r>
+              <a:rPr lang="ru-RU" dirty="0"/>
+              <a:t>)</a:t>
+            </a:r>
+            <a:r>
+              <a:rPr lang="en-US" dirty="0"/>
+              <a:t>exactly-once. </a:t>
+            </a:r>
+            <a:endParaRPr lang="ru-RU" dirty="0"/>
+          </a:p>
+          <a:p>
+            <a:r>
+              <a:rPr lang="ru-RU" dirty="0"/>
+              <a:t>Решение:</a:t>
+            </a:r>
+            <a:r>
+              <a:rPr lang="en-US" dirty="0"/>
+              <a:t> </a:t>
+            </a:r>
+            <a:r>
+              <a:rPr lang="ru-RU" dirty="0" err="1"/>
+              <a:t>дедубликация</a:t>
+            </a:r>
+            <a:r>
+              <a:rPr lang="ru-RU" dirty="0"/>
+              <a:t> по </a:t>
             </a:r>
             <a:r>
               <a:rPr lang="en-US" dirty="0" err="1"/>
-              <a:t>avro</a:t>
+              <a:t>lsn</a:t>
             </a:r>
             <a:endParaRPr lang="ru-RU" dirty="0"/>
           </a:p>
           <a:p>
             <a:r>
               <a:rPr lang="ru-RU" dirty="0"/>
-              <a:t>Проблема </a:t>
-            </a:r>
-            <a:r>
-              <a:rPr lang="en-US" dirty="0"/>
-              <a:t>#1</a:t>
-            </a:r>
-            <a:r>
-              <a:rPr lang="ru-RU" dirty="0"/>
-              <a:t>: </a:t>
-            </a:r>
-            <a:r>
-              <a:rPr lang="ru-RU" dirty="0" err="1"/>
-              <a:t>эвенты</a:t>
-            </a:r>
-            <a:r>
-              <a:rPr lang="ru-RU" dirty="0"/>
-              <a:t> по одинаковым таблицам имею одинаковую структуру, но </a:t>
-            </a:r>
-            <a:r>
-              <a:rPr lang="en-US" dirty="0" err="1"/>
-              <a:t>debezium</a:t>
-            </a:r>
-            <a:r>
-              <a:rPr lang="en-US" dirty="0"/>
-              <a:t> </a:t>
-            </a:r>
-            <a:r>
-              <a:rPr lang="ru-RU" dirty="0"/>
-              <a:t>генерирует разные несовместимые схемы</a:t>
-            </a:r>
-          </a:p>
-          <a:p>
-            <a:r>
-              <a:rPr lang="ru-RU" dirty="0"/>
-              <a:t>Решение:</a:t>
-            </a:r>
-          </a:p>
-          <a:p>
-            <a:pPr lvl="1"/>
-            <a:r>
-              <a:rPr lang="ru-RU" dirty="0"/>
-              <a:t>Трансформ для переименования рекордов</a:t>
+              <a:t>Проблема: при </a:t>
+            </a:r>
+            <a:r>
+              <a:rPr lang="en-US" dirty="0"/>
+              <a:t>INCREMENTAL snapshot LSN </a:t>
+            </a:r>
+            <a:r>
+              <a:rPr lang="ru-RU" dirty="0"/>
+              <a:t>нет</a:t>
             </a:r>
             <a:endParaRPr lang="en-US" dirty="0"/>
           </a:p>
           <a:p>
-            <a:r>
-              <a:rPr lang="ru-RU" dirty="0"/>
-              <a:t>Проблема </a:t>
-            </a:r>
-            <a:r>
-              <a:rPr lang="en-US" dirty="0"/>
-              <a:t>#2: </a:t>
-            </a:r>
-            <a:r>
-              <a:rPr lang="ru-RU" dirty="0"/>
-              <a:t>переименование сработало только на верхнем уровне. Вложенные структуры также с разным </a:t>
-            </a:r>
-            <a:r>
-              <a:rPr lang="ru-RU" dirty="0" err="1"/>
-              <a:t>неймингом</a:t>
-            </a:r>
+            <a:pPr marL="0" indent="0">
+              <a:buNone/>
+            </a:pPr>
+            <a:endParaRPr lang="en-US" b="0" i="0" u="none" strike="noStrike" dirty="0">
+              <a:solidFill>
+                <a:srgbClr val="1565C0"/>
+              </a:solidFill>
+              <a:effectLst/>
+              <a:latin typeface="acumin-pro"/>
+            </a:endParaRPr>
+          </a:p>
+          <a:p>
+            <a:endParaRPr lang="en-US" dirty="0">
+              <a:solidFill>
+                <a:srgbClr val="1565C0"/>
+              </a:solidFill>
+              <a:latin typeface="acumin-pro"/>
+            </a:endParaRPr>
+          </a:p>
+          <a:p>
+            <a:pPr marL="0" indent="0">
+              <a:buNone/>
+            </a:pPr>
             <a:endParaRPr lang="ru-RU" dirty="0"/>
-          </a:p>
-          <a:p>
-            <a:r>
-              <a:rPr lang="ru-RU" dirty="0"/>
-              <a:t>Решение:</a:t>
-            </a:r>
-          </a:p>
-          <a:p>
-            <a:pPr lvl="1"/>
-            <a:r>
-              <a:rPr lang="ru-RU" dirty="0" err="1"/>
-              <a:t>Кастомный</a:t>
-            </a:r>
-            <a:r>
-              <a:rPr lang="ru-RU" dirty="0"/>
-              <a:t> трансформ, который переименовывает в том числе и вложенные структуры</a:t>
-            </a:r>
           </a:p>
         </p:txBody>
       </p:sp>
     </p:spTree>
     <p:extLst>
       <p:ext uri="{BB962C8B-B14F-4D97-AF65-F5344CB8AC3E}">
-        <p14:creationId xmlns:p14="http://schemas.microsoft.com/office/powerpoint/2010/main" val="167980905"/>
+        <p14:creationId xmlns:p14="http://schemas.microsoft.com/office/powerpoint/2010/main" val="710608870"/>
       </p:ext>
     </p:extLst>
   </p:cSld>
@@ -8073,7 +8153,15 @@
             </a:r>
             <a:r>
               <a:rPr lang="en-US" dirty="0"/>
-              <a:t>: transaction boundaries</a:t>
+              <a:t>: </a:t>
+            </a:r>
+            <a:r>
+              <a:rPr lang="ru-RU" dirty="0"/>
+              <a:t>потерянные </a:t>
+            </a:r>
+            <a:r>
+              <a:rPr lang="en-US" dirty="0"/>
+              <a:t>CREATE/UPDATE</a:t>
             </a:r>
           </a:p>
         </p:txBody>
@@ -8108,54 +8196,29 @@
           <a:p>
             <a:r>
               <a:rPr lang="ru-RU" dirty="0"/>
-              <a:t>Проблема: </a:t>
+              <a:t>Задача: восстановить потерянный срез данных за заданный период</a:t>
+            </a:r>
+          </a:p>
+          <a:p>
+            <a:r>
+              <a:rPr lang="ru-RU" dirty="0"/>
+              <a:t>Решение: </a:t>
             </a:r>
             <a:r>
               <a:rPr lang="ru-RU" dirty="0" err="1"/>
-              <a:t>эвенты</a:t>
-            </a:r>
-            <a:r>
-              <a:rPr lang="ru-RU" dirty="0"/>
-              <a:t> от источника приходят сплошным потоком, но есть требование сохранять данные с учетом границ исходных транзакций</a:t>
-            </a:r>
-          </a:p>
-          <a:p>
-            <a:r>
-              <a:rPr lang="ru-RU" dirty="0"/>
-              <a:t>Решение:</a:t>
-            </a:r>
-            <a:r>
-              <a:rPr lang="en-US" dirty="0"/>
-              <a:t> provide.transaction.metadata=true</a:t>
-            </a:r>
-            <a:endParaRPr lang="en-US" b="0" i="0" u="none" strike="noStrike" dirty="0">
-              <a:solidFill>
-                <a:srgbClr val="1565C0"/>
-              </a:solidFill>
-              <a:effectLst/>
-              <a:latin typeface="acumin-pro"/>
-            </a:endParaRPr>
-          </a:p>
-          <a:p>
-            <a:endParaRPr lang="en-US" dirty="0">
-              <a:solidFill>
-                <a:srgbClr val="1565C0"/>
-              </a:solidFill>
-              <a:latin typeface="acumin-pro"/>
-            </a:endParaRPr>
-          </a:p>
-          <a:p>
-            <a:pPr marL="0" indent="0">
-              <a:buNone/>
-            </a:pPr>
-            <a:endParaRPr lang="ru-RU" dirty="0"/>
+              <a:t>снепшот</a:t>
+            </a:r>
+            <a:r>
+              <a:rPr lang="ru-RU" dirty="0"/>
+              <a:t> с фильтром</a:t>
+            </a:r>
           </a:p>
         </p:txBody>
       </p:sp>
     </p:spTree>
     <p:extLst>
       <p:ext uri="{BB962C8B-B14F-4D97-AF65-F5344CB8AC3E}">
-        <p14:creationId xmlns:p14="http://schemas.microsoft.com/office/powerpoint/2010/main" val="1533522270"/>
+        <p14:creationId xmlns:p14="http://schemas.microsoft.com/office/powerpoint/2010/main" val="2994142072"/>
       </p:ext>
     </p:extLst>
   </p:cSld>
@@ -8218,9 +8281,12 @@
             </a:r>
             <a:r>
               <a:rPr lang="ru-RU" dirty="0"/>
-              <a:t>дубли</a:t>
-            </a:r>
-            <a:endParaRPr lang="en-US" dirty="0"/>
+              <a:t>потерянные </a:t>
+            </a:r>
+            <a:r>
+              <a:rPr lang="en-US" dirty="0"/>
+              <a:t>DELETE</a:t>
+            </a:r>
           </a:p>
         </p:txBody>
       </p:sp>
@@ -8254,11 +8320,45 @@
           <a:p>
             <a:r>
               <a:rPr lang="ru-RU" dirty="0"/>
-              <a:t>Задача: </a:t>
-            </a:r>
-            <a:r>
-              <a:rPr lang="en-US" dirty="0" err="1"/>
-              <a:t>debezium</a:t>
+              <a:t>Контекст: из-за сбоя потеряли часть </a:t>
+            </a:r>
+            <a:r>
+              <a:rPr lang="ru-RU" dirty="0" err="1"/>
+              <a:t>эвентов</a:t>
+            </a:r>
+            <a:r>
+              <a:rPr lang="ru-RU" dirty="0"/>
+              <a:t>, среди которых были </a:t>
+            </a:r>
+            <a:r>
+              <a:rPr lang="en-US" dirty="0"/>
+              <a:t>DELETE. </a:t>
+            </a:r>
+            <a:r>
+              <a:rPr lang="ru-RU" dirty="0"/>
+              <a:t>В </a:t>
+            </a:r>
+            <a:r>
+              <a:rPr lang="ru-RU" dirty="0" err="1"/>
+              <a:t>таргете</a:t>
+            </a:r>
+            <a:r>
+              <a:rPr lang="ru-RU" dirty="0"/>
+              <a:t> теперь есть «зависшие» записи</a:t>
+            </a:r>
+          </a:p>
+          <a:p>
+            <a:r>
+              <a:rPr lang="ru-RU" dirty="0"/>
+              <a:t>Решение </a:t>
+            </a:r>
+            <a:r>
+              <a:rPr lang="en-US" dirty="0"/>
+              <a:t>#1</a:t>
+            </a:r>
+            <a:r>
+              <a:rPr lang="ru-RU" dirty="0"/>
+              <a:t>:</a:t>
             </a:r>
             <a:r>
               <a:rPr lang="en-US" dirty="0"/>
@@ -8266,50 +8366,19 @@
             </a:r>
             <a:r>
               <a:rPr lang="ru-RU" dirty="0"/>
-              <a:t>обещает </a:t>
-            </a:r>
-            <a:r>
-              <a:rPr lang="en-US" dirty="0"/>
-              <a:t>at-least-once </a:t>
-            </a:r>
-            <a:r>
-              <a:rPr lang="ru-RU" dirty="0"/>
-              <a:t>семантику, но есть требование прийти к (</a:t>
-            </a:r>
-            <a:r>
-              <a:rPr lang="en-US" dirty="0"/>
-              <a:t>effectively</a:t>
-            </a:r>
-            <a:r>
-              <a:rPr lang="ru-RU" dirty="0"/>
-              <a:t>)</a:t>
-            </a:r>
-            <a:r>
-              <a:rPr lang="en-US" dirty="0"/>
-              <a:t>exactly-once. </a:t>
+              <a:t>очистка данных, повторный полный </a:t>
+            </a:r>
+            <a:r>
+              <a:rPr lang="ru-RU" dirty="0" err="1"/>
+              <a:t>снепшот</a:t>
             </a:r>
             <a:endParaRPr lang="ru-RU" dirty="0"/>
           </a:p>
           <a:p>
-            <a:r>
-              <a:rPr lang="ru-RU" dirty="0"/>
-              <a:t>Решение:</a:t>
-            </a:r>
-            <a:r>
-              <a:rPr lang="en-US" dirty="0"/>
-              <a:t> </a:t>
-            </a:r>
-            <a:r>
-              <a:rPr lang="ru-RU" dirty="0" err="1"/>
-              <a:t>дедубликация</a:t>
-            </a:r>
-            <a:r>
-              <a:rPr lang="ru-RU" dirty="0"/>
-              <a:t> по </a:t>
-            </a:r>
-            <a:r>
-              <a:rPr lang="en-US" dirty="0" err="1"/>
-              <a:t>lsn</a:t>
+            <a:pPr lvl="1"/>
+            <a:r>
+              <a:rPr lang="ru-RU" dirty="0"/>
+              <a:t>Может не подойти в случаях, когда историю все равно нужно хранить</a:t>
             </a:r>
             <a:endParaRPr lang="en-US" b="0" i="0" u="none" strike="noStrike" dirty="0">
               <a:solidFill>
@@ -8338,7 +8407,7 @@
     </p:spTree>
     <p:extLst>
       <p:ext uri="{BB962C8B-B14F-4D97-AF65-F5344CB8AC3E}">
-        <p14:creationId xmlns:p14="http://schemas.microsoft.com/office/powerpoint/2010/main" val="710608870"/>
+        <p14:creationId xmlns:p14="http://schemas.microsoft.com/office/powerpoint/2010/main" val="4209725804"/>
       </p:ext>
     </p:extLst>
   </p:cSld>
@@ -8397,7 +8466,15 @@
             </a:r>
             <a:r>
               <a:rPr lang="en-US" dirty="0"/>
-              <a:t>: before/after diff</a:t>
+              <a:t>: </a:t>
+            </a:r>
+            <a:r>
+              <a:rPr lang="ru-RU" dirty="0"/>
+              <a:t>потерянные </a:t>
+            </a:r>
+            <a:r>
+              <a:rPr lang="en-US" dirty="0"/>
+              <a:t>DELETE</a:t>
             </a:r>
           </a:p>
         </p:txBody>
@@ -8432,63 +8509,146 @@
           <a:p>
             <a:r>
               <a:rPr lang="ru-RU" dirty="0"/>
-              <a:t>Задача: нужно получить </a:t>
-            </a:r>
-            <a:r>
-              <a:rPr lang="en-US" dirty="0"/>
-              <a:t>diff </a:t>
-            </a:r>
-            <a:r>
-              <a:rPr lang="ru-RU" dirty="0"/>
-              <a:t>обновленных значений (</a:t>
-            </a:r>
-            <a:r>
-              <a:rPr lang="en-US" dirty="0"/>
-              <a:t>before &lt;-&gt; after</a:t>
-            </a:r>
-            <a:r>
-              <a:rPr lang="ru-RU" dirty="0"/>
-              <a:t>), но приходят только </a:t>
-            </a:r>
-            <a:r>
-              <a:rPr lang="en-US" dirty="0"/>
-              <a:t>after (</a:t>
-            </a:r>
-            <a:r>
-              <a:rPr lang="ru-RU" dirty="0"/>
-              <a:t>для </a:t>
-            </a:r>
-            <a:r>
-              <a:rPr lang="en-US" dirty="0"/>
-              <a:t>update/create) </a:t>
-            </a:r>
-            <a:r>
-              <a:rPr lang="ru-RU" dirty="0"/>
-              <a:t>и </a:t>
-            </a:r>
-            <a:r>
-              <a:rPr lang="en-US" dirty="0"/>
-              <a:t>before (</a:t>
-            </a:r>
-            <a:r>
-              <a:rPr lang="ru-RU" dirty="0"/>
-              <a:t>для </a:t>
-            </a:r>
-            <a:r>
-              <a:rPr lang="en-US" dirty="0"/>
-              <a:t>delete)</a:t>
+              <a:t>Контекст: из-за сбоя потеряли часть </a:t>
+            </a:r>
+            <a:r>
+              <a:rPr lang="ru-RU" dirty="0" err="1"/>
+              <a:t>эвентов</a:t>
+            </a:r>
+            <a:r>
+              <a:rPr lang="ru-RU" dirty="0"/>
+              <a:t>, среди которых были </a:t>
+            </a:r>
+            <a:r>
+              <a:rPr lang="en-US" dirty="0"/>
+              <a:t>DELETE. </a:t>
+            </a:r>
+            <a:r>
+              <a:rPr lang="ru-RU" dirty="0"/>
+              <a:t>В </a:t>
+            </a:r>
+            <a:r>
+              <a:rPr lang="ru-RU" dirty="0" err="1"/>
+              <a:t>таргете</a:t>
+            </a:r>
+            <a:r>
+              <a:rPr lang="ru-RU" dirty="0"/>
+              <a:t> теперь есть «зависшие» записи</a:t>
+            </a:r>
+          </a:p>
+          <a:p>
+            <a:r>
+              <a:rPr lang="ru-RU" dirty="0"/>
+              <a:t>Решение </a:t>
+            </a:r>
+            <a:r>
+              <a:rPr lang="en-US" dirty="0"/>
+              <a:t>#2</a:t>
+            </a:r>
+            <a:r>
+              <a:rPr lang="ru-RU" dirty="0"/>
+              <a:t>:</a:t>
+            </a:r>
+            <a:r>
+              <a:rPr lang="en-US" dirty="0"/>
+              <a:t> </a:t>
+            </a:r>
+            <a:r>
+              <a:rPr lang="ru-RU" dirty="0"/>
+              <a:t>добавить поле </a:t>
+            </a:r>
+            <a:r>
+              <a:rPr lang="en-US" dirty="0" err="1"/>
+              <a:t>epoch_id</a:t>
             </a:r>
             <a:endParaRPr lang="ru-RU" dirty="0"/>
           </a:p>
           <a:p>
-            <a:r>
-              <a:rPr lang="ru-RU" dirty="0"/>
-              <a:t>Решение:</a:t>
-            </a:r>
-            <a:r>
-              <a:rPr lang="en-US" dirty="0"/>
-              <a:t> REPLICA IDENTITY FULL</a:t>
-            </a:r>
+            <a:pPr lvl="1"/>
+            <a:r>
+              <a:rPr lang="ru-RU" dirty="0"/>
+              <a:t>По умолчанию </a:t>
+            </a:r>
+            <a:r>
+              <a:rPr lang="en-US" dirty="0" err="1"/>
+              <a:t>epoch_id</a:t>
+            </a:r>
+            <a:r>
+              <a:rPr lang="en-US" dirty="0"/>
+              <a:t> </a:t>
+            </a:r>
+            <a:r>
+              <a:rPr lang="ru-RU" dirty="0"/>
+              <a:t>для всех таблиц = 0</a:t>
+            </a:r>
+          </a:p>
+          <a:p>
+            <a:pPr lvl="1"/>
+            <a:r>
+              <a:rPr lang="ru-RU" dirty="0"/>
+              <a:t>При появлении сигналов на запуск </a:t>
+            </a:r>
+            <a:r>
+              <a:rPr lang="ru-RU" dirty="0" err="1"/>
+              <a:t>снепшота</a:t>
+            </a:r>
+            <a:r>
+              <a:rPr lang="ru-RU" dirty="0"/>
+              <a:t> по таблице, </a:t>
+            </a:r>
+            <a:r>
+              <a:rPr lang="en-US" dirty="0" err="1"/>
+              <a:t>epoch_id</a:t>
+            </a:r>
+            <a:r>
+              <a:rPr lang="en-US" dirty="0"/>
+              <a:t> </a:t>
+            </a:r>
+            <a:r>
+              <a:rPr lang="ru-RU" dirty="0"/>
+              <a:t>инкрементируется</a:t>
+            </a:r>
+          </a:p>
+          <a:p>
+            <a:pPr lvl="1"/>
+            <a:r>
+              <a:rPr lang="ru-RU" dirty="0"/>
+              <a:t>В конечном итоге в </a:t>
+            </a:r>
+            <a:r>
+              <a:rPr lang="ru-RU" dirty="0" err="1"/>
+              <a:t>таргете</a:t>
+            </a:r>
+            <a:r>
+              <a:rPr lang="ru-RU" dirty="0"/>
+              <a:t> будет несколько версий слепков с разными </a:t>
+            </a:r>
+            <a:r>
+              <a:rPr lang="en-US" dirty="0" err="1"/>
+              <a:t>epoch_id</a:t>
+            </a:r>
+            <a:r>
+              <a:rPr lang="en-US" dirty="0"/>
+              <a:t>, </a:t>
+            </a:r>
+            <a:r>
+              <a:rPr lang="ru-RU" dirty="0"/>
+              <a:t>что позволит построить </a:t>
+            </a:r>
+            <a:r>
+              <a:rPr lang="ru-RU" dirty="0" err="1"/>
+              <a:t>дифф</a:t>
+            </a:r>
+            <a:r>
+              <a:rPr lang="ru-RU" dirty="0"/>
+              <a:t> и удалить «зависшие» записи</a:t>
+            </a:r>
+            <a:endParaRPr lang="en-US" dirty="0"/>
+          </a:p>
+          <a:p>
+            <a:pPr marL="0" indent="0">
+              <a:buNone/>
+            </a:pPr>
             <a:endParaRPr lang="en-US" b="0" i="0" u="none" strike="noStrike" dirty="0">
               <a:solidFill>
                 <a:srgbClr val="1565C0"/>
@@ -8516,7 +8676,7 @@
     </p:spTree>
     <p:extLst>
       <p:ext uri="{BB962C8B-B14F-4D97-AF65-F5344CB8AC3E}">
-        <p14:creationId xmlns:p14="http://schemas.microsoft.com/office/powerpoint/2010/main" val="1754120474"/>
+        <p14:creationId xmlns:p14="http://schemas.microsoft.com/office/powerpoint/2010/main" val="3857290573"/>
       </p:ext>
     </p:extLst>
   </p:cSld>
@@ -8739,19 +8899,15 @@
             </a:r>
             <a:r>
               <a:rPr lang="en-US" dirty="0"/>
-              <a:t>: timestamp / </a:t>
-            </a:r>
-            <a:r>
-              <a:rPr lang="en-US" dirty="0" err="1"/>
-              <a:t>timestamptz</a:t>
-            </a:r>
-            <a:r>
-              <a:rPr lang="en-US" dirty="0"/>
-              <a:t> # </a:t>
-            </a:r>
-            <a:r>
-              <a:rPr lang="ru-RU" dirty="0"/>
-              <a:t>представление значений</a:t>
+              <a:t>: </a:t>
+            </a:r>
+            <a:r>
+              <a:rPr lang="ru-RU" dirty="0" err="1"/>
+              <a:t>эвенты</a:t>
+            </a:r>
+            <a:r>
+              <a:rPr lang="ru-RU" dirty="0"/>
+              <a:t> с неполным состоянием</a:t>
             </a:r>
             <a:endParaRPr lang="en-US" dirty="0"/>
           </a:p>
@@ -8787,100 +8943,62 @@
           <a:p>
             <a:r>
               <a:rPr lang="ru-RU" dirty="0"/>
-              <a:t>Контекст: нужно реплицировать таблицы с колонками типов </a:t>
-            </a:r>
-            <a:r>
-              <a:rPr lang="en-US" dirty="0"/>
-              <a:t>timestamp / </a:t>
-            </a:r>
-            <a:r>
-              <a:rPr lang="en-US" dirty="0" err="1"/>
-              <a:t>timestamptz</a:t>
+              <a:t>Контекст: реплицируется таблица с </a:t>
+            </a:r>
+            <a:r>
+              <a:rPr lang="en-US" dirty="0"/>
+              <a:t>TOAST </a:t>
+            </a:r>
+            <a:r>
+              <a:rPr lang="ru-RU" dirty="0"/>
+              <a:t>полями</a:t>
+            </a:r>
+          </a:p>
+          <a:p>
+            <a:r>
+              <a:rPr lang="ru-RU" dirty="0"/>
+              <a:t>Проблема: некоторые </a:t>
+            </a:r>
+            <a:r>
+              <a:rPr lang="ru-RU" dirty="0" err="1"/>
+              <a:t>эвенты</a:t>
+            </a:r>
+            <a:r>
+              <a:rPr lang="ru-RU" dirty="0"/>
+              <a:t> приходят только с частью заполненных колонок</a:t>
+            </a:r>
+          </a:p>
+          <a:p>
+            <a:r>
+              <a:rPr lang="ru-RU" dirty="0"/>
+              <a:t>Решения:</a:t>
+            </a:r>
+          </a:p>
+          <a:p>
+            <a:pPr lvl="1"/>
+            <a:r>
+              <a:rPr lang="en-US" dirty="0"/>
+              <a:t>REPLICA IDENTITY FULL</a:t>
+            </a:r>
+          </a:p>
+          <a:p>
+            <a:pPr lvl="1"/>
+            <a:r>
+              <a:rPr lang="ru-RU" dirty="0"/>
+              <a:t>Сделать поля частью </a:t>
+            </a:r>
+            <a:r>
+              <a:rPr lang="en-US" dirty="0"/>
+              <a:t>PK / Unique index</a:t>
             </a:r>
             <a:endParaRPr lang="ru-RU" dirty="0"/>
-          </a:p>
-          <a:p>
-            <a:r>
-              <a:rPr lang="ru-RU" dirty="0"/>
-              <a:t>Проблема </a:t>
-            </a:r>
-            <a:r>
-              <a:rPr lang="en-US" dirty="0"/>
-              <a:t>#1</a:t>
-            </a:r>
-            <a:r>
-              <a:rPr lang="ru-RU" dirty="0"/>
-              <a:t>: </a:t>
-            </a:r>
-            <a:r>
-              <a:rPr lang="en-US" dirty="0" err="1"/>
-              <a:t>debezium</a:t>
-            </a:r>
-            <a:r>
-              <a:rPr lang="en-US" dirty="0"/>
-              <a:t> </a:t>
-            </a:r>
-            <a:r>
-              <a:rPr lang="ru-RU" dirty="0"/>
-              <a:t>конвертирует один тип в </a:t>
-            </a:r>
-            <a:r>
-              <a:rPr lang="en-US" dirty="0"/>
-              <a:t>long, </a:t>
-            </a:r>
-            <a:r>
-              <a:rPr lang="ru-RU" dirty="0"/>
-              <a:t>другой в </a:t>
-            </a:r>
-            <a:r>
-              <a:rPr lang="en-US" dirty="0"/>
-              <a:t>string</a:t>
-            </a:r>
-            <a:endParaRPr lang="ru-RU" dirty="0"/>
-          </a:p>
-          <a:p>
-            <a:r>
-              <a:rPr lang="ru-RU" dirty="0"/>
-              <a:t>Решение:</a:t>
-            </a:r>
-          </a:p>
-          <a:p>
-            <a:pPr lvl="1"/>
-            <a:r>
-              <a:rPr lang="ru-RU" dirty="0"/>
-              <a:t>Трансформ для конвертации типов</a:t>
-            </a:r>
-          </a:p>
-          <a:p>
-            <a:pPr lvl="1"/>
-            <a:r>
-              <a:rPr lang="ru-RU" dirty="0"/>
-              <a:t>Указывать явно </a:t>
-            </a:r>
-            <a:r>
-              <a:rPr lang="en-US" dirty="0" err="1"/>
-              <a:t>timezone</a:t>
-            </a:r>
-            <a:r>
-              <a:rPr lang="en-US" dirty="0"/>
-              <a:t>, </a:t>
-            </a:r>
-            <a:r>
-              <a:rPr lang="ru-RU" dirty="0"/>
-              <a:t> которую нужно конвертировать </a:t>
-            </a:r>
-            <a:r>
-              <a:rPr lang="en-US" dirty="0" err="1"/>
-              <a:t>timestamptz</a:t>
-            </a:r>
-            <a:endParaRPr lang="en-US" dirty="0"/>
           </a:p>
         </p:txBody>
       </p:sp>
     </p:spTree>
     <p:extLst>
       <p:ext uri="{BB962C8B-B14F-4D97-AF65-F5344CB8AC3E}">
-        <p14:creationId xmlns:p14="http://schemas.microsoft.com/office/powerpoint/2010/main" val="281530354"/>
+        <p14:creationId xmlns:p14="http://schemas.microsoft.com/office/powerpoint/2010/main" val="3406737331"/>
       </p:ext>
     </p:extLst>
   </p:cSld>
@@ -8926,7 +9044,7 @@
         <p:spPr>
           <a:xfrm>
             <a:off x="0" y="18255"/>
-            <a:ext cx="12192000" cy="1325563"/>
+            <a:ext cx="10515600" cy="1325563"/>
           </a:xfrm>
         </p:spPr>
         <p:txBody>
@@ -8939,25 +9057,8 @@
             </a:r>
             <a:r>
               <a:rPr lang="en-US" dirty="0"/>
-              <a:t>: timestamp / </a:t>
-            </a:r>
-            <a:r>
-              <a:rPr lang="en-US" dirty="0" err="1"/>
-              <a:t>timestamptz</a:t>
-            </a:r>
-            <a:r>
-              <a:rPr lang="ru-RU" dirty="0"/>
-              <a:t> </a:t>
-            </a:r>
-            <a:r>
-              <a:rPr lang="en-US" dirty="0"/>
-              <a:t>#</a:t>
-            </a:r>
-            <a:r>
-              <a:rPr lang="ru-RU" dirty="0"/>
-              <a:t> потеря точности</a:t>
-            </a:r>
-            <a:endParaRPr lang="en-US" dirty="0"/>
+              <a:t>: before/after diff</a:t>
+            </a:r>
           </a:p>
         </p:txBody>
       </p:sp>
@@ -8991,100 +9092,91 @@
           <a:p>
             <a:r>
               <a:rPr lang="ru-RU" dirty="0"/>
-              <a:t>Контекст: нужно реплицировать таблицы с колонками типов </a:t>
-            </a:r>
-            <a:r>
-              <a:rPr lang="en-US" dirty="0"/>
-              <a:t>timestamp / </a:t>
-            </a:r>
-            <a:r>
-              <a:rPr lang="en-US" dirty="0" err="1"/>
-              <a:t>timestamptz</a:t>
+              <a:t>Задача: нужно получить </a:t>
+            </a:r>
+            <a:r>
+              <a:rPr lang="en-US" dirty="0"/>
+              <a:t>diff </a:t>
+            </a:r>
+            <a:r>
+              <a:rPr lang="ru-RU" dirty="0"/>
+              <a:t>обновленных значений (</a:t>
+            </a:r>
+            <a:r>
+              <a:rPr lang="en-US" dirty="0"/>
+              <a:t>before &lt;-&gt; after</a:t>
+            </a:r>
+            <a:r>
+              <a:rPr lang="ru-RU" dirty="0"/>
+              <a:t>), но приходят только </a:t>
+            </a:r>
+            <a:r>
+              <a:rPr lang="en-US" dirty="0"/>
+              <a:t>after (</a:t>
+            </a:r>
+            <a:r>
+              <a:rPr lang="ru-RU" dirty="0"/>
+              <a:t>для </a:t>
+            </a:r>
+            <a:r>
+              <a:rPr lang="en-US" dirty="0"/>
+              <a:t>update/create) </a:t>
+            </a:r>
+            <a:r>
+              <a:rPr lang="ru-RU" dirty="0"/>
+              <a:t>и </a:t>
+            </a:r>
+            <a:r>
+              <a:rPr lang="en-US" dirty="0"/>
+              <a:t>before (</a:t>
+            </a:r>
+            <a:r>
+              <a:rPr lang="ru-RU" dirty="0"/>
+              <a:t>для </a:t>
+            </a:r>
+            <a:r>
+              <a:rPr lang="en-US" dirty="0"/>
+              <a:t>delete)</a:t>
             </a:r>
             <a:endParaRPr lang="ru-RU" dirty="0"/>
           </a:p>
           <a:p>
             <a:r>
               <a:rPr lang="ru-RU" dirty="0"/>
-              <a:t>Проблема </a:t>
-            </a:r>
-            <a:r>
-              <a:rPr lang="en-US" dirty="0"/>
-              <a:t>#1</a:t>
-            </a:r>
-            <a:r>
-              <a:rPr lang="ru-RU" dirty="0"/>
-              <a:t>: </a:t>
-            </a:r>
-            <a:r>
-              <a:rPr lang="en-US" dirty="0" err="1"/>
-              <a:t>debezium</a:t>
-            </a:r>
-            <a:r>
-              <a:rPr lang="en-US" dirty="0"/>
-              <a:t> </a:t>
-            </a:r>
-            <a:r>
-              <a:rPr lang="ru-RU" dirty="0"/>
-              <a:t>конвертирует один тип в </a:t>
-            </a:r>
-            <a:r>
-              <a:rPr lang="en-US" dirty="0"/>
-              <a:t>long, </a:t>
-            </a:r>
-            <a:r>
-              <a:rPr lang="ru-RU" dirty="0"/>
-              <a:t>другой в </a:t>
-            </a:r>
-            <a:r>
-              <a:rPr lang="en-US" dirty="0"/>
-              <a:t>string</a:t>
-            </a:r>
+              <a:t>Решение:</a:t>
+            </a:r>
+            <a:r>
+              <a:rPr lang="en-US" dirty="0"/>
+              <a:t> REPLICA IDENTITY FULL</a:t>
+            </a:r>
+            <a:endParaRPr lang="en-US" b="0" i="0" u="none" strike="noStrike" dirty="0">
+              <a:solidFill>
+                <a:srgbClr val="1565C0"/>
+              </a:solidFill>
+              <a:effectLst/>
+              <a:latin typeface="acumin-pro"/>
+            </a:endParaRPr>
+          </a:p>
+          <a:p>
+            <a:endParaRPr lang="en-US" dirty="0">
+              <a:solidFill>
+                <a:srgbClr val="1565C0"/>
+              </a:solidFill>
+              <a:latin typeface="acumin-pro"/>
+            </a:endParaRPr>
+          </a:p>
+          <a:p>
+            <a:pPr marL="0" indent="0">
+              <a:buNone/>
+            </a:pPr>
             <a:endParaRPr lang="ru-RU" dirty="0"/>
-          </a:p>
-          <a:p>
-            <a:r>
-              <a:rPr lang="ru-RU" dirty="0"/>
-              <a:t>Решение:</a:t>
-            </a:r>
-          </a:p>
-          <a:p>
-            <a:pPr lvl="1"/>
-            <a:r>
-              <a:rPr lang="ru-RU" dirty="0"/>
-              <a:t>Трансформ для конвертации типов</a:t>
-            </a:r>
-          </a:p>
-          <a:p>
-            <a:pPr lvl="1"/>
-            <a:r>
-              <a:rPr lang="ru-RU" dirty="0"/>
-              <a:t>Указывать явно </a:t>
-            </a:r>
-            <a:r>
-              <a:rPr lang="en-US" dirty="0" err="1"/>
-              <a:t>timezone</a:t>
-            </a:r>
-            <a:r>
-              <a:rPr lang="en-US" dirty="0"/>
-              <a:t>, </a:t>
-            </a:r>
-            <a:r>
-              <a:rPr lang="ru-RU" dirty="0"/>
-              <a:t> которую нужно конвертировать </a:t>
-            </a:r>
-            <a:r>
-              <a:rPr lang="en-US" dirty="0" err="1"/>
-              <a:t>timestamptz</a:t>
-            </a:r>
-            <a:endParaRPr lang="en-US" dirty="0"/>
           </a:p>
         </p:txBody>
       </p:sp>
     </p:spTree>
     <p:extLst>
       <p:ext uri="{BB962C8B-B14F-4D97-AF65-F5344CB8AC3E}">
-        <p14:creationId xmlns:p14="http://schemas.microsoft.com/office/powerpoint/2010/main" val="1481861357"/>
+        <p14:creationId xmlns:p14="http://schemas.microsoft.com/office/powerpoint/2010/main" val="1754120474"/>
       </p:ext>
     </p:extLst>
   </p:cSld>
@@ -9138,8 +9230,24 @@
           <a:lstStyle/>
           <a:p>
             <a:r>
-              <a:rPr lang="ru-RU" dirty="0"/>
-              <a:t>Выводы</a:t>
+              <a:rPr lang="en-US" dirty="0" err="1"/>
+              <a:t>Debezium</a:t>
+            </a:r>
+            <a:r>
+              <a:rPr lang="en-US" dirty="0"/>
+              <a:t>: timestamp / </a:t>
+            </a:r>
+            <a:r>
+              <a:rPr lang="en-US" dirty="0" err="1"/>
+              <a:t>timestamptz</a:t>
+            </a:r>
+            <a:r>
+              <a:rPr lang="en-US" dirty="0"/>
+              <a:t> # </a:t>
+            </a:r>
+            <a:r>
+              <a:rPr lang="ru-RU" dirty="0"/>
+              <a:t>представление значений</a:t>
             </a:r>
             <a:endParaRPr lang="en-US" dirty="0"/>
           </a:p>
@@ -9169,56 +9277,157 @@
         </p:spPr>
         <p:txBody>
           <a:bodyPr>
-            <a:normAutofit lnSpcReduction="10000"/>
+            <a:normAutofit/>
           </a:bodyPr>
           <a:lstStyle/>
           <a:p>
             <a:r>
               <a:rPr lang="ru-RU" dirty="0"/>
-              <a:t>Одну и ту же задачу можно решать разными способами</a:t>
-            </a:r>
-          </a:p>
-          <a:p>
-            <a:r>
-              <a:rPr lang="ru-RU" dirty="0"/>
-              <a:t>Каждый способ имеет право на жизнь и выбор конкретного решения зависит от таких факторов, как например:</a:t>
+              <a:t>Контекст: нужно реплицировать таблицы с колонками типов </a:t>
+            </a:r>
+            <a:r>
+              <a:rPr lang="en-US" dirty="0"/>
+              <a:t>timestamp / </a:t>
+            </a:r>
+            <a:r>
+              <a:rPr lang="en-US" dirty="0" err="1"/>
+              <a:t>timestamptz</a:t>
+            </a:r>
+            <a:endParaRPr lang="ru-RU" dirty="0"/>
+          </a:p>
+          <a:p>
+            <a:r>
+              <a:rPr lang="ru-RU" dirty="0"/>
+              <a:t>Проблема </a:t>
+            </a:r>
+            <a:r>
+              <a:rPr lang="en-US" dirty="0"/>
+              <a:t>#1</a:t>
+            </a:r>
+            <a:r>
+              <a:rPr lang="ru-RU" dirty="0"/>
+              <a:t>: </a:t>
+            </a:r>
+            <a:r>
+              <a:rPr lang="en-US" dirty="0" err="1"/>
+              <a:t>debezium</a:t>
+            </a:r>
+            <a:r>
+              <a:rPr lang="en-US" dirty="0"/>
+              <a:t> </a:t>
+            </a:r>
+            <a:r>
+              <a:rPr lang="ru-RU" dirty="0"/>
+              <a:t>конвертирует один тип в </a:t>
+            </a:r>
+            <a:r>
+              <a:rPr lang="en-US" dirty="0"/>
+              <a:t>long, </a:t>
+            </a:r>
+            <a:r>
+              <a:rPr lang="ru-RU" dirty="0"/>
+              <a:t>другой в </a:t>
+            </a:r>
+            <a:r>
+              <a:rPr lang="en-US" dirty="0"/>
+              <a:t>string</a:t>
+            </a:r>
+            <a:endParaRPr lang="ru-RU" dirty="0"/>
+          </a:p>
+          <a:p>
+            <a:r>
+              <a:rPr lang="ru-RU" dirty="0"/>
+              <a:t>Решение:</a:t>
             </a:r>
           </a:p>
           <a:p>
             <a:pPr lvl="1"/>
             <a:r>
               <a:rPr lang="ru-RU" dirty="0"/>
-              <a:t>Стоимость разработки</a:t>
+              <a:t>Трансформ для конвертации типов</a:t>
             </a:r>
           </a:p>
           <a:p>
             <a:pPr lvl="1"/>
             <a:r>
               <a:rPr lang="ru-RU" dirty="0"/>
-              <a:t>Влияние на процессы владельцев БД</a:t>
-            </a:r>
-          </a:p>
-          <a:p>
-            <a:pPr lvl="1"/>
-            <a:r>
-              <a:rPr lang="ru-RU" dirty="0"/>
-              <a:t>Влияние на БД</a:t>
-            </a:r>
-          </a:p>
-          <a:p>
-            <a:pPr lvl="1"/>
-            <a:r>
-              <a:rPr lang="ru-RU" dirty="0"/>
-              <a:t>Возможность адаптироваться под новые требования</a:t>
-            </a:r>
-          </a:p>
-          <a:p>
-            <a:pPr lvl="1"/>
-            <a:r>
-              <a:rPr lang="ru-RU" dirty="0"/>
-              <a:t>Гарантии доставки</a:t>
-            </a:r>
-          </a:p>
+              <a:t>Указывать явно </a:t>
+            </a:r>
+            <a:r>
+              <a:rPr lang="en-US" dirty="0" err="1"/>
+              <a:t>timezone</a:t>
+            </a:r>
+            <a:r>
+              <a:rPr lang="en-US" dirty="0"/>
+              <a:t>, </a:t>
+            </a:r>
+            <a:r>
+              <a:rPr lang="ru-RU" dirty="0"/>
+              <a:t> в которую нужно конвертировать </a:t>
+            </a:r>
+            <a:r>
+              <a:rPr lang="en-US" dirty="0" err="1"/>
+              <a:t>timestamptz</a:t>
+            </a:r>
+            <a:endParaRPr lang="en-US" dirty="0"/>
+          </a:p>
+        </p:txBody>
+      </p:sp>
+    </p:spTree>
+    <p:extLst>
+      <p:ext uri="{BB962C8B-B14F-4D97-AF65-F5344CB8AC3E}">
+        <p14:creationId xmlns:p14="http://schemas.microsoft.com/office/powerpoint/2010/main" val="281530354"/>
+      </p:ext>
+    </p:extLst>
+  </p:cSld>
+  <p:clrMapOvr>
+    <a:masterClrMapping/>
+  </p:clrMapOvr>
+</p:sld>
+</file>
+
+<file path=ppt/slides/slide43.xml><?xml version="1.0" encoding="utf-8"?>
+<p:sld xmlns:a="http://schemas.openxmlformats.org/drawingml/2006/main" xmlns:r="http://schemas.openxmlformats.org/officeDocument/2006/relationships" xmlns:p="http://schemas.openxmlformats.org/presentationml/2006/main">
+  <p:cSld>
+    <p:spTree>
+      <p:nvGrpSpPr>
+        <p:cNvPr id="1" name=""/>
+        <p:cNvGrpSpPr/>
+        <p:nvPr/>
+      </p:nvGrpSpPr>
+      <p:grpSpPr>
+        <a:xfrm>
+          <a:off x="0" y="0"/>
+          <a:ext cx="0" cy="0"/>
+          <a:chOff x="0" y="0"/>
+          <a:chExt cx="0" cy="0"/>
+        </a:xfrm>
+      </p:grpSpPr>
+      <p:sp>
+        <p:nvSpPr>
+          <p:cNvPr id="2" name="Title 1">
+            <a:extLst>
+              <a:ext uri="{FF2B5EF4-FFF2-40B4-BE49-F238E27FC236}">
+                <a16:creationId xmlns:a16="http://schemas.microsoft.com/office/drawing/2014/main" id="{00888323-12E8-8C4F-8E27-23BD5B7DEE03}"/>
+              </a:ext>
+            </a:extLst>
+          </p:cNvPr>
+          <p:cNvSpPr>
+            <a:spLocks noGrp="1"/>
+          </p:cNvSpPr>
+          <p:nvPr>
+            <p:ph type="title"/>
+          </p:nvPr>
+        </p:nvSpPr>
+        <p:spPr>
+          <a:xfrm>
+            <a:off x="0" y="18255"/>
+            <a:ext cx="12192000" cy="1325563"/>
+          </a:xfrm>
+        </p:spPr>
+        <p:txBody>
+          <a:bodyPr/>
+          <a:lstStyle/>
           <a:p>
             <a:r>
               <a:rPr lang="en-US" dirty="0" err="1"/>
@@ -9226,12 +9435,455 @@
             </a:r>
             <a:r>
               <a:rPr lang="en-US" dirty="0"/>
+              <a:t>: timestamp / </a:t>
+            </a:r>
+            <a:r>
+              <a:rPr lang="en-US" dirty="0" err="1"/>
+              <a:t>timestamptz</a:t>
+            </a:r>
+            <a:r>
+              <a:rPr lang="ru-RU" dirty="0"/>
               <a:t> </a:t>
             </a:r>
             <a:r>
+              <a:rPr lang="en-US" dirty="0"/>
+              <a:t>#</a:t>
+            </a:r>
+            <a:r>
+              <a:rPr lang="ru-RU" dirty="0"/>
+              <a:t> потеря точности</a:t>
+            </a:r>
+            <a:endParaRPr lang="en-US" dirty="0"/>
+          </a:p>
+        </p:txBody>
+      </p:sp>
+      <p:sp>
+        <p:nvSpPr>
+          <p:cNvPr id="3" name="Content Placeholder 2">
+            <a:extLst>
+              <a:ext uri="{FF2B5EF4-FFF2-40B4-BE49-F238E27FC236}">
+                <a16:creationId xmlns:a16="http://schemas.microsoft.com/office/drawing/2014/main" id="{DA11F9D3-C291-2245-AEA5-8D09537FB4E5}"/>
+              </a:ext>
+            </a:extLst>
+          </p:cNvPr>
+          <p:cNvSpPr>
+            <a:spLocks noGrp="1"/>
+          </p:cNvSpPr>
+          <p:nvPr>
+            <p:ph idx="1"/>
+          </p:nvPr>
+        </p:nvSpPr>
+        <p:spPr>
+          <a:xfrm>
+            <a:off x="0" y="1343818"/>
+            <a:ext cx="10515600" cy="4351338"/>
+          </a:xfrm>
+        </p:spPr>
+        <p:txBody>
+          <a:bodyPr>
+            <a:normAutofit/>
+          </a:bodyPr>
+          <a:lstStyle/>
+          <a:p>
+            <a:r>
+              <a:rPr lang="ru-RU" dirty="0"/>
+              <a:t>Контекст: нужно реплицировать таблицы с колонками типов </a:t>
+            </a:r>
+            <a:r>
+              <a:rPr lang="en-US" dirty="0"/>
+              <a:t>timestamp / </a:t>
+            </a:r>
+            <a:r>
+              <a:rPr lang="en-US" dirty="0" err="1"/>
+              <a:t>timestamptz</a:t>
+            </a:r>
+            <a:endParaRPr lang="ru-RU" dirty="0"/>
+          </a:p>
+          <a:p>
+            <a:r>
+              <a:rPr lang="ru-RU" dirty="0"/>
+              <a:t>Проблема </a:t>
+            </a:r>
+            <a:r>
+              <a:rPr lang="en-US" dirty="0"/>
+              <a:t>#2</a:t>
+            </a:r>
+            <a:r>
+              <a:rPr lang="ru-RU" dirty="0"/>
+              <a:t>: </a:t>
+            </a:r>
+            <a:r>
+              <a:rPr lang="en-US" dirty="0" err="1"/>
+              <a:t>debezium</a:t>
+            </a:r>
+            <a:r>
+              <a:rPr lang="en-US" dirty="0"/>
+              <a:t> </a:t>
+            </a:r>
+            <a:r>
+              <a:rPr lang="ru-RU" dirty="0"/>
+              <a:t>теряет </a:t>
+            </a:r>
+            <a:r>
+              <a:rPr lang="ru-RU" dirty="0" err="1"/>
+              <a:t>милли</a:t>
+            </a:r>
+            <a:r>
+              <a:rPr lang="ru-RU" dirty="0"/>
+              <a:t>/микро/нано-секунды</a:t>
+            </a:r>
+          </a:p>
+          <a:p>
+            <a:r>
+              <a:rPr lang="ru-RU" dirty="0"/>
+              <a:t>Решение:</a:t>
+            </a:r>
+          </a:p>
+          <a:p>
+            <a:pPr lvl="1"/>
+            <a:r>
+              <a:rPr lang="ru-RU" dirty="0"/>
+              <a:t>Установить </a:t>
+            </a:r>
+            <a:r>
+              <a:rPr lang="en-US" b="0" i="0" u="sng" dirty="0" err="1">
+                <a:solidFill>
+                  <a:srgbClr val="333333"/>
+                </a:solidFill>
+                <a:effectLst/>
+                <a:latin typeface="Roboto Mono" pitchFamily="49" charset="0"/>
+              </a:rPr>
+              <a:t>time.precision.mode</a:t>
+            </a:r>
+            <a:r>
+              <a:rPr lang="ru-RU" dirty="0">
+                <a:solidFill>
+                  <a:srgbClr val="333333"/>
+                </a:solidFill>
+                <a:latin typeface="Roboto Mono" pitchFamily="49" charset="0"/>
+              </a:rPr>
+              <a:t> </a:t>
+            </a:r>
+            <a:endParaRPr lang="en-US" dirty="0">
+              <a:solidFill>
+                <a:srgbClr val="333333"/>
+              </a:solidFill>
+              <a:latin typeface="Roboto Mono" pitchFamily="49" charset="0"/>
+            </a:endParaRPr>
+          </a:p>
+          <a:p>
+            <a:pPr lvl="1"/>
+            <a:r>
+              <a:rPr lang="en-US" dirty="0" err="1"/>
+              <a:t>time.precision.mode</a:t>
+            </a:r>
+            <a:r>
+              <a:rPr lang="en-US" dirty="0"/>
+              <a:t>=nanoseconds </a:t>
+            </a:r>
+            <a:r>
+              <a:rPr lang="ru-RU" dirty="0"/>
+              <a:t>доступен с версии </a:t>
+            </a:r>
+            <a:r>
+              <a:rPr lang="en-US" dirty="0"/>
+              <a:t>3.1</a:t>
+            </a:r>
+            <a:endParaRPr lang="ru-RU" dirty="0"/>
+          </a:p>
+        </p:txBody>
+      </p:sp>
+    </p:spTree>
+    <p:extLst>
+      <p:ext uri="{BB962C8B-B14F-4D97-AF65-F5344CB8AC3E}">
+        <p14:creationId xmlns:p14="http://schemas.microsoft.com/office/powerpoint/2010/main" val="1481861357"/>
+      </p:ext>
+    </p:extLst>
+  </p:cSld>
+  <p:clrMapOvr>
+    <a:masterClrMapping/>
+  </p:clrMapOvr>
+</p:sld>
+</file>
+
+<file path=ppt/slides/slide44.xml><?xml version="1.0" encoding="utf-8"?>
+<p:sld xmlns:a="http://schemas.openxmlformats.org/drawingml/2006/main" xmlns:r="http://schemas.openxmlformats.org/officeDocument/2006/relationships" xmlns:p="http://schemas.openxmlformats.org/presentationml/2006/main">
+  <p:cSld>
+    <p:spTree>
+      <p:nvGrpSpPr>
+        <p:cNvPr id="1" name=""/>
+        <p:cNvGrpSpPr/>
+        <p:nvPr/>
+      </p:nvGrpSpPr>
+      <p:grpSpPr>
+        <a:xfrm>
+          <a:off x="0" y="0"/>
+          <a:ext cx="0" cy="0"/>
+          <a:chOff x="0" y="0"/>
+          <a:chExt cx="0" cy="0"/>
+        </a:xfrm>
+      </p:grpSpPr>
+      <p:sp>
+        <p:nvSpPr>
+          <p:cNvPr id="2" name="Title 1">
+            <a:extLst>
+              <a:ext uri="{FF2B5EF4-FFF2-40B4-BE49-F238E27FC236}">
+                <a16:creationId xmlns:a16="http://schemas.microsoft.com/office/drawing/2014/main" id="{00888323-12E8-8C4F-8E27-23BD5B7DEE03}"/>
+              </a:ext>
+            </a:extLst>
+          </p:cNvPr>
+          <p:cNvSpPr>
+            <a:spLocks noGrp="1"/>
+          </p:cNvSpPr>
+          <p:nvPr>
+            <p:ph type="title"/>
+          </p:nvPr>
+        </p:nvSpPr>
+        <p:spPr>
+          <a:xfrm>
+            <a:off x="0" y="18255"/>
+            <a:ext cx="12192000" cy="1325563"/>
+          </a:xfrm>
+        </p:spPr>
+        <p:txBody>
+          <a:bodyPr/>
+          <a:lstStyle/>
+          <a:p>
+            <a:r>
+              <a:rPr lang="en-US" dirty="0" err="1"/>
+              <a:t>Debezium</a:t>
+            </a:r>
+            <a:r>
+              <a:rPr lang="en-US" dirty="0"/>
+              <a:t>: </a:t>
+            </a:r>
+            <a:r>
+              <a:rPr lang="ru-RU" dirty="0"/>
+              <a:t>мониторинг</a:t>
+            </a:r>
+            <a:endParaRPr lang="en-US" dirty="0"/>
+          </a:p>
+        </p:txBody>
+      </p:sp>
+      <p:sp>
+        <p:nvSpPr>
+          <p:cNvPr id="3" name="Content Placeholder 2">
+            <a:extLst>
+              <a:ext uri="{FF2B5EF4-FFF2-40B4-BE49-F238E27FC236}">
+                <a16:creationId xmlns:a16="http://schemas.microsoft.com/office/drawing/2014/main" id="{DA11F9D3-C291-2245-AEA5-8D09537FB4E5}"/>
+              </a:ext>
+            </a:extLst>
+          </p:cNvPr>
+          <p:cNvSpPr>
+            <a:spLocks noGrp="1"/>
+          </p:cNvSpPr>
+          <p:nvPr>
+            <p:ph idx="1"/>
+          </p:nvPr>
+        </p:nvSpPr>
+        <p:spPr>
+          <a:xfrm>
+            <a:off x="0" y="1343818"/>
+            <a:ext cx="10515600" cy="4351338"/>
+          </a:xfrm>
+        </p:spPr>
+        <p:txBody>
+          <a:bodyPr>
+            <a:normAutofit/>
+          </a:bodyPr>
+          <a:lstStyle/>
+          <a:p>
+            <a:r>
+              <a:rPr lang="ru-RU" dirty="0"/>
+              <a:t>Задача: нужно </a:t>
+            </a:r>
+            <a:r>
+              <a:rPr lang="ru-RU" dirty="0" err="1"/>
+              <a:t>мониторить</a:t>
+            </a:r>
+            <a:r>
+              <a:rPr lang="ru-RU" dirty="0"/>
+              <a:t> состояние репликации</a:t>
+            </a:r>
+          </a:p>
+          <a:p>
+            <a:r>
+              <a:rPr lang="ru-RU" dirty="0"/>
+              <a:t>Решение: в минимальной комплектации достаточно одной метрики – лаг слота</a:t>
+            </a:r>
+          </a:p>
+        </p:txBody>
+      </p:sp>
+    </p:spTree>
+    <p:extLst>
+      <p:ext uri="{BB962C8B-B14F-4D97-AF65-F5344CB8AC3E}">
+        <p14:creationId xmlns:p14="http://schemas.microsoft.com/office/powerpoint/2010/main" val="1448291743"/>
+      </p:ext>
+    </p:extLst>
+  </p:cSld>
+  <p:clrMapOvr>
+    <a:masterClrMapping/>
+  </p:clrMapOvr>
+</p:sld>
+</file>
+
+<file path=ppt/slides/slide45.xml><?xml version="1.0" encoding="utf-8"?>
+<p:sld xmlns:a="http://schemas.openxmlformats.org/drawingml/2006/main" xmlns:r="http://schemas.openxmlformats.org/officeDocument/2006/relationships" xmlns:p="http://schemas.openxmlformats.org/presentationml/2006/main">
+  <p:cSld>
+    <p:spTree>
+      <p:nvGrpSpPr>
+        <p:cNvPr id="1" name=""/>
+        <p:cNvGrpSpPr/>
+        <p:nvPr/>
+      </p:nvGrpSpPr>
+      <p:grpSpPr>
+        <a:xfrm>
+          <a:off x="0" y="0"/>
+          <a:ext cx="0" cy="0"/>
+          <a:chOff x="0" y="0"/>
+          <a:chExt cx="0" cy="0"/>
+        </a:xfrm>
+      </p:grpSpPr>
+      <p:sp>
+        <p:nvSpPr>
+          <p:cNvPr id="2" name="Title 1">
+            <a:extLst>
+              <a:ext uri="{FF2B5EF4-FFF2-40B4-BE49-F238E27FC236}">
+                <a16:creationId xmlns:a16="http://schemas.microsoft.com/office/drawing/2014/main" id="{00888323-12E8-8C4F-8E27-23BD5B7DEE03}"/>
+              </a:ext>
+            </a:extLst>
+          </p:cNvPr>
+          <p:cNvSpPr>
+            <a:spLocks noGrp="1"/>
+          </p:cNvSpPr>
+          <p:nvPr>
+            <p:ph type="title"/>
+          </p:nvPr>
+        </p:nvSpPr>
+        <p:spPr>
+          <a:xfrm>
+            <a:off x="0" y="18255"/>
+            <a:ext cx="10515600" cy="1325563"/>
+          </a:xfrm>
+        </p:spPr>
+        <p:txBody>
+          <a:bodyPr/>
+          <a:lstStyle/>
+          <a:p>
+            <a:r>
+              <a:rPr lang="ru-RU" dirty="0"/>
+              <a:t>Выводы</a:t>
+            </a:r>
+            <a:endParaRPr lang="en-US" dirty="0"/>
+          </a:p>
+        </p:txBody>
+      </p:sp>
+      <p:sp>
+        <p:nvSpPr>
+          <p:cNvPr id="3" name="Content Placeholder 2">
+            <a:extLst>
+              <a:ext uri="{FF2B5EF4-FFF2-40B4-BE49-F238E27FC236}">
+                <a16:creationId xmlns:a16="http://schemas.microsoft.com/office/drawing/2014/main" id="{DA11F9D3-C291-2245-AEA5-8D09537FB4E5}"/>
+              </a:ext>
+            </a:extLst>
+          </p:cNvPr>
+          <p:cNvSpPr>
+            <a:spLocks noGrp="1"/>
+          </p:cNvSpPr>
+          <p:nvPr>
+            <p:ph idx="1"/>
+          </p:nvPr>
+        </p:nvSpPr>
+        <p:spPr>
+          <a:xfrm>
+            <a:off x="0" y="1343818"/>
+            <a:ext cx="10515600" cy="4351338"/>
+          </a:xfrm>
+        </p:spPr>
+        <p:txBody>
+          <a:bodyPr>
+            <a:normAutofit fontScale="85000" lnSpcReduction="20000"/>
+          </a:bodyPr>
+          <a:lstStyle/>
+          <a:p>
+            <a:r>
+              <a:rPr lang="ru-RU" dirty="0"/>
+              <a:t>Одну и ту же задачу можно решать разными способами</a:t>
+            </a:r>
+          </a:p>
+          <a:p>
+            <a:r>
+              <a:rPr lang="ru-RU" dirty="0"/>
+              <a:t>Каждый способ имеет право на жизнь и выбор конкретного решения зависит от таких факторов, как например:</a:t>
+            </a:r>
+          </a:p>
+          <a:p>
+            <a:pPr lvl="1"/>
+            <a:r>
+              <a:rPr lang="ru-RU" dirty="0"/>
+              <a:t>Стоимость разработки</a:t>
+            </a:r>
+          </a:p>
+          <a:p>
+            <a:pPr lvl="1"/>
+            <a:r>
+              <a:rPr lang="ru-RU" dirty="0"/>
+              <a:t>Влияние на процессы владельцев БД</a:t>
+            </a:r>
+          </a:p>
+          <a:p>
+            <a:pPr lvl="1"/>
+            <a:r>
+              <a:rPr lang="ru-RU" dirty="0"/>
+              <a:t>Влияние на БД</a:t>
+            </a:r>
+          </a:p>
+          <a:p>
+            <a:pPr lvl="1"/>
+            <a:r>
+              <a:rPr lang="ru-RU" dirty="0"/>
+              <a:t>Возможность адаптироваться под новые требования</a:t>
+            </a:r>
+          </a:p>
+          <a:p>
+            <a:pPr lvl="1"/>
+            <a:r>
+              <a:rPr lang="ru-RU" dirty="0"/>
+              <a:t>Гарантии доставки</a:t>
+            </a:r>
+          </a:p>
+          <a:p>
+            <a:r>
+              <a:rPr lang="en-US" dirty="0" err="1"/>
+              <a:t>Debezium</a:t>
+            </a:r>
+            <a:r>
+              <a:rPr lang="en-US" dirty="0"/>
+              <a:t> </a:t>
+            </a:r>
+            <a:r>
               <a:rPr lang="ru-RU" dirty="0"/>
               <a:t>может показаться «готовым» решением, но для некоторых задач может оказаться проще использовать другой подход</a:t>
             </a:r>
+          </a:p>
+          <a:p>
+            <a:r>
+              <a:rPr lang="ru-RU" dirty="0"/>
+              <a:t>Технически любая из описанных проблем решается. Сложности в большинстве случаев будут в процесс взаимодействия между</a:t>
+            </a:r>
+            <a:r>
+              <a:rPr lang="en-US" dirty="0"/>
+              <a:t> </a:t>
+            </a:r>
+            <a:r>
+              <a:rPr lang="ru-RU" dirty="0"/>
+              <a:t>командами, отвечающими за </a:t>
+            </a:r>
+            <a:r>
+              <a:rPr lang="en-US" dirty="0"/>
+              <a:t>DB &lt;-&gt; CDC &lt;-&gt; Target</a:t>
+            </a:r>
+            <a:endParaRPr lang="ru-RU" dirty="0"/>
           </a:p>
         </p:txBody>
       </p:sp>

</xml_diff>